<commit_message>
Add seminar presentation and example code of Chapter 3, 4.
</commit_message>
<xml_diff>
--- a/Swift세미나자료.pptx
+++ b/Swift세미나자료.pptx
@@ -16,6 +16,14 @@
     <p:sldId id="264" r:id="rId10"/>
     <p:sldId id="265" r:id="rId11"/>
     <p:sldId id="266" r:id="rId12"/>
+    <p:sldId id="267" r:id="rId13"/>
+    <p:sldId id="269" r:id="rId14"/>
+    <p:sldId id="270" r:id="rId15"/>
+    <p:sldId id="271" r:id="rId16"/>
+    <p:sldId id="268" r:id="rId17"/>
+    <p:sldId id="272" r:id="rId18"/>
+    <p:sldId id="273" r:id="rId19"/>
+    <p:sldId id="274" r:id="rId20"/>
   </p:sldIdLst>
   <p:sldSz cx="9144000" cy="6858000" type="screen4x3"/>
   <p:notesSz cx="6858000" cy="9144000"/>
@@ -114,6 +122,22 @@
       </a:defRPr>
     </a:lvl9pPr>
   </p:defaultTextStyle>
+  <p:extLst>
+    <p:ext uri="{EFAFB233-063F-42B5-8137-9DF3F51BA10A}">
+      <p15:sldGuideLst xmlns:p15="http://schemas.microsoft.com/office/powerpoint/2012/main">
+        <p15:guide id="1" orient="horz" pos="2160">
+          <p15:clr>
+            <a:srgbClr val="A4A3A4"/>
+          </p15:clr>
+        </p15:guide>
+        <p15:guide id="2" pos="2880">
+          <p15:clr>
+            <a:srgbClr val="A4A3A4"/>
+          </p15:clr>
+        </p15:guide>
+      </p15:sldGuideLst>
+    </p:ext>
+  </p:extLst>
 </p:presentation>
 </file>
 
@@ -147,9 +171,7 @@
         <p:spPr/>
         <p:txBody>
           <a:bodyPr/>
-          <a:lstStyle>
-            <a:extLst/>
-          </a:lstStyle>
+          <a:lstStyle/>
           <a:p>
             <a:fld id="{7BD332C6-334E-4F1C-B658-24FEC90472A2}" type="datetimeFigureOut">
               <a:rPr lang="ko-KR" altLang="en-US" smtClean="0"/>
@@ -172,9 +194,7 @@
         <p:spPr/>
         <p:txBody>
           <a:bodyPr/>
-          <a:lstStyle>
-            <a:extLst/>
-          </a:lstStyle>
+          <a:lstStyle/>
           <a:p>
             <a:endParaRPr lang="ko-KR" altLang="en-US"/>
           </a:p>
@@ -193,9 +213,7 @@
         <p:spPr/>
         <p:txBody>
           <a:bodyPr/>
-          <a:lstStyle>
-            <a:extLst/>
-          </a:lstStyle>
+          <a:lstStyle/>
           <a:p>
             <a:fld id="{7883653F-12CF-49FA-8FD2-298086A20844}" type="slidenum">
               <a:rPr lang="ko-KR" altLang="en-US" smtClean="0"/>
@@ -246,9 +264,7 @@
         </p:style>
         <p:txBody>
           <a:bodyPr anchor="ctr"/>
-          <a:lstStyle>
-            <a:extLst/>
-          </a:lstStyle>
+          <a:lstStyle/>
           <a:p>
             <a:pPr algn="ctr" eaLnBrk="1" latinLnBrk="0" hangingPunct="1"/>
             <a:endParaRPr kumimoji="0" lang="en-US"/>
@@ -294,9 +310,7 @@
         </p:style>
         <p:txBody>
           <a:bodyPr anchor="ctr"/>
-          <a:lstStyle>
-            <a:extLst/>
-          </a:lstStyle>
+          <a:lstStyle/>
           <a:p>
             <a:pPr algn="ctr" eaLnBrk="1" latinLnBrk="0" hangingPunct="1"/>
             <a:endParaRPr kumimoji="0" lang="en-US" dirty="0"/>
@@ -342,9 +356,7 @@
         </p:style>
         <p:txBody>
           <a:bodyPr anchor="ctr"/>
-          <a:lstStyle>
-            <a:extLst/>
-          </a:lstStyle>
+          <a:lstStyle/>
           <a:p>
             <a:pPr algn="ctr" eaLnBrk="1" latinLnBrk="0" hangingPunct="1"/>
             <a:endParaRPr kumimoji="0" lang="en-US" dirty="0"/>
@@ -390,9 +402,7 @@
         </p:style>
         <p:txBody>
           <a:bodyPr anchor="ctr"/>
-          <a:lstStyle>
-            <a:extLst/>
-          </a:lstStyle>
+          <a:lstStyle/>
           <a:p>
             <a:pPr algn="ctr" eaLnBrk="1" latinLnBrk="0" hangingPunct="1"/>
             <a:endParaRPr kumimoji="0" lang="en-US"/>
@@ -438,9 +448,7 @@
         </p:style>
         <p:txBody>
           <a:bodyPr anchor="ctr"/>
-          <a:lstStyle>
-            <a:extLst/>
-          </a:lstStyle>
+          <a:lstStyle/>
           <a:p>
             <a:pPr algn="ctr" eaLnBrk="1" latinLnBrk="0" hangingPunct="1"/>
             <a:endParaRPr kumimoji="0" lang="en-US" dirty="0"/>
@@ -590,9 +598,7 @@
         </p:style>
         <p:txBody>
           <a:bodyPr anchor="ctr"/>
-          <a:lstStyle>
-            <a:extLst/>
-          </a:lstStyle>
+          <a:lstStyle/>
           <a:p>
             <a:pPr algn="ctr" eaLnBrk="1" latinLnBrk="0" hangingPunct="1"/>
             <a:endParaRPr kumimoji="0" lang="en-US"/>
@@ -640,9 +646,7 @@
         </p:style>
         <p:txBody>
           <a:bodyPr anchor="ctr"/>
-          <a:lstStyle>
-            <a:extLst/>
-          </a:lstStyle>
+          <a:lstStyle/>
           <a:p>
             <a:pPr algn="ctr" eaLnBrk="1" latinLnBrk="0" hangingPunct="1"/>
             <a:endParaRPr kumimoji="0" lang="en-US"/>
@@ -688,9 +692,7 @@
         </p:style>
         <p:txBody>
           <a:bodyPr anchor="ctr"/>
-          <a:lstStyle>
-            <a:extLst/>
-          </a:lstStyle>
+          <a:lstStyle/>
           <a:p>
             <a:pPr algn="ctr" eaLnBrk="1" latinLnBrk="0" hangingPunct="1"/>
             <a:endParaRPr kumimoji="0" lang="en-US"/>
@@ -738,9 +740,7 @@
         </p:style>
         <p:txBody>
           <a:bodyPr anchor="ctr"/>
-          <a:lstStyle>
-            <a:extLst/>
-          </a:lstStyle>
+          <a:lstStyle/>
           <a:p>
             <a:pPr algn="ctr" eaLnBrk="1" latinLnBrk="0" hangingPunct="1"/>
             <a:endParaRPr kumimoji="0" lang="en-US" dirty="0"/>
@@ -752,6 +752,13 @@
   <p:clrMapOvr>
     <a:masterClrMapping/>
   </p:clrMapOvr>
+  <p:timing>
+    <p:tnLst>
+      <p:par>
+        <p:cTn id="1" dur="indefinite" restart="never" nodeType="tmRoot"/>
+      </p:par>
+    </p:tnLst>
+  </p:timing>
 </p:sldLayout>
 </file>
 
@@ -785,9 +792,7 @@
         <p:spPr/>
         <p:txBody>
           <a:bodyPr/>
-          <a:lstStyle>
-            <a:extLst/>
-          </a:lstStyle>
+          <a:lstStyle/>
           <a:p>
             <a:r>
               <a:rPr kumimoji="0" lang="ko-KR" altLang="en-US" smtClean="0"/>
@@ -810,9 +815,7 @@
         <p:spPr/>
         <p:txBody>
           <a:bodyPr vert="eaVert"/>
-          <a:lstStyle>
-            <a:extLst/>
-          </a:lstStyle>
+          <a:lstStyle/>
           <a:p>
             <a:pPr lvl="0" eaLnBrk="1" latinLnBrk="0" hangingPunct="1"/>
             <a:r>
@@ -864,9 +867,7 @@
         <p:spPr/>
         <p:txBody>
           <a:bodyPr/>
-          <a:lstStyle>
-            <a:extLst/>
-          </a:lstStyle>
+          <a:lstStyle/>
           <a:p>
             <a:fld id="{7BD332C6-334E-4F1C-B658-24FEC90472A2}" type="datetimeFigureOut">
               <a:rPr lang="ko-KR" altLang="en-US" smtClean="0"/>
@@ -889,9 +890,7 @@
         <p:spPr/>
         <p:txBody>
           <a:bodyPr/>
-          <a:lstStyle>
-            <a:extLst/>
-          </a:lstStyle>
+          <a:lstStyle/>
           <a:p>
             <a:endParaRPr lang="ko-KR" altLang="en-US"/>
           </a:p>
@@ -910,9 +909,7 @@
         <p:spPr/>
         <p:txBody>
           <a:bodyPr/>
-          <a:lstStyle>
-            <a:extLst/>
-          </a:lstStyle>
+          <a:lstStyle/>
           <a:p>
             <a:fld id="{7883653F-12CF-49FA-8FD2-298086A20844}" type="slidenum">
               <a:rPr lang="ko-KR" altLang="en-US" smtClean="0"/>
@@ -965,9 +962,7 @@
         </p:spPr>
         <p:txBody>
           <a:bodyPr vert="eaVert" anchor="ctr"/>
-          <a:lstStyle>
-            <a:extLst/>
-          </a:lstStyle>
+          <a:lstStyle/>
           <a:p>
             <a:r>
               <a:rPr kumimoji="0" lang="ko-KR" altLang="en-US" smtClean="0"/>
@@ -995,9 +990,7 @@
         </p:spPr>
         <p:txBody>
           <a:bodyPr vert="eaVert"/>
-          <a:lstStyle>
-            <a:extLst/>
-          </a:lstStyle>
+          <a:lstStyle/>
           <a:p>
             <a:pPr lvl="0" eaLnBrk="1" latinLnBrk="0" hangingPunct="1"/>
             <a:r>
@@ -1049,9 +1042,7 @@
         <p:spPr/>
         <p:txBody>
           <a:bodyPr/>
-          <a:lstStyle>
-            <a:extLst/>
-          </a:lstStyle>
+          <a:lstStyle/>
           <a:p>
             <a:fld id="{7BD332C6-334E-4F1C-B658-24FEC90472A2}" type="datetimeFigureOut">
               <a:rPr lang="ko-KR" altLang="en-US" smtClean="0"/>
@@ -1074,9 +1065,7 @@
         <p:spPr/>
         <p:txBody>
           <a:bodyPr/>
-          <a:lstStyle>
-            <a:extLst/>
-          </a:lstStyle>
+          <a:lstStyle/>
           <a:p>
             <a:endParaRPr lang="ko-KR" altLang="en-US"/>
           </a:p>
@@ -1095,9 +1084,7 @@
         <p:spPr/>
         <p:txBody>
           <a:bodyPr/>
-          <a:lstStyle>
-            <a:extLst/>
-          </a:lstStyle>
+          <a:lstStyle/>
           <a:p>
             <a:fld id="{7883653F-12CF-49FA-8FD2-298086A20844}" type="slidenum">
               <a:rPr lang="ko-KR" altLang="en-US" smtClean="0"/>
@@ -1145,15 +1132,13 @@
         <p:spPr/>
         <p:txBody>
           <a:bodyPr/>
-          <a:lstStyle>
-            <a:extLst/>
-          </a:lstStyle>
-          <a:p>
-            <a:r>
-              <a:rPr kumimoji="0" lang="ko-KR" altLang="en-US" smtClean="0"/>
+          <a:lstStyle/>
+          <a:p>
+            <a:r>
+              <a:rPr kumimoji="0" lang="ko-KR" altLang="en-US" dirty="0" smtClean="0"/>
               <a:t>마스터 제목 스타일 편집</a:t>
             </a:r>
-            <a:endParaRPr kumimoji="0" lang="en-US"/>
+            <a:endParaRPr kumimoji="0" lang="en-US" dirty="0"/>
           </a:p>
         </p:txBody>
       </p:sp>
@@ -1167,47 +1152,66 @@
             <p:ph idx="1"/>
           </p:nvPr>
         </p:nvSpPr>
-        <p:spPr/>
+        <p:spPr>
+          <a:xfrm>
+            <a:off x="914400" y="756466"/>
+            <a:ext cx="8317283" cy="5616624"/>
+          </a:xfrm>
+        </p:spPr>
         <p:txBody>
           <a:bodyPr/>
           <a:lstStyle>
-            <a:extLst/>
+            <a:lvl1pPr>
+              <a:defRPr sz="2400"/>
+            </a:lvl1pPr>
+            <a:lvl2pPr>
+              <a:defRPr sz="1800"/>
+            </a:lvl2pPr>
+            <a:lvl3pPr>
+              <a:defRPr sz="1600"/>
+            </a:lvl3pPr>
+            <a:lvl4pPr>
+              <a:defRPr sz="1200"/>
+            </a:lvl4pPr>
+            <a:lvl5pPr>
+              <a:defRPr sz="1000"/>
+            </a:lvl5pPr>
           </a:lstStyle>
           <a:p>
             <a:pPr lvl="0" eaLnBrk="1" latinLnBrk="0" hangingPunct="1"/>
             <a:r>
-              <a:rPr lang="ko-KR" altLang="en-US" smtClean="0"/>
+              <a:rPr lang="ko-KR" altLang="en-US" dirty="0" smtClean="0"/>
               <a:t>마스터 텍스트 스타일을 편집합니다</a:t>
             </a:r>
           </a:p>
           <a:p>
             <a:pPr lvl="1" eaLnBrk="1" latinLnBrk="0" hangingPunct="1"/>
             <a:r>
-              <a:rPr lang="ko-KR" altLang="en-US" smtClean="0"/>
+              <a:rPr lang="ko-KR" altLang="en-US" dirty="0" smtClean="0"/>
               <a:t>둘째 수준</a:t>
             </a:r>
           </a:p>
           <a:p>
             <a:pPr lvl="2" eaLnBrk="1" latinLnBrk="0" hangingPunct="1"/>
             <a:r>
-              <a:rPr lang="ko-KR" altLang="en-US" smtClean="0"/>
+              <a:rPr lang="ko-KR" altLang="en-US" dirty="0" smtClean="0"/>
               <a:t>셋째 수준</a:t>
             </a:r>
           </a:p>
           <a:p>
             <a:pPr lvl="3" eaLnBrk="1" latinLnBrk="0" hangingPunct="1"/>
             <a:r>
-              <a:rPr lang="ko-KR" altLang="en-US" smtClean="0"/>
+              <a:rPr lang="ko-KR" altLang="en-US" dirty="0" smtClean="0"/>
               <a:t>넷째 수준</a:t>
             </a:r>
           </a:p>
           <a:p>
             <a:pPr lvl="4" eaLnBrk="1" latinLnBrk="0" hangingPunct="1"/>
             <a:r>
-              <a:rPr lang="ko-KR" altLang="en-US" smtClean="0"/>
+              <a:rPr lang="ko-KR" altLang="en-US" dirty="0" smtClean="0"/>
               <a:t>다섯째 수준</a:t>
             </a:r>
-            <a:endParaRPr kumimoji="0" lang="en-US"/>
+            <a:endParaRPr kumimoji="0" lang="en-US" dirty="0"/>
           </a:p>
         </p:txBody>
       </p:sp>
@@ -1224,9 +1228,7 @@
         <p:spPr/>
         <p:txBody>
           <a:bodyPr/>
-          <a:lstStyle>
-            <a:extLst/>
-          </a:lstStyle>
+          <a:lstStyle/>
           <a:p>
             <a:fld id="{7BD332C6-334E-4F1C-B658-24FEC90472A2}" type="datetimeFigureOut">
               <a:rPr lang="ko-KR" altLang="en-US" smtClean="0"/>
@@ -1249,9 +1251,7 @@
         <p:spPr/>
         <p:txBody>
           <a:bodyPr/>
-          <a:lstStyle>
-            <a:extLst/>
-          </a:lstStyle>
+          <a:lstStyle/>
           <a:p>
             <a:endParaRPr lang="ko-KR" altLang="en-US"/>
           </a:p>
@@ -1270,9 +1270,7 @@
         <p:spPr/>
         <p:txBody>
           <a:bodyPr/>
-          <a:lstStyle>
-            <a:extLst/>
-          </a:lstStyle>
+          <a:lstStyle/>
           <a:p>
             <a:fld id="{7883653F-12CF-49FA-8FD2-298086A20844}" type="slidenum">
               <a:rPr lang="ko-KR" altLang="en-US" smtClean="0"/>
@@ -1287,6 +1285,13 @@
   <p:clrMapOvr>
     <a:masterClrMapping/>
   </p:clrMapOvr>
+  <p:timing>
+    <p:tnLst>
+      <p:par>
+        <p:cTn id="1" dur="indefinite" restart="never" nodeType="tmRoot"/>
+      </p:par>
+    </p:tnLst>
+  </p:timing>
 </p:sldLayout>
 </file>
 
@@ -1400,9 +1405,7 @@
         </p:spPr>
         <p:txBody>
           <a:bodyPr vert="horz" wrap="square" lIns="91440" tIns="45720" rIns="91440" bIns="45720" anchor="t" compatLnSpc="1"/>
-          <a:lstStyle>
-            <a:extLst/>
-          </a:lstStyle>
+          <a:lstStyle/>
           <a:p>
             <a:endParaRPr kumimoji="0" lang="en-US"/>
           </a:p>
@@ -1501,9 +1504,7 @@
         </p:spPr>
         <p:txBody>
           <a:bodyPr vert="horz" wrap="square" lIns="91440" tIns="45720" rIns="91440" bIns="45720" anchor="t" compatLnSpc="1"/>
-          <a:lstStyle>
-            <a:extLst/>
-          </a:lstStyle>
+          <a:lstStyle/>
           <a:p>
             <a:endParaRPr kumimoji="0" lang="en-US"/>
           </a:p>
@@ -1586,9 +1587,7 @@
         </p:spPr>
         <p:txBody>
           <a:bodyPr vert="horz" wrap="square" lIns="91440" tIns="45720" rIns="91440" bIns="45720" anchor="t" compatLnSpc="1"/>
-          <a:lstStyle>
-            <a:extLst/>
-          </a:lstStyle>
+          <a:lstStyle/>
           <a:p>
             <a:endParaRPr kumimoji="0" lang="en-US"/>
           </a:p>
@@ -1671,9 +1670,7 @@
         </p:spPr>
         <p:txBody>
           <a:bodyPr vert="horz" wrap="square" lIns="91440" tIns="45720" rIns="91440" bIns="45720" anchor="t" compatLnSpc="1"/>
-          <a:lstStyle>
-            <a:extLst/>
-          </a:lstStyle>
+          <a:lstStyle/>
           <a:p>
             <a:endParaRPr kumimoji="0" lang="en-US"/>
           </a:p>
@@ -1756,9 +1753,7 @@
         </p:spPr>
         <p:txBody>
           <a:bodyPr vert="horz" wrap="square" lIns="91440" tIns="45720" rIns="91440" bIns="45720" anchor="t" compatLnSpc="1"/>
-          <a:lstStyle>
-            <a:extLst/>
-          </a:lstStyle>
+          <a:lstStyle/>
           <a:p>
             <a:endParaRPr kumimoji="0" lang="en-US"/>
           </a:p>
@@ -1841,9 +1836,7 @@
         </p:spPr>
         <p:txBody>
           <a:bodyPr vert="horz" wrap="square" lIns="91440" tIns="45720" rIns="91440" bIns="45720" anchor="t" compatLnSpc="1"/>
-          <a:lstStyle>
-            <a:extLst/>
-          </a:lstStyle>
+          <a:lstStyle/>
           <a:p>
             <a:endParaRPr kumimoji="0" lang="en-US"/>
           </a:p>
@@ -1926,9 +1919,7 @@
         </p:spPr>
         <p:txBody>
           <a:bodyPr vert="horz" wrap="square" lIns="91440" tIns="45720" rIns="91440" bIns="45720" anchor="t" compatLnSpc="1"/>
-          <a:lstStyle>
-            <a:extLst/>
-          </a:lstStyle>
+          <a:lstStyle/>
           <a:p>
             <a:endParaRPr kumimoji="0" lang="en-US"/>
           </a:p>
@@ -2011,9 +2002,7 @@
         </p:spPr>
         <p:txBody>
           <a:bodyPr vert="horz" wrap="square" lIns="91440" tIns="45720" rIns="91440" bIns="45720" anchor="t" compatLnSpc="1"/>
-          <a:lstStyle>
-            <a:extLst/>
-          </a:lstStyle>
+          <a:lstStyle/>
           <a:p>
             <a:endParaRPr kumimoji="0" lang="en-US"/>
           </a:p>
@@ -2096,9 +2085,7 @@
         </p:spPr>
         <p:txBody>
           <a:bodyPr vert="horz" wrap="square" lIns="91440" tIns="45720" rIns="91440" bIns="45720" anchor="t" compatLnSpc="1"/>
-          <a:lstStyle>
-            <a:extLst/>
-          </a:lstStyle>
+          <a:lstStyle/>
           <a:p>
             <a:endParaRPr kumimoji="0" lang="en-US"/>
           </a:p>
@@ -2181,9 +2168,7 @@
         </p:spPr>
         <p:txBody>
           <a:bodyPr vert="horz" wrap="square" lIns="91440" tIns="45720" rIns="91440" bIns="45720" anchor="t" compatLnSpc="1"/>
-          <a:lstStyle>
-            <a:extLst/>
-          </a:lstStyle>
+          <a:lstStyle/>
           <a:p>
             <a:endParaRPr kumimoji="0" lang="en-US"/>
           </a:p>
@@ -2266,9 +2251,7 @@
         </p:spPr>
         <p:txBody>
           <a:bodyPr vert="horz" wrap="square" lIns="91440" tIns="45720" rIns="91440" bIns="45720" anchor="t" compatLnSpc="1"/>
-          <a:lstStyle>
-            <a:extLst/>
-          </a:lstStyle>
+          <a:lstStyle/>
           <a:p>
             <a:endParaRPr kumimoji="0" lang="en-US"/>
           </a:p>
@@ -2351,9 +2334,7 @@
         </p:spPr>
         <p:txBody>
           <a:bodyPr vert="horz" wrap="square" lIns="91440" tIns="45720" rIns="91440" bIns="45720" anchor="t" compatLnSpc="1"/>
-          <a:lstStyle>
-            <a:extLst/>
-          </a:lstStyle>
+          <a:lstStyle/>
           <a:p>
             <a:endParaRPr kumimoji="0" lang="en-US"/>
           </a:p>
@@ -2436,9 +2417,7 @@
         </p:spPr>
         <p:txBody>
           <a:bodyPr vert="horz" wrap="square" lIns="91440" tIns="45720" rIns="91440" bIns="45720" anchor="t" compatLnSpc="1"/>
-          <a:lstStyle>
-            <a:extLst/>
-          </a:lstStyle>
+          <a:lstStyle/>
           <a:p>
             <a:endParaRPr kumimoji="0" lang="en-US"/>
           </a:p>
@@ -2521,9 +2500,7 @@
         </p:spPr>
         <p:txBody>
           <a:bodyPr vert="horz" wrap="square" lIns="91440" tIns="45720" rIns="91440" bIns="45720" anchor="t" compatLnSpc="1"/>
-          <a:lstStyle>
-            <a:extLst/>
-          </a:lstStyle>
+          <a:lstStyle/>
           <a:p>
             <a:endParaRPr kumimoji="0" lang="en-US"/>
           </a:p>
@@ -2606,9 +2583,7 @@
         </p:spPr>
         <p:txBody>
           <a:bodyPr vert="horz" wrap="square" lIns="91440" tIns="45720" rIns="91440" bIns="45720" anchor="t" compatLnSpc="1"/>
-          <a:lstStyle>
-            <a:extLst/>
-          </a:lstStyle>
+          <a:lstStyle/>
           <a:p>
             <a:endParaRPr kumimoji="0" lang="en-US"/>
           </a:p>
@@ -2707,9 +2682,7 @@
         <p:spPr/>
         <p:txBody>
           <a:bodyPr/>
-          <a:lstStyle>
-            <a:extLst/>
-          </a:lstStyle>
+          <a:lstStyle/>
           <a:p>
             <a:fld id="{7BD332C6-334E-4F1C-B658-24FEC90472A2}" type="datetimeFigureOut">
               <a:rPr lang="ko-KR" altLang="en-US" smtClean="0"/>
@@ -2732,9 +2705,7 @@
         <p:spPr/>
         <p:txBody>
           <a:bodyPr/>
-          <a:lstStyle>
-            <a:extLst/>
-          </a:lstStyle>
+          <a:lstStyle/>
           <a:p>
             <a:endParaRPr lang="ko-KR" altLang="en-US"/>
           </a:p>
@@ -2753,9 +2724,7 @@
         <p:spPr/>
         <p:txBody>
           <a:bodyPr/>
-          <a:lstStyle>
-            <a:extLst/>
-          </a:lstStyle>
+          <a:lstStyle/>
           <a:p>
             <a:fld id="{7883653F-12CF-49FA-8FD2-298086A20844}" type="slidenum">
               <a:rPr lang="ko-KR" altLang="en-US" smtClean="0"/>
@@ -2808,9 +2777,7 @@
         </p:style>
         <p:txBody>
           <a:bodyPr anchor="ctr"/>
-          <a:lstStyle>
-            <a:extLst/>
-          </a:lstStyle>
+          <a:lstStyle/>
           <a:p>
             <a:pPr algn="ctr" eaLnBrk="1" latinLnBrk="0" hangingPunct="1"/>
             <a:endParaRPr kumimoji="0" lang="en-US"/>
@@ -2890,9 +2857,7 @@
         </p:style>
         <p:txBody>
           <a:bodyPr anchor="ctr"/>
-          <a:lstStyle>
-            <a:extLst/>
-          </a:lstStyle>
+          <a:lstStyle/>
           <a:p>
             <a:pPr algn="ctr" eaLnBrk="1" latinLnBrk="0" hangingPunct="1"/>
             <a:endParaRPr kumimoji="0" lang="en-US" dirty="0"/>
@@ -2938,9 +2903,7 @@
         </p:style>
         <p:txBody>
           <a:bodyPr anchor="ctr"/>
-          <a:lstStyle>
-            <a:extLst/>
-          </a:lstStyle>
+          <a:lstStyle/>
           <a:p>
             <a:pPr algn="ctr" eaLnBrk="1" latinLnBrk="0" hangingPunct="1"/>
             <a:endParaRPr kumimoji="0" lang="en-US" dirty="0"/>
@@ -2986,9 +2949,7 @@
         </p:style>
         <p:txBody>
           <a:bodyPr anchor="ctr"/>
-          <a:lstStyle>
-            <a:extLst/>
-          </a:lstStyle>
+          <a:lstStyle/>
           <a:p>
             <a:pPr algn="ctr" eaLnBrk="1" latinLnBrk="0" hangingPunct="1"/>
             <a:endParaRPr kumimoji="0" lang="en-US"/>
@@ -3034,9 +2995,7 @@
         </p:style>
         <p:txBody>
           <a:bodyPr anchor="ctr"/>
-          <a:lstStyle>
-            <a:extLst/>
-          </a:lstStyle>
+          <a:lstStyle/>
           <a:p>
             <a:pPr algn="ctr" eaLnBrk="1" latinLnBrk="0" hangingPunct="1"/>
             <a:endParaRPr kumimoji="0" lang="en-US" dirty="0"/>
@@ -3082,9 +3041,7 @@
         </p:style>
         <p:txBody>
           <a:bodyPr anchor="ctr"/>
-          <a:lstStyle>
-            <a:extLst/>
-          </a:lstStyle>
+          <a:lstStyle/>
           <a:p>
             <a:pPr algn="ctr" eaLnBrk="1" latinLnBrk="0" hangingPunct="1"/>
             <a:endParaRPr kumimoji="0" lang="en-US" dirty="0"/>
@@ -3096,6 +3053,13 @@
   <p:clrMapOvr>
     <a:masterClrMapping/>
   </p:clrMapOvr>
+  <p:timing>
+    <p:tnLst>
+      <p:par>
+        <p:cTn id="1" dur="indefinite" restart="never" nodeType="tmRoot"/>
+      </p:par>
+    </p:tnLst>
+  </p:timing>
 </p:sldLayout>
 </file>
 
@@ -3134,9 +3098,7 @@
         </p:spPr>
         <p:txBody>
           <a:bodyPr/>
-          <a:lstStyle>
-            <a:extLst/>
-          </a:lstStyle>
+          <a:lstStyle/>
           <a:p>
             <a:r>
               <a:rPr kumimoji="0" lang="ko-KR" altLang="en-US" smtClean="0"/>
@@ -3307,9 +3269,7 @@
         <p:spPr/>
         <p:txBody>
           <a:bodyPr/>
-          <a:lstStyle>
-            <a:extLst/>
-          </a:lstStyle>
+          <a:lstStyle/>
           <a:p>
             <a:fld id="{7BD332C6-334E-4F1C-B658-24FEC90472A2}" type="datetimeFigureOut">
               <a:rPr lang="ko-KR" altLang="en-US" smtClean="0"/>
@@ -3332,9 +3292,7 @@
         <p:spPr/>
         <p:txBody>
           <a:bodyPr/>
-          <a:lstStyle>
-            <a:extLst/>
-          </a:lstStyle>
+          <a:lstStyle/>
           <a:p>
             <a:endParaRPr lang="ko-KR" altLang="en-US"/>
           </a:p>
@@ -3353,9 +3311,7 @@
         <p:spPr/>
         <p:txBody>
           <a:bodyPr/>
-          <a:lstStyle>
-            <a:extLst/>
-          </a:lstStyle>
+          <a:lstStyle/>
           <a:p>
             <a:fld id="{7883653F-12CF-49FA-8FD2-298086A20844}" type="slidenum">
               <a:rPr lang="ko-KR" altLang="en-US" smtClean="0"/>
@@ -3370,6 +3326,13 @@
   <p:clrMapOvr>
     <a:masterClrMapping/>
   </p:clrMapOvr>
+  <p:timing>
+    <p:tnLst>
+      <p:par>
+        <p:cTn id="1" dur="indefinite" restart="never" nodeType="tmRoot"/>
+      </p:par>
+    </p:tnLst>
+  </p:timing>
 </p:sldLayout>
 </file>
 
@@ -3433,9 +3396,7 @@
         </p:style>
         <p:txBody>
           <a:bodyPr anchor="ctr"/>
-          <a:lstStyle>
-            <a:extLst/>
-          </a:lstStyle>
+          <a:lstStyle/>
           <a:p>
             <a:pPr algn="ctr" eaLnBrk="1" latinLnBrk="0" hangingPunct="1"/>
             <a:endParaRPr kumimoji="0" lang="en-US"/>
@@ -3744,9 +3705,7 @@
         <p:spPr/>
         <p:txBody>
           <a:bodyPr/>
-          <a:lstStyle>
-            <a:extLst/>
-          </a:lstStyle>
+          <a:lstStyle/>
           <a:p>
             <a:fld id="{7BD332C6-334E-4F1C-B658-24FEC90472A2}" type="datetimeFigureOut">
               <a:rPr lang="ko-KR" altLang="en-US" smtClean="0"/>
@@ -3769,9 +3728,7 @@
         <p:spPr/>
         <p:txBody>
           <a:bodyPr/>
-          <a:lstStyle>
-            <a:extLst/>
-          </a:lstStyle>
+          <a:lstStyle/>
           <a:p>
             <a:endParaRPr lang="ko-KR" altLang="en-US"/>
           </a:p>
@@ -3790,9 +3747,7 @@
         <p:spPr/>
         <p:txBody>
           <a:bodyPr/>
-          <a:lstStyle>
-            <a:extLst/>
-          </a:lstStyle>
+          <a:lstStyle/>
           <a:p>
             <a:fld id="{7883653F-12CF-49FA-8FD2-298086A20844}" type="slidenum">
               <a:rPr lang="ko-KR" altLang="en-US" smtClean="0"/>
@@ -3841,9 +3796,7 @@
         </p:style>
         <p:txBody>
           <a:bodyPr anchor="ctr"/>
-          <a:lstStyle>
-            <a:extLst/>
-          </a:lstStyle>
+          <a:lstStyle/>
           <a:p>
             <a:pPr algn="ctr" eaLnBrk="1" latinLnBrk="0" hangingPunct="1"/>
             <a:endParaRPr kumimoji="0" lang="en-US" dirty="0"/>
@@ -3889,9 +3842,7 @@
         </p:style>
         <p:txBody>
           <a:bodyPr anchor="ctr"/>
-          <a:lstStyle>
-            <a:extLst/>
-          </a:lstStyle>
+          <a:lstStyle/>
           <a:p>
             <a:pPr algn="ctr" eaLnBrk="1" latinLnBrk="0" hangingPunct="1"/>
             <a:endParaRPr kumimoji="0" lang="en-US" dirty="0"/>
@@ -3937,9 +3888,7 @@
         </p:style>
         <p:txBody>
           <a:bodyPr anchor="ctr"/>
-          <a:lstStyle>
-            <a:extLst/>
-          </a:lstStyle>
+          <a:lstStyle/>
           <a:p>
             <a:pPr algn="ctr" eaLnBrk="1" latinLnBrk="0" hangingPunct="1"/>
             <a:endParaRPr kumimoji="0" lang="en-US"/>
@@ -3985,9 +3934,7 @@
         </p:style>
         <p:txBody>
           <a:bodyPr anchor="ctr"/>
-          <a:lstStyle>
-            <a:extLst/>
-          </a:lstStyle>
+          <a:lstStyle/>
           <a:p>
             <a:pPr algn="ctr" eaLnBrk="1" latinLnBrk="0" hangingPunct="1"/>
             <a:endParaRPr kumimoji="0" lang="en-US" dirty="0"/>
@@ -4033,9 +3980,7 @@
         </p:style>
         <p:txBody>
           <a:bodyPr anchor="ctr"/>
-          <a:lstStyle>
-            <a:extLst/>
-          </a:lstStyle>
+          <a:lstStyle/>
           <a:p>
             <a:pPr algn="ctr" eaLnBrk="1" latinLnBrk="0" hangingPunct="1"/>
             <a:endParaRPr kumimoji="0" lang="en-US" dirty="0"/>
@@ -4081,9 +4026,7 @@
         </p:style>
         <p:txBody>
           <a:bodyPr anchor="ctr"/>
-          <a:lstStyle>
-            <a:extLst/>
-          </a:lstStyle>
+          <a:lstStyle/>
           <a:p>
             <a:pPr algn="ctr" eaLnBrk="1" latinLnBrk="0" hangingPunct="1"/>
             <a:endParaRPr kumimoji="0" lang="en-US" dirty="0"/>
@@ -4129,9 +4072,7 @@
         </p:style>
         <p:txBody>
           <a:bodyPr anchor="ctr"/>
-          <a:lstStyle>
-            <a:extLst/>
-          </a:lstStyle>
+          <a:lstStyle/>
           <a:p>
             <a:pPr algn="ctr" eaLnBrk="1" latinLnBrk="0" hangingPunct="1"/>
             <a:endParaRPr kumimoji="0" lang="en-US"/>
@@ -4177,9 +4118,7 @@
         </p:style>
         <p:txBody>
           <a:bodyPr anchor="ctr"/>
-          <a:lstStyle>
-            <a:extLst/>
-          </a:lstStyle>
+          <a:lstStyle/>
           <a:p>
             <a:pPr algn="ctr" eaLnBrk="1" latinLnBrk="0" hangingPunct="1"/>
             <a:endParaRPr kumimoji="0" lang="en-US" dirty="0"/>
@@ -4225,9 +4164,7 @@
         </p:style>
         <p:txBody>
           <a:bodyPr anchor="ctr"/>
-          <a:lstStyle>
-            <a:extLst/>
-          </a:lstStyle>
+          <a:lstStyle/>
           <a:p>
             <a:pPr algn="ctr" eaLnBrk="1" latinLnBrk="0" hangingPunct="1"/>
             <a:endParaRPr kumimoji="0" lang="en-US" dirty="0"/>
@@ -4239,6 +4176,13 @@
   <p:clrMapOvr>
     <a:masterClrMapping/>
   </p:clrMapOvr>
+  <p:timing>
+    <p:tnLst>
+      <p:par>
+        <p:cTn id="1" dur="indefinite" restart="never" nodeType="tmRoot"/>
+      </p:par>
+    </p:tnLst>
+  </p:timing>
 </p:sldLayout>
 </file>
 
@@ -4305,9 +4249,7 @@
         <p:spPr/>
         <p:txBody>
           <a:bodyPr/>
-          <a:lstStyle>
-            <a:extLst/>
-          </a:lstStyle>
+          <a:lstStyle/>
           <a:p>
             <a:fld id="{7BD332C6-334E-4F1C-B658-24FEC90472A2}" type="datetimeFigureOut">
               <a:rPr lang="ko-KR" altLang="en-US" smtClean="0"/>
@@ -4330,9 +4272,7 @@
         <p:spPr/>
         <p:txBody>
           <a:bodyPr/>
-          <a:lstStyle>
-            <a:extLst/>
-          </a:lstStyle>
+          <a:lstStyle/>
           <a:p>
             <a:endParaRPr lang="ko-KR" altLang="en-US"/>
           </a:p>
@@ -4351,9 +4291,7 @@
         <p:spPr/>
         <p:txBody>
           <a:bodyPr/>
-          <a:lstStyle>
-            <a:extLst/>
-          </a:lstStyle>
+          <a:lstStyle/>
           <a:p>
             <a:fld id="{7883653F-12CF-49FA-8FD2-298086A20844}" type="slidenum">
               <a:rPr lang="ko-KR" altLang="en-US" smtClean="0"/>
@@ -4368,6 +4306,13 @@
   <p:clrMapOvr>
     <a:masterClrMapping/>
   </p:clrMapOvr>
+  <p:timing>
+    <p:tnLst>
+      <p:par>
+        <p:cTn id="1" dur="indefinite" restart="never" nodeType="tmRoot"/>
+      </p:par>
+    </p:tnLst>
+  </p:timing>
 </p:sldLayout>
 </file>
 
@@ -4401,9 +4346,7 @@
         <p:spPr/>
         <p:txBody>
           <a:bodyPr/>
-          <a:lstStyle>
-            <a:extLst/>
-          </a:lstStyle>
+          <a:lstStyle/>
           <a:p>
             <a:fld id="{7BD332C6-334E-4F1C-B658-24FEC90472A2}" type="datetimeFigureOut">
               <a:rPr lang="ko-KR" altLang="en-US" smtClean="0"/>
@@ -4426,9 +4369,7 @@
         <p:spPr/>
         <p:txBody>
           <a:bodyPr/>
-          <a:lstStyle>
-            <a:extLst/>
-          </a:lstStyle>
+          <a:lstStyle/>
           <a:p>
             <a:endParaRPr lang="ko-KR" altLang="en-US"/>
           </a:p>
@@ -4447,9 +4388,7 @@
         <p:spPr/>
         <p:txBody>
           <a:bodyPr/>
-          <a:lstStyle>
-            <a:extLst/>
-          </a:lstStyle>
+          <a:lstStyle/>
           <a:p>
             <a:fld id="{7883653F-12CF-49FA-8FD2-298086A20844}" type="slidenum">
               <a:rPr lang="ko-KR" altLang="en-US" smtClean="0"/>
@@ -4464,6 +4403,13 @@
   <p:clrMapOvr>
     <a:masterClrMapping/>
   </p:clrMapOvr>
+  <p:timing>
+    <p:tnLst>
+      <p:par>
+        <p:cTn id="1" dur="indefinite" restart="never" nodeType="tmRoot"/>
+      </p:par>
+    </p:tnLst>
+  </p:timing>
 </p:sldLayout>
 </file>
 
@@ -4655,9 +4601,7 @@
         <p:spPr/>
         <p:txBody>
           <a:bodyPr/>
-          <a:lstStyle>
-            <a:extLst/>
-          </a:lstStyle>
+          <a:lstStyle/>
           <a:p>
             <a:fld id="{7BD332C6-334E-4F1C-B658-24FEC90472A2}" type="datetimeFigureOut">
               <a:rPr lang="ko-KR" altLang="en-US" smtClean="0"/>
@@ -4680,9 +4624,7 @@
         <p:spPr/>
         <p:txBody>
           <a:bodyPr/>
-          <a:lstStyle>
-            <a:extLst/>
-          </a:lstStyle>
+          <a:lstStyle/>
           <a:p>
             <a:endParaRPr lang="ko-KR" altLang="en-US"/>
           </a:p>
@@ -4701,9 +4643,7 @@
         <p:spPr/>
         <p:txBody>
           <a:bodyPr/>
-          <a:lstStyle>
-            <a:extLst/>
-          </a:lstStyle>
+          <a:lstStyle/>
           <a:p>
             <a:fld id="{7883653F-12CF-49FA-8FD2-298086A20844}" type="slidenum">
               <a:rPr lang="ko-KR" altLang="en-US" smtClean="0"/>
@@ -4718,6 +4658,13 @@
   <p:clrMapOvr>
     <a:masterClrMapping/>
   </p:clrMapOvr>
+  <p:timing>
+    <p:tnLst>
+      <p:par>
+        <p:cTn id="1" dur="indefinite" restart="never" nodeType="tmRoot"/>
+      </p:par>
+    </p:tnLst>
+  </p:timing>
 </p:sldLayout>
 </file>
 
@@ -4779,9 +4726,7 @@
         </p:style>
         <p:txBody>
           <a:bodyPr anchor="ctr"/>
-          <a:lstStyle>
-            <a:extLst/>
-          </a:lstStyle>
+          <a:lstStyle/>
           <a:p>
             <a:pPr algn="ctr" eaLnBrk="1" latinLnBrk="0" hangingPunct="1"/>
             <a:endParaRPr kumimoji="0" lang="en-US"/>
@@ -5376,9 +5321,7 @@
         </p:spPr>
         <p:txBody>
           <a:bodyPr/>
-          <a:lstStyle>
-            <a:extLst/>
-          </a:lstStyle>
+          <a:lstStyle/>
           <a:p>
             <a:fld id="{7BD332C6-334E-4F1C-B658-24FEC90472A2}" type="datetimeFigureOut">
               <a:rPr lang="ko-KR" altLang="en-US" smtClean="0"/>
@@ -5406,9 +5349,7 @@
         </p:spPr>
         <p:txBody>
           <a:bodyPr/>
-          <a:lstStyle>
-            <a:extLst/>
-          </a:lstStyle>
+          <a:lstStyle/>
           <a:p>
             <a:endParaRPr lang="ko-KR" altLang="en-US"/>
           </a:p>
@@ -5432,9 +5373,7 @@
         </p:spPr>
         <p:txBody>
           <a:bodyPr/>
-          <a:lstStyle>
-            <a:extLst/>
-          </a:lstStyle>
+          <a:lstStyle/>
           <a:p>
             <a:fld id="{7883653F-12CF-49FA-8FD2-298086A20844}" type="slidenum">
               <a:rPr lang="ko-KR" altLang="en-US" smtClean="0"/>
@@ -5515,9 +5454,7 @@
         </p:style>
         <p:txBody>
           <a:bodyPr anchor="ctr"/>
-          <a:lstStyle>
-            <a:extLst/>
-          </a:lstStyle>
+          <a:lstStyle/>
           <a:p>
             <a:pPr algn="ctr" eaLnBrk="1" latinLnBrk="0" hangingPunct="1"/>
             <a:endParaRPr kumimoji="0" lang="en-US"/>
@@ -5565,9 +5502,7 @@
         </p:style>
         <p:txBody>
           <a:bodyPr anchor="ctr"/>
-          <a:lstStyle>
-            <a:extLst/>
-          </a:lstStyle>
+          <a:lstStyle/>
           <a:p>
             <a:pPr algn="ctr" eaLnBrk="1" latinLnBrk="0" hangingPunct="1"/>
             <a:endParaRPr kumimoji="0" lang="en-US"/>
@@ -5615,9 +5550,7 @@
         </p:style>
         <p:txBody>
           <a:bodyPr anchor="ctr"/>
-          <a:lstStyle>
-            <a:extLst/>
-          </a:lstStyle>
+          <a:lstStyle/>
           <a:p>
             <a:pPr algn="ctr" eaLnBrk="1" latinLnBrk="0" hangingPunct="1"/>
             <a:endParaRPr kumimoji="0" lang="en-US"/>
@@ -5663,9 +5596,7 @@
         </p:style>
         <p:txBody>
           <a:bodyPr anchor="ctr"/>
-          <a:lstStyle>
-            <a:extLst/>
-          </a:lstStyle>
+          <a:lstStyle/>
           <a:p>
             <a:pPr algn="ctr" eaLnBrk="1" latinLnBrk="0" hangingPunct="1"/>
             <a:endParaRPr kumimoji="0" lang="en-US"/>
@@ -5713,9 +5644,7 @@
         </p:style>
         <p:txBody>
           <a:bodyPr anchor="ctr"/>
-          <a:lstStyle>
-            <a:extLst/>
-          </a:lstStyle>
+          <a:lstStyle/>
           <a:p>
             <a:pPr algn="ctr" eaLnBrk="1" latinLnBrk="0" hangingPunct="1"/>
             <a:endParaRPr kumimoji="0" lang="en-US" dirty="0"/>
@@ -5763,9 +5692,7 @@
         </p:style>
         <p:txBody>
           <a:bodyPr anchor="ctr"/>
-          <a:lstStyle>
-            <a:extLst/>
-          </a:lstStyle>
+          <a:lstStyle/>
           <a:p>
             <a:pPr algn="ctr" eaLnBrk="1" latinLnBrk="0" hangingPunct="1"/>
             <a:endParaRPr kumimoji="0" lang="en-US" dirty="0"/>
@@ -5813,9 +5740,7 @@
         </p:style>
         <p:txBody>
           <a:bodyPr anchor="ctr"/>
-          <a:lstStyle>
-            <a:extLst/>
-          </a:lstStyle>
+          <a:lstStyle/>
           <a:p>
             <a:pPr algn="ctr" eaLnBrk="1" latinLnBrk="0" hangingPunct="1"/>
             <a:endParaRPr kumimoji="0" lang="en-US" dirty="0"/>
@@ -5863,9 +5788,7 @@
         </p:style>
         <p:txBody>
           <a:bodyPr anchor="ctr"/>
-          <a:lstStyle>
-            <a:extLst/>
-          </a:lstStyle>
+          <a:lstStyle/>
           <a:p>
             <a:pPr algn="ctr" eaLnBrk="1" latinLnBrk="0" hangingPunct="1"/>
             <a:endParaRPr kumimoji="0" lang="en-US"/>
@@ -5913,9 +5836,7 @@
         </p:style>
         <p:txBody>
           <a:bodyPr anchor="ctr"/>
-          <a:lstStyle>
-            <a:extLst/>
-          </a:lstStyle>
+          <a:lstStyle/>
           <a:p>
             <a:pPr algn="ctr" eaLnBrk="1" latinLnBrk="0" hangingPunct="1"/>
             <a:endParaRPr kumimoji="0" lang="en-US" dirty="0"/>
@@ -5934,8 +5855,8 @@
         </p:nvSpPr>
         <p:spPr>
           <a:xfrm>
-            <a:off x="914400" y="512064"/>
-            <a:ext cx="7772400" cy="914400"/>
+            <a:off x="539552" y="116632"/>
+            <a:ext cx="8680730" cy="596250"/>
           </a:xfrm>
           <a:prstGeom prst="rect">
             <a:avLst/>
@@ -5945,15 +5866,13 @@
           <a:bodyPr vert="horz" anchor="t">
             <a:noAutofit/>
           </a:bodyPr>
-          <a:lstStyle>
-            <a:extLst/>
-          </a:lstStyle>
-          <a:p>
-            <a:r>
-              <a:rPr kumimoji="0" lang="ko-KR" altLang="en-US" smtClean="0"/>
+          <a:lstStyle/>
+          <a:p>
+            <a:r>
+              <a:rPr kumimoji="0" lang="ko-KR" altLang="en-US" dirty="0" smtClean="0"/>
               <a:t>마스터 제목 스타일 편집</a:t>
             </a:r>
-            <a:endParaRPr kumimoji="0" lang="en-US"/>
+            <a:endParaRPr kumimoji="0" lang="en-US" dirty="0"/>
           </a:p>
         </p:txBody>
       </p:sp>
@@ -5969,8 +5888,8 @@
         </p:nvSpPr>
         <p:spPr>
           <a:xfrm>
-            <a:off x="914400" y="1783560"/>
-            <a:ext cx="7772400" cy="4572000"/>
+            <a:off x="914400" y="980728"/>
+            <a:ext cx="8692131" cy="5616624"/>
           </a:xfrm>
           <a:prstGeom prst="rect">
             <a:avLst/>
@@ -5980,44 +5899,42 @@
           <a:bodyPr vert="horz">
             <a:normAutofit/>
           </a:bodyPr>
-          <a:lstStyle>
-            <a:extLst/>
-          </a:lstStyle>
+          <a:lstStyle/>
           <a:p>
             <a:pPr lvl="0" eaLnBrk="1" latinLnBrk="0" hangingPunct="1"/>
             <a:r>
-              <a:rPr kumimoji="0" lang="ko-KR" altLang="en-US" smtClean="0"/>
+              <a:rPr kumimoji="0" lang="ko-KR" altLang="en-US" dirty="0" smtClean="0"/>
               <a:t>마스터 텍스트 스타일을 편집합니다</a:t>
             </a:r>
           </a:p>
           <a:p>
             <a:pPr lvl="1" eaLnBrk="1" latinLnBrk="0" hangingPunct="1"/>
             <a:r>
-              <a:rPr kumimoji="0" lang="ko-KR" altLang="en-US" smtClean="0"/>
+              <a:rPr kumimoji="0" lang="ko-KR" altLang="en-US" dirty="0" smtClean="0"/>
               <a:t>둘째 수준</a:t>
             </a:r>
           </a:p>
           <a:p>
             <a:pPr lvl="2" eaLnBrk="1" latinLnBrk="0" hangingPunct="1"/>
             <a:r>
-              <a:rPr kumimoji="0" lang="ko-KR" altLang="en-US" smtClean="0"/>
+              <a:rPr kumimoji="0" lang="ko-KR" altLang="en-US" dirty="0" smtClean="0"/>
               <a:t>셋째 수준</a:t>
             </a:r>
           </a:p>
           <a:p>
             <a:pPr lvl="3" eaLnBrk="1" latinLnBrk="0" hangingPunct="1"/>
             <a:r>
-              <a:rPr kumimoji="0" lang="ko-KR" altLang="en-US" smtClean="0"/>
+              <a:rPr kumimoji="0" lang="ko-KR" altLang="en-US" dirty="0" smtClean="0"/>
               <a:t>넷째 수준</a:t>
             </a:r>
           </a:p>
           <a:p>
             <a:pPr lvl="4" eaLnBrk="1" latinLnBrk="0" hangingPunct="1"/>
             <a:r>
-              <a:rPr kumimoji="0" lang="ko-KR" altLang="en-US" smtClean="0"/>
+              <a:rPr kumimoji="0" lang="ko-KR" altLang="en-US" dirty="0" smtClean="0"/>
               <a:t>다섯째 수준</a:t>
             </a:r>
-            <a:endParaRPr kumimoji="0" lang="en-US"/>
+            <a:endParaRPr kumimoji="0" lang="en-US" dirty="0"/>
           </a:p>
         </p:txBody>
       </p:sp>
@@ -6153,6 +6070,13 @@
     <p:sldLayoutId id="2147483670" r:id="rId10"/>
     <p:sldLayoutId id="2147483671" r:id="rId11"/>
   </p:sldLayoutIdLst>
+  <p:timing>
+    <p:tnLst>
+      <p:par>
+        <p:cTn id="1" dur="indefinite" restart="never" nodeType="tmRoot"/>
+      </p:par>
+    </p:tnLst>
+  </p:timing>
   <p:txStyles>
     <p:titleStyle>
       <a:lvl1pPr algn="l" rtl="0" eaLnBrk="1" latinLnBrk="1" hangingPunct="1">
@@ -6160,14 +6084,14 @@
           <a:spcPct val="0"/>
         </a:spcBef>
         <a:buNone/>
-        <a:defRPr kumimoji="0" sz="4000" kern="1200" spc="-100" baseline="0">
+        <a:defRPr kumimoji="0" sz="3200" b="1" kern="1200" spc="-100" baseline="0">
           <a:solidFill>
             <a:schemeClr val="tx2">
               <a:satMod val="200000"/>
             </a:schemeClr>
           </a:solidFill>
-          <a:latin typeface="+mj-lt"/>
-          <a:ea typeface="+mj-ea"/>
+          <a:latin typeface="+mn-ea"/>
+          <a:ea typeface="+mn-ea"/>
           <a:cs typeface="+mj-cs"/>
         </a:defRPr>
       </a:lvl1pPr>
@@ -6184,11 +6108,11 @@
         <a:buSzPct val="95000"/>
         <a:buFont typeface="Wingdings"/>
         <a:buChar char=""/>
-        <a:defRPr kumimoji="0" sz="3000" kern="1200">
+        <a:defRPr kumimoji="0" sz="2400" kern="1200">
           <a:solidFill>
             <a:schemeClr val="tx1"/>
           </a:solidFill>
-          <a:latin typeface="+mn-lt"/>
+          <a:latin typeface="+mn-ea"/>
           <a:ea typeface="+mn-ea"/>
           <a:cs typeface="+mn-cs"/>
         </a:defRPr>
@@ -6203,7 +6127,7 @@
         <a:buSzPct val="90000"/>
         <a:buFont typeface="Wingdings"/>
         <a:buChar char=""/>
-        <a:defRPr kumimoji="0" sz="2600" kern="1200">
+        <a:defRPr kumimoji="0" sz="2000" kern="1200">
           <a:solidFill>
             <a:schemeClr val="tx1"/>
           </a:solidFill>
@@ -6221,7 +6145,7 @@
         </a:buClr>
         <a:buFont typeface="Wingdings 2"/>
         <a:buChar char=""/>
-        <a:defRPr kumimoji="0" sz="2400" kern="1200">
+        <a:defRPr kumimoji="0" sz="1800" kern="1200">
           <a:solidFill>
             <a:schemeClr val="tx1"/>
           </a:solidFill>
@@ -6239,7 +6163,7 @@
         </a:buClr>
         <a:buFont typeface="Wingdings 3"/>
         <a:buChar char=""/>
-        <a:defRPr kumimoji="0" sz="2200" kern="1200">
+        <a:defRPr kumimoji="0" sz="1800" kern="1200">
           <a:solidFill>
             <a:schemeClr val="tx1"/>
           </a:solidFill>
@@ -6257,7 +6181,7 @@
         </a:buClr>
         <a:buFont typeface="Wingdings 2"/>
         <a:buChar char=""/>
-        <a:defRPr kumimoji="0" sz="2000" kern="1200">
+        <a:defRPr kumimoji="0" sz="1600" kern="1200">
           <a:solidFill>
             <a:schemeClr val="tx1"/>
           </a:solidFill>
@@ -6488,6 +6412,13 @@
   <p:clrMapOvr>
     <a:masterClrMapping/>
   </p:clrMapOvr>
+  <p:timing>
+    <p:tnLst>
+      <p:par>
+        <p:cTn id="1" dur="indefinite" restart="never" nodeType="tmRoot"/>
+      </p:par>
+    </p:tnLst>
+  </p:timing>
 </p:sld>
 </file>
 
@@ -6672,8 +6603,20 @@
                 <a:tableStyleId>{073A0DAA-6AF3-43AB-8588-CEC1D06C72B9}</a:tableStyleId>
               </a:tblPr>
               <a:tblGrid>
-                <a:gridCol w="1440160"/>
-                <a:gridCol w="1440160"/>
+                <a:gridCol w="1440160">
+                  <a:extLst>
+                    <a:ext uri="{9D8B030D-6E8A-4147-A177-3AD203B41FA5}">
+                      <a16:colId xmlns:a16="http://schemas.microsoft.com/office/drawing/2014/main" val="20000"/>
+                    </a:ext>
+                  </a:extLst>
+                </a:gridCol>
+                <a:gridCol w="1440160">
+                  <a:extLst>
+                    <a:ext uri="{9D8B030D-6E8A-4147-A177-3AD203B41FA5}">
+                      <a16:colId xmlns:a16="http://schemas.microsoft.com/office/drawing/2014/main" val="20001"/>
+                    </a:ext>
+                  </a:extLst>
+                </a:gridCol>
               </a:tblGrid>
               <a:tr h="313234">
                 <a:tc>
@@ -6722,6 +6665,11 @@
                     <a:noFill/>
                   </a:tcPr>
                 </a:tc>
+                <a:extLst>
+                  <a:ext uri="{0D108BD9-81ED-4DB2-BD59-A6C34878D82A}">
+                    <a16:rowId xmlns:a16="http://schemas.microsoft.com/office/drawing/2014/main" val="10000"/>
+                  </a:ext>
+                </a:extLst>
               </a:tr>
               <a:tr h="313234">
                 <a:tc>
@@ -6782,6 +6730,11 @@
                     <a:noFill/>
                   </a:tcPr>
                 </a:tc>
+                <a:extLst>
+                  <a:ext uri="{0D108BD9-81ED-4DB2-BD59-A6C34878D82A}">
+                    <a16:rowId xmlns:a16="http://schemas.microsoft.com/office/drawing/2014/main" val="10001"/>
+                  </a:ext>
+                </a:extLst>
               </a:tr>
             </a:tbl>
           </a:graphicData>
@@ -6896,6 +6849,13 @@
   <p:clrMapOvr>
     <a:masterClrMapping/>
   </p:clrMapOvr>
+  <p:timing>
+    <p:tnLst>
+      <p:par>
+        <p:cTn id="1" dur="indefinite" restart="never" nodeType="tmRoot"/>
+      </p:par>
+    </p:tnLst>
+  </p:timing>
 </p:sld>
 </file>
 
@@ -7077,8 +7037,20 @@
                 <a:tableStyleId>{073A0DAA-6AF3-43AB-8588-CEC1D06C72B9}</a:tableStyleId>
               </a:tblPr>
               <a:tblGrid>
-                <a:gridCol w="1980220"/>
-                <a:gridCol w="1980220"/>
+                <a:gridCol w="1980220">
+                  <a:extLst>
+                    <a:ext uri="{9D8B030D-6E8A-4147-A177-3AD203B41FA5}">
+                      <a16:colId xmlns:a16="http://schemas.microsoft.com/office/drawing/2014/main" val="20000"/>
+                    </a:ext>
+                  </a:extLst>
+                </a:gridCol>
+                <a:gridCol w="1980220">
+                  <a:extLst>
+                    <a:ext uri="{9D8B030D-6E8A-4147-A177-3AD203B41FA5}">
+                      <a16:colId xmlns:a16="http://schemas.microsoft.com/office/drawing/2014/main" val="20001"/>
+                    </a:ext>
+                  </a:extLst>
+                </a:gridCol>
               </a:tblGrid>
               <a:tr h="313234">
                 <a:tc>
@@ -7149,6 +7121,11 @@
                     <a:noFill/>
                   </a:tcPr>
                 </a:tc>
+                <a:extLst>
+                  <a:ext uri="{0D108BD9-81ED-4DB2-BD59-A6C34878D82A}">
+                    <a16:rowId xmlns:a16="http://schemas.microsoft.com/office/drawing/2014/main" val="10000"/>
+                  </a:ext>
+                </a:extLst>
               </a:tr>
               <a:tr h="313234">
                 <a:tc>
@@ -7209,6 +7186,11 @@
                     <a:noFill/>
                   </a:tcPr>
                 </a:tc>
+                <a:extLst>
+                  <a:ext uri="{0D108BD9-81ED-4DB2-BD59-A6C34878D82A}">
+                    <a16:rowId xmlns:a16="http://schemas.microsoft.com/office/drawing/2014/main" val="10001"/>
+                  </a:ext>
+                </a:extLst>
               </a:tr>
             </a:tbl>
           </a:graphicData>
@@ -7391,6 +7373,1543 @@
   <p:clrMapOvr>
     <a:masterClrMapping/>
   </p:clrMapOvr>
+  <p:timing>
+    <p:tnLst>
+      <p:par>
+        <p:cTn id="1" dur="indefinite" restart="never" nodeType="tmRoot"/>
+      </p:par>
+    </p:tnLst>
+  </p:timing>
+</p:sld>
+</file>
+
+<file path=ppt/slides/slide12.xml><?xml version="1.0" encoding="utf-8"?>
+<p:sld xmlns:a="http://schemas.openxmlformats.org/drawingml/2006/main" xmlns:r="http://schemas.openxmlformats.org/officeDocument/2006/relationships" xmlns:p="http://schemas.openxmlformats.org/presentationml/2006/main">
+  <p:cSld>
+    <p:spTree>
+      <p:nvGrpSpPr>
+        <p:cNvPr id="1" name=""/>
+        <p:cNvGrpSpPr/>
+        <p:nvPr/>
+      </p:nvGrpSpPr>
+      <p:grpSpPr>
+        <a:xfrm>
+          <a:off x="0" y="0"/>
+          <a:ext cx="0" cy="0"/>
+          <a:chOff x="0" y="0"/>
+          <a:chExt cx="0" cy="0"/>
+        </a:xfrm>
+      </p:grpSpPr>
+      <p:sp>
+        <p:nvSpPr>
+          <p:cNvPr id="2" name="TextBox 1"/>
+          <p:cNvSpPr txBox="1"/>
+          <p:nvPr/>
+        </p:nvSpPr>
+        <p:spPr>
+          <a:xfrm>
+            <a:off x="1245609" y="2937138"/>
+            <a:ext cx="6652783" cy="707886"/>
+          </a:xfrm>
+          <a:prstGeom prst="rect">
+            <a:avLst/>
+          </a:prstGeom>
+          <a:noFill/>
+        </p:spPr>
+        <p:txBody>
+          <a:bodyPr wrap="none" rtlCol="0">
+            <a:spAutoFit/>
+          </a:bodyPr>
+          <a:lstStyle/>
+          <a:p>
+            <a:r>
+              <a:rPr lang="en-US" altLang="ko-KR" sz="4000" dirty="0">
+                <a:latin typeface="+mn-ea"/>
+              </a:rPr>
+              <a:t>3</a:t>
+            </a:r>
+            <a:r>
+              <a:rPr lang="ko-KR" altLang="en-US" sz="4000" dirty="0" smtClean="0">
+                <a:latin typeface="+mn-ea"/>
+              </a:rPr>
+              <a:t>장 </a:t>
+            </a:r>
+            <a:r>
+              <a:rPr lang="ko-KR" altLang="en-US" sz="4000" dirty="0" smtClean="0">
+                <a:latin typeface="+mn-ea"/>
+              </a:rPr>
+              <a:t>저장 클래스와 </a:t>
+            </a:r>
+            <a:r>
+              <a:rPr lang="ko-KR" altLang="en-US" sz="4000" dirty="0" err="1" smtClean="0">
+                <a:latin typeface="+mn-ea"/>
+              </a:rPr>
+              <a:t>접근범위</a:t>
+            </a:r>
+            <a:endParaRPr lang="ko-KR" altLang="en-US" sz="4000" dirty="0">
+              <a:latin typeface="+mn-ea"/>
+            </a:endParaRPr>
+          </a:p>
+        </p:txBody>
+      </p:sp>
+      <p:graphicFrame>
+        <p:nvGraphicFramePr>
+          <p:cNvPr id="3" name="개체 2"/>
+          <p:cNvGraphicFramePr>
+            <a:graphicFrameLocks noChangeAspect="1"/>
+          </p:cNvGraphicFramePr>
+          <p:nvPr>
+            <p:extLst>
+              <p:ext uri="{D42A27DB-BD31-4B8C-83A1-F6EECF244321}">
+                <p14:modId xmlns:p14="http://schemas.microsoft.com/office/powerpoint/2010/main" val="1619615563"/>
+              </p:ext>
+            </p:extLst>
+          </p:nvPr>
+        </p:nvGraphicFramePr>
+        <p:xfrm>
+          <a:off x="7989888" y="6242767"/>
+          <a:ext cx="1154112" cy="604837"/>
+        </p:xfrm>
+        <a:graphic>
+          <a:graphicData uri="http://schemas.openxmlformats.org/presentationml/2006/ole">
+            <mc:AlternateContent xmlns:mc="http://schemas.openxmlformats.org/markup-compatibility/2006">
+              <mc:Choice xmlns:v="urn:schemas-microsoft-com:vml" Requires="v">
+                <p:oleObj spid="_x0000_s1026" name="포장기 셸 개체" showAsIcon="1" r:id="rId3" imgW="1154880" imgH="604800" progId="Package">
+                  <p:embed/>
+                </p:oleObj>
+              </mc:Choice>
+              <mc:Fallback>
+                <p:oleObj name="포장기 셸 개체" showAsIcon="1" r:id="rId3" imgW="1154880" imgH="604800" progId="Package">
+                  <p:embed/>
+                  <p:pic>
+                    <p:nvPicPr>
+                      <p:cNvPr id="0" name=""/>
+                      <p:cNvPicPr/>
+                      <p:nvPr/>
+                    </p:nvPicPr>
+                    <p:blipFill>
+                      <a:blip r:embed="rId4"/>
+                      <a:stretch>
+                        <a:fillRect/>
+                      </a:stretch>
+                    </p:blipFill>
+                    <p:spPr>
+                      <a:xfrm>
+                        <a:off x="7989888" y="6242767"/>
+                        <a:ext cx="1154112" cy="604837"/>
+                      </a:xfrm>
+                      <a:prstGeom prst="rect">
+                        <a:avLst/>
+                      </a:prstGeom>
+                    </p:spPr>
+                  </p:pic>
+                </p:oleObj>
+              </mc:Fallback>
+            </mc:AlternateContent>
+          </a:graphicData>
+        </a:graphic>
+      </p:graphicFrame>
+    </p:spTree>
+    <p:extLst>
+      <p:ext uri="{BB962C8B-B14F-4D97-AF65-F5344CB8AC3E}">
+        <p14:creationId xmlns:p14="http://schemas.microsoft.com/office/powerpoint/2010/main" val="2248532225"/>
+      </p:ext>
+    </p:extLst>
+  </p:cSld>
+  <p:clrMapOvr>
+    <a:masterClrMapping/>
+  </p:clrMapOvr>
+  <p:timing>
+    <p:tnLst>
+      <p:par>
+        <p:cTn id="1" dur="indefinite" restart="never" nodeType="tmRoot"/>
+      </p:par>
+    </p:tnLst>
+  </p:timing>
+</p:sld>
+</file>
+
+<file path=ppt/slides/slide13.xml><?xml version="1.0" encoding="utf-8"?>
+<p:sld xmlns:a="http://schemas.openxmlformats.org/drawingml/2006/main" xmlns:r="http://schemas.openxmlformats.org/officeDocument/2006/relationships" xmlns:p="http://schemas.openxmlformats.org/presentationml/2006/main">
+  <p:cSld>
+    <p:spTree>
+      <p:nvGrpSpPr>
+        <p:cNvPr id="1" name=""/>
+        <p:cNvGrpSpPr/>
+        <p:nvPr/>
+      </p:nvGrpSpPr>
+      <p:grpSpPr>
+        <a:xfrm>
+          <a:off x="0" y="0"/>
+          <a:ext cx="0" cy="0"/>
+          <a:chOff x="0" y="0"/>
+          <a:chExt cx="0" cy="0"/>
+        </a:xfrm>
+      </p:grpSpPr>
+      <p:sp>
+        <p:nvSpPr>
+          <p:cNvPr id="2" name="제목 1"/>
+          <p:cNvSpPr>
+            <a:spLocks noGrp="1"/>
+          </p:cNvSpPr>
+          <p:nvPr>
+            <p:ph type="title"/>
+          </p:nvPr>
+        </p:nvSpPr>
+        <p:spPr/>
+        <p:txBody>
+          <a:bodyPr/>
+          <a:lstStyle/>
+          <a:p>
+            <a:r>
+              <a:rPr lang="ko-KR" altLang="en-US" dirty="0" smtClean="0"/>
+              <a:t>저장 클래스와 </a:t>
+            </a:r>
+            <a:r>
+              <a:rPr lang="ko-KR" altLang="en-US" dirty="0" err="1" smtClean="0"/>
+              <a:t>접근범위</a:t>
+            </a:r>
+            <a:endParaRPr lang="ko-KR" altLang="en-US" dirty="0"/>
+          </a:p>
+        </p:txBody>
+      </p:sp>
+      <p:sp>
+        <p:nvSpPr>
+          <p:cNvPr id="3" name="내용 개체 틀 2"/>
+          <p:cNvSpPr>
+            <a:spLocks noGrp="1"/>
+          </p:cNvSpPr>
+          <p:nvPr>
+            <p:ph idx="1"/>
+          </p:nvPr>
+        </p:nvSpPr>
+        <p:spPr/>
+        <p:txBody>
+          <a:bodyPr/>
+          <a:lstStyle/>
+          <a:p>
+            <a:r>
+              <a:rPr lang="ko-KR" altLang="en-US" dirty="0" smtClean="0"/>
+              <a:t>지역변수</a:t>
+            </a:r>
+            <a:endParaRPr lang="en-US" altLang="ko-KR" dirty="0" smtClean="0"/>
+          </a:p>
+          <a:p>
+            <a:pPr lvl="1"/>
+            <a:r>
+              <a:rPr lang="en-US" altLang="ko-KR" dirty="0" smtClean="0"/>
+              <a:t>Block { } </a:t>
+            </a:r>
+            <a:r>
+              <a:rPr lang="ko-KR" altLang="en-US" dirty="0" smtClean="0"/>
+              <a:t>내부에 선언된 변수</a:t>
+            </a:r>
+            <a:endParaRPr lang="en-US" altLang="ko-KR" dirty="0" smtClean="0"/>
+          </a:p>
+          <a:p>
+            <a:pPr lvl="1"/>
+            <a:r>
+              <a:rPr lang="en-US" altLang="ko-KR" dirty="0" smtClean="0"/>
+              <a:t>Block { } </a:t>
+            </a:r>
+            <a:r>
+              <a:rPr lang="ko-KR" altLang="en-US" dirty="0" smtClean="0"/>
+              <a:t>내부에서만 접근 가능</a:t>
+            </a:r>
+            <a:endParaRPr lang="en-US" altLang="ko-KR" dirty="0" smtClean="0"/>
+          </a:p>
+          <a:p>
+            <a:pPr lvl="1"/>
+            <a:r>
+              <a:rPr lang="ko-KR" altLang="en-US" dirty="0" smtClean="0"/>
+              <a:t>상위 </a:t>
+            </a:r>
+            <a:r>
+              <a:rPr lang="en-US" altLang="ko-KR" dirty="0" smtClean="0"/>
+              <a:t>Block</a:t>
+            </a:r>
+            <a:r>
+              <a:rPr lang="ko-KR" altLang="en-US" dirty="0" smtClean="0"/>
+              <a:t>의 지역 변수에는 접근 가능</a:t>
+            </a:r>
+            <a:endParaRPr lang="en-US" altLang="ko-KR" dirty="0" smtClean="0"/>
+          </a:p>
+          <a:p>
+            <a:pPr lvl="1"/>
+            <a:r>
+              <a:rPr lang="ko-KR" altLang="en-US" dirty="0" smtClean="0"/>
+              <a:t>하위 </a:t>
+            </a:r>
+            <a:r>
+              <a:rPr lang="en-US" altLang="ko-KR" dirty="0" smtClean="0"/>
+              <a:t>Block</a:t>
+            </a:r>
+            <a:r>
+              <a:rPr lang="ko-KR" altLang="en-US" dirty="0" smtClean="0"/>
+              <a:t>의 지역 변수에는 접근 불가능</a:t>
+            </a:r>
+            <a:endParaRPr lang="en-US" altLang="ko-KR" dirty="0" smtClean="0"/>
+          </a:p>
+          <a:p>
+            <a:pPr lvl="1"/>
+            <a:endParaRPr lang="en-US" altLang="ko-KR" dirty="0"/>
+          </a:p>
+        </p:txBody>
+      </p:sp>
+      <p:pic>
+        <p:nvPicPr>
+          <p:cNvPr id="5" name="그림 4"/>
+          <p:cNvPicPr>
+            <a:picLocks noChangeAspect="1"/>
+          </p:cNvPicPr>
+          <p:nvPr/>
+        </p:nvPicPr>
+        <p:blipFill rotWithShape="1">
+          <a:blip r:embed="rId2"/>
+          <a:srcRect b="2453"/>
+          <a:stretch/>
+        </p:blipFill>
+        <p:spPr>
+          <a:xfrm>
+            <a:off x="390525" y="2996952"/>
+            <a:ext cx="8753475" cy="3744416"/>
+          </a:xfrm>
+          <a:prstGeom prst="rect">
+            <a:avLst/>
+          </a:prstGeom>
+        </p:spPr>
+      </p:pic>
+    </p:spTree>
+    <p:extLst>
+      <p:ext uri="{BB962C8B-B14F-4D97-AF65-F5344CB8AC3E}">
+        <p14:creationId xmlns:p14="http://schemas.microsoft.com/office/powerpoint/2010/main" val="716975381"/>
+      </p:ext>
+    </p:extLst>
+  </p:cSld>
+  <p:clrMapOvr>
+    <a:masterClrMapping/>
+  </p:clrMapOvr>
+  <p:timing>
+    <p:tnLst>
+      <p:par>
+        <p:cTn id="1" dur="indefinite" restart="never" nodeType="tmRoot"/>
+      </p:par>
+    </p:tnLst>
+  </p:timing>
+</p:sld>
+</file>
+
+<file path=ppt/slides/slide14.xml><?xml version="1.0" encoding="utf-8"?>
+<p:sld xmlns:a="http://schemas.openxmlformats.org/drawingml/2006/main" xmlns:r="http://schemas.openxmlformats.org/officeDocument/2006/relationships" xmlns:p="http://schemas.openxmlformats.org/presentationml/2006/main">
+  <p:cSld>
+    <p:spTree>
+      <p:nvGrpSpPr>
+        <p:cNvPr id="1" name=""/>
+        <p:cNvGrpSpPr/>
+        <p:nvPr/>
+      </p:nvGrpSpPr>
+      <p:grpSpPr>
+        <a:xfrm>
+          <a:off x="0" y="0"/>
+          <a:ext cx="0" cy="0"/>
+          <a:chOff x="0" y="0"/>
+          <a:chExt cx="0" cy="0"/>
+        </a:xfrm>
+      </p:grpSpPr>
+      <p:sp>
+        <p:nvSpPr>
+          <p:cNvPr id="2" name="제목 1"/>
+          <p:cNvSpPr>
+            <a:spLocks noGrp="1"/>
+          </p:cNvSpPr>
+          <p:nvPr>
+            <p:ph type="title"/>
+          </p:nvPr>
+        </p:nvSpPr>
+        <p:spPr/>
+        <p:txBody>
+          <a:bodyPr/>
+          <a:lstStyle/>
+          <a:p>
+            <a:r>
+              <a:rPr lang="ko-KR" altLang="en-US" dirty="0" smtClean="0"/>
+              <a:t>저장 클래스와 </a:t>
+            </a:r>
+            <a:r>
+              <a:rPr lang="ko-KR" altLang="en-US" dirty="0" err="1" smtClean="0"/>
+              <a:t>접근범위</a:t>
+            </a:r>
+            <a:endParaRPr lang="ko-KR" altLang="en-US" dirty="0"/>
+          </a:p>
+        </p:txBody>
+      </p:sp>
+      <p:sp>
+        <p:nvSpPr>
+          <p:cNvPr id="3" name="내용 개체 틀 2"/>
+          <p:cNvSpPr>
+            <a:spLocks noGrp="1"/>
+          </p:cNvSpPr>
+          <p:nvPr>
+            <p:ph idx="1"/>
+          </p:nvPr>
+        </p:nvSpPr>
+        <p:spPr/>
+        <p:txBody>
+          <a:bodyPr/>
+          <a:lstStyle/>
+          <a:p>
+            <a:r>
+              <a:rPr lang="ko-KR" altLang="en-US" dirty="0" smtClean="0"/>
+              <a:t>지역변수</a:t>
+            </a:r>
+            <a:endParaRPr lang="en-US" altLang="ko-KR" dirty="0" smtClean="0"/>
+          </a:p>
+          <a:p>
+            <a:pPr lvl="1"/>
+            <a:r>
+              <a:rPr lang="ko-KR" altLang="en-US" dirty="0" smtClean="0"/>
+              <a:t>같은 이름이면 접근 가능한 변수 중 가장 가까운 변수에 접근</a:t>
+            </a:r>
+            <a:endParaRPr lang="ko-KR" altLang="en-US" dirty="0"/>
+          </a:p>
+        </p:txBody>
+      </p:sp>
+      <p:pic>
+        <p:nvPicPr>
+          <p:cNvPr id="4" name="그림 3"/>
+          <p:cNvPicPr>
+            <a:picLocks noChangeAspect="1"/>
+          </p:cNvPicPr>
+          <p:nvPr/>
+        </p:nvPicPr>
+        <p:blipFill rotWithShape="1">
+          <a:blip r:embed="rId2"/>
+          <a:srcRect t="12096"/>
+          <a:stretch/>
+        </p:blipFill>
+        <p:spPr>
+          <a:xfrm>
+            <a:off x="371475" y="3573016"/>
+            <a:ext cx="8772525" cy="3139827"/>
+          </a:xfrm>
+          <a:prstGeom prst="rect">
+            <a:avLst/>
+          </a:prstGeom>
+        </p:spPr>
+      </p:pic>
+    </p:spTree>
+    <p:extLst>
+      <p:ext uri="{BB962C8B-B14F-4D97-AF65-F5344CB8AC3E}">
+        <p14:creationId xmlns:p14="http://schemas.microsoft.com/office/powerpoint/2010/main" val="3096176865"/>
+      </p:ext>
+    </p:extLst>
+  </p:cSld>
+  <p:clrMapOvr>
+    <a:masterClrMapping/>
+  </p:clrMapOvr>
+  <p:timing>
+    <p:tnLst>
+      <p:par>
+        <p:cTn id="1" dur="indefinite" restart="never" nodeType="tmRoot"/>
+      </p:par>
+    </p:tnLst>
+  </p:timing>
+</p:sld>
+</file>
+
+<file path=ppt/slides/slide15.xml><?xml version="1.0" encoding="utf-8"?>
+<p:sld xmlns:a="http://schemas.openxmlformats.org/drawingml/2006/main" xmlns:r="http://schemas.openxmlformats.org/officeDocument/2006/relationships" xmlns:p="http://schemas.openxmlformats.org/presentationml/2006/main">
+  <p:cSld>
+    <p:spTree>
+      <p:nvGrpSpPr>
+        <p:cNvPr id="1" name=""/>
+        <p:cNvGrpSpPr/>
+        <p:nvPr/>
+      </p:nvGrpSpPr>
+      <p:grpSpPr>
+        <a:xfrm>
+          <a:off x="0" y="0"/>
+          <a:ext cx="0" cy="0"/>
+          <a:chOff x="0" y="0"/>
+          <a:chExt cx="0" cy="0"/>
+        </a:xfrm>
+      </p:grpSpPr>
+      <p:sp>
+        <p:nvSpPr>
+          <p:cNvPr id="2" name="제목 1"/>
+          <p:cNvSpPr>
+            <a:spLocks noGrp="1"/>
+          </p:cNvSpPr>
+          <p:nvPr>
+            <p:ph type="title"/>
+          </p:nvPr>
+        </p:nvSpPr>
+        <p:spPr/>
+        <p:txBody>
+          <a:bodyPr/>
+          <a:lstStyle/>
+          <a:p>
+            <a:r>
+              <a:rPr lang="ko-KR" altLang="en-US" dirty="0" smtClean="0"/>
+              <a:t>저장 클래스와 </a:t>
+            </a:r>
+            <a:r>
+              <a:rPr lang="ko-KR" altLang="en-US" dirty="0" err="1" smtClean="0"/>
+              <a:t>접근범위</a:t>
+            </a:r>
+            <a:endParaRPr lang="ko-KR" altLang="en-US" dirty="0"/>
+          </a:p>
+        </p:txBody>
+      </p:sp>
+      <p:sp>
+        <p:nvSpPr>
+          <p:cNvPr id="3" name="내용 개체 틀 2"/>
+          <p:cNvSpPr>
+            <a:spLocks noGrp="1"/>
+          </p:cNvSpPr>
+          <p:nvPr>
+            <p:ph idx="1"/>
+          </p:nvPr>
+        </p:nvSpPr>
+        <p:spPr/>
+        <p:txBody>
+          <a:bodyPr/>
+          <a:lstStyle/>
+          <a:p>
+            <a:r>
+              <a:rPr lang="ko-KR" altLang="en-US" dirty="0" smtClean="0"/>
+              <a:t>전역 변수</a:t>
+            </a:r>
+            <a:endParaRPr lang="en-US" altLang="ko-KR" dirty="0" smtClean="0"/>
+          </a:p>
+          <a:p>
+            <a:pPr lvl="1"/>
+            <a:r>
+              <a:rPr lang="ko-KR" altLang="en-US" dirty="0" smtClean="0"/>
+              <a:t>동일 모듈 내에서 접근 가능</a:t>
+            </a:r>
+            <a:endParaRPr lang="en-US" altLang="ko-KR" dirty="0" smtClean="0"/>
+          </a:p>
+          <a:p>
+            <a:pPr lvl="1"/>
+            <a:r>
+              <a:rPr lang="ko-KR" altLang="en-US" dirty="0" smtClean="0"/>
+              <a:t>첫 접근 시점에 초기화</a:t>
+            </a:r>
+            <a:endParaRPr lang="en-US" altLang="ko-KR" dirty="0" smtClean="0"/>
+          </a:p>
+          <a:p>
+            <a:pPr lvl="1"/>
+            <a:endParaRPr lang="en-US" altLang="ko-KR" dirty="0"/>
+          </a:p>
+          <a:p>
+            <a:pPr lvl="1"/>
+            <a:r>
+              <a:rPr lang="ko-KR" altLang="en-US" dirty="0" smtClean="0"/>
+              <a:t>우선순위</a:t>
+            </a:r>
+            <a:r>
+              <a:rPr lang="en-US" altLang="ko-KR" dirty="0" smtClean="0"/>
+              <a:t>: </a:t>
+            </a:r>
+            <a:r>
+              <a:rPr lang="ko-KR" altLang="en-US" dirty="0" err="1" smtClean="0"/>
+              <a:t>전역변수</a:t>
+            </a:r>
+            <a:r>
+              <a:rPr lang="ko-KR" altLang="en-US" dirty="0" smtClean="0"/>
+              <a:t> </a:t>
+            </a:r>
+            <a:r>
+              <a:rPr lang="en-US" altLang="ko-KR" dirty="0" smtClean="0"/>
+              <a:t>&lt; </a:t>
+            </a:r>
+            <a:r>
+              <a:rPr lang="ko-KR" altLang="en-US" dirty="0" smtClean="0"/>
+              <a:t>지역변수</a:t>
+            </a:r>
+            <a:endParaRPr lang="en-US" altLang="ko-KR" dirty="0" smtClean="0"/>
+          </a:p>
+          <a:p>
+            <a:pPr lvl="1"/>
+            <a:endParaRPr lang="ko-KR" altLang="en-US" dirty="0"/>
+          </a:p>
+        </p:txBody>
+      </p:sp>
+      <p:pic>
+        <p:nvPicPr>
+          <p:cNvPr id="5" name="그림 4"/>
+          <p:cNvPicPr>
+            <a:picLocks noChangeAspect="1"/>
+          </p:cNvPicPr>
+          <p:nvPr/>
+        </p:nvPicPr>
+        <p:blipFill>
+          <a:blip r:embed="rId2"/>
+          <a:stretch>
+            <a:fillRect/>
+          </a:stretch>
+        </p:blipFill>
+        <p:spPr>
+          <a:xfrm>
+            <a:off x="375625" y="4550618"/>
+            <a:ext cx="8772525" cy="2190750"/>
+          </a:xfrm>
+          <a:prstGeom prst="rect">
+            <a:avLst/>
+          </a:prstGeom>
+        </p:spPr>
+      </p:pic>
+    </p:spTree>
+    <p:extLst>
+      <p:ext uri="{BB962C8B-B14F-4D97-AF65-F5344CB8AC3E}">
+        <p14:creationId xmlns:p14="http://schemas.microsoft.com/office/powerpoint/2010/main" val="3945910518"/>
+      </p:ext>
+    </p:extLst>
+  </p:cSld>
+  <p:clrMapOvr>
+    <a:masterClrMapping/>
+  </p:clrMapOvr>
+  <p:timing>
+    <p:tnLst>
+      <p:par>
+        <p:cTn id="1" dur="indefinite" restart="never" nodeType="tmRoot"/>
+      </p:par>
+    </p:tnLst>
+  </p:timing>
+</p:sld>
+</file>
+
+<file path=ppt/slides/slide16.xml><?xml version="1.0" encoding="utf-8"?>
+<p:sld xmlns:a="http://schemas.openxmlformats.org/drawingml/2006/main" xmlns:r="http://schemas.openxmlformats.org/officeDocument/2006/relationships" xmlns:p="http://schemas.openxmlformats.org/presentationml/2006/main">
+  <p:cSld>
+    <p:spTree>
+      <p:nvGrpSpPr>
+        <p:cNvPr id="1" name=""/>
+        <p:cNvGrpSpPr/>
+        <p:nvPr/>
+      </p:nvGrpSpPr>
+      <p:grpSpPr>
+        <a:xfrm>
+          <a:off x="0" y="0"/>
+          <a:ext cx="0" cy="0"/>
+          <a:chOff x="0" y="0"/>
+          <a:chExt cx="0" cy="0"/>
+        </a:xfrm>
+      </p:grpSpPr>
+      <p:sp>
+        <p:nvSpPr>
+          <p:cNvPr id="2" name="TextBox 1"/>
+          <p:cNvSpPr txBox="1"/>
+          <p:nvPr/>
+        </p:nvSpPr>
+        <p:spPr>
+          <a:xfrm>
+            <a:off x="1853756" y="2937138"/>
+            <a:ext cx="5436488" cy="707886"/>
+          </a:xfrm>
+          <a:prstGeom prst="rect">
+            <a:avLst/>
+          </a:prstGeom>
+          <a:noFill/>
+        </p:spPr>
+        <p:txBody>
+          <a:bodyPr wrap="none" rtlCol="0">
+            <a:spAutoFit/>
+          </a:bodyPr>
+          <a:lstStyle/>
+          <a:p>
+            <a:r>
+              <a:rPr lang="en-US" altLang="ko-KR" sz="4000" dirty="0">
+                <a:latin typeface="+mn-ea"/>
+              </a:rPr>
+              <a:t>4</a:t>
+            </a:r>
+            <a:r>
+              <a:rPr lang="ko-KR" altLang="en-US" sz="4000" dirty="0" smtClean="0">
+                <a:latin typeface="+mn-ea"/>
+              </a:rPr>
+              <a:t>장 </a:t>
+            </a:r>
+            <a:r>
+              <a:rPr lang="ko-KR" altLang="en-US" sz="4000" dirty="0" err="1" smtClean="0">
+                <a:latin typeface="+mn-ea"/>
+              </a:rPr>
+              <a:t>옵셔널</a:t>
+            </a:r>
+            <a:r>
+              <a:rPr lang="ko-KR" altLang="en-US" sz="4000" dirty="0" smtClean="0">
+                <a:latin typeface="+mn-ea"/>
+              </a:rPr>
+              <a:t> </a:t>
+            </a:r>
+            <a:r>
+              <a:rPr lang="en-US" altLang="ko-KR" sz="4000" dirty="0" smtClean="0">
+                <a:latin typeface="+mn-ea"/>
+              </a:rPr>
+              <a:t>(swift only)</a:t>
+            </a:r>
+            <a:endParaRPr lang="ko-KR" altLang="en-US" sz="4000" dirty="0">
+              <a:latin typeface="+mn-ea"/>
+            </a:endParaRPr>
+          </a:p>
+        </p:txBody>
+      </p:sp>
+      <p:graphicFrame>
+        <p:nvGraphicFramePr>
+          <p:cNvPr id="4" name="개체 3"/>
+          <p:cNvGraphicFramePr>
+            <a:graphicFrameLocks noChangeAspect="1"/>
+          </p:cNvGraphicFramePr>
+          <p:nvPr>
+            <p:extLst>
+              <p:ext uri="{D42A27DB-BD31-4B8C-83A1-F6EECF244321}">
+                <p14:modId xmlns:p14="http://schemas.microsoft.com/office/powerpoint/2010/main" val="174843180"/>
+              </p:ext>
+            </p:extLst>
+          </p:nvPr>
+        </p:nvGraphicFramePr>
+        <p:xfrm>
+          <a:off x="7958572" y="6253163"/>
+          <a:ext cx="1154112" cy="604837"/>
+        </p:xfrm>
+        <a:graphic>
+          <a:graphicData uri="http://schemas.openxmlformats.org/presentationml/2006/ole">
+            <mc:AlternateContent xmlns:mc="http://schemas.openxmlformats.org/markup-compatibility/2006">
+              <mc:Choice xmlns:v="urn:schemas-microsoft-com:vml" Requires="v">
+                <p:oleObj spid="_x0000_s2050" name="포장기 셸 개체" showAsIcon="1" r:id="rId3" imgW="1154880" imgH="604800" progId="Package">
+                  <p:embed/>
+                </p:oleObj>
+              </mc:Choice>
+              <mc:Fallback>
+                <p:oleObj name="포장기 셸 개체" showAsIcon="1" r:id="rId3" imgW="1154880" imgH="604800" progId="Package">
+                  <p:embed/>
+                  <p:pic>
+                    <p:nvPicPr>
+                      <p:cNvPr id="0" name=""/>
+                      <p:cNvPicPr/>
+                      <p:nvPr/>
+                    </p:nvPicPr>
+                    <p:blipFill>
+                      <a:blip r:embed="rId4"/>
+                      <a:stretch>
+                        <a:fillRect/>
+                      </a:stretch>
+                    </p:blipFill>
+                    <p:spPr>
+                      <a:xfrm>
+                        <a:off x="7958572" y="6253163"/>
+                        <a:ext cx="1154112" cy="604837"/>
+                      </a:xfrm>
+                      <a:prstGeom prst="rect">
+                        <a:avLst/>
+                      </a:prstGeom>
+                    </p:spPr>
+                  </p:pic>
+                </p:oleObj>
+              </mc:Fallback>
+            </mc:AlternateContent>
+          </a:graphicData>
+        </a:graphic>
+      </p:graphicFrame>
+    </p:spTree>
+    <p:extLst>
+      <p:ext uri="{BB962C8B-B14F-4D97-AF65-F5344CB8AC3E}">
+        <p14:creationId xmlns:p14="http://schemas.microsoft.com/office/powerpoint/2010/main" val="750454511"/>
+      </p:ext>
+    </p:extLst>
+  </p:cSld>
+  <p:clrMapOvr>
+    <a:masterClrMapping/>
+  </p:clrMapOvr>
+  <p:timing>
+    <p:tnLst>
+      <p:par>
+        <p:cTn id="1" dur="indefinite" restart="never" nodeType="tmRoot"/>
+      </p:par>
+    </p:tnLst>
+  </p:timing>
+</p:sld>
+</file>
+
+<file path=ppt/slides/slide17.xml><?xml version="1.0" encoding="utf-8"?>
+<p:sld xmlns:a="http://schemas.openxmlformats.org/drawingml/2006/main" xmlns:r="http://schemas.openxmlformats.org/officeDocument/2006/relationships" xmlns:p="http://schemas.openxmlformats.org/presentationml/2006/main">
+  <p:cSld>
+    <p:spTree>
+      <p:nvGrpSpPr>
+        <p:cNvPr id="1" name=""/>
+        <p:cNvGrpSpPr/>
+        <p:nvPr/>
+      </p:nvGrpSpPr>
+      <p:grpSpPr>
+        <a:xfrm>
+          <a:off x="0" y="0"/>
+          <a:ext cx="0" cy="0"/>
+          <a:chOff x="0" y="0"/>
+          <a:chExt cx="0" cy="0"/>
+        </a:xfrm>
+      </p:grpSpPr>
+      <p:sp>
+        <p:nvSpPr>
+          <p:cNvPr id="2" name="제목 1"/>
+          <p:cNvSpPr>
+            <a:spLocks noGrp="1"/>
+          </p:cNvSpPr>
+          <p:nvPr>
+            <p:ph type="title"/>
+          </p:nvPr>
+        </p:nvSpPr>
+        <p:spPr/>
+        <p:txBody>
+          <a:bodyPr/>
+          <a:lstStyle/>
+          <a:p>
+            <a:r>
+              <a:rPr lang="ko-KR" altLang="en-US" dirty="0" err="1" smtClean="0"/>
+              <a:t>옵셔널</a:t>
+            </a:r>
+            <a:endParaRPr lang="ko-KR" altLang="en-US" dirty="0"/>
+          </a:p>
+        </p:txBody>
+      </p:sp>
+      <p:sp>
+        <p:nvSpPr>
+          <p:cNvPr id="3" name="내용 개체 틀 2"/>
+          <p:cNvSpPr>
+            <a:spLocks noGrp="1"/>
+          </p:cNvSpPr>
+          <p:nvPr>
+            <p:ph idx="1"/>
+          </p:nvPr>
+        </p:nvSpPr>
+        <p:spPr/>
+        <p:txBody>
+          <a:bodyPr/>
+          <a:lstStyle/>
+          <a:p>
+            <a:r>
+              <a:rPr lang="en-US" altLang="ko-KR" dirty="0" smtClean="0"/>
+              <a:t>Optional Type</a:t>
+            </a:r>
+          </a:p>
+          <a:p>
+            <a:pPr lvl="1"/>
+            <a:r>
+              <a:rPr lang="en-US" altLang="ko-KR" dirty="0" smtClean="0"/>
+              <a:t>nil </a:t>
+            </a:r>
+            <a:r>
+              <a:rPr lang="ko-KR" altLang="en-US" dirty="0" smtClean="0"/>
+              <a:t>값을 가질 수 있는 형식</a:t>
+            </a:r>
+            <a:endParaRPr lang="en-US" altLang="ko-KR" dirty="0" smtClean="0"/>
+          </a:p>
+          <a:p>
+            <a:pPr lvl="1"/>
+            <a:r>
+              <a:rPr lang="ko-KR" altLang="en-US" dirty="0" smtClean="0"/>
+              <a:t>선언 방법</a:t>
+            </a:r>
+            <a:endParaRPr lang="en-US" altLang="ko-KR" dirty="0" smtClean="0"/>
+          </a:p>
+          <a:p>
+            <a:pPr lvl="2"/>
+            <a:r>
+              <a:rPr lang="en-US" altLang="ko-KR" dirty="0" err="1"/>
+              <a:t>v</a:t>
+            </a:r>
+            <a:r>
+              <a:rPr lang="en-US" altLang="ko-KR" dirty="0" err="1" smtClean="0"/>
+              <a:t>ar</a:t>
+            </a:r>
+            <a:r>
+              <a:rPr lang="en-US" altLang="ko-KR" dirty="0" smtClean="0"/>
+              <a:t> name: String</a:t>
+            </a:r>
+            <a:r>
+              <a:rPr lang="en-US" altLang="ko-KR" dirty="0" smtClean="0">
+                <a:solidFill>
+                  <a:srgbClr val="FF0000"/>
+                </a:solidFill>
+              </a:rPr>
+              <a:t>? </a:t>
+            </a:r>
+            <a:r>
+              <a:rPr lang="en-US" altLang="ko-KR" sz="1400" dirty="0" smtClean="0">
+                <a:solidFill>
+                  <a:srgbClr val="FFFF00"/>
+                </a:solidFill>
+                <a:sym typeface="Wingdings" panose="05000000000000000000" pitchFamily="2" charset="2"/>
+              </a:rPr>
+              <a:t> </a:t>
+            </a:r>
+            <a:r>
+              <a:rPr lang="ko-KR" altLang="en-US" sz="1400" dirty="0" err="1" smtClean="0">
+                <a:solidFill>
+                  <a:srgbClr val="FFFF00"/>
+                </a:solidFill>
+                <a:sym typeface="Wingdings" panose="05000000000000000000" pitchFamily="2" charset="2"/>
+              </a:rPr>
+              <a:t>자료형</a:t>
+            </a:r>
+            <a:r>
+              <a:rPr lang="ko-KR" altLang="en-US" sz="1400" dirty="0" smtClean="0">
+                <a:solidFill>
+                  <a:srgbClr val="FFFF00"/>
+                </a:solidFill>
+                <a:sym typeface="Wingdings" panose="05000000000000000000" pitchFamily="2" charset="2"/>
+              </a:rPr>
+              <a:t> 뒤에 </a:t>
+            </a:r>
+            <a:r>
+              <a:rPr lang="en-US" altLang="ko-KR" sz="1400" dirty="0" smtClean="0">
+                <a:solidFill>
+                  <a:srgbClr val="FFFF00"/>
+                </a:solidFill>
+                <a:sym typeface="Wingdings" panose="05000000000000000000" pitchFamily="2" charset="2"/>
+              </a:rPr>
+              <a:t>?</a:t>
+            </a:r>
+            <a:r>
+              <a:rPr lang="ko-KR" altLang="en-US" sz="1400" dirty="0" smtClean="0">
+                <a:solidFill>
+                  <a:srgbClr val="FFFF00"/>
+                </a:solidFill>
+                <a:sym typeface="Wingdings" panose="05000000000000000000" pitchFamily="2" charset="2"/>
+              </a:rPr>
+              <a:t> 추가</a:t>
+            </a:r>
+            <a:endParaRPr lang="en-US" altLang="ko-KR" sz="1400" dirty="0" smtClean="0">
+              <a:solidFill>
+                <a:srgbClr val="FFFF00"/>
+              </a:solidFill>
+              <a:sym typeface="Wingdings" panose="05000000000000000000" pitchFamily="2" charset="2"/>
+            </a:endParaRPr>
+          </a:p>
+          <a:p>
+            <a:pPr lvl="1"/>
+            <a:endParaRPr lang="en-US" altLang="ko-KR" dirty="0" smtClean="0">
+              <a:solidFill>
+                <a:srgbClr val="FFFF00"/>
+              </a:solidFill>
+            </a:endParaRPr>
+          </a:p>
+          <a:p>
+            <a:pPr lvl="1"/>
+            <a:r>
+              <a:rPr lang="ko-KR" altLang="en-US" dirty="0" smtClean="0"/>
+              <a:t>초기화 하지 않으면 </a:t>
+            </a:r>
+            <a:r>
+              <a:rPr lang="en-US" altLang="ko-KR" dirty="0" smtClean="0"/>
+              <a:t>nil</a:t>
+            </a:r>
+            <a:r>
+              <a:rPr lang="ko-KR" altLang="en-US" dirty="0" smtClean="0"/>
+              <a:t>로 자동 초기화</a:t>
+            </a:r>
+            <a:endParaRPr lang="en-US" altLang="ko-KR" dirty="0" smtClean="0"/>
+          </a:p>
+        </p:txBody>
+      </p:sp>
+    </p:spTree>
+    <p:extLst>
+      <p:ext uri="{BB962C8B-B14F-4D97-AF65-F5344CB8AC3E}">
+        <p14:creationId xmlns:p14="http://schemas.microsoft.com/office/powerpoint/2010/main" val="3541069758"/>
+      </p:ext>
+    </p:extLst>
+  </p:cSld>
+  <p:clrMapOvr>
+    <a:masterClrMapping/>
+  </p:clrMapOvr>
+  <p:timing>
+    <p:tnLst>
+      <p:par>
+        <p:cTn id="1" dur="indefinite" restart="never" nodeType="tmRoot"/>
+      </p:par>
+    </p:tnLst>
+  </p:timing>
+</p:sld>
+</file>
+
+<file path=ppt/slides/slide18.xml><?xml version="1.0" encoding="utf-8"?>
+<p:sld xmlns:a="http://schemas.openxmlformats.org/drawingml/2006/main" xmlns:r="http://schemas.openxmlformats.org/officeDocument/2006/relationships" xmlns:p="http://schemas.openxmlformats.org/presentationml/2006/main">
+  <p:cSld>
+    <p:spTree>
+      <p:nvGrpSpPr>
+        <p:cNvPr id="1" name=""/>
+        <p:cNvGrpSpPr/>
+        <p:nvPr/>
+      </p:nvGrpSpPr>
+      <p:grpSpPr>
+        <a:xfrm>
+          <a:off x="0" y="0"/>
+          <a:ext cx="0" cy="0"/>
+          <a:chOff x="0" y="0"/>
+          <a:chExt cx="0" cy="0"/>
+        </a:xfrm>
+      </p:grpSpPr>
+      <p:sp>
+        <p:nvSpPr>
+          <p:cNvPr id="2" name="제목 1"/>
+          <p:cNvSpPr>
+            <a:spLocks noGrp="1"/>
+          </p:cNvSpPr>
+          <p:nvPr>
+            <p:ph type="title"/>
+          </p:nvPr>
+        </p:nvSpPr>
+        <p:spPr/>
+        <p:txBody>
+          <a:bodyPr/>
+          <a:lstStyle/>
+          <a:p>
+            <a:r>
+              <a:rPr lang="ko-KR" altLang="en-US" dirty="0" err="1" smtClean="0"/>
+              <a:t>옵셔널</a:t>
+            </a:r>
+            <a:endParaRPr lang="ko-KR" altLang="en-US" dirty="0"/>
+          </a:p>
+        </p:txBody>
+      </p:sp>
+      <p:sp>
+        <p:nvSpPr>
+          <p:cNvPr id="3" name="내용 개체 틀 2"/>
+          <p:cNvSpPr>
+            <a:spLocks noGrp="1"/>
+          </p:cNvSpPr>
+          <p:nvPr>
+            <p:ph idx="1"/>
+          </p:nvPr>
+        </p:nvSpPr>
+        <p:spPr/>
+        <p:txBody>
+          <a:bodyPr/>
+          <a:lstStyle/>
+          <a:p>
+            <a:r>
+              <a:rPr lang="en-US" altLang="ko-KR" dirty="0"/>
+              <a:t>Wrapping &amp; </a:t>
+            </a:r>
+            <a:r>
+              <a:rPr lang="en-US" altLang="ko-KR" dirty="0" smtClean="0"/>
+              <a:t>Unwrapping</a:t>
+            </a:r>
+          </a:p>
+          <a:p>
+            <a:pPr lvl="1"/>
+            <a:r>
+              <a:rPr lang="en-US" altLang="ko-KR" dirty="0" smtClean="0"/>
+              <a:t>Optional type</a:t>
+            </a:r>
+            <a:r>
+              <a:rPr lang="ko-KR" altLang="en-US" dirty="0" smtClean="0"/>
+              <a:t>에 </a:t>
+            </a:r>
+            <a:r>
+              <a:rPr lang="en-US" altLang="ko-KR" dirty="0" smtClean="0"/>
+              <a:t>‘!’ </a:t>
+            </a:r>
+            <a:r>
+              <a:rPr lang="ko-KR" altLang="en-US" dirty="0" smtClean="0"/>
+              <a:t>문자를 붙여야 값이 추출됨</a:t>
+            </a:r>
+            <a:endParaRPr lang="en-US" altLang="ko-KR" dirty="0"/>
+          </a:p>
+          <a:p>
+            <a:pPr lvl="2"/>
+            <a:r>
+              <a:rPr lang="ko-KR" altLang="en-US" dirty="0" smtClean="0"/>
+              <a:t>반드시 값이 저장되어 있어야 함</a:t>
+            </a:r>
+            <a:r>
+              <a:rPr lang="en-US" altLang="ko-KR" dirty="0" smtClean="0"/>
+              <a:t>.</a:t>
+            </a:r>
+          </a:p>
+          <a:p>
+            <a:pPr lvl="1"/>
+            <a:endParaRPr lang="en-US" altLang="ko-KR" dirty="0"/>
+          </a:p>
+          <a:p>
+            <a:pPr lvl="1"/>
+            <a:endParaRPr lang="en-US" altLang="ko-KR" dirty="0" smtClean="0"/>
+          </a:p>
+          <a:p>
+            <a:pPr lvl="1"/>
+            <a:endParaRPr lang="en-US" altLang="ko-KR" dirty="0"/>
+          </a:p>
+          <a:p>
+            <a:pPr lvl="1"/>
+            <a:r>
+              <a:rPr lang="ko-KR" altLang="en-US" dirty="0" smtClean="0"/>
+              <a:t>선언 시 </a:t>
+            </a:r>
+            <a:r>
+              <a:rPr lang="en-US" altLang="ko-KR" dirty="0" smtClean="0"/>
+              <a:t>‘?’ </a:t>
+            </a:r>
+            <a:r>
+              <a:rPr lang="ko-KR" altLang="en-US" dirty="0" smtClean="0"/>
+              <a:t>대신 </a:t>
+            </a:r>
+            <a:r>
+              <a:rPr lang="en-US" altLang="ko-KR" dirty="0" smtClean="0"/>
+              <a:t>‘!’</a:t>
+            </a:r>
+            <a:r>
+              <a:rPr lang="ko-KR" altLang="en-US" dirty="0" smtClean="0"/>
+              <a:t>를 사용하면 </a:t>
+            </a:r>
+            <a:r>
+              <a:rPr lang="en-US" altLang="ko-KR" dirty="0" smtClean="0"/>
+              <a:t>‘!’ </a:t>
+            </a:r>
+            <a:r>
+              <a:rPr lang="ko-KR" altLang="en-US" dirty="0" smtClean="0"/>
+              <a:t>연산자 사용하지 않아도 값 추출</a:t>
+            </a:r>
+            <a:endParaRPr lang="en-US" altLang="ko-KR" dirty="0" smtClean="0"/>
+          </a:p>
+          <a:p>
+            <a:pPr lvl="2"/>
+            <a:r>
+              <a:rPr lang="en-US" altLang="ko-KR" dirty="0" err="1" smtClean="0"/>
+              <a:t>var</a:t>
+            </a:r>
+            <a:r>
+              <a:rPr lang="en-US" altLang="ko-KR" dirty="0" smtClean="0"/>
+              <a:t>  name: String! = “Swift”</a:t>
+            </a:r>
+          </a:p>
+          <a:p>
+            <a:pPr lvl="2"/>
+            <a:r>
+              <a:rPr lang="en-US" altLang="ko-KR" dirty="0" smtClean="0"/>
+              <a:t>print(name) // Swift</a:t>
+            </a:r>
+          </a:p>
+          <a:p>
+            <a:pPr lvl="2"/>
+            <a:endParaRPr lang="en-US" altLang="ko-KR" dirty="0" smtClean="0"/>
+          </a:p>
+        </p:txBody>
+      </p:sp>
+      <p:pic>
+        <p:nvPicPr>
+          <p:cNvPr id="4" name="그림 3"/>
+          <p:cNvPicPr>
+            <a:picLocks noChangeAspect="1"/>
+          </p:cNvPicPr>
+          <p:nvPr/>
+        </p:nvPicPr>
+        <p:blipFill>
+          <a:blip r:embed="rId2"/>
+          <a:stretch>
+            <a:fillRect/>
+          </a:stretch>
+        </p:blipFill>
+        <p:spPr>
+          <a:xfrm>
+            <a:off x="390525" y="4149080"/>
+            <a:ext cx="8753475" cy="2552700"/>
+          </a:xfrm>
+          <a:prstGeom prst="rect">
+            <a:avLst/>
+          </a:prstGeom>
+        </p:spPr>
+      </p:pic>
+      <p:grpSp>
+        <p:nvGrpSpPr>
+          <p:cNvPr id="5" name="그룹 4"/>
+          <p:cNvGrpSpPr/>
+          <p:nvPr/>
+        </p:nvGrpSpPr>
+        <p:grpSpPr>
+          <a:xfrm>
+            <a:off x="1979712" y="1948770"/>
+            <a:ext cx="4077498" cy="616134"/>
+            <a:chOff x="1547664" y="2492896"/>
+            <a:chExt cx="3024271" cy="616134"/>
+          </a:xfrm>
+        </p:grpSpPr>
+        <p:sp>
+          <p:nvSpPr>
+            <p:cNvPr id="6" name="TextBox 5"/>
+            <p:cNvSpPr txBox="1"/>
+            <p:nvPr/>
+          </p:nvSpPr>
+          <p:spPr>
+            <a:xfrm>
+              <a:off x="1547664" y="2708920"/>
+              <a:ext cx="1572497" cy="400110"/>
+            </a:xfrm>
+            <a:prstGeom prst="rect">
+              <a:avLst/>
+            </a:prstGeom>
+            <a:noFill/>
+          </p:spPr>
+          <p:txBody>
+            <a:bodyPr wrap="none" rtlCol="0">
+              <a:spAutoFit/>
+            </a:bodyPr>
+            <a:lstStyle/>
+            <a:p>
+              <a:r>
+                <a:rPr lang="en-US" altLang="ko-KR" sz="2000" dirty="0" err="1" smtClean="0">
+                  <a:latin typeface="+mn-ea"/>
+                </a:rPr>
+                <a:t>printf</a:t>
+              </a:r>
+              <a:r>
+                <a:rPr lang="en-US" altLang="ko-KR" sz="2000" dirty="0" smtClean="0">
+                  <a:latin typeface="+mn-ea"/>
+                </a:rPr>
+                <a:t>(“%d”, *</a:t>
+              </a:r>
+              <a:r>
+                <a:rPr lang="en-US" altLang="ko-KR" sz="2000" dirty="0" err="1" smtClean="0">
+                  <a:latin typeface="+mn-ea"/>
+                </a:rPr>
+                <a:t>str</a:t>
+              </a:r>
+              <a:r>
+                <a:rPr lang="en-US" altLang="ko-KR" sz="2000" dirty="0" smtClean="0">
+                  <a:latin typeface="+mn-ea"/>
+                </a:rPr>
+                <a:t>);</a:t>
+              </a:r>
+              <a:endParaRPr lang="ko-KR" altLang="en-US" sz="2000" dirty="0">
+                <a:latin typeface="+mn-ea"/>
+              </a:endParaRPr>
+            </a:p>
+          </p:txBody>
+        </p:sp>
+        <p:sp>
+          <p:nvSpPr>
+            <p:cNvPr id="7" name="TextBox 6"/>
+            <p:cNvSpPr txBox="1"/>
+            <p:nvPr/>
+          </p:nvSpPr>
+          <p:spPr>
+            <a:xfrm>
+              <a:off x="3644321" y="2708920"/>
+              <a:ext cx="927614" cy="400110"/>
+            </a:xfrm>
+            <a:prstGeom prst="rect">
+              <a:avLst/>
+            </a:prstGeom>
+            <a:noFill/>
+          </p:spPr>
+          <p:txBody>
+            <a:bodyPr wrap="none" rtlCol="0">
+              <a:spAutoFit/>
+            </a:bodyPr>
+            <a:lstStyle/>
+            <a:p>
+              <a:r>
+                <a:rPr lang="en-US" altLang="ko-KR" sz="2000" dirty="0" smtClean="0">
+                  <a:latin typeface="+mn-ea"/>
+                </a:rPr>
+                <a:t>print(</a:t>
+              </a:r>
+              <a:r>
+                <a:rPr lang="en-US" altLang="ko-KR" sz="2000" dirty="0" err="1" smtClean="0">
+                  <a:latin typeface="+mn-ea"/>
+                </a:rPr>
+                <a:t>str</a:t>
+              </a:r>
+              <a:r>
+                <a:rPr lang="en-US" altLang="ko-KR" sz="2000" dirty="0" smtClean="0">
+                  <a:latin typeface="+mn-ea"/>
+                </a:rPr>
+                <a:t>!)</a:t>
+              </a:r>
+              <a:endParaRPr lang="ko-KR" altLang="en-US" sz="2000" dirty="0">
+                <a:latin typeface="+mn-ea"/>
+              </a:endParaRPr>
+            </a:p>
+          </p:txBody>
+        </p:sp>
+        <p:sp>
+          <p:nvSpPr>
+            <p:cNvPr id="9" name="TextBox 8"/>
+            <p:cNvSpPr txBox="1"/>
+            <p:nvPr/>
+          </p:nvSpPr>
+          <p:spPr>
+            <a:xfrm>
+              <a:off x="1835696" y="2492896"/>
+              <a:ext cx="590226" cy="276999"/>
+            </a:xfrm>
+            <a:prstGeom prst="rect">
+              <a:avLst/>
+            </a:prstGeom>
+            <a:noFill/>
+          </p:spPr>
+          <p:txBody>
+            <a:bodyPr wrap="none" rtlCol="0">
+              <a:spAutoFit/>
+            </a:bodyPr>
+            <a:lstStyle/>
+            <a:p>
+              <a:r>
+                <a:rPr lang="en-US" altLang="ko-KR" sz="1200" dirty="0" smtClean="0">
+                  <a:solidFill>
+                    <a:schemeClr val="accent2">
+                      <a:lumMod val="60000"/>
+                      <a:lumOff val="40000"/>
+                    </a:schemeClr>
+                  </a:solidFill>
+                  <a:latin typeface="+mn-ea"/>
+                </a:rPr>
+                <a:t>C</a:t>
+              </a:r>
+              <a:r>
+                <a:rPr lang="ko-KR" altLang="en-US" sz="1200" dirty="0" smtClean="0">
+                  <a:solidFill>
+                    <a:schemeClr val="accent2">
+                      <a:lumMod val="60000"/>
+                      <a:lumOff val="40000"/>
+                    </a:schemeClr>
+                  </a:solidFill>
+                  <a:latin typeface="+mn-ea"/>
+                </a:rPr>
+                <a:t>언어</a:t>
+              </a:r>
+              <a:endParaRPr lang="ko-KR" altLang="en-US" sz="1200" dirty="0">
+                <a:solidFill>
+                  <a:schemeClr val="accent2">
+                    <a:lumMod val="60000"/>
+                    <a:lumOff val="40000"/>
+                  </a:schemeClr>
+                </a:solidFill>
+                <a:latin typeface="+mn-ea"/>
+              </a:endParaRPr>
+            </a:p>
+          </p:txBody>
+        </p:sp>
+        <p:sp>
+          <p:nvSpPr>
+            <p:cNvPr id="10" name="TextBox 9"/>
+            <p:cNvSpPr txBox="1"/>
+            <p:nvPr/>
+          </p:nvSpPr>
+          <p:spPr>
+            <a:xfrm>
+              <a:off x="3909574" y="2492896"/>
+              <a:ext cx="522131" cy="276999"/>
+            </a:xfrm>
+            <a:prstGeom prst="rect">
+              <a:avLst/>
+            </a:prstGeom>
+            <a:noFill/>
+          </p:spPr>
+          <p:txBody>
+            <a:bodyPr wrap="none" rtlCol="0">
+              <a:spAutoFit/>
+            </a:bodyPr>
+            <a:lstStyle/>
+            <a:p>
+              <a:r>
+                <a:rPr lang="en-US" altLang="ko-KR" sz="1200" dirty="0" smtClean="0">
+                  <a:solidFill>
+                    <a:schemeClr val="accent2">
+                      <a:lumMod val="60000"/>
+                      <a:lumOff val="40000"/>
+                    </a:schemeClr>
+                  </a:solidFill>
+                  <a:latin typeface="+mn-ea"/>
+                </a:rPr>
+                <a:t>Swift</a:t>
+              </a:r>
+              <a:endParaRPr lang="ko-KR" altLang="en-US" sz="1200" dirty="0">
+                <a:solidFill>
+                  <a:schemeClr val="accent2">
+                    <a:lumMod val="60000"/>
+                    <a:lumOff val="40000"/>
+                  </a:schemeClr>
+                </a:solidFill>
+                <a:latin typeface="+mn-ea"/>
+              </a:endParaRPr>
+            </a:p>
+          </p:txBody>
+        </p:sp>
+      </p:grpSp>
+    </p:spTree>
+    <p:extLst>
+      <p:ext uri="{BB962C8B-B14F-4D97-AF65-F5344CB8AC3E}">
+        <p14:creationId xmlns:p14="http://schemas.microsoft.com/office/powerpoint/2010/main" val="600057941"/>
+      </p:ext>
+    </p:extLst>
+  </p:cSld>
+  <p:clrMapOvr>
+    <a:masterClrMapping/>
+  </p:clrMapOvr>
+  <p:timing>
+    <p:tnLst>
+      <p:par>
+        <p:cTn id="1" dur="indefinite" restart="never" nodeType="tmRoot"/>
+      </p:par>
+    </p:tnLst>
+  </p:timing>
+</p:sld>
+</file>
+
+<file path=ppt/slides/slide19.xml><?xml version="1.0" encoding="utf-8"?>
+<p:sld xmlns:a="http://schemas.openxmlformats.org/drawingml/2006/main" xmlns:r="http://schemas.openxmlformats.org/officeDocument/2006/relationships" xmlns:p="http://schemas.openxmlformats.org/presentationml/2006/main">
+  <p:cSld>
+    <p:spTree>
+      <p:nvGrpSpPr>
+        <p:cNvPr id="1" name=""/>
+        <p:cNvGrpSpPr/>
+        <p:nvPr/>
+      </p:nvGrpSpPr>
+      <p:grpSpPr>
+        <a:xfrm>
+          <a:off x="0" y="0"/>
+          <a:ext cx="0" cy="0"/>
+          <a:chOff x="0" y="0"/>
+          <a:chExt cx="0" cy="0"/>
+        </a:xfrm>
+      </p:grpSpPr>
+      <p:sp>
+        <p:nvSpPr>
+          <p:cNvPr id="2" name="제목 1"/>
+          <p:cNvSpPr>
+            <a:spLocks noGrp="1"/>
+          </p:cNvSpPr>
+          <p:nvPr>
+            <p:ph type="title"/>
+          </p:nvPr>
+        </p:nvSpPr>
+        <p:spPr/>
+        <p:txBody>
+          <a:bodyPr/>
+          <a:lstStyle/>
+          <a:p>
+            <a:r>
+              <a:rPr lang="ko-KR" altLang="en-US" dirty="0" err="1" smtClean="0"/>
+              <a:t>옵셔널</a:t>
+            </a:r>
+            <a:endParaRPr lang="ko-KR" altLang="en-US" dirty="0"/>
+          </a:p>
+        </p:txBody>
+      </p:sp>
+      <p:sp>
+        <p:nvSpPr>
+          <p:cNvPr id="3" name="내용 개체 틀 2"/>
+          <p:cNvSpPr>
+            <a:spLocks noGrp="1"/>
+          </p:cNvSpPr>
+          <p:nvPr>
+            <p:ph idx="1"/>
+          </p:nvPr>
+        </p:nvSpPr>
+        <p:spPr/>
+        <p:txBody>
+          <a:bodyPr/>
+          <a:lstStyle/>
+          <a:p>
+            <a:r>
+              <a:rPr lang="en-US" altLang="ko-KR" dirty="0" smtClean="0"/>
+              <a:t>Optional binding</a:t>
+            </a:r>
+          </a:p>
+          <a:p>
+            <a:pPr lvl="1"/>
+            <a:r>
+              <a:rPr lang="en-US" altLang="ko-KR" dirty="0" smtClean="0"/>
+              <a:t>C </a:t>
+            </a:r>
+            <a:r>
+              <a:rPr lang="ko-KR" altLang="en-US" dirty="0" smtClean="0"/>
+              <a:t>언어에서의 </a:t>
+            </a:r>
+            <a:r>
+              <a:rPr lang="en-US" altLang="ko-KR" dirty="0" smtClean="0"/>
+              <a:t>null check </a:t>
+            </a:r>
+            <a:r>
+              <a:rPr lang="ko-KR" altLang="en-US" dirty="0" smtClean="0"/>
+              <a:t>와 같은 개념</a:t>
+            </a:r>
+            <a:endParaRPr lang="en-US" altLang="ko-KR" dirty="0"/>
+          </a:p>
+          <a:p>
+            <a:pPr lvl="2"/>
+            <a:r>
+              <a:rPr lang="en-US" altLang="ko-KR" dirty="0" smtClean="0">
+                <a:solidFill>
+                  <a:schemeClr val="accent3"/>
+                </a:solidFill>
+              </a:rPr>
+              <a:t>Optional type</a:t>
+            </a:r>
+            <a:r>
+              <a:rPr lang="ko-KR" altLang="en-US" dirty="0" smtClean="0">
+                <a:solidFill>
+                  <a:schemeClr val="accent3"/>
+                </a:solidFill>
+              </a:rPr>
+              <a:t>은 값이 할당되어 있지 않으면 </a:t>
+            </a:r>
+            <a:r>
+              <a:rPr lang="en-US" altLang="ko-KR" dirty="0" smtClean="0">
+                <a:solidFill>
+                  <a:schemeClr val="accent3"/>
+                </a:solidFill>
+              </a:rPr>
+              <a:t>runtime error</a:t>
+            </a:r>
+          </a:p>
+          <a:p>
+            <a:pPr lvl="2"/>
+            <a:endParaRPr lang="en-US" altLang="ko-KR" dirty="0" smtClean="0"/>
+          </a:p>
+        </p:txBody>
+      </p:sp>
+      <p:pic>
+        <p:nvPicPr>
+          <p:cNvPr id="8" name="그림 7"/>
+          <p:cNvPicPr>
+            <a:picLocks noChangeAspect="1"/>
+          </p:cNvPicPr>
+          <p:nvPr/>
+        </p:nvPicPr>
+        <p:blipFill>
+          <a:blip r:embed="rId2"/>
+          <a:stretch>
+            <a:fillRect/>
+          </a:stretch>
+        </p:blipFill>
+        <p:spPr>
+          <a:xfrm>
+            <a:off x="409575" y="2924944"/>
+            <a:ext cx="8734425" cy="3762375"/>
+          </a:xfrm>
+          <a:prstGeom prst="rect">
+            <a:avLst/>
+          </a:prstGeom>
+        </p:spPr>
+      </p:pic>
+    </p:spTree>
+    <p:extLst>
+      <p:ext uri="{BB962C8B-B14F-4D97-AF65-F5344CB8AC3E}">
+        <p14:creationId xmlns:p14="http://schemas.microsoft.com/office/powerpoint/2010/main" val="4119404002"/>
+      </p:ext>
+    </p:extLst>
+  </p:cSld>
+  <p:clrMapOvr>
+    <a:masterClrMapping/>
+  </p:clrMapOvr>
+  <p:timing>
+    <p:tnLst>
+      <p:par>
+        <p:cTn id="1" dur="indefinite" restart="never" nodeType="tmRoot"/>
+      </p:par>
+    </p:tnLst>
+  </p:timing>
 </p:sld>
 </file>
 
@@ -7461,6 +8980,13 @@
   <p:clrMapOvr>
     <a:masterClrMapping/>
   </p:clrMapOvr>
+  <p:timing>
+    <p:tnLst>
+      <p:par>
+        <p:cTn id="1" dur="indefinite" restart="never" nodeType="tmRoot"/>
+      </p:par>
+    </p:tnLst>
+  </p:timing>
 </p:sld>
 </file>
 
@@ -8567,13 +10093,7 @@
               <a:rPr lang="en-US" altLang="ko-KR" sz="1600" dirty="0" smtClean="0">
                 <a:latin typeface="+mn-ea"/>
               </a:rPr>
-              <a:t>/protocol/extension</a:t>
-            </a:r>
-            <a:r>
-              <a:rPr lang="en-US" altLang="ko-KR" sz="1600" dirty="0" smtClean="0">
-                <a:latin typeface="+mn-ea"/>
-              </a:rPr>
-              <a:t> </a:t>
+              <a:t>/protocol/extension </a:t>
             </a:r>
             <a:r>
               <a:rPr lang="ko-KR" altLang="en-US" sz="1600" dirty="0" smtClean="0">
@@ -8790,6 +10310,13 @@
   <p:clrMapOvr>
     <a:masterClrMapping/>
   </p:clrMapOvr>
+  <p:timing>
+    <p:tnLst>
+      <p:par>
+        <p:cTn id="1" dur="indefinite" restart="never" nodeType="tmRoot"/>
+      </p:par>
+    </p:tnLst>
+  </p:timing>
 </p:sld>
 </file>
 
@@ -9648,6 +11175,13 @@
   <p:clrMapOvr>
     <a:masterClrMapping/>
   </p:clrMapOvr>
+  <p:timing>
+    <p:tnLst>
+      <p:par>
+        <p:cTn id="1" dur="indefinite" restart="never" nodeType="tmRoot"/>
+      </p:par>
+    </p:tnLst>
+  </p:timing>
 </p:sld>
 </file>
 
@@ -10618,6 +12152,13 @@
   <p:clrMapOvr>
     <a:masterClrMapping/>
   </p:clrMapOvr>
+  <p:timing>
+    <p:tnLst>
+      <p:par>
+        <p:cTn id="1" dur="indefinite" restart="never" nodeType="tmRoot"/>
+      </p:par>
+    </p:tnLst>
+  </p:timing>
 </p:sld>
 </file>
 
@@ -10688,6 +12229,13 @@
   <p:clrMapOvr>
     <a:masterClrMapping/>
   </p:clrMapOvr>
+  <p:timing>
+    <p:tnLst>
+      <p:par>
+        <p:cTn id="1" dur="indefinite" restart="never" nodeType="tmRoot"/>
+      </p:par>
+    </p:tnLst>
+  </p:timing>
 </p:sld>
 </file>
 
@@ -11349,6 +12897,13 @@
   <p:clrMapOvr>
     <a:masterClrMapping/>
   </p:clrMapOvr>
+  <p:timing>
+    <p:tnLst>
+      <p:par>
+        <p:cTn id="1" dur="indefinite" restart="never" nodeType="tmRoot"/>
+      </p:par>
+    </p:tnLst>
+  </p:timing>
 </p:sld>
 </file>
 
@@ -11558,8 +13113,20 @@
                 <a:tableStyleId>{073A0DAA-6AF3-43AB-8588-CEC1D06C72B9}</a:tableStyleId>
               </a:tblPr>
               <a:tblGrid>
-                <a:gridCol w="1440160"/>
-                <a:gridCol w="1440160"/>
+                <a:gridCol w="1440160">
+                  <a:extLst>
+                    <a:ext uri="{9D8B030D-6E8A-4147-A177-3AD203B41FA5}">
+                      <a16:colId xmlns:a16="http://schemas.microsoft.com/office/drawing/2014/main" val="20000"/>
+                    </a:ext>
+                  </a:extLst>
+                </a:gridCol>
+                <a:gridCol w="1440160">
+                  <a:extLst>
+                    <a:ext uri="{9D8B030D-6E8A-4147-A177-3AD203B41FA5}">
+                      <a16:colId xmlns:a16="http://schemas.microsoft.com/office/drawing/2014/main" val="20001"/>
+                    </a:ext>
+                  </a:extLst>
+                </a:gridCol>
               </a:tblGrid>
               <a:tr h="313234">
                 <a:tc>
@@ -11608,6 +13175,11 @@
                     <a:noFill/>
                   </a:tcPr>
                 </a:tc>
+                <a:extLst>
+                  <a:ext uri="{0D108BD9-81ED-4DB2-BD59-A6C34878D82A}">
+                    <a16:rowId xmlns:a16="http://schemas.microsoft.com/office/drawing/2014/main" val="10000"/>
+                  </a:ext>
+                </a:extLst>
               </a:tr>
               <a:tr h="313234">
                 <a:tc>
@@ -11678,6 +13250,11 @@
                     <a:noFill/>
                   </a:tcPr>
                 </a:tc>
+                <a:extLst>
+                  <a:ext uri="{0D108BD9-81ED-4DB2-BD59-A6C34878D82A}">
+                    <a16:rowId xmlns:a16="http://schemas.microsoft.com/office/drawing/2014/main" val="10001"/>
+                  </a:ext>
+                </a:extLst>
               </a:tr>
               <a:tr h="313234">
                 <a:tc>
@@ -11748,6 +13325,11 @@
                     <a:noFill/>
                   </a:tcPr>
                 </a:tc>
+                <a:extLst>
+                  <a:ext uri="{0D108BD9-81ED-4DB2-BD59-A6C34878D82A}">
+                    <a16:rowId xmlns:a16="http://schemas.microsoft.com/office/drawing/2014/main" val="10002"/>
+                  </a:ext>
+                </a:extLst>
               </a:tr>
               <a:tr h="313234">
                 <a:tc>
@@ -11818,6 +13400,11 @@
                     <a:noFill/>
                   </a:tcPr>
                 </a:tc>
+                <a:extLst>
+                  <a:ext uri="{0D108BD9-81ED-4DB2-BD59-A6C34878D82A}">
+                    <a16:rowId xmlns:a16="http://schemas.microsoft.com/office/drawing/2014/main" val="10003"/>
+                  </a:ext>
+                </a:extLst>
               </a:tr>
               <a:tr h="313234">
                 <a:tc>
@@ -11888,6 +13475,11 @@
                     <a:noFill/>
                   </a:tcPr>
                 </a:tc>
+                <a:extLst>
+                  <a:ext uri="{0D108BD9-81ED-4DB2-BD59-A6C34878D82A}">
+                    <a16:rowId xmlns:a16="http://schemas.microsoft.com/office/drawing/2014/main" val="10004"/>
+                  </a:ext>
+                </a:extLst>
               </a:tr>
             </a:tbl>
           </a:graphicData>
@@ -12065,6 +13657,13 @@
   <p:clrMapOvr>
     <a:masterClrMapping/>
   </p:clrMapOvr>
+  <p:timing>
+    <p:tnLst>
+      <p:par>
+        <p:cTn id="1" dur="indefinite" restart="never" nodeType="tmRoot"/>
+      </p:par>
+    </p:tnLst>
+  </p:timing>
 </p:sld>
 </file>
 
@@ -12301,8 +13900,20 @@
                 <a:tableStyleId>{073A0DAA-6AF3-43AB-8588-CEC1D06C72B9}</a:tableStyleId>
               </a:tblPr>
               <a:tblGrid>
-                <a:gridCol w="1440160"/>
-                <a:gridCol w="1440160"/>
+                <a:gridCol w="1440160">
+                  <a:extLst>
+                    <a:ext uri="{9D8B030D-6E8A-4147-A177-3AD203B41FA5}">
+                      <a16:colId xmlns:a16="http://schemas.microsoft.com/office/drawing/2014/main" val="20000"/>
+                    </a:ext>
+                  </a:extLst>
+                </a:gridCol>
+                <a:gridCol w="1440160">
+                  <a:extLst>
+                    <a:ext uri="{9D8B030D-6E8A-4147-A177-3AD203B41FA5}">
+                      <a16:colId xmlns:a16="http://schemas.microsoft.com/office/drawing/2014/main" val="20001"/>
+                    </a:ext>
+                  </a:extLst>
+                </a:gridCol>
               </a:tblGrid>
               <a:tr h="313234">
                 <a:tc>
@@ -12351,6 +13962,11 @@
                     <a:noFill/>
                   </a:tcPr>
                 </a:tc>
+                <a:extLst>
+                  <a:ext uri="{0D108BD9-81ED-4DB2-BD59-A6C34878D82A}">
+                    <a16:rowId xmlns:a16="http://schemas.microsoft.com/office/drawing/2014/main" val="10000"/>
+                  </a:ext>
+                </a:extLst>
               </a:tr>
               <a:tr h="313234">
                 <a:tc>
@@ -12411,6 +14027,11 @@
                     <a:noFill/>
                   </a:tcPr>
                 </a:tc>
+                <a:extLst>
+                  <a:ext uri="{0D108BD9-81ED-4DB2-BD59-A6C34878D82A}">
+                    <a16:rowId xmlns:a16="http://schemas.microsoft.com/office/drawing/2014/main" val="10001"/>
+                  </a:ext>
+                </a:extLst>
               </a:tr>
               <a:tr h="313234">
                 <a:tc>
@@ -12471,6 +14092,11 @@
                     <a:noFill/>
                   </a:tcPr>
                 </a:tc>
+                <a:extLst>
+                  <a:ext uri="{0D108BD9-81ED-4DB2-BD59-A6C34878D82A}">
+                    <a16:rowId xmlns:a16="http://schemas.microsoft.com/office/drawing/2014/main" val="10002"/>
+                  </a:ext>
+                </a:extLst>
               </a:tr>
             </a:tbl>
           </a:graphicData>
@@ -12615,13 +14241,7 @@
               <a:rPr lang="en-US" altLang="ko-KR" dirty="0" err="1" smtClean="0">
                 <a:latin typeface="+mn-ea"/>
               </a:rPr>
-              <a:t>Float</a:t>
-            </a:r>
-            <a:r>
-              <a:rPr lang="en-US" altLang="ko-KR" dirty="0" err="1" smtClean="0">
-                <a:latin typeface="+mn-ea"/>
-              </a:rPr>
-              <a:t>.max</a:t>
+              <a:t>Float.max</a:t>
             </a:r>
             <a:r>
               <a:rPr lang="en-US" altLang="ko-KR" dirty="0" smtClean="0">
@@ -12642,6 +14262,13 @@
   <p:clrMapOvr>
     <a:masterClrMapping/>
   </p:clrMapOvr>
+  <p:timing>
+    <p:tnLst>
+      <p:par>
+        <p:cTn id="1" dur="indefinite" restart="never" nodeType="tmRoot"/>
+      </p:par>
+    </p:tnLst>
+  </p:timing>
 </p:sld>
 </file>
 

</xml_diff>

<commit_message>
Chanpter 6, 7. Add book sample code.
</commit_message>
<xml_diff>
--- a/Swift세미나자료.pptx
+++ b/Swift세미나자료.pptx
@@ -35,6 +35,16 @@
     <p:sldId id="283" r:id="rId29"/>
     <p:sldId id="284" r:id="rId30"/>
     <p:sldId id="285" r:id="rId31"/>
+    <p:sldId id="286" r:id="rId32"/>
+    <p:sldId id="288" r:id="rId33"/>
+    <p:sldId id="290" r:id="rId34"/>
+    <p:sldId id="287" r:id="rId35"/>
+    <p:sldId id="294" r:id="rId36"/>
+    <p:sldId id="291" r:id="rId37"/>
+    <p:sldId id="296" r:id="rId38"/>
+    <p:sldId id="297" r:id="rId39"/>
+    <p:sldId id="295" r:id="rId40"/>
+    <p:sldId id="298" r:id="rId41"/>
   </p:sldIdLst>
   <p:sldSz cx="9144000" cy="6858000" type="screen4x3"/>
   <p:notesSz cx="6858000" cy="9144000"/>
@@ -6617,14 +6627,14 @@
                 <a:gridCol w="1440160">
                   <a:extLst>
                     <a:ext uri="{9D8B030D-6E8A-4147-A177-3AD203B41FA5}">
-                      <a16:colId xmlns="" xmlns:a16="http://schemas.microsoft.com/office/drawing/2014/main" val="20000"/>
+                      <a16:colId xmlns:a16="http://schemas.microsoft.com/office/drawing/2014/main" val="20000"/>
                     </a:ext>
                   </a:extLst>
                 </a:gridCol>
                 <a:gridCol w="1440160">
                   <a:extLst>
                     <a:ext uri="{9D8B030D-6E8A-4147-A177-3AD203B41FA5}">
-                      <a16:colId xmlns="" xmlns:a16="http://schemas.microsoft.com/office/drawing/2014/main" val="20001"/>
+                      <a16:colId xmlns:a16="http://schemas.microsoft.com/office/drawing/2014/main" val="20001"/>
                     </a:ext>
                   </a:extLst>
                 </a:gridCol>
@@ -6678,7 +6688,7 @@
                 </a:tc>
                 <a:extLst>
                   <a:ext uri="{0D108BD9-81ED-4DB2-BD59-A6C34878D82A}">
-                    <a16:rowId xmlns="" xmlns:a16="http://schemas.microsoft.com/office/drawing/2014/main" val="10000"/>
+                    <a16:rowId xmlns:a16="http://schemas.microsoft.com/office/drawing/2014/main" val="10000"/>
                   </a:ext>
                 </a:extLst>
               </a:tr>
@@ -6743,7 +6753,7 @@
                 </a:tc>
                 <a:extLst>
                   <a:ext uri="{0D108BD9-81ED-4DB2-BD59-A6C34878D82A}">
-                    <a16:rowId xmlns="" xmlns:a16="http://schemas.microsoft.com/office/drawing/2014/main" val="10001"/>
+                    <a16:rowId xmlns:a16="http://schemas.microsoft.com/office/drawing/2014/main" val="10001"/>
                   </a:ext>
                 </a:extLst>
               </a:tr>
@@ -7051,14 +7061,14 @@
                 <a:gridCol w="1980220">
                   <a:extLst>
                     <a:ext uri="{9D8B030D-6E8A-4147-A177-3AD203B41FA5}">
-                      <a16:colId xmlns="" xmlns:a16="http://schemas.microsoft.com/office/drawing/2014/main" val="20000"/>
+                      <a16:colId xmlns:a16="http://schemas.microsoft.com/office/drawing/2014/main" val="20000"/>
                     </a:ext>
                   </a:extLst>
                 </a:gridCol>
                 <a:gridCol w="1980220">
                   <a:extLst>
                     <a:ext uri="{9D8B030D-6E8A-4147-A177-3AD203B41FA5}">
-                      <a16:colId xmlns="" xmlns:a16="http://schemas.microsoft.com/office/drawing/2014/main" val="20001"/>
+                      <a16:colId xmlns:a16="http://schemas.microsoft.com/office/drawing/2014/main" val="20001"/>
                     </a:ext>
                   </a:extLst>
                 </a:gridCol>
@@ -7134,7 +7144,7 @@
                 </a:tc>
                 <a:extLst>
                   <a:ext uri="{0D108BD9-81ED-4DB2-BD59-A6C34878D82A}">
-                    <a16:rowId xmlns="" xmlns:a16="http://schemas.microsoft.com/office/drawing/2014/main" val="10000"/>
+                    <a16:rowId xmlns:a16="http://schemas.microsoft.com/office/drawing/2014/main" val="10000"/>
                   </a:ext>
                 </a:extLst>
               </a:tr>
@@ -7199,7 +7209,7 @@
                 </a:tc>
                 <a:extLst>
                   <a:ext uri="{0D108BD9-81ED-4DB2-BD59-A6C34878D82A}">
-                    <a16:rowId xmlns="" xmlns:a16="http://schemas.microsoft.com/office/drawing/2014/main" val="10001"/>
+                    <a16:rowId xmlns:a16="http://schemas.microsoft.com/office/drawing/2014/main" val="10001"/>
                   </a:ext>
                 </a:extLst>
               </a:tr>
@@ -7479,7 +7489,7 @@
           <a:graphicData uri="http://schemas.openxmlformats.org/presentationml/2006/ole">
             <mc:AlternateContent xmlns:mc="http://schemas.openxmlformats.org/markup-compatibility/2006">
               <mc:Choice xmlns:v="urn:schemas-microsoft-com:vml" Requires="v">
-                <p:oleObj spid="_x0000_s1075" name="포장기 셸 개체" showAsIcon="1" r:id="rId3" imgW="1154880" imgH="604800" progId="Package">
+                <p:oleObj spid="_x0000_s1078" name="포장기 셸 개체" showAsIcon="1" r:id="rId3" imgW="1154880" imgH="604800" progId="Package">
                   <p:embed/>
                 </p:oleObj>
               </mc:Choice>
@@ -8082,7 +8092,7 @@
           <a:graphicData uri="http://schemas.openxmlformats.org/presentationml/2006/ole">
             <mc:AlternateContent xmlns:mc="http://schemas.openxmlformats.org/markup-compatibility/2006">
               <mc:Choice xmlns:v="urn:schemas-microsoft-com:vml" Requires="v">
-                <p:oleObj spid="_x0000_s2099" name="포장기 셸 개체" showAsIcon="1" r:id="rId3" imgW="1154880" imgH="604800" progId="Package">
+                <p:oleObj spid="_x0000_s2102" name="포장기 셸 개체" showAsIcon="1" r:id="rId3" imgW="1154880" imgH="604800" progId="Package">
                   <p:embed/>
                 </p:oleObj>
               </mc:Choice>
@@ -9070,7 +9080,7 @@
           <a:graphicData uri="http://schemas.openxmlformats.org/presentationml/2006/ole">
             <mc:AlternateContent xmlns:mc="http://schemas.openxmlformats.org/markup-compatibility/2006">
               <mc:Choice xmlns:v="urn:schemas-microsoft-com:vml" Requires="v">
-                <p:oleObj spid="_x0000_s3122" name="포장기 셸 개체" showAsIcon="1" r:id="rId3" imgW="1154880" imgH="604800" progId="Package">
+                <p:oleObj spid="_x0000_s3125" name="포장기 셸 개체" showAsIcon="1" r:id="rId3" imgW="1154880" imgH="604800" progId="Package">
                   <p:embed/>
                 </p:oleObj>
               </mc:Choice>
@@ -13824,10 +13834,34 @@
                 <a:tableStyleId>{5C22544A-7EE6-4342-B048-85BDC9FD1C3A}</a:tableStyleId>
               </a:tblPr>
               <a:tblGrid>
-                <a:gridCol w="936104"/>
-                <a:gridCol w="1512168"/>
-                <a:gridCol w="4968552"/>
-                <a:gridCol w="1008112"/>
+                <a:gridCol w="936104">
+                  <a:extLst>
+                    <a:ext uri="{9D8B030D-6E8A-4147-A177-3AD203B41FA5}">
+                      <a16:colId xmlns:a16="http://schemas.microsoft.com/office/drawing/2014/main" val="20000"/>
+                    </a:ext>
+                  </a:extLst>
+                </a:gridCol>
+                <a:gridCol w="1512168">
+                  <a:extLst>
+                    <a:ext uri="{9D8B030D-6E8A-4147-A177-3AD203B41FA5}">
+                      <a16:colId xmlns:a16="http://schemas.microsoft.com/office/drawing/2014/main" val="20001"/>
+                    </a:ext>
+                  </a:extLst>
+                </a:gridCol>
+                <a:gridCol w="4968552">
+                  <a:extLst>
+                    <a:ext uri="{9D8B030D-6E8A-4147-A177-3AD203B41FA5}">
+                      <a16:colId xmlns:a16="http://schemas.microsoft.com/office/drawing/2014/main" val="20002"/>
+                    </a:ext>
+                  </a:extLst>
+                </a:gridCol>
+                <a:gridCol w="1008112">
+                  <a:extLst>
+                    <a:ext uri="{9D8B030D-6E8A-4147-A177-3AD203B41FA5}">
+                      <a16:colId xmlns:a16="http://schemas.microsoft.com/office/drawing/2014/main" val="20003"/>
+                    </a:ext>
+                  </a:extLst>
+                </a:gridCol>
               </a:tblGrid>
               <a:tr h="370840">
                 <a:tc>
@@ -13902,6 +13936,11 @@
                     <a:noFill/>
                   </a:tcPr>
                 </a:tc>
+                <a:extLst>
+                  <a:ext uri="{0D108BD9-81ED-4DB2-BD59-A6C34878D82A}">
+                    <a16:rowId xmlns:a16="http://schemas.microsoft.com/office/drawing/2014/main" val="10000"/>
+                  </a:ext>
+                </a:extLst>
               </a:tr>
               <a:tr h="370840">
                 <a:tc>
@@ -14135,6 +14174,11 @@
                     <a:noFill/>
                   </a:tcPr>
                 </a:tc>
+                <a:extLst>
+                  <a:ext uri="{0D108BD9-81ED-4DB2-BD59-A6C34878D82A}">
+                    <a16:rowId xmlns:a16="http://schemas.microsoft.com/office/drawing/2014/main" val="10001"/>
+                  </a:ext>
+                </a:extLst>
               </a:tr>
               <a:tr h="370840">
                 <a:tc>
@@ -14384,6 +14428,11 @@
                     <a:noFill/>
                   </a:tcPr>
                 </a:tc>
+                <a:extLst>
+                  <a:ext uri="{0D108BD9-81ED-4DB2-BD59-A6C34878D82A}">
+                    <a16:rowId xmlns:a16="http://schemas.microsoft.com/office/drawing/2014/main" val="10002"/>
+                  </a:ext>
+                </a:extLst>
               </a:tr>
             </a:tbl>
           </a:graphicData>
@@ -14948,10 +14997,34 @@
                 <a:tableStyleId>{5C22544A-7EE6-4342-B048-85BDC9FD1C3A}</a:tableStyleId>
               </a:tblPr>
               <a:tblGrid>
-                <a:gridCol w="936104"/>
-                <a:gridCol w="1512168"/>
-                <a:gridCol w="4968552"/>
-                <a:gridCol w="1008112"/>
+                <a:gridCol w="936104">
+                  <a:extLst>
+                    <a:ext uri="{9D8B030D-6E8A-4147-A177-3AD203B41FA5}">
+                      <a16:colId xmlns:a16="http://schemas.microsoft.com/office/drawing/2014/main" val="20000"/>
+                    </a:ext>
+                  </a:extLst>
+                </a:gridCol>
+                <a:gridCol w="1512168">
+                  <a:extLst>
+                    <a:ext uri="{9D8B030D-6E8A-4147-A177-3AD203B41FA5}">
+                      <a16:colId xmlns:a16="http://schemas.microsoft.com/office/drawing/2014/main" val="20001"/>
+                    </a:ext>
+                  </a:extLst>
+                </a:gridCol>
+                <a:gridCol w="4968552">
+                  <a:extLst>
+                    <a:ext uri="{9D8B030D-6E8A-4147-A177-3AD203B41FA5}">
+                      <a16:colId xmlns:a16="http://schemas.microsoft.com/office/drawing/2014/main" val="20002"/>
+                    </a:ext>
+                  </a:extLst>
+                </a:gridCol>
+                <a:gridCol w="1008112">
+                  <a:extLst>
+                    <a:ext uri="{9D8B030D-6E8A-4147-A177-3AD203B41FA5}">
+                      <a16:colId xmlns:a16="http://schemas.microsoft.com/office/drawing/2014/main" val="20003"/>
+                    </a:ext>
+                  </a:extLst>
+                </a:gridCol>
               </a:tblGrid>
               <a:tr h="370840">
                 <a:tc>
@@ -15026,6 +15099,11 @@
                     <a:noFill/>
                   </a:tcPr>
                 </a:tc>
+                <a:extLst>
+                  <a:ext uri="{0D108BD9-81ED-4DB2-BD59-A6C34878D82A}">
+                    <a16:rowId xmlns:a16="http://schemas.microsoft.com/office/drawing/2014/main" val="10000"/>
+                  </a:ext>
+                </a:extLst>
               </a:tr>
               <a:tr h="370840">
                 <a:tc>
@@ -15285,6 +15363,11 @@
                     <a:noFill/>
                   </a:tcPr>
                 </a:tc>
+                <a:extLst>
+                  <a:ext uri="{0D108BD9-81ED-4DB2-BD59-A6C34878D82A}">
+                    <a16:rowId xmlns:a16="http://schemas.microsoft.com/office/drawing/2014/main" val="10001"/>
+                  </a:ext>
+                </a:extLst>
               </a:tr>
               <a:tr h="370840">
                 <a:tc>
@@ -15573,6 +15656,11 @@
                     <a:noFill/>
                   </a:tcPr>
                 </a:tc>
+                <a:extLst>
+                  <a:ext uri="{0D108BD9-81ED-4DB2-BD59-A6C34878D82A}">
+                    <a16:rowId xmlns:a16="http://schemas.microsoft.com/office/drawing/2014/main" val="10002"/>
+                  </a:ext>
+                </a:extLst>
               </a:tr>
               <a:tr h="370840">
                 <a:tc>
@@ -15783,6 +15871,11 @@
                     <a:noFill/>
                   </a:tcPr>
                 </a:tc>
+                <a:extLst>
+                  <a:ext uri="{0D108BD9-81ED-4DB2-BD59-A6C34878D82A}">
+                    <a16:rowId xmlns:a16="http://schemas.microsoft.com/office/drawing/2014/main" val="10003"/>
+                  </a:ext>
+                </a:extLst>
               </a:tr>
             </a:tbl>
           </a:graphicData>
@@ -16394,10 +16487,34 @@
                 <a:tableStyleId>{5C22544A-7EE6-4342-B048-85BDC9FD1C3A}</a:tableStyleId>
               </a:tblPr>
               <a:tblGrid>
-                <a:gridCol w="936104"/>
-                <a:gridCol w="1512168"/>
-                <a:gridCol w="4968552"/>
-                <a:gridCol w="1008112"/>
+                <a:gridCol w="936104">
+                  <a:extLst>
+                    <a:ext uri="{9D8B030D-6E8A-4147-A177-3AD203B41FA5}">
+                      <a16:colId xmlns:a16="http://schemas.microsoft.com/office/drawing/2014/main" val="20000"/>
+                    </a:ext>
+                  </a:extLst>
+                </a:gridCol>
+                <a:gridCol w="1512168">
+                  <a:extLst>
+                    <a:ext uri="{9D8B030D-6E8A-4147-A177-3AD203B41FA5}">
+                      <a16:colId xmlns:a16="http://schemas.microsoft.com/office/drawing/2014/main" val="20001"/>
+                    </a:ext>
+                  </a:extLst>
+                </a:gridCol>
+                <a:gridCol w="4968552">
+                  <a:extLst>
+                    <a:ext uri="{9D8B030D-6E8A-4147-A177-3AD203B41FA5}">
+                      <a16:colId xmlns:a16="http://schemas.microsoft.com/office/drawing/2014/main" val="20002"/>
+                    </a:ext>
+                  </a:extLst>
+                </a:gridCol>
+                <a:gridCol w="1008112">
+                  <a:extLst>
+                    <a:ext uri="{9D8B030D-6E8A-4147-A177-3AD203B41FA5}">
+                      <a16:colId xmlns:a16="http://schemas.microsoft.com/office/drawing/2014/main" val="20003"/>
+                    </a:ext>
+                  </a:extLst>
+                </a:gridCol>
               </a:tblGrid>
               <a:tr h="370840">
                 <a:tc>
@@ -16472,6 +16589,11 @@
                     <a:noFill/>
                   </a:tcPr>
                 </a:tc>
+                <a:extLst>
+                  <a:ext uri="{0D108BD9-81ED-4DB2-BD59-A6C34878D82A}">
+                    <a16:rowId xmlns:a16="http://schemas.microsoft.com/office/drawing/2014/main" val="10000"/>
+                  </a:ext>
+                </a:extLst>
               </a:tr>
               <a:tr h="370840">
                 <a:tc>
@@ -16653,6 +16775,11 @@
                     <a:noFill/>
                   </a:tcPr>
                 </a:tc>
+                <a:extLst>
+                  <a:ext uri="{0D108BD9-81ED-4DB2-BD59-A6C34878D82A}">
+                    <a16:rowId xmlns:a16="http://schemas.microsoft.com/office/drawing/2014/main" val="10001"/>
+                  </a:ext>
+                </a:extLst>
               </a:tr>
               <a:tr h="370840">
                 <a:tc>
@@ -16834,6 +16961,11 @@
                     <a:noFill/>
                   </a:tcPr>
                 </a:tc>
+                <a:extLst>
+                  <a:ext uri="{0D108BD9-81ED-4DB2-BD59-A6C34878D82A}">
+                    <a16:rowId xmlns:a16="http://schemas.microsoft.com/office/drawing/2014/main" val="10002"/>
+                  </a:ext>
+                </a:extLst>
               </a:tr>
               <a:tr h="370840">
                 <a:tc>
@@ -17002,6 +17134,11 @@
                     <a:noFill/>
                   </a:tcPr>
                 </a:tc>
+                <a:extLst>
+                  <a:ext uri="{0D108BD9-81ED-4DB2-BD59-A6C34878D82A}">
+                    <a16:rowId xmlns:a16="http://schemas.microsoft.com/office/drawing/2014/main" val="10003"/>
+                  </a:ext>
+                </a:extLst>
               </a:tr>
               <a:tr h="370840">
                 <a:tc>
@@ -17173,6 +17310,11 @@
                     <a:noFill/>
                   </a:tcPr>
                 </a:tc>
+                <a:extLst>
+                  <a:ext uri="{0D108BD9-81ED-4DB2-BD59-A6C34878D82A}">
+                    <a16:rowId xmlns:a16="http://schemas.microsoft.com/office/drawing/2014/main" val="10004"/>
+                  </a:ext>
+                </a:extLst>
               </a:tr>
               <a:tr h="370840">
                 <a:tc>
@@ -17500,6 +17642,11 @@
                     <a:noFill/>
                   </a:tcPr>
                 </a:tc>
+                <a:extLst>
+                  <a:ext uri="{0D108BD9-81ED-4DB2-BD59-A6C34878D82A}">
+                    <a16:rowId xmlns:a16="http://schemas.microsoft.com/office/drawing/2014/main" val="10005"/>
+                  </a:ext>
+                </a:extLst>
               </a:tr>
               <a:tr h="370840">
                 <a:tc>
@@ -17814,6 +17961,11 @@
                     <a:noFill/>
                   </a:tcPr>
                 </a:tc>
+                <a:extLst>
+                  <a:ext uri="{0D108BD9-81ED-4DB2-BD59-A6C34878D82A}">
+                    <a16:rowId xmlns:a16="http://schemas.microsoft.com/office/drawing/2014/main" val="10006"/>
+                  </a:ext>
+                </a:extLst>
               </a:tr>
             </a:tbl>
           </a:graphicData>
@@ -19665,11 +19817,7 @@
           <a:p>
             <a:r>
               <a:rPr lang="ko-KR" altLang="en-US" dirty="0" smtClean="0"/>
-              <a:t>범위</a:t>
-            </a:r>
-            <a:r>
-              <a:rPr lang="ko-KR" altLang="en-US" dirty="0" smtClean="0"/>
-              <a:t>연산자</a:t>
+              <a:t>범위연산자</a:t>
             </a:r>
             <a:endParaRPr lang="en-US" altLang="ko-KR" dirty="0" smtClean="0"/>
           </a:p>
@@ -19930,35 +20078,8 @@
                 <a:rPr lang="en-US" altLang="ko-KR" dirty="0" smtClean="0">
                   <a:latin typeface="+mn-ea"/>
                 </a:rPr>
-                <a:t>let </a:t>
+                <a:t>let range = 0…3</a:t>
               </a:r>
-              <a:r>
-                <a:rPr lang="en-US" altLang="ko-KR" dirty="0" smtClean="0">
-                  <a:latin typeface="+mn-ea"/>
-                </a:rPr>
-                <a:t>range</a:t>
-              </a:r>
-              <a:r>
-                <a:rPr lang="en-US" altLang="ko-KR" dirty="0" smtClean="0">
-                  <a:latin typeface="+mn-ea"/>
-                </a:rPr>
-                <a:t> </a:t>
-              </a:r>
-              <a:r>
-                <a:rPr lang="en-US" altLang="ko-KR" dirty="0" smtClean="0">
-                  <a:latin typeface="+mn-ea"/>
-                </a:rPr>
-                <a:t>= </a:t>
-              </a:r>
-              <a:r>
-                <a:rPr lang="en-US" altLang="ko-KR" dirty="0" smtClean="0">
-                  <a:latin typeface="+mn-ea"/>
-                </a:rPr>
-                <a:t>0…3</a:t>
-              </a:r>
-              <a:endParaRPr lang="en-US" altLang="ko-KR" dirty="0" smtClean="0">
-                <a:latin typeface="+mn-ea"/>
-              </a:endParaRPr>
             </a:p>
             <a:p>
               <a:r>
@@ -21766,11 +21887,7 @@
           <a:p>
             <a:r>
               <a:rPr lang="ko-KR" altLang="en-US" dirty="0" smtClean="0"/>
-              <a:t>범위</a:t>
-            </a:r>
-            <a:r>
-              <a:rPr lang="ko-KR" altLang="en-US" dirty="0" smtClean="0"/>
-              <a:t>연산자</a:t>
+              <a:t>범위연산자</a:t>
             </a:r>
             <a:endParaRPr lang="en-US" altLang="ko-KR" dirty="0" smtClean="0"/>
           </a:p>
@@ -21908,35 +22025,8 @@
                   <a:rPr lang="en-US" altLang="ko-KR" dirty="0" smtClean="0">
                     <a:latin typeface="+mn-ea"/>
                   </a:rPr>
-                  <a:t>let </a:t>
+                  <a:t>let range = 0..&lt;3</a:t>
                 </a:r>
-                <a:r>
-                  <a:rPr lang="en-US" altLang="ko-KR" dirty="0" smtClean="0">
-                    <a:latin typeface="+mn-ea"/>
-                  </a:rPr>
-                  <a:t>range</a:t>
-                </a:r>
-                <a:r>
-                  <a:rPr lang="en-US" altLang="ko-KR" dirty="0" smtClean="0">
-                    <a:latin typeface="+mn-ea"/>
-                  </a:rPr>
-                  <a:t> </a:t>
-                </a:r>
-                <a:r>
-                  <a:rPr lang="en-US" altLang="ko-KR" dirty="0" smtClean="0">
-                    <a:latin typeface="+mn-ea"/>
-                  </a:rPr>
-                  <a:t>= </a:t>
-                </a:r>
-                <a:r>
-                  <a:rPr lang="en-US" altLang="ko-KR" dirty="0" smtClean="0">
-                    <a:latin typeface="+mn-ea"/>
-                  </a:rPr>
-                  <a:t>0..&lt;3</a:t>
-                </a:r>
-                <a:endParaRPr lang="en-US" altLang="ko-KR" dirty="0" smtClean="0">
-                  <a:latin typeface="+mn-ea"/>
-                </a:endParaRPr>
               </a:p>
               <a:p>
                 <a:r>
@@ -22106,35 +22196,8 @@
                   <a:rPr lang="en-US" altLang="ko-KR" dirty="0" smtClean="0">
                     <a:latin typeface="+mn-ea"/>
                   </a:rPr>
-                  <a:t>let </a:t>
+                  <a:t>let range = 0..&lt;3</a:t>
                 </a:r>
-                <a:r>
-                  <a:rPr lang="en-US" altLang="ko-KR" dirty="0" smtClean="0">
-                    <a:latin typeface="+mn-ea"/>
-                  </a:rPr>
-                  <a:t>range</a:t>
-                </a:r>
-                <a:r>
-                  <a:rPr lang="en-US" altLang="ko-KR" dirty="0" smtClean="0">
-                    <a:latin typeface="+mn-ea"/>
-                  </a:rPr>
-                  <a:t> </a:t>
-                </a:r>
-                <a:r>
-                  <a:rPr lang="en-US" altLang="ko-KR" dirty="0" smtClean="0">
-                    <a:latin typeface="+mn-ea"/>
-                  </a:rPr>
-                  <a:t>= </a:t>
-                </a:r>
-                <a:r>
-                  <a:rPr lang="en-US" altLang="ko-KR" dirty="0" smtClean="0">
-                    <a:latin typeface="+mn-ea"/>
-                  </a:rPr>
-                  <a:t>0..&lt;3</a:t>
-                </a:r>
-                <a:endParaRPr lang="en-US" altLang="ko-KR" dirty="0" smtClean="0">
-                  <a:latin typeface="+mn-ea"/>
-                </a:endParaRPr>
               </a:p>
               <a:p>
                 <a:r>
@@ -22364,6 +22427,2500 @@
 </p:sld>
 </file>
 
+<file path=ppt/slides/slide31.xml><?xml version="1.0" encoding="utf-8"?>
+<p:sld xmlns:a="http://schemas.openxmlformats.org/drawingml/2006/main" xmlns:r="http://schemas.openxmlformats.org/officeDocument/2006/relationships" xmlns:p="http://schemas.openxmlformats.org/presentationml/2006/main">
+  <p:cSld>
+    <p:spTree>
+      <p:nvGrpSpPr>
+        <p:cNvPr id="1" name=""/>
+        <p:cNvGrpSpPr/>
+        <p:nvPr/>
+      </p:nvGrpSpPr>
+      <p:grpSpPr>
+        <a:xfrm>
+          <a:off x="0" y="0"/>
+          <a:ext cx="0" cy="0"/>
+          <a:chOff x="0" y="0"/>
+          <a:chExt cx="0" cy="0"/>
+        </a:xfrm>
+      </p:grpSpPr>
+      <p:sp>
+        <p:nvSpPr>
+          <p:cNvPr id="2" name="TextBox 1"/>
+          <p:cNvSpPr txBox="1"/>
+          <p:nvPr/>
+        </p:nvSpPr>
+        <p:spPr>
+          <a:xfrm>
+            <a:off x="2305995" y="2996952"/>
+            <a:ext cx="4532010" cy="707886"/>
+          </a:xfrm>
+          <a:prstGeom prst="rect">
+            <a:avLst/>
+          </a:prstGeom>
+          <a:noFill/>
+        </p:spPr>
+        <p:txBody>
+          <a:bodyPr wrap="none" rtlCol="0">
+            <a:spAutoFit/>
+          </a:bodyPr>
+          <a:lstStyle/>
+          <a:p>
+            <a:r>
+              <a:rPr lang="en-US" altLang="ko-KR" sz="4000" dirty="0">
+                <a:latin typeface="+mn-ea"/>
+              </a:rPr>
+              <a:t>6</a:t>
+            </a:r>
+            <a:r>
+              <a:rPr lang="ko-KR" altLang="en-US" sz="4000" dirty="0" smtClean="0">
+                <a:latin typeface="+mn-ea"/>
+              </a:rPr>
+              <a:t>장 </a:t>
+            </a:r>
+            <a:r>
+              <a:rPr lang="ko-KR" altLang="en-US" sz="4000" dirty="0" err="1" smtClean="0">
+                <a:latin typeface="+mn-ea"/>
+              </a:rPr>
+              <a:t>제어문</a:t>
+            </a:r>
+            <a:r>
+              <a:rPr lang="en-US" altLang="ko-KR" sz="4000" dirty="0" smtClean="0">
+                <a:latin typeface="+mn-ea"/>
+              </a:rPr>
+              <a:t>: </a:t>
+            </a:r>
+            <a:r>
+              <a:rPr lang="ko-KR" altLang="en-US" sz="4000" dirty="0" err="1" smtClean="0">
+                <a:latin typeface="+mn-ea"/>
+              </a:rPr>
+              <a:t>반복문</a:t>
+            </a:r>
+            <a:endParaRPr lang="ko-KR" altLang="en-US" sz="4000" dirty="0">
+              <a:latin typeface="+mn-ea"/>
+            </a:endParaRPr>
+          </a:p>
+        </p:txBody>
+      </p:sp>
+      <p:graphicFrame>
+        <p:nvGraphicFramePr>
+          <p:cNvPr id="3" name="개체 2"/>
+          <p:cNvGraphicFramePr>
+            <a:graphicFrameLocks noChangeAspect="1"/>
+          </p:cNvGraphicFramePr>
+          <p:nvPr>
+            <p:extLst>
+              <p:ext uri="{D42A27DB-BD31-4B8C-83A1-F6EECF244321}">
+                <p14:modId xmlns:p14="http://schemas.microsoft.com/office/powerpoint/2010/main" val="4285684367"/>
+              </p:ext>
+            </p:extLst>
+          </p:nvPr>
+        </p:nvGraphicFramePr>
+        <p:xfrm>
+          <a:off x="7989887" y="6165304"/>
+          <a:ext cx="1154113" cy="604838"/>
+        </p:xfrm>
+        <a:graphic>
+          <a:graphicData uri="http://schemas.openxmlformats.org/presentationml/2006/ole">
+            <mc:AlternateContent xmlns:mc="http://schemas.openxmlformats.org/markup-compatibility/2006">
+              <mc:Choice xmlns:v="urn:schemas-microsoft-com:vml" Requires="v">
+                <p:oleObj spid="_x0000_s4100" name="포장기 셸 개체" showAsIcon="1" r:id="rId3" imgW="1154880" imgH="604800" progId="Package">
+                  <p:embed/>
+                </p:oleObj>
+              </mc:Choice>
+              <mc:Fallback>
+                <p:oleObj name="포장기 셸 개체" showAsIcon="1" r:id="rId3" imgW="1154880" imgH="604800" progId="Package">
+                  <p:embed/>
+                  <p:pic>
+                    <p:nvPicPr>
+                      <p:cNvPr id="0" name=""/>
+                      <p:cNvPicPr/>
+                      <p:nvPr/>
+                    </p:nvPicPr>
+                    <p:blipFill>
+                      <a:blip r:embed="rId4"/>
+                      <a:stretch>
+                        <a:fillRect/>
+                      </a:stretch>
+                    </p:blipFill>
+                    <p:spPr>
+                      <a:xfrm>
+                        <a:off x="7989887" y="6165304"/>
+                        <a:ext cx="1154113" cy="604838"/>
+                      </a:xfrm>
+                      <a:prstGeom prst="rect">
+                        <a:avLst/>
+                      </a:prstGeom>
+                    </p:spPr>
+                  </p:pic>
+                </p:oleObj>
+              </mc:Fallback>
+            </mc:AlternateContent>
+          </a:graphicData>
+        </a:graphic>
+      </p:graphicFrame>
+    </p:spTree>
+    <p:extLst>
+      <p:ext uri="{BB962C8B-B14F-4D97-AF65-F5344CB8AC3E}">
+        <p14:creationId xmlns:p14="http://schemas.microsoft.com/office/powerpoint/2010/main" val="2637499840"/>
+      </p:ext>
+    </p:extLst>
+  </p:cSld>
+  <p:clrMapOvr>
+    <a:masterClrMapping/>
+  </p:clrMapOvr>
+  <p:timing>
+    <p:tnLst>
+      <p:par>
+        <p:cTn id="1" dur="indefinite" restart="never" nodeType="tmRoot"/>
+      </p:par>
+    </p:tnLst>
+  </p:timing>
+</p:sld>
+</file>
+
+<file path=ppt/slides/slide32.xml><?xml version="1.0" encoding="utf-8"?>
+<p:sld xmlns:a="http://schemas.openxmlformats.org/drawingml/2006/main" xmlns:r="http://schemas.openxmlformats.org/officeDocument/2006/relationships" xmlns:p="http://schemas.openxmlformats.org/presentationml/2006/main">
+  <p:cSld>
+    <p:spTree>
+      <p:nvGrpSpPr>
+        <p:cNvPr id="1" name=""/>
+        <p:cNvGrpSpPr/>
+        <p:nvPr/>
+      </p:nvGrpSpPr>
+      <p:grpSpPr>
+        <a:xfrm>
+          <a:off x="0" y="0"/>
+          <a:ext cx="0" cy="0"/>
+          <a:chOff x="0" y="0"/>
+          <a:chExt cx="0" cy="0"/>
+        </a:xfrm>
+      </p:grpSpPr>
+      <p:sp>
+        <p:nvSpPr>
+          <p:cNvPr id="2" name="제목 1"/>
+          <p:cNvSpPr>
+            <a:spLocks noGrp="1"/>
+          </p:cNvSpPr>
+          <p:nvPr>
+            <p:ph type="title"/>
+          </p:nvPr>
+        </p:nvSpPr>
+        <p:spPr/>
+        <p:txBody>
+          <a:bodyPr/>
+          <a:lstStyle/>
+          <a:p>
+            <a:r>
+              <a:rPr lang="ko-KR" altLang="en-US" dirty="0" err="1" smtClean="0"/>
+              <a:t>제어문</a:t>
+            </a:r>
+            <a:r>
+              <a:rPr lang="en-US" altLang="ko-KR" dirty="0" smtClean="0"/>
+              <a:t>: </a:t>
+            </a:r>
+            <a:r>
+              <a:rPr lang="ko-KR" altLang="en-US" dirty="0" err="1" smtClean="0"/>
+              <a:t>반복문</a:t>
+            </a:r>
+            <a:endParaRPr lang="ko-KR" altLang="en-US" dirty="0"/>
+          </a:p>
+        </p:txBody>
+      </p:sp>
+      <p:sp>
+        <p:nvSpPr>
+          <p:cNvPr id="3" name="내용 개체 틀 2"/>
+          <p:cNvSpPr>
+            <a:spLocks noGrp="1"/>
+          </p:cNvSpPr>
+          <p:nvPr>
+            <p:ph idx="1"/>
+          </p:nvPr>
+        </p:nvSpPr>
+        <p:spPr/>
+        <p:txBody>
+          <a:bodyPr/>
+          <a:lstStyle/>
+          <a:p>
+            <a:r>
+              <a:rPr lang="en-US" altLang="ko-KR" dirty="0" smtClean="0"/>
+              <a:t>c style for</a:t>
+            </a:r>
+            <a:r>
+              <a:rPr lang="ko-KR" altLang="en-US" dirty="0" smtClean="0"/>
+              <a:t>문 사용 안함</a:t>
+            </a:r>
+            <a:r>
+              <a:rPr lang="en-US" altLang="ko-KR" dirty="0"/>
+              <a:t> </a:t>
+            </a:r>
+            <a:r>
+              <a:rPr lang="en-US" altLang="ko-KR" dirty="0" smtClean="0"/>
+              <a:t>(</a:t>
+            </a:r>
+            <a:r>
+              <a:rPr lang="en-US" altLang="ko-KR" dirty="0"/>
+              <a:t>swift </a:t>
+            </a:r>
+            <a:r>
+              <a:rPr lang="en-US" altLang="ko-KR" dirty="0" smtClean="0"/>
+              <a:t>2.2 ~)</a:t>
+            </a:r>
+          </a:p>
+          <a:p>
+            <a:r>
+              <a:rPr lang="en-US" altLang="ko-KR" dirty="0" smtClean="0"/>
+              <a:t>for-in</a:t>
+            </a:r>
+          </a:p>
+          <a:p>
+            <a:pPr lvl="1"/>
+            <a:r>
+              <a:rPr lang="en-US" altLang="ko-KR" dirty="0" smtClean="0"/>
+              <a:t>for </a:t>
+            </a:r>
+            <a:r>
+              <a:rPr lang="ko-KR" altLang="en-US" dirty="0" err="1" smtClean="0"/>
+              <a:t>루프상수</a:t>
+            </a:r>
+            <a:r>
+              <a:rPr lang="ko-KR" altLang="en-US" dirty="0" smtClean="0"/>
+              <a:t> </a:t>
+            </a:r>
+            <a:r>
+              <a:rPr lang="en-US" altLang="ko-KR" dirty="0" smtClean="0"/>
+              <a:t>in </a:t>
+            </a:r>
+            <a:r>
+              <a:rPr lang="ko-KR" altLang="en-US" dirty="0" smtClean="0"/>
+              <a:t>컬렉션</a:t>
+            </a:r>
+            <a:r>
+              <a:rPr lang="en-US" altLang="ko-KR" dirty="0" smtClean="0"/>
+              <a:t>/</a:t>
+            </a:r>
+            <a:r>
+              <a:rPr lang="ko-KR" altLang="en-US" dirty="0" smtClean="0"/>
+              <a:t>문자열</a:t>
+            </a:r>
+            <a:r>
+              <a:rPr lang="en-US" altLang="ko-KR" dirty="0" smtClean="0"/>
+              <a:t>/</a:t>
+            </a:r>
+            <a:r>
+              <a:rPr lang="ko-KR" altLang="en-US" dirty="0" smtClean="0"/>
+              <a:t>범위 </a:t>
+            </a:r>
+            <a:r>
+              <a:rPr lang="en-US" altLang="ko-KR" dirty="0" smtClean="0"/>
+              <a:t>{</a:t>
+            </a:r>
+            <a:br>
+              <a:rPr lang="en-US" altLang="ko-KR" dirty="0" smtClean="0"/>
+            </a:br>
+            <a:r>
+              <a:rPr lang="en-US" altLang="ko-KR" dirty="0" smtClean="0"/>
+              <a:t>   // …</a:t>
+            </a:r>
+            <a:br>
+              <a:rPr lang="en-US" altLang="ko-KR" dirty="0" smtClean="0"/>
+            </a:br>
+            <a:r>
+              <a:rPr lang="en-US" altLang="ko-KR" dirty="0" smtClean="0"/>
+              <a:t>}</a:t>
+            </a:r>
+          </a:p>
+          <a:p>
+            <a:pPr marL="454914" lvl="1" indent="0">
+              <a:buNone/>
+            </a:pPr>
+            <a:endParaRPr lang="en-US" altLang="ko-KR" dirty="0"/>
+          </a:p>
+          <a:p>
+            <a:pPr marL="454914" lvl="1" indent="0">
+              <a:buNone/>
+            </a:pPr>
+            <a:endParaRPr lang="ko-KR" altLang="en-US" dirty="0"/>
+          </a:p>
+        </p:txBody>
+      </p:sp>
+      <p:pic>
+        <p:nvPicPr>
+          <p:cNvPr id="5" name="그림 4"/>
+          <p:cNvPicPr>
+            <a:picLocks noChangeAspect="1"/>
+          </p:cNvPicPr>
+          <p:nvPr/>
+        </p:nvPicPr>
+        <p:blipFill>
+          <a:blip r:embed="rId2"/>
+          <a:stretch>
+            <a:fillRect/>
+          </a:stretch>
+        </p:blipFill>
+        <p:spPr>
+          <a:xfrm>
+            <a:off x="390677" y="2733675"/>
+            <a:ext cx="8734425" cy="4124325"/>
+          </a:xfrm>
+          <a:prstGeom prst="rect">
+            <a:avLst/>
+          </a:prstGeom>
+        </p:spPr>
+      </p:pic>
+    </p:spTree>
+    <p:extLst>
+      <p:ext uri="{BB962C8B-B14F-4D97-AF65-F5344CB8AC3E}">
+        <p14:creationId xmlns:p14="http://schemas.microsoft.com/office/powerpoint/2010/main" val="1906329340"/>
+      </p:ext>
+    </p:extLst>
+  </p:cSld>
+  <p:clrMapOvr>
+    <a:masterClrMapping/>
+  </p:clrMapOvr>
+</p:sld>
+</file>
+
+<file path=ppt/slides/slide33.xml><?xml version="1.0" encoding="utf-8"?>
+<p:sld xmlns:a="http://schemas.openxmlformats.org/drawingml/2006/main" xmlns:r="http://schemas.openxmlformats.org/officeDocument/2006/relationships" xmlns:p="http://schemas.openxmlformats.org/presentationml/2006/main">
+  <p:cSld>
+    <p:spTree>
+      <p:nvGrpSpPr>
+        <p:cNvPr id="1" name=""/>
+        <p:cNvGrpSpPr/>
+        <p:nvPr/>
+      </p:nvGrpSpPr>
+      <p:grpSpPr>
+        <a:xfrm>
+          <a:off x="0" y="0"/>
+          <a:ext cx="0" cy="0"/>
+          <a:chOff x="0" y="0"/>
+          <a:chExt cx="0" cy="0"/>
+        </a:xfrm>
+      </p:grpSpPr>
+      <p:sp>
+        <p:nvSpPr>
+          <p:cNvPr id="2" name="제목 1"/>
+          <p:cNvSpPr>
+            <a:spLocks noGrp="1"/>
+          </p:cNvSpPr>
+          <p:nvPr>
+            <p:ph type="title"/>
+          </p:nvPr>
+        </p:nvSpPr>
+        <p:spPr/>
+        <p:txBody>
+          <a:bodyPr/>
+          <a:lstStyle/>
+          <a:p>
+            <a:r>
+              <a:rPr lang="ko-KR" altLang="en-US" dirty="0" err="1" smtClean="0"/>
+              <a:t>제어문</a:t>
+            </a:r>
+            <a:r>
+              <a:rPr lang="en-US" altLang="ko-KR" dirty="0" smtClean="0"/>
+              <a:t>: </a:t>
+            </a:r>
+            <a:r>
+              <a:rPr lang="ko-KR" altLang="en-US" dirty="0" err="1" smtClean="0"/>
+              <a:t>반복문</a:t>
+            </a:r>
+            <a:endParaRPr lang="ko-KR" altLang="en-US" dirty="0"/>
+          </a:p>
+        </p:txBody>
+      </p:sp>
+      <p:sp>
+        <p:nvSpPr>
+          <p:cNvPr id="3" name="내용 개체 틀 2"/>
+          <p:cNvSpPr>
+            <a:spLocks noGrp="1"/>
+          </p:cNvSpPr>
+          <p:nvPr>
+            <p:ph idx="1"/>
+          </p:nvPr>
+        </p:nvSpPr>
+        <p:spPr/>
+        <p:txBody>
+          <a:bodyPr/>
+          <a:lstStyle/>
+          <a:p>
+            <a:r>
+              <a:rPr lang="en-US" altLang="ko-KR" dirty="0" smtClean="0"/>
+              <a:t>while </a:t>
+            </a:r>
+            <a:r>
+              <a:rPr lang="en-US" altLang="ko-KR" sz="1200" dirty="0" smtClean="0">
+                <a:solidFill>
+                  <a:schemeClr val="accent6"/>
+                </a:solidFill>
+              </a:rPr>
+              <a:t>(</a:t>
+            </a:r>
+            <a:r>
+              <a:rPr lang="ko-KR" altLang="en-US" sz="1200" dirty="0" smtClean="0">
+                <a:solidFill>
+                  <a:schemeClr val="accent6"/>
+                </a:solidFill>
+              </a:rPr>
+              <a:t>조건식이 </a:t>
+            </a:r>
+            <a:r>
+              <a:rPr lang="en-US" altLang="ko-KR" sz="1200" dirty="0" smtClean="0">
+                <a:solidFill>
+                  <a:schemeClr val="accent6"/>
+                </a:solidFill>
+              </a:rPr>
+              <a:t>true</a:t>
+            </a:r>
+            <a:r>
+              <a:rPr lang="ko-KR" altLang="en-US" sz="1200" dirty="0" smtClean="0">
+                <a:solidFill>
+                  <a:schemeClr val="accent6"/>
+                </a:solidFill>
+              </a:rPr>
+              <a:t>이면 블록 내부 코드 실행을 반복한다</a:t>
+            </a:r>
+            <a:r>
+              <a:rPr lang="en-US" altLang="ko-KR" sz="1200" dirty="0" smtClean="0">
+                <a:solidFill>
+                  <a:schemeClr val="accent6"/>
+                </a:solidFill>
+              </a:rPr>
+              <a:t>)</a:t>
+            </a:r>
+            <a:endParaRPr lang="en-US" altLang="ko-KR" dirty="0" smtClean="0">
+              <a:solidFill>
+                <a:schemeClr val="accent6"/>
+              </a:solidFill>
+            </a:endParaRPr>
+          </a:p>
+          <a:p>
+            <a:pPr lvl="1"/>
+            <a:r>
+              <a:rPr lang="en-US" altLang="ko-KR" dirty="0" smtClean="0"/>
+              <a:t>while </a:t>
+            </a:r>
+            <a:r>
+              <a:rPr lang="ko-KR" altLang="en-US" dirty="0" smtClean="0"/>
+              <a:t>조건식 </a:t>
+            </a:r>
+            <a:r>
+              <a:rPr lang="en-US" altLang="ko-KR" dirty="0" smtClean="0"/>
+              <a:t>{</a:t>
+            </a:r>
+            <a:br>
+              <a:rPr lang="en-US" altLang="ko-KR" dirty="0" smtClean="0"/>
+            </a:br>
+            <a:r>
+              <a:rPr lang="en-US" altLang="ko-KR" dirty="0" smtClean="0"/>
+              <a:t>   // …</a:t>
+            </a:r>
+            <a:br>
+              <a:rPr lang="en-US" altLang="ko-KR" dirty="0" smtClean="0"/>
+            </a:br>
+            <a:r>
+              <a:rPr lang="en-US" altLang="ko-KR" dirty="0" smtClean="0"/>
+              <a:t>}</a:t>
+            </a:r>
+          </a:p>
+          <a:p>
+            <a:pPr lvl="0">
+              <a:buClr>
+                <a:srgbClr val="D6ECFF"/>
+              </a:buClr>
+            </a:pPr>
+            <a:r>
+              <a:rPr lang="en-US" altLang="ko-KR" dirty="0" smtClean="0"/>
+              <a:t>repeat while </a:t>
+            </a:r>
+            <a:r>
+              <a:rPr lang="en-US" altLang="ko-KR" sz="1200" dirty="0" smtClean="0">
+                <a:solidFill>
+                  <a:srgbClr val="1AB39F"/>
+                </a:solidFill>
+              </a:rPr>
+              <a:t>(</a:t>
+            </a:r>
+            <a:r>
+              <a:rPr lang="ko-KR" altLang="en-US" sz="1200" u="sng" dirty="0" smtClean="0">
+                <a:solidFill>
+                  <a:srgbClr val="1AB39F"/>
+                </a:solidFill>
+              </a:rPr>
+              <a:t>블록 내부 코드 최초 </a:t>
+            </a:r>
+            <a:r>
+              <a:rPr lang="en-US" altLang="ko-KR" sz="1200" u="sng" dirty="0" smtClean="0">
+                <a:solidFill>
+                  <a:srgbClr val="1AB39F"/>
+                </a:solidFill>
+              </a:rPr>
+              <a:t>1</a:t>
+            </a:r>
+            <a:r>
+              <a:rPr lang="ko-KR" altLang="en-US" sz="1200" u="sng" dirty="0" smtClean="0">
+                <a:solidFill>
+                  <a:srgbClr val="1AB39F"/>
+                </a:solidFill>
+              </a:rPr>
+              <a:t>번 실행 후</a:t>
+            </a:r>
+            <a:r>
+              <a:rPr lang="ko-KR" altLang="en-US" sz="1200" dirty="0" smtClean="0">
+                <a:solidFill>
+                  <a:srgbClr val="1AB39F"/>
+                </a:solidFill>
+              </a:rPr>
+              <a:t> 조건식이 </a:t>
+            </a:r>
+            <a:r>
+              <a:rPr lang="en-US" altLang="ko-KR" sz="1200" dirty="0">
+                <a:solidFill>
+                  <a:srgbClr val="1AB39F"/>
+                </a:solidFill>
+              </a:rPr>
+              <a:t>true</a:t>
+            </a:r>
+            <a:r>
+              <a:rPr lang="ko-KR" altLang="en-US" sz="1200" dirty="0">
+                <a:solidFill>
+                  <a:srgbClr val="1AB39F"/>
+                </a:solidFill>
+              </a:rPr>
+              <a:t>이면 </a:t>
+            </a:r>
+            <a:r>
+              <a:rPr lang="ko-KR" altLang="en-US" sz="1200" dirty="0" smtClean="0">
+                <a:solidFill>
+                  <a:srgbClr val="1AB39F"/>
+                </a:solidFill>
+              </a:rPr>
+              <a:t>실행을 </a:t>
+            </a:r>
+            <a:r>
+              <a:rPr lang="ko-KR" altLang="en-US" sz="1200" dirty="0">
+                <a:solidFill>
+                  <a:srgbClr val="1AB39F"/>
+                </a:solidFill>
+              </a:rPr>
+              <a:t>반복한다</a:t>
+            </a:r>
+            <a:r>
+              <a:rPr lang="en-US" altLang="ko-KR" sz="1200" dirty="0" smtClean="0">
+                <a:solidFill>
+                  <a:srgbClr val="1AB39F"/>
+                </a:solidFill>
+              </a:rPr>
+              <a:t>)</a:t>
+            </a:r>
+            <a:endParaRPr lang="en-US" altLang="ko-KR" dirty="0" smtClean="0"/>
+          </a:p>
+          <a:p>
+            <a:pPr lvl="1"/>
+            <a:r>
+              <a:rPr lang="en-US" altLang="ko-KR" dirty="0" smtClean="0"/>
+              <a:t>c/</a:t>
+            </a:r>
+            <a:r>
+              <a:rPr lang="en-US" altLang="ko-KR" dirty="0" err="1" smtClean="0"/>
+              <a:t>c++</a:t>
+            </a:r>
+            <a:r>
+              <a:rPr lang="ko-KR" altLang="en-US" dirty="0" smtClean="0"/>
+              <a:t>의 </a:t>
+            </a:r>
+            <a:r>
+              <a:rPr lang="en-US" altLang="ko-KR" dirty="0" smtClean="0"/>
+              <a:t>do while </a:t>
+            </a:r>
+            <a:r>
+              <a:rPr lang="ko-KR" altLang="en-US" dirty="0" smtClean="0"/>
+              <a:t>문과 같은 역할</a:t>
+            </a:r>
+            <a:endParaRPr lang="en-US" altLang="ko-KR" dirty="0" smtClean="0"/>
+          </a:p>
+          <a:p>
+            <a:pPr lvl="1"/>
+            <a:r>
+              <a:rPr lang="en-US" altLang="ko-KR" dirty="0" smtClean="0"/>
+              <a:t>repeat {</a:t>
+            </a:r>
+            <a:br>
+              <a:rPr lang="en-US" altLang="ko-KR" dirty="0" smtClean="0"/>
+            </a:br>
+            <a:r>
+              <a:rPr lang="en-US" altLang="ko-KR" dirty="0" smtClean="0"/>
+              <a:t>   // …</a:t>
+            </a:r>
+            <a:br>
+              <a:rPr lang="en-US" altLang="ko-KR" dirty="0" smtClean="0"/>
+            </a:br>
+            <a:r>
+              <a:rPr lang="en-US" altLang="ko-KR" dirty="0" smtClean="0"/>
+              <a:t>} while </a:t>
+            </a:r>
+            <a:r>
+              <a:rPr lang="ko-KR" altLang="en-US" dirty="0" smtClean="0"/>
+              <a:t>조건식</a:t>
+            </a:r>
+            <a:endParaRPr lang="en-US" altLang="ko-KR" dirty="0" smtClean="0"/>
+          </a:p>
+        </p:txBody>
+      </p:sp>
+      <p:pic>
+        <p:nvPicPr>
+          <p:cNvPr id="4" name="그림 3"/>
+          <p:cNvPicPr>
+            <a:picLocks noChangeAspect="1"/>
+          </p:cNvPicPr>
+          <p:nvPr/>
+        </p:nvPicPr>
+        <p:blipFill>
+          <a:blip r:embed="rId2"/>
+          <a:stretch>
+            <a:fillRect/>
+          </a:stretch>
+        </p:blipFill>
+        <p:spPr>
+          <a:xfrm>
+            <a:off x="395543" y="3822526"/>
+            <a:ext cx="8734425" cy="2990850"/>
+          </a:xfrm>
+          <a:prstGeom prst="rect">
+            <a:avLst/>
+          </a:prstGeom>
+        </p:spPr>
+      </p:pic>
+    </p:spTree>
+    <p:extLst>
+      <p:ext uri="{BB962C8B-B14F-4D97-AF65-F5344CB8AC3E}">
+        <p14:creationId xmlns:p14="http://schemas.microsoft.com/office/powerpoint/2010/main" val="2244516515"/>
+      </p:ext>
+    </p:extLst>
+  </p:cSld>
+  <p:clrMapOvr>
+    <a:masterClrMapping/>
+  </p:clrMapOvr>
+</p:sld>
+</file>
+
+<file path=ppt/slides/slide34.xml><?xml version="1.0" encoding="utf-8"?>
+<p:sld xmlns:a="http://schemas.openxmlformats.org/drawingml/2006/main" xmlns:r="http://schemas.openxmlformats.org/officeDocument/2006/relationships" xmlns:p="http://schemas.openxmlformats.org/presentationml/2006/main">
+  <p:cSld>
+    <p:spTree>
+      <p:nvGrpSpPr>
+        <p:cNvPr id="1" name=""/>
+        <p:cNvGrpSpPr/>
+        <p:nvPr/>
+      </p:nvGrpSpPr>
+      <p:grpSpPr>
+        <a:xfrm>
+          <a:off x="0" y="0"/>
+          <a:ext cx="0" cy="0"/>
+          <a:chOff x="0" y="0"/>
+          <a:chExt cx="0" cy="0"/>
+        </a:xfrm>
+      </p:grpSpPr>
+      <p:sp>
+        <p:nvSpPr>
+          <p:cNvPr id="2" name="TextBox 1"/>
+          <p:cNvSpPr txBox="1"/>
+          <p:nvPr/>
+        </p:nvSpPr>
+        <p:spPr>
+          <a:xfrm>
+            <a:off x="2305995" y="2996952"/>
+            <a:ext cx="4532010" cy="707886"/>
+          </a:xfrm>
+          <a:prstGeom prst="rect">
+            <a:avLst/>
+          </a:prstGeom>
+          <a:noFill/>
+        </p:spPr>
+        <p:txBody>
+          <a:bodyPr wrap="none" rtlCol="0">
+            <a:spAutoFit/>
+          </a:bodyPr>
+          <a:lstStyle/>
+          <a:p>
+            <a:r>
+              <a:rPr lang="en-US" altLang="ko-KR" sz="4000" dirty="0">
+                <a:latin typeface="+mn-ea"/>
+              </a:rPr>
+              <a:t>7</a:t>
+            </a:r>
+            <a:r>
+              <a:rPr lang="ko-KR" altLang="en-US" sz="4000" dirty="0" smtClean="0">
+                <a:latin typeface="+mn-ea"/>
+              </a:rPr>
+              <a:t>장 </a:t>
+            </a:r>
+            <a:r>
+              <a:rPr lang="ko-KR" altLang="en-US" sz="4000" dirty="0" err="1" smtClean="0">
+                <a:latin typeface="+mn-ea"/>
+              </a:rPr>
+              <a:t>제어문</a:t>
+            </a:r>
+            <a:r>
+              <a:rPr lang="en-US" altLang="ko-KR" sz="4000" dirty="0" smtClean="0">
+                <a:latin typeface="+mn-ea"/>
+              </a:rPr>
+              <a:t>: </a:t>
+            </a:r>
+            <a:r>
+              <a:rPr lang="ko-KR" altLang="en-US" sz="4000" dirty="0" err="1" smtClean="0">
+                <a:latin typeface="+mn-ea"/>
+              </a:rPr>
+              <a:t>조건문</a:t>
+            </a:r>
+            <a:endParaRPr lang="ko-KR" altLang="en-US" sz="4000" dirty="0">
+              <a:latin typeface="+mn-ea"/>
+            </a:endParaRPr>
+          </a:p>
+        </p:txBody>
+      </p:sp>
+      <p:graphicFrame>
+        <p:nvGraphicFramePr>
+          <p:cNvPr id="3" name="개체 2"/>
+          <p:cNvGraphicFramePr>
+            <a:graphicFrameLocks noChangeAspect="1"/>
+          </p:cNvGraphicFramePr>
+          <p:nvPr>
+            <p:extLst>
+              <p:ext uri="{D42A27DB-BD31-4B8C-83A1-F6EECF244321}">
+                <p14:modId xmlns:p14="http://schemas.microsoft.com/office/powerpoint/2010/main" val="2557865237"/>
+              </p:ext>
+            </p:extLst>
+          </p:nvPr>
+        </p:nvGraphicFramePr>
+        <p:xfrm>
+          <a:off x="7989887" y="6253162"/>
+          <a:ext cx="1154113" cy="604838"/>
+        </p:xfrm>
+        <a:graphic>
+          <a:graphicData uri="http://schemas.openxmlformats.org/presentationml/2006/ole">
+            <mc:AlternateContent xmlns:mc="http://schemas.openxmlformats.org/markup-compatibility/2006">
+              <mc:Choice xmlns:v="urn:schemas-microsoft-com:vml" Requires="v">
+                <p:oleObj spid="_x0000_s5124" name="포장기 셸 개체" showAsIcon="1" r:id="rId3" imgW="1154880" imgH="604800" progId="Package">
+                  <p:embed/>
+                </p:oleObj>
+              </mc:Choice>
+              <mc:Fallback>
+                <p:oleObj name="포장기 셸 개체" showAsIcon="1" r:id="rId3" imgW="1154880" imgH="604800" progId="Package">
+                  <p:embed/>
+                  <p:pic>
+                    <p:nvPicPr>
+                      <p:cNvPr id="0" name=""/>
+                      <p:cNvPicPr/>
+                      <p:nvPr/>
+                    </p:nvPicPr>
+                    <p:blipFill>
+                      <a:blip r:embed="rId4"/>
+                      <a:stretch>
+                        <a:fillRect/>
+                      </a:stretch>
+                    </p:blipFill>
+                    <p:spPr>
+                      <a:xfrm>
+                        <a:off x="7989887" y="6253162"/>
+                        <a:ext cx="1154113" cy="604838"/>
+                      </a:xfrm>
+                      <a:prstGeom prst="rect">
+                        <a:avLst/>
+                      </a:prstGeom>
+                    </p:spPr>
+                  </p:pic>
+                </p:oleObj>
+              </mc:Fallback>
+            </mc:AlternateContent>
+          </a:graphicData>
+        </a:graphic>
+      </p:graphicFrame>
+    </p:spTree>
+    <p:extLst>
+      <p:ext uri="{BB962C8B-B14F-4D97-AF65-F5344CB8AC3E}">
+        <p14:creationId xmlns:p14="http://schemas.microsoft.com/office/powerpoint/2010/main" val="2424485204"/>
+      </p:ext>
+    </p:extLst>
+  </p:cSld>
+  <p:clrMapOvr>
+    <a:masterClrMapping/>
+  </p:clrMapOvr>
+  <p:timing>
+    <p:tnLst>
+      <p:par>
+        <p:cTn id="1" dur="indefinite" restart="never" nodeType="tmRoot"/>
+      </p:par>
+    </p:tnLst>
+  </p:timing>
+</p:sld>
+</file>
+
+<file path=ppt/slides/slide35.xml><?xml version="1.0" encoding="utf-8"?>
+<p:sld xmlns:a="http://schemas.openxmlformats.org/drawingml/2006/main" xmlns:r="http://schemas.openxmlformats.org/officeDocument/2006/relationships" xmlns:p="http://schemas.openxmlformats.org/presentationml/2006/main">
+  <p:cSld>
+    <p:spTree>
+      <p:nvGrpSpPr>
+        <p:cNvPr id="1" name=""/>
+        <p:cNvGrpSpPr/>
+        <p:nvPr/>
+      </p:nvGrpSpPr>
+      <p:grpSpPr>
+        <a:xfrm>
+          <a:off x="0" y="0"/>
+          <a:ext cx="0" cy="0"/>
+          <a:chOff x="0" y="0"/>
+          <a:chExt cx="0" cy="0"/>
+        </a:xfrm>
+      </p:grpSpPr>
+      <p:sp>
+        <p:nvSpPr>
+          <p:cNvPr id="2" name="제목 1"/>
+          <p:cNvSpPr>
+            <a:spLocks noGrp="1"/>
+          </p:cNvSpPr>
+          <p:nvPr>
+            <p:ph type="title"/>
+          </p:nvPr>
+        </p:nvSpPr>
+        <p:spPr/>
+        <p:txBody>
+          <a:bodyPr/>
+          <a:lstStyle/>
+          <a:p>
+            <a:r>
+              <a:rPr lang="ko-KR" altLang="en-US" dirty="0" err="1" smtClean="0"/>
+              <a:t>제어문</a:t>
+            </a:r>
+            <a:r>
+              <a:rPr lang="en-US" altLang="ko-KR" dirty="0" smtClean="0"/>
+              <a:t>: </a:t>
+            </a:r>
+            <a:r>
+              <a:rPr lang="ko-KR" altLang="en-US" dirty="0" err="1" smtClean="0"/>
+              <a:t>조건문</a:t>
+            </a:r>
+            <a:endParaRPr lang="ko-KR" altLang="en-US" dirty="0"/>
+          </a:p>
+        </p:txBody>
+      </p:sp>
+      <p:sp>
+        <p:nvSpPr>
+          <p:cNvPr id="3" name="내용 개체 틀 2"/>
+          <p:cNvSpPr>
+            <a:spLocks noGrp="1"/>
+          </p:cNvSpPr>
+          <p:nvPr>
+            <p:ph idx="1"/>
+          </p:nvPr>
+        </p:nvSpPr>
+        <p:spPr/>
+        <p:txBody>
+          <a:bodyPr/>
+          <a:lstStyle/>
+          <a:p>
+            <a:r>
+              <a:rPr lang="en-US" altLang="ko-KR" dirty="0" smtClean="0"/>
+              <a:t>if, else if, else </a:t>
+            </a:r>
+            <a:r>
+              <a:rPr lang="en-US" altLang="ko-KR" sz="1200" dirty="0">
+                <a:solidFill>
+                  <a:schemeClr val="accent6"/>
+                </a:solidFill>
+              </a:rPr>
+              <a:t>(</a:t>
+            </a:r>
+            <a:r>
+              <a:rPr lang="ko-KR" altLang="en-US" sz="1200" dirty="0">
+                <a:solidFill>
+                  <a:schemeClr val="accent6"/>
+                </a:solidFill>
+              </a:rPr>
+              <a:t>조건식의 결과가 </a:t>
+            </a:r>
+            <a:r>
+              <a:rPr lang="en-US" altLang="ko-KR" sz="1200" dirty="0">
+                <a:solidFill>
+                  <a:schemeClr val="accent6"/>
+                </a:solidFill>
+              </a:rPr>
+              <a:t>true</a:t>
+            </a:r>
+            <a:r>
+              <a:rPr lang="ko-KR" altLang="en-US" sz="1200" dirty="0">
+                <a:solidFill>
+                  <a:schemeClr val="accent6"/>
+                </a:solidFill>
+              </a:rPr>
+              <a:t>일 때 코드 실행</a:t>
+            </a:r>
+            <a:r>
+              <a:rPr lang="en-US" altLang="ko-KR" sz="1200" dirty="0">
+                <a:solidFill>
+                  <a:schemeClr val="accent6"/>
+                </a:solidFill>
+              </a:rPr>
+              <a:t>)</a:t>
+            </a:r>
+          </a:p>
+          <a:p>
+            <a:pPr lvl="1"/>
+            <a:r>
+              <a:rPr lang="en-US" altLang="ko-KR" dirty="0" smtClean="0"/>
+              <a:t>if</a:t>
+            </a:r>
+            <a:r>
+              <a:rPr lang="ko-KR" altLang="en-US" dirty="0"/>
+              <a:t> </a:t>
+            </a:r>
+            <a:r>
+              <a:rPr lang="en-US" altLang="ko-KR" dirty="0"/>
+              <a:t> </a:t>
+            </a:r>
+            <a:r>
+              <a:rPr lang="ko-KR" altLang="en-US" dirty="0" smtClean="0"/>
+              <a:t>조건식 </a:t>
+            </a:r>
+            <a:r>
+              <a:rPr lang="en-US" altLang="ko-KR" dirty="0" smtClean="0"/>
+              <a:t>{   </a:t>
+            </a:r>
+            <a:r>
+              <a:rPr lang="en-US" altLang="ko-KR" sz="1200" dirty="0" smtClean="0">
+                <a:solidFill>
+                  <a:schemeClr val="accent6"/>
+                </a:solidFill>
+              </a:rPr>
+              <a:t>//  1</a:t>
+            </a:r>
+            <a:r>
+              <a:rPr lang="ko-KR" altLang="en-US" sz="1200" dirty="0" smtClean="0">
+                <a:solidFill>
+                  <a:schemeClr val="accent6"/>
+                </a:solidFill>
+              </a:rPr>
+              <a:t>개만 작성 가능</a:t>
+            </a:r>
+            <a:r>
+              <a:rPr lang="en-US" altLang="ko-KR" sz="1200" dirty="0" smtClean="0">
+                <a:solidFill>
+                  <a:schemeClr val="accent6"/>
+                </a:solidFill>
+              </a:rPr>
+              <a:t/>
+            </a:r>
+            <a:br>
+              <a:rPr lang="en-US" altLang="ko-KR" sz="1200" dirty="0" smtClean="0">
+                <a:solidFill>
+                  <a:schemeClr val="accent6"/>
+                </a:solidFill>
+              </a:rPr>
+            </a:br>
+            <a:r>
+              <a:rPr lang="en-US" altLang="ko-KR" dirty="0" smtClean="0"/>
+              <a:t>   // …1</a:t>
+            </a:r>
+            <a:br>
+              <a:rPr lang="en-US" altLang="ko-KR" dirty="0" smtClean="0"/>
+            </a:br>
+            <a:r>
+              <a:rPr lang="en-US" altLang="ko-KR" dirty="0" smtClean="0"/>
+              <a:t>} else if </a:t>
+            </a:r>
+            <a:r>
+              <a:rPr lang="ko-KR" altLang="en-US" dirty="0" smtClean="0"/>
+              <a:t>조건식 </a:t>
+            </a:r>
+            <a:r>
+              <a:rPr lang="en-US" altLang="ko-KR" dirty="0" smtClean="0"/>
+              <a:t>{   </a:t>
+            </a:r>
+            <a:r>
+              <a:rPr lang="en-US" altLang="ko-KR" sz="1200" dirty="0" smtClean="0">
+                <a:solidFill>
+                  <a:schemeClr val="accent6"/>
+                </a:solidFill>
+              </a:rPr>
+              <a:t>//  0</a:t>
+            </a:r>
+            <a:r>
+              <a:rPr lang="ko-KR" altLang="en-US" sz="1200" dirty="0" smtClean="0">
+                <a:solidFill>
+                  <a:schemeClr val="accent6"/>
+                </a:solidFill>
+              </a:rPr>
+              <a:t>개 이상 작성 가능</a:t>
+            </a:r>
+            <a:r>
+              <a:rPr lang="en-US" altLang="ko-KR" sz="1200" dirty="0" smtClean="0">
+                <a:solidFill>
+                  <a:schemeClr val="accent6"/>
+                </a:solidFill>
+              </a:rPr>
+              <a:t/>
+            </a:r>
+            <a:br>
+              <a:rPr lang="en-US" altLang="ko-KR" sz="1200" dirty="0" smtClean="0">
+                <a:solidFill>
+                  <a:schemeClr val="accent6"/>
+                </a:solidFill>
+              </a:rPr>
+            </a:br>
+            <a:r>
+              <a:rPr lang="en-US" altLang="ko-KR" dirty="0" smtClean="0"/>
+              <a:t>   // …2</a:t>
+            </a:r>
+            <a:br>
+              <a:rPr lang="en-US" altLang="ko-KR" dirty="0" smtClean="0"/>
+            </a:br>
+            <a:r>
+              <a:rPr lang="en-US" altLang="ko-KR" dirty="0" smtClean="0"/>
+              <a:t>} </a:t>
+            </a:r>
+            <a:r>
+              <a:rPr lang="en-US" altLang="ko-KR" dirty="0"/>
+              <a:t>else </a:t>
+            </a:r>
+            <a:r>
+              <a:rPr lang="en-US" altLang="ko-KR" dirty="0" smtClean="0"/>
+              <a:t>{ </a:t>
+            </a:r>
+            <a:r>
+              <a:rPr lang="en-US" altLang="ko-KR" sz="1200" dirty="0" smtClean="0">
+                <a:solidFill>
+                  <a:schemeClr val="accent6"/>
+                </a:solidFill>
+              </a:rPr>
+              <a:t> //  0, 1</a:t>
+            </a:r>
+            <a:r>
+              <a:rPr lang="ko-KR" altLang="en-US" sz="1200" dirty="0" smtClean="0">
+                <a:solidFill>
+                  <a:schemeClr val="accent6"/>
+                </a:solidFill>
+              </a:rPr>
+              <a:t>개 작성 가능</a:t>
+            </a:r>
+            <a:r>
+              <a:rPr lang="en-US" altLang="ko-KR" sz="1200" dirty="0">
+                <a:solidFill>
+                  <a:schemeClr val="accent6"/>
+                </a:solidFill>
+              </a:rPr>
+              <a:t/>
+            </a:r>
+            <a:br>
+              <a:rPr lang="en-US" altLang="ko-KR" sz="1200" dirty="0">
+                <a:solidFill>
+                  <a:schemeClr val="accent6"/>
+                </a:solidFill>
+              </a:rPr>
+            </a:br>
+            <a:r>
+              <a:rPr lang="en-US" altLang="ko-KR" dirty="0"/>
+              <a:t>   // </a:t>
+            </a:r>
+            <a:r>
+              <a:rPr lang="en-US" altLang="ko-KR" dirty="0" smtClean="0"/>
+              <a:t>…3</a:t>
+            </a:r>
+            <a:r>
+              <a:rPr lang="en-US" altLang="ko-KR" dirty="0"/>
+              <a:t/>
+            </a:r>
+            <a:br>
+              <a:rPr lang="en-US" altLang="ko-KR" dirty="0"/>
+            </a:br>
+            <a:r>
+              <a:rPr lang="en-US" altLang="ko-KR" dirty="0"/>
+              <a:t>}</a:t>
+            </a:r>
+            <a:endParaRPr lang="en-US" altLang="ko-KR" dirty="0" smtClean="0"/>
+          </a:p>
+          <a:p>
+            <a:r>
+              <a:rPr lang="en-US" altLang="ko-KR" dirty="0" smtClean="0"/>
+              <a:t> </a:t>
+            </a:r>
+            <a:endParaRPr lang="en-US" altLang="ko-KR" sz="1200" dirty="0">
+              <a:solidFill>
+                <a:schemeClr val="accent6"/>
+              </a:solidFill>
+            </a:endParaRPr>
+          </a:p>
+        </p:txBody>
+      </p:sp>
+      <p:pic>
+        <p:nvPicPr>
+          <p:cNvPr id="4" name="그림 3"/>
+          <p:cNvPicPr>
+            <a:picLocks noChangeAspect="1"/>
+          </p:cNvPicPr>
+          <p:nvPr/>
+        </p:nvPicPr>
+        <p:blipFill>
+          <a:blip r:embed="rId2"/>
+          <a:stretch>
+            <a:fillRect/>
+          </a:stretch>
+        </p:blipFill>
+        <p:spPr>
+          <a:xfrm>
+            <a:off x="400050" y="3356992"/>
+            <a:ext cx="8743950" cy="2828925"/>
+          </a:xfrm>
+          <a:prstGeom prst="rect">
+            <a:avLst/>
+          </a:prstGeom>
+        </p:spPr>
+      </p:pic>
+    </p:spTree>
+    <p:extLst>
+      <p:ext uri="{BB962C8B-B14F-4D97-AF65-F5344CB8AC3E}">
+        <p14:creationId xmlns:p14="http://schemas.microsoft.com/office/powerpoint/2010/main" val="3001691124"/>
+      </p:ext>
+    </p:extLst>
+  </p:cSld>
+  <p:clrMapOvr>
+    <a:masterClrMapping/>
+  </p:clrMapOvr>
+</p:sld>
+</file>
+
+<file path=ppt/slides/slide36.xml><?xml version="1.0" encoding="utf-8"?>
+<p:sld xmlns:a="http://schemas.openxmlformats.org/drawingml/2006/main" xmlns:r="http://schemas.openxmlformats.org/officeDocument/2006/relationships" xmlns:p="http://schemas.openxmlformats.org/presentationml/2006/main">
+  <p:cSld>
+    <p:spTree>
+      <p:nvGrpSpPr>
+        <p:cNvPr id="1" name=""/>
+        <p:cNvGrpSpPr/>
+        <p:nvPr/>
+      </p:nvGrpSpPr>
+      <p:grpSpPr>
+        <a:xfrm>
+          <a:off x="0" y="0"/>
+          <a:ext cx="0" cy="0"/>
+          <a:chOff x="0" y="0"/>
+          <a:chExt cx="0" cy="0"/>
+        </a:xfrm>
+      </p:grpSpPr>
+      <p:sp>
+        <p:nvSpPr>
+          <p:cNvPr id="2" name="제목 1"/>
+          <p:cNvSpPr>
+            <a:spLocks noGrp="1"/>
+          </p:cNvSpPr>
+          <p:nvPr>
+            <p:ph type="title"/>
+          </p:nvPr>
+        </p:nvSpPr>
+        <p:spPr/>
+        <p:txBody>
+          <a:bodyPr/>
+          <a:lstStyle/>
+          <a:p>
+            <a:r>
+              <a:rPr lang="ko-KR" altLang="en-US" dirty="0" err="1" smtClean="0"/>
+              <a:t>제어문</a:t>
+            </a:r>
+            <a:r>
+              <a:rPr lang="en-US" altLang="ko-KR" dirty="0" smtClean="0"/>
+              <a:t>: </a:t>
+            </a:r>
+            <a:r>
+              <a:rPr lang="ko-KR" altLang="en-US" dirty="0" err="1" smtClean="0"/>
+              <a:t>조건문</a:t>
+            </a:r>
+            <a:endParaRPr lang="ko-KR" altLang="en-US" dirty="0"/>
+          </a:p>
+        </p:txBody>
+      </p:sp>
+      <p:sp>
+        <p:nvSpPr>
+          <p:cNvPr id="3" name="내용 개체 틀 2"/>
+          <p:cNvSpPr>
+            <a:spLocks noGrp="1"/>
+          </p:cNvSpPr>
+          <p:nvPr>
+            <p:ph idx="1"/>
+          </p:nvPr>
+        </p:nvSpPr>
+        <p:spPr/>
+        <p:txBody>
+          <a:bodyPr/>
+          <a:lstStyle/>
+          <a:p>
+            <a:r>
+              <a:rPr lang="en-US" altLang="ko-KR" dirty="0" smtClean="0"/>
+              <a:t>guard (Swift only) </a:t>
+            </a:r>
+            <a:r>
+              <a:rPr lang="en-US" altLang="ko-KR" sz="1200" dirty="0" smtClean="0">
+                <a:solidFill>
+                  <a:schemeClr val="accent6"/>
+                </a:solidFill>
+              </a:rPr>
+              <a:t>(</a:t>
+            </a:r>
+            <a:r>
+              <a:rPr lang="ko-KR" altLang="en-US" sz="1200" dirty="0" smtClean="0">
+                <a:solidFill>
+                  <a:schemeClr val="accent6"/>
+                </a:solidFill>
+              </a:rPr>
+              <a:t>조건식을 충족하지 않을 때 수행할 내용을 명시</a:t>
+            </a:r>
+            <a:r>
+              <a:rPr lang="en-US" altLang="ko-KR" sz="1200" dirty="0" smtClean="0">
+                <a:solidFill>
+                  <a:schemeClr val="accent6"/>
+                </a:solidFill>
+              </a:rPr>
+              <a:t>)</a:t>
+            </a:r>
+            <a:endParaRPr lang="en-US" altLang="ko-KR" sz="1200" dirty="0">
+              <a:solidFill>
+                <a:schemeClr val="accent6"/>
+              </a:solidFill>
+            </a:endParaRPr>
+          </a:p>
+          <a:p>
+            <a:pPr lvl="1"/>
+            <a:r>
+              <a:rPr lang="en-US" altLang="ko-KR" dirty="0" smtClean="0"/>
+              <a:t>guard</a:t>
+            </a:r>
+            <a:r>
+              <a:rPr lang="ko-KR" altLang="en-US" dirty="0" smtClean="0"/>
+              <a:t> </a:t>
+            </a:r>
+            <a:r>
+              <a:rPr lang="en-US" altLang="ko-KR" dirty="0" smtClean="0"/>
+              <a:t> </a:t>
+            </a:r>
+            <a:r>
+              <a:rPr lang="ko-KR" altLang="en-US" dirty="0" smtClean="0"/>
+              <a:t>조건식 </a:t>
+            </a:r>
+            <a:r>
+              <a:rPr lang="en-US" altLang="ko-KR" dirty="0" smtClean="0"/>
+              <a:t>else {   </a:t>
+            </a:r>
+            <a:r>
+              <a:rPr lang="en-US" altLang="ko-KR" sz="1200" dirty="0" smtClean="0">
+                <a:solidFill>
+                  <a:schemeClr val="accent6"/>
+                </a:solidFill>
+              </a:rPr>
+              <a:t>//  </a:t>
+            </a:r>
+            <a:r>
+              <a:rPr lang="ko-KR" altLang="en-US" sz="1200" dirty="0" smtClean="0">
+                <a:solidFill>
+                  <a:schemeClr val="accent6"/>
+                </a:solidFill>
+              </a:rPr>
+              <a:t>충족하지 않으면 </a:t>
+            </a:r>
+            <a:r>
+              <a:rPr lang="en-US" altLang="ko-KR" sz="1200" dirty="0" smtClean="0">
+                <a:solidFill>
+                  <a:schemeClr val="accent6"/>
+                </a:solidFill>
+              </a:rPr>
+              <a:t>return, throw, (</a:t>
+            </a:r>
+            <a:r>
+              <a:rPr lang="ko-KR" altLang="en-US" sz="1200" dirty="0" smtClean="0">
+                <a:solidFill>
+                  <a:schemeClr val="accent6"/>
+                </a:solidFill>
+              </a:rPr>
+              <a:t>함수</a:t>
+            </a:r>
+            <a:r>
+              <a:rPr lang="en-US" altLang="ko-KR" sz="1200" dirty="0" smtClean="0">
+                <a:solidFill>
+                  <a:schemeClr val="accent6"/>
+                </a:solidFill>
+              </a:rPr>
+              <a:t>, </a:t>
+            </a:r>
+            <a:r>
+              <a:rPr lang="ko-KR" altLang="en-US" sz="1200" dirty="0" err="1" smtClean="0">
+                <a:solidFill>
+                  <a:schemeClr val="accent6"/>
+                </a:solidFill>
+              </a:rPr>
+              <a:t>메소드</a:t>
+            </a:r>
+            <a:r>
+              <a:rPr lang="ko-KR" altLang="en-US" sz="1200" dirty="0" smtClean="0">
+                <a:solidFill>
+                  <a:schemeClr val="accent6"/>
+                </a:solidFill>
+              </a:rPr>
+              <a:t> 아니면 </a:t>
+            </a:r>
+            <a:r>
+              <a:rPr lang="en-US" altLang="ko-KR" sz="1200" dirty="0" smtClean="0">
+                <a:solidFill>
+                  <a:schemeClr val="accent6"/>
+                </a:solidFill>
+              </a:rPr>
+              <a:t>break, continue</a:t>
+            </a:r>
+            <a:r>
+              <a:rPr lang="ko-KR" altLang="en-US" sz="1200" dirty="0" smtClean="0">
+                <a:solidFill>
+                  <a:schemeClr val="accent6"/>
+                </a:solidFill>
+              </a:rPr>
+              <a:t>도 가능</a:t>
+            </a:r>
+            <a:r>
+              <a:rPr lang="en-US" altLang="ko-KR" sz="1200" dirty="0" smtClean="0">
+                <a:solidFill>
+                  <a:schemeClr val="accent6"/>
+                </a:solidFill>
+              </a:rPr>
+              <a:t>)</a:t>
+            </a:r>
+            <a:br>
+              <a:rPr lang="en-US" altLang="ko-KR" sz="1200" dirty="0" smtClean="0">
+                <a:solidFill>
+                  <a:schemeClr val="accent6"/>
+                </a:solidFill>
+              </a:rPr>
+            </a:br>
+            <a:r>
+              <a:rPr lang="en-US" altLang="ko-KR" dirty="0" smtClean="0"/>
+              <a:t>   // return or break</a:t>
+            </a:r>
+            <a:br>
+              <a:rPr lang="en-US" altLang="ko-KR" dirty="0" smtClean="0"/>
+            </a:br>
+            <a:r>
+              <a:rPr lang="en-US" altLang="ko-KR" dirty="0" smtClean="0"/>
+              <a:t>}</a:t>
+            </a:r>
+          </a:p>
+          <a:p>
+            <a:pPr lvl="1"/>
+            <a:r>
+              <a:rPr lang="en-US" altLang="ko-KR" dirty="0"/>
+              <a:t>guard</a:t>
+            </a:r>
+            <a:r>
+              <a:rPr lang="ko-KR" altLang="en-US" dirty="0"/>
+              <a:t> </a:t>
+            </a:r>
+            <a:r>
+              <a:rPr lang="en-US" altLang="ko-KR" dirty="0"/>
+              <a:t> </a:t>
+            </a:r>
+            <a:r>
+              <a:rPr lang="ko-KR" altLang="en-US" dirty="0" err="1" smtClean="0"/>
+              <a:t>옵셔널바인딩</a:t>
+            </a:r>
+            <a:r>
+              <a:rPr lang="ko-KR" altLang="en-US" dirty="0" smtClean="0"/>
+              <a:t> </a:t>
+            </a:r>
+            <a:r>
+              <a:rPr lang="en-US" altLang="ko-KR" dirty="0" smtClean="0"/>
+              <a:t>where </a:t>
+            </a:r>
+            <a:r>
+              <a:rPr lang="ko-KR" altLang="en-US" dirty="0" smtClean="0"/>
+              <a:t>조건식 </a:t>
+            </a:r>
+            <a:r>
+              <a:rPr lang="en-US" altLang="ko-KR" dirty="0"/>
+              <a:t>else </a:t>
+            </a:r>
+            <a:r>
+              <a:rPr lang="en-US" altLang="ko-KR" dirty="0" smtClean="0"/>
+              <a:t>{   </a:t>
+            </a:r>
+            <a:r>
+              <a:rPr lang="en-US" altLang="ko-KR" sz="1200" dirty="0" smtClean="0">
+                <a:solidFill>
+                  <a:schemeClr val="accent6"/>
+                </a:solidFill>
+              </a:rPr>
+              <a:t>//  where </a:t>
+            </a:r>
+            <a:r>
+              <a:rPr lang="ko-KR" altLang="en-US" sz="1200" dirty="0" smtClean="0">
+                <a:solidFill>
+                  <a:schemeClr val="accent6"/>
+                </a:solidFill>
+              </a:rPr>
+              <a:t>절 생략 가능</a:t>
+            </a:r>
+            <a:r>
+              <a:rPr lang="en-US" altLang="ko-KR" dirty="0" smtClean="0"/>
+              <a:t/>
+            </a:r>
+            <a:br>
+              <a:rPr lang="en-US" altLang="ko-KR" dirty="0" smtClean="0"/>
+            </a:br>
+            <a:r>
+              <a:rPr lang="en-US" altLang="ko-KR" sz="1200" dirty="0" smtClean="0"/>
+              <a:t>      </a:t>
+            </a:r>
+            <a:r>
+              <a:rPr lang="en-US" altLang="ko-KR" sz="1200" dirty="0" smtClean="0">
+                <a:solidFill>
+                  <a:schemeClr val="accent6"/>
+                </a:solidFill>
+              </a:rPr>
+              <a:t>//  </a:t>
+            </a:r>
+            <a:r>
+              <a:rPr lang="ko-KR" altLang="en-US" sz="1200" dirty="0" err="1">
+                <a:solidFill>
+                  <a:schemeClr val="accent6"/>
+                </a:solidFill>
+              </a:rPr>
+              <a:t>옵셔널</a:t>
+            </a:r>
+            <a:r>
+              <a:rPr lang="ko-KR" altLang="en-US" sz="1200" dirty="0">
+                <a:solidFill>
+                  <a:schemeClr val="accent6"/>
+                </a:solidFill>
+              </a:rPr>
+              <a:t> </a:t>
+            </a:r>
+            <a:r>
+              <a:rPr lang="ko-KR" altLang="en-US" sz="1200" dirty="0" smtClean="0">
+                <a:solidFill>
+                  <a:schemeClr val="accent6"/>
+                </a:solidFill>
+              </a:rPr>
+              <a:t>바인딩</a:t>
+            </a:r>
+            <a:r>
+              <a:rPr lang="en-US" altLang="ko-KR" sz="1200" dirty="0" smtClean="0">
+                <a:solidFill>
+                  <a:schemeClr val="accent6"/>
+                </a:solidFill>
+              </a:rPr>
+              <a:t>X </a:t>
+            </a:r>
+            <a:r>
+              <a:rPr lang="ko-KR" altLang="en-US" sz="1200" dirty="0" smtClean="0">
+                <a:solidFill>
+                  <a:schemeClr val="accent6"/>
+                </a:solidFill>
+              </a:rPr>
+              <a:t>혹은 조건식 충족하지 </a:t>
+            </a:r>
+            <a:r>
+              <a:rPr lang="ko-KR" altLang="en-US" sz="1200" dirty="0">
+                <a:solidFill>
+                  <a:schemeClr val="accent6"/>
+                </a:solidFill>
+              </a:rPr>
+              <a:t>않으면 </a:t>
+            </a:r>
+            <a:r>
+              <a:rPr lang="en-US" altLang="ko-KR" sz="1200" dirty="0">
+                <a:solidFill>
+                  <a:schemeClr val="accent6"/>
+                </a:solidFill>
+              </a:rPr>
+              <a:t>return, throw, (</a:t>
+            </a:r>
+            <a:r>
+              <a:rPr lang="ko-KR" altLang="en-US" sz="1200" dirty="0">
+                <a:solidFill>
+                  <a:schemeClr val="accent6"/>
+                </a:solidFill>
+              </a:rPr>
+              <a:t>함수</a:t>
+            </a:r>
+            <a:r>
+              <a:rPr lang="en-US" altLang="ko-KR" sz="1200" dirty="0">
+                <a:solidFill>
+                  <a:schemeClr val="accent6"/>
+                </a:solidFill>
+              </a:rPr>
+              <a:t>, </a:t>
+            </a:r>
+            <a:r>
+              <a:rPr lang="ko-KR" altLang="en-US" sz="1200" dirty="0" err="1">
+                <a:solidFill>
+                  <a:schemeClr val="accent6"/>
+                </a:solidFill>
+              </a:rPr>
+              <a:t>메소드</a:t>
+            </a:r>
+            <a:r>
+              <a:rPr lang="ko-KR" altLang="en-US" sz="1200" dirty="0">
+                <a:solidFill>
+                  <a:schemeClr val="accent6"/>
+                </a:solidFill>
+              </a:rPr>
+              <a:t> 아니면 </a:t>
+            </a:r>
+            <a:r>
+              <a:rPr lang="en-US" altLang="ko-KR" sz="1200" dirty="0">
+                <a:solidFill>
+                  <a:schemeClr val="accent6"/>
+                </a:solidFill>
+              </a:rPr>
+              <a:t>break, continue</a:t>
+            </a:r>
+            <a:r>
+              <a:rPr lang="ko-KR" altLang="en-US" sz="1200" dirty="0">
+                <a:solidFill>
+                  <a:schemeClr val="accent6"/>
+                </a:solidFill>
+              </a:rPr>
+              <a:t>도 가능</a:t>
+            </a:r>
+            <a:r>
+              <a:rPr lang="en-US" altLang="ko-KR" sz="1200" dirty="0" smtClean="0">
+                <a:solidFill>
+                  <a:schemeClr val="accent6"/>
+                </a:solidFill>
+              </a:rPr>
+              <a:t>)</a:t>
+            </a:r>
+            <a:r>
+              <a:rPr lang="en-US" altLang="ko-KR" dirty="0" smtClean="0"/>
+              <a:t/>
+            </a:r>
+            <a:br>
+              <a:rPr lang="en-US" altLang="ko-KR" dirty="0" smtClean="0"/>
+            </a:br>
+            <a:r>
+              <a:rPr lang="en-US" altLang="ko-KR" dirty="0" smtClean="0"/>
+              <a:t>   // </a:t>
+            </a:r>
+            <a:r>
+              <a:rPr lang="en-US" altLang="ko-KR" dirty="0"/>
+              <a:t>return or break</a:t>
+            </a:r>
+            <a:br>
+              <a:rPr lang="en-US" altLang="ko-KR" dirty="0"/>
+            </a:br>
+            <a:r>
+              <a:rPr lang="en-US" altLang="ko-KR" dirty="0"/>
+              <a:t>}</a:t>
+            </a:r>
+          </a:p>
+          <a:p>
+            <a:pPr lvl="1"/>
+            <a:endParaRPr lang="en-US" altLang="ko-KR" dirty="0" smtClean="0"/>
+          </a:p>
+          <a:p>
+            <a:r>
+              <a:rPr lang="en-US" altLang="ko-KR" dirty="0" smtClean="0"/>
+              <a:t> </a:t>
+            </a:r>
+            <a:endParaRPr lang="en-US" altLang="ko-KR" sz="1200" dirty="0">
+              <a:solidFill>
+                <a:schemeClr val="accent6"/>
+              </a:solidFill>
+            </a:endParaRPr>
+          </a:p>
+        </p:txBody>
+      </p:sp>
+      <p:pic>
+        <p:nvPicPr>
+          <p:cNvPr id="5" name="그림 4"/>
+          <p:cNvPicPr>
+            <a:picLocks noChangeAspect="1"/>
+          </p:cNvPicPr>
+          <p:nvPr/>
+        </p:nvPicPr>
+        <p:blipFill>
+          <a:blip r:embed="rId2"/>
+          <a:stretch>
+            <a:fillRect/>
+          </a:stretch>
+        </p:blipFill>
+        <p:spPr>
+          <a:xfrm>
+            <a:off x="409575" y="3501008"/>
+            <a:ext cx="8734425" cy="3295650"/>
+          </a:xfrm>
+          <a:prstGeom prst="rect">
+            <a:avLst/>
+          </a:prstGeom>
+        </p:spPr>
+      </p:pic>
+    </p:spTree>
+    <p:extLst>
+      <p:ext uri="{BB962C8B-B14F-4D97-AF65-F5344CB8AC3E}">
+        <p14:creationId xmlns:p14="http://schemas.microsoft.com/office/powerpoint/2010/main" val="3300044932"/>
+      </p:ext>
+    </p:extLst>
+  </p:cSld>
+  <p:clrMapOvr>
+    <a:masterClrMapping/>
+  </p:clrMapOvr>
+</p:sld>
+</file>
+
+<file path=ppt/slides/slide37.xml><?xml version="1.0" encoding="utf-8"?>
+<p:sld xmlns:a="http://schemas.openxmlformats.org/drawingml/2006/main" xmlns:r="http://schemas.openxmlformats.org/officeDocument/2006/relationships" xmlns:p="http://schemas.openxmlformats.org/presentationml/2006/main">
+  <p:cSld>
+    <p:spTree>
+      <p:nvGrpSpPr>
+        <p:cNvPr id="1" name=""/>
+        <p:cNvGrpSpPr/>
+        <p:nvPr/>
+      </p:nvGrpSpPr>
+      <p:grpSpPr>
+        <a:xfrm>
+          <a:off x="0" y="0"/>
+          <a:ext cx="0" cy="0"/>
+          <a:chOff x="0" y="0"/>
+          <a:chExt cx="0" cy="0"/>
+        </a:xfrm>
+      </p:grpSpPr>
+      <p:sp>
+        <p:nvSpPr>
+          <p:cNvPr id="2" name="제목 1"/>
+          <p:cNvSpPr>
+            <a:spLocks noGrp="1"/>
+          </p:cNvSpPr>
+          <p:nvPr>
+            <p:ph type="title"/>
+          </p:nvPr>
+        </p:nvSpPr>
+        <p:spPr/>
+        <p:txBody>
+          <a:bodyPr/>
+          <a:lstStyle/>
+          <a:p>
+            <a:r>
+              <a:rPr lang="ko-KR" altLang="en-US" dirty="0" err="1" smtClean="0"/>
+              <a:t>제어문</a:t>
+            </a:r>
+            <a:r>
+              <a:rPr lang="en-US" altLang="ko-KR" dirty="0" smtClean="0"/>
+              <a:t>: </a:t>
+            </a:r>
+            <a:r>
+              <a:rPr lang="ko-KR" altLang="en-US" dirty="0" err="1" smtClean="0"/>
+              <a:t>조건문</a:t>
+            </a:r>
+            <a:endParaRPr lang="ko-KR" altLang="en-US" dirty="0"/>
+          </a:p>
+        </p:txBody>
+      </p:sp>
+      <p:sp>
+        <p:nvSpPr>
+          <p:cNvPr id="3" name="내용 개체 틀 2"/>
+          <p:cNvSpPr>
+            <a:spLocks noGrp="1"/>
+          </p:cNvSpPr>
+          <p:nvPr>
+            <p:ph idx="1"/>
+          </p:nvPr>
+        </p:nvSpPr>
+        <p:spPr/>
+        <p:txBody>
+          <a:bodyPr/>
+          <a:lstStyle/>
+          <a:p>
+            <a:r>
+              <a:rPr lang="en-US" altLang="ko-KR" dirty="0" smtClean="0"/>
+              <a:t>switch </a:t>
+            </a:r>
+            <a:r>
+              <a:rPr lang="en-US" altLang="ko-KR" sz="1200" dirty="0" smtClean="0">
+                <a:solidFill>
+                  <a:schemeClr val="accent6"/>
+                </a:solidFill>
+              </a:rPr>
+              <a:t>(</a:t>
+            </a:r>
+            <a:r>
+              <a:rPr lang="ko-KR" altLang="en-US" sz="1200" dirty="0" smtClean="0">
+                <a:solidFill>
+                  <a:schemeClr val="accent6"/>
+                </a:solidFill>
+              </a:rPr>
+              <a:t>표현식 </a:t>
+            </a:r>
+            <a:r>
+              <a:rPr lang="ko-KR" altLang="en-US" sz="1200" dirty="0">
+                <a:solidFill>
+                  <a:schemeClr val="accent6"/>
+                </a:solidFill>
+              </a:rPr>
+              <a:t>결과가 </a:t>
+            </a:r>
+            <a:r>
+              <a:rPr lang="ko-KR" altLang="en-US" sz="1200" dirty="0" smtClean="0">
+                <a:solidFill>
+                  <a:schemeClr val="accent6"/>
+                </a:solidFill>
+              </a:rPr>
+              <a:t>상수 표현식과 같은 </a:t>
+            </a:r>
+            <a:r>
+              <a:rPr lang="en-US" altLang="ko-KR" sz="1200" dirty="0" smtClean="0">
+                <a:solidFill>
+                  <a:schemeClr val="accent6"/>
+                </a:solidFill>
+              </a:rPr>
+              <a:t>case </a:t>
+            </a:r>
+            <a:r>
+              <a:rPr lang="ko-KR" altLang="en-US" sz="1200" dirty="0" smtClean="0">
+                <a:solidFill>
+                  <a:schemeClr val="accent6"/>
+                </a:solidFill>
+              </a:rPr>
+              <a:t>블록 수행</a:t>
+            </a:r>
+            <a:r>
+              <a:rPr lang="en-US" altLang="ko-KR" sz="1200" dirty="0" smtClean="0">
+                <a:solidFill>
+                  <a:schemeClr val="accent6"/>
+                </a:solidFill>
+              </a:rPr>
+              <a:t>)</a:t>
+            </a:r>
+            <a:endParaRPr lang="en-US" altLang="ko-KR" sz="1200" dirty="0">
+              <a:solidFill>
+                <a:schemeClr val="accent6"/>
+              </a:solidFill>
+            </a:endParaRPr>
+          </a:p>
+          <a:p>
+            <a:pPr lvl="1"/>
+            <a:r>
+              <a:rPr lang="en-US" altLang="ko-KR" dirty="0" smtClean="0"/>
+              <a:t>switch</a:t>
+            </a:r>
+            <a:r>
+              <a:rPr lang="ko-KR" altLang="en-US" dirty="0" smtClean="0"/>
+              <a:t> 표현식 </a:t>
+            </a:r>
+            <a:r>
+              <a:rPr lang="en-US" altLang="ko-KR" dirty="0" smtClean="0"/>
+              <a:t>{   </a:t>
+            </a:r>
+            <a:r>
+              <a:rPr lang="en-US" altLang="ko-KR" sz="1200" dirty="0" smtClean="0">
+                <a:solidFill>
+                  <a:schemeClr val="accent6"/>
+                </a:solidFill>
+              </a:rPr>
+              <a:t>//  1</a:t>
+            </a:r>
+            <a:r>
+              <a:rPr lang="ko-KR" altLang="en-US" sz="1200" dirty="0" smtClean="0">
+                <a:solidFill>
+                  <a:schemeClr val="accent6"/>
+                </a:solidFill>
+              </a:rPr>
+              <a:t>개만 작성 가능</a:t>
+            </a:r>
+            <a:r>
+              <a:rPr lang="en-US" altLang="ko-KR" sz="1200" dirty="0" smtClean="0">
+                <a:solidFill>
+                  <a:schemeClr val="accent6"/>
+                </a:solidFill>
+              </a:rPr>
+              <a:t/>
+            </a:r>
+            <a:br>
+              <a:rPr lang="en-US" altLang="ko-KR" sz="1200" dirty="0" smtClean="0">
+                <a:solidFill>
+                  <a:schemeClr val="accent6"/>
+                </a:solidFill>
+              </a:rPr>
+            </a:br>
+            <a:r>
+              <a:rPr lang="en-US" altLang="ko-KR" dirty="0" smtClean="0"/>
+              <a:t>case </a:t>
+            </a:r>
+            <a:r>
+              <a:rPr lang="ko-KR" altLang="en-US" dirty="0" smtClean="0"/>
+              <a:t>상수 표현식</a:t>
+            </a:r>
+            <a:r>
+              <a:rPr lang="en-US" altLang="ko-KR" dirty="0" smtClean="0"/>
+              <a:t>1:</a:t>
+            </a:r>
+            <a:br>
+              <a:rPr lang="en-US" altLang="ko-KR" dirty="0" smtClean="0"/>
+            </a:br>
+            <a:r>
+              <a:rPr lang="en-US" altLang="ko-KR" dirty="0" smtClean="0"/>
+              <a:t>	// …</a:t>
+            </a:r>
+            <a:br>
+              <a:rPr lang="en-US" altLang="ko-KR" dirty="0" smtClean="0"/>
+            </a:br>
+            <a:r>
+              <a:rPr lang="en-US" altLang="ko-KR" dirty="0" smtClean="0"/>
+              <a:t>	</a:t>
+            </a:r>
+            <a:r>
+              <a:rPr lang="en-US" altLang="ko-KR" dirty="0" err="1" smtClean="0"/>
+              <a:t>fallthrough</a:t>
+            </a:r>
+            <a:r>
+              <a:rPr lang="en-US" altLang="ko-KR" dirty="0" smtClean="0"/>
+              <a:t>   </a:t>
+            </a:r>
+            <a:r>
+              <a:rPr lang="en-US" altLang="ko-KR" sz="1200" dirty="0" smtClean="0">
+                <a:solidFill>
+                  <a:schemeClr val="accent6"/>
+                </a:solidFill>
+              </a:rPr>
+              <a:t>// break</a:t>
+            </a:r>
+            <a:r>
+              <a:rPr lang="ko-KR" altLang="en-US" sz="1200" dirty="0" smtClean="0">
+                <a:solidFill>
+                  <a:schemeClr val="accent6"/>
+                </a:solidFill>
+              </a:rPr>
+              <a:t>를 </a:t>
+            </a:r>
+            <a:r>
+              <a:rPr lang="ko-KR" altLang="en-US" sz="1200" dirty="0" err="1" smtClean="0">
+                <a:solidFill>
+                  <a:schemeClr val="accent6"/>
+                </a:solidFill>
+              </a:rPr>
+              <a:t>생략한것과</a:t>
+            </a:r>
+            <a:r>
+              <a:rPr lang="ko-KR" altLang="en-US" sz="1200" dirty="0" smtClean="0">
+                <a:solidFill>
+                  <a:schemeClr val="accent6"/>
+                </a:solidFill>
+              </a:rPr>
+              <a:t> 같은 효과</a:t>
+            </a:r>
+            <a:r>
+              <a:rPr lang="en-US" altLang="ko-KR" sz="1200" dirty="0" smtClean="0">
+                <a:solidFill>
+                  <a:schemeClr val="accent6"/>
+                </a:solidFill>
+              </a:rPr>
+              <a:t/>
+            </a:r>
+            <a:br>
+              <a:rPr lang="en-US" altLang="ko-KR" sz="1200" dirty="0" smtClean="0">
+                <a:solidFill>
+                  <a:schemeClr val="accent6"/>
+                </a:solidFill>
+              </a:rPr>
+            </a:br>
+            <a:r>
+              <a:rPr lang="en-US" altLang="ko-KR" dirty="0" smtClean="0"/>
+              <a:t>case </a:t>
+            </a:r>
+            <a:r>
+              <a:rPr lang="ko-KR" altLang="en-US" dirty="0"/>
+              <a:t>상수 </a:t>
+            </a:r>
+            <a:r>
+              <a:rPr lang="ko-KR" altLang="en-US" dirty="0" smtClean="0"/>
+              <a:t>표현식</a:t>
+            </a:r>
+            <a:r>
+              <a:rPr lang="en-US" altLang="ko-KR" dirty="0" smtClean="0"/>
+              <a:t>2, </a:t>
+            </a:r>
+            <a:r>
+              <a:rPr lang="ko-KR" altLang="en-US" dirty="0"/>
+              <a:t>상수 </a:t>
+            </a:r>
+            <a:r>
+              <a:rPr lang="ko-KR" altLang="en-US" dirty="0" smtClean="0"/>
+              <a:t>표현식</a:t>
+            </a:r>
+            <a:r>
+              <a:rPr lang="en-US" altLang="ko-KR" dirty="0" smtClean="0"/>
+              <a:t>3:</a:t>
+            </a:r>
+            <a:r>
+              <a:rPr lang="en-US" altLang="ko-KR" dirty="0"/>
+              <a:t/>
+            </a:r>
+            <a:br>
+              <a:rPr lang="en-US" altLang="ko-KR" dirty="0"/>
+            </a:br>
+            <a:r>
+              <a:rPr lang="en-US" altLang="ko-KR" dirty="0" smtClean="0"/>
+              <a:t>	// …</a:t>
+            </a:r>
+            <a:br>
+              <a:rPr lang="en-US" altLang="ko-KR" dirty="0" smtClean="0"/>
+            </a:br>
+            <a:r>
+              <a:rPr lang="en-US" altLang="ko-KR" dirty="0" smtClean="0"/>
+              <a:t>default:</a:t>
+            </a:r>
+            <a:br>
+              <a:rPr lang="en-US" altLang="ko-KR" dirty="0" smtClean="0"/>
+            </a:br>
+            <a:r>
+              <a:rPr lang="en-US" altLang="ko-KR" dirty="0"/>
+              <a:t>	// </a:t>
+            </a:r>
+            <a:r>
+              <a:rPr lang="en-US" altLang="ko-KR" dirty="0" smtClean="0"/>
+              <a:t>…</a:t>
+            </a:r>
+            <a:br>
+              <a:rPr lang="en-US" altLang="ko-KR" dirty="0" smtClean="0"/>
+            </a:br>
+            <a:r>
+              <a:rPr lang="en-US" altLang="ko-KR" dirty="0" smtClean="0"/>
+              <a:t>}</a:t>
+            </a:r>
+            <a:endParaRPr lang="en-US" altLang="ko-KR" sz="1200" dirty="0" smtClean="0">
+              <a:solidFill>
+                <a:schemeClr val="accent6"/>
+              </a:solidFill>
+            </a:endParaRPr>
+          </a:p>
+          <a:p>
+            <a:pPr lvl="1"/>
+            <a:endParaRPr lang="en-US" altLang="ko-KR" sz="1200" dirty="0">
+              <a:solidFill>
+                <a:schemeClr val="accent6"/>
+              </a:solidFill>
+            </a:endParaRPr>
+          </a:p>
+          <a:p>
+            <a:pPr lvl="1"/>
+            <a:r>
+              <a:rPr lang="en-US" altLang="ko-KR" sz="1200" dirty="0" smtClean="0">
+                <a:solidFill>
+                  <a:schemeClr val="accent6"/>
+                </a:solidFill>
+              </a:rPr>
+              <a:t>break </a:t>
+            </a:r>
+            <a:r>
+              <a:rPr lang="ko-KR" altLang="en-US" sz="1200" dirty="0" smtClean="0">
+                <a:solidFill>
+                  <a:schemeClr val="accent6"/>
+                </a:solidFill>
+              </a:rPr>
+              <a:t>사용하지 않음</a:t>
+            </a:r>
+            <a:endParaRPr lang="en-US" altLang="ko-KR" sz="1200" dirty="0" smtClean="0">
+              <a:solidFill>
+                <a:schemeClr val="accent6"/>
+              </a:solidFill>
+            </a:endParaRPr>
+          </a:p>
+          <a:p>
+            <a:pPr lvl="1"/>
+            <a:r>
+              <a:rPr lang="en-US" altLang="ko-KR" sz="1200" dirty="0" smtClean="0">
+                <a:solidFill>
+                  <a:schemeClr val="accent6"/>
+                </a:solidFill>
+              </a:rPr>
+              <a:t>default</a:t>
+            </a:r>
+            <a:r>
+              <a:rPr lang="ko-KR" altLang="en-US" sz="1200" dirty="0" smtClean="0">
+                <a:solidFill>
+                  <a:schemeClr val="accent6"/>
+                </a:solidFill>
+              </a:rPr>
+              <a:t>는 항상 마지막 </a:t>
+            </a:r>
+            <a:r>
+              <a:rPr lang="en-US" altLang="ko-KR" sz="1200" dirty="0" smtClean="0">
+                <a:solidFill>
+                  <a:schemeClr val="accent6"/>
+                </a:solidFill>
+              </a:rPr>
+              <a:t>(</a:t>
+            </a:r>
+            <a:r>
+              <a:rPr lang="ko-KR" altLang="en-US" sz="1200" dirty="0" smtClean="0">
+                <a:solidFill>
+                  <a:schemeClr val="accent6"/>
+                </a:solidFill>
+              </a:rPr>
+              <a:t>필수</a:t>
+            </a:r>
+            <a:r>
+              <a:rPr lang="en-US" altLang="ko-KR" sz="1200" dirty="0" smtClean="0">
+                <a:solidFill>
+                  <a:schemeClr val="accent6"/>
+                </a:solidFill>
+              </a:rPr>
+              <a:t>)</a:t>
+            </a:r>
+            <a:endParaRPr lang="en-US" altLang="ko-KR" dirty="0" smtClean="0"/>
+          </a:p>
+        </p:txBody>
+      </p:sp>
+    </p:spTree>
+    <p:extLst>
+      <p:ext uri="{BB962C8B-B14F-4D97-AF65-F5344CB8AC3E}">
+        <p14:creationId xmlns:p14="http://schemas.microsoft.com/office/powerpoint/2010/main" val="2676136499"/>
+      </p:ext>
+    </p:extLst>
+  </p:cSld>
+  <p:clrMapOvr>
+    <a:masterClrMapping/>
+  </p:clrMapOvr>
+</p:sld>
+</file>
+
+<file path=ppt/slides/slide38.xml><?xml version="1.0" encoding="utf-8"?>
+<p:sld xmlns:a="http://schemas.openxmlformats.org/drawingml/2006/main" xmlns:r="http://schemas.openxmlformats.org/officeDocument/2006/relationships" xmlns:p="http://schemas.openxmlformats.org/presentationml/2006/main">
+  <p:cSld>
+    <p:spTree>
+      <p:nvGrpSpPr>
+        <p:cNvPr id="1" name=""/>
+        <p:cNvGrpSpPr/>
+        <p:nvPr/>
+      </p:nvGrpSpPr>
+      <p:grpSpPr>
+        <a:xfrm>
+          <a:off x="0" y="0"/>
+          <a:ext cx="0" cy="0"/>
+          <a:chOff x="0" y="0"/>
+          <a:chExt cx="0" cy="0"/>
+        </a:xfrm>
+      </p:grpSpPr>
+      <p:sp>
+        <p:nvSpPr>
+          <p:cNvPr id="2" name="제목 1"/>
+          <p:cNvSpPr>
+            <a:spLocks noGrp="1"/>
+          </p:cNvSpPr>
+          <p:nvPr>
+            <p:ph type="title"/>
+          </p:nvPr>
+        </p:nvSpPr>
+        <p:spPr/>
+        <p:txBody>
+          <a:bodyPr/>
+          <a:lstStyle/>
+          <a:p>
+            <a:r>
+              <a:rPr lang="ko-KR" altLang="en-US" dirty="0" err="1" smtClean="0"/>
+              <a:t>제어문</a:t>
+            </a:r>
+            <a:r>
+              <a:rPr lang="en-US" altLang="ko-KR" dirty="0" smtClean="0"/>
+              <a:t>: </a:t>
+            </a:r>
+            <a:r>
+              <a:rPr lang="ko-KR" altLang="en-US" dirty="0" err="1" smtClean="0"/>
+              <a:t>조건문</a:t>
+            </a:r>
+            <a:endParaRPr lang="ko-KR" altLang="en-US" dirty="0"/>
+          </a:p>
+        </p:txBody>
+      </p:sp>
+      <p:sp>
+        <p:nvSpPr>
+          <p:cNvPr id="3" name="내용 개체 틀 2"/>
+          <p:cNvSpPr>
+            <a:spLocks noGrp="1"/>
+          </p:cNvSpPr>
+          <p:nvPr>
+            <p:ph idx="1"/>
+          </p:nvPr>
+        </p:nvSpPr>
+        <p:spPr/>
+        <p:txBody>
+          <a:bodyPr/>
+          <a:lstStyle/>
+          <a:p>
+            <a:r>
+              <a:rPr lang="en-US" altLang="ko-KR" dirty="0" smtClean="0"/>
+              <a:t>switch </a:t>
+            </a:r>
+            <a:r>
+              <a:rPr lang="en-US" altLang="ko-KR" sz="1200" dirty="0" smtClean="0">
+                <a:solidFill>
+                  <a:schemeClr val="accent6"/>
+                </a:solidFill>
+              </a:rPr>
+              <a:t>(</a:t>
+            </a:r>
+            <a:r>
+              <a:rPr lang="ko-KR" altLang="en-US" sz="1200" dirty="0" smtClean="0">
+                <a:solidFill>
+                  <a:schemeClr val="accent6"/>
+                </a:solidFill>
+              </a:rPr>
+              <a:t>표현식 </a:t>
+            </a:r>
+            <a:r>
+              <a:rPr lang="ko-KR" altLang="en-US" sz="1200" dirty="0">
+                <a:solidFill>
+                  <a:schemeClr val="accent6"/>
+                </a:solidFill>
+              </a:rPr>
+              <a:t>결과가 </a:t>
+            </a:r>
+            <a:r>
+              <a:rPr lang="ko-KR" altLang="en-US" sz="1200" dirty="0" smtClean="0">
+                <a:solidFill>
+                  <a:schemeClr val="accent6"/>
+                </a:solidFill>
+              </a:rPr>
+              <a:t>상수 표현식과 같은 </a:t>
+            </a:r>
+            <a:r>
+              <a:rPr lang="en-US" altLang="ko-KR" sz="1200" dirty="0" smtClean="0">
+                <a:solidFill>
+                  <a:schemeClr val="accent6"/>
+                </a:solidFill>
+              </a:rPr>
+              <a:t>case </a:t>
+            </a:r>
+            <a:r>
+              <a:rPr lang="ko-KR" altLang="en-US" sz="1200" dirty="0" smtClean="0">
+                <a:solidFill>
+                  <a:schemeClr val="accent6"/>
+                </a:solidFill>
+              </a:rPr>
+              <a:t>블록 수행</a:t>
+            </a:r>
+            <a:r>
+              <a:rPr lang="en-US" altLang="ko-KR" sz="1200" dirty="0" smtClean="0">
+                <a:solidFill>
+                  <a:schemeClr val="accent6"/>
+                </a:solidFill>
+              </a:rPr>
+              <a:t>)</a:t>
+            </a:r>
+            <a:endParaRPr lang="en-US" altLang="ko-KR" sz="1200" dirty="0">
+              <a:solidFill>
+                <a:schemeClr val="accent6"/>
+              </a:solidFill>
+            </a:endParaRPr>
+          </a:p>
+        </p:txBody>
+      </p:sp>
+      <p:pic>
+        <p:nvPicPr>
+          <p:cNvPr id="4" name="그림 3"/>
+          <p:cNvPicPr>
+            <a:picLocks noChangeAspect="1"/>
+          </p:cNvPicPr>
+          <p:nvPr/>
+        </p:nvPicPr>
+        <p:blipFill>
+          <a:blip r:embed="rId2"/>
+          <a:stretch>
+            <a:fillRect/>
+          </a:stretch>
+        </p:blipFill>
+        <p:spPr>
+          <a:xfrm>
+            <a:off x="400050" y="1847850"/>
+            <a:ext cx="8743950" cy="5010150"/>
+          </a:xfrm>
+          <a:prstGeom prst="rect">
+            <a:avLst/>
+          </a:prstGeom>
+        </p:spPr>
+      </p:pic>
+    </p:spTree>
+    <p:extLst>
+      <p:ext uri="{BB962C8B-B14F-4D97-AF65-F5344CB8AC3E}">
+        <p14:creationId xmlns:p14="http://schemas.microsoft.com/office/powerpoint/2010/main" val="4087058970"/>
+      </p:ext>
+    </p:extLst>
+  </p:cSld>
+  <p:clrMapOvr>
+    <a:masterClrMapping/>
+  </p:clrMapOvr>
+</p:sld>
+</file>
+
+<file path=ppt/slides/slide39.xml><?xml version="1.0" encoding="utf-8"?>
+<p:sld xmlns:a="http://schemas.openxmlformats.org/drawingml/2006/main" xmlns:r="http://schemas.openxmlformats.org/officeDocument/2006/relationships" xmlns:p="http://schemas.openxmlformats.org/presentationml/2006/main">
+  <p:cSld>
+    <p:spTree>
+      <p:nvGrpSpPr>
+        <p:cNvPr id="1" name=""/>
+        <p:cNvGrpSpPr/>
+        <p:nvPr/>
+      </p:nvGrpSpPr>
+      <p:grpSpPr>
+        <a:xfrm>
+          <a:off x="0" y="0"/>
+          <a:ext cx="0" cy="0"/>
+          <a:chOff x="0" y="0"/>
+          <a:chExt cx="0" cy="0"/>
+        </a:xfrm>
+      </p:grpSpPr>
+      <p:sp>
+        <p:nvSpPr>
+          <p:cNvPr id="2" name="제목 1"/>
+          <p:cNvSpPr>
+            <a:spLocks noGrp="1"/>
+          </p:cNvSpPr>
+          <p:nvPr>
+            <p:ph type="title"/>
+          </p:nvPr>
+        </p:nvSpPr>
+        <p:spPr/>
+        <p:txBody>
+          <a:bodyPr/>
+          <a:lstStyle/>
+          <a:p>
+            <a:r>
+              <a:rPr lang="ko-KR" altLang="en-US" dirty="0" err="1" smtClean="0"/>
+              <a:t>제어문</a:t>
+            </a:r>
+            <a:r>
+              <a:rPr lang="en-US" altLang="ko-KR" dirty="0" smtClean="0"/>
+              <a:t>: </a:t>
+            </a:r>
+            <a:r>
+              <a:rPr lang="ko-KR" altLang="en-US" dirty="0" err="1" smtClean="0"/>
+              <a:t>조건문</a:t>
+            </a:r>
+            <a:endParaRPr lang="ko-KR" altLang="en-US" dirty="0"/>
+          </a:p>
+        </p:txBody>
+      </p:sp>
+      <p:sp>
+        <p:nvSpPr>
+          <p:cNvPr id="3" name="내용 개체 틀 2"/>
+          <p:cNvSpPr>
+            <a:spLocks noGrp="1"/>
+          </p:cNvSpPr>
+          <p:nvPr>
+            <p:ph idx="1"/>
+          </p:nvPr>
+        </p:nvSpPr>
+        <p:spPr/>
+        <p:txBody>
+          <a:bodyPr/>
+          <a:lstStyle/>
+          <a:p>
+            <a:r>
+              <a:rPr lang="en-US" altLang="ko-KR" dirty="0" smtClean="0"/>
+              <a:t>break </a:t>
+            </a:r>
+            <a:r>
+              <a:rPr lang="en-US" altLang="ko-KR" sz="1200" dirty="0" smtClean="0">
+                <a:solidFill>
+                  <a:schemeClr val="accent6"/>
+                </a:solidFill>
+              </a:rPr>
+              <a:t>(</a:t>
+            </a:r>
+            <a:r>
+              <a:rPr lang="ko-KR" altLang="en-US" sz="1200" dirty="0" smtClean="0">
+                <a:solidFill>
+                  <a:schemeClr val="accent6"/>
+                </a:solidFill>
+              </a:rPr>
+              <a:t>가장 인접한 </a:t>
+            </a:r>
+            <a:r>
+              <a:rPr lang="ko-KR" altLang="en-US" sz="1200" dirty="0" err="1" smtClean="0">
+                <a:solidFill>
+                  <a:schemeClr val="accent6"/>
+                </a:solidFill>
+              </a:rPr>
+              <a:t>반복문을</a:t>
+            </a:r>
+            <a:r>
+              <a:rPr lang="ko-KR" altLang="en-US" sz="1200" dirty="0" smtClean="0">
+                <a:solidFill>
+                  <a:schemeClr val="accent6"/>
+                </a:solidFill>
+              </a:rPr>
+              <a:t> 종료</a:t>
+            </a:r>
+            <a:r>
+              <a:rPr lang="en-US" altLang="ko-KR" sz="1200" dirty="0" smtClean="0">
+                <a:solidFill>
+                  <a:schemeClr val="accent6"/>
+                </a:solidFill>
+              </a:rPr>
+              <a:t>)</a:t>
+            </a:r>
+            <a:endParaRPr lang="en-US" altLang="ko-KR" sz="1200" dirty="0">
+              <a:solidFill>
+                <a:schemeClr val="accent6"/>
+              </a:solidFill>
+            </a:endParaRPr>
+          </a:p>
+          <a:p>
+            <a:pPr lvl="1"/>
+            <a:r>
+              <a:rPr lang="ko-KR" altLang="en-US" dirty="0" err="1" smtClean="0"/>
+              <a:t>반복문</a:t>
+            </a:r>
+            <a:r>
+              <a:rPr lang="en-US" altLang="ko-KR" dirty="0" smtClean="0"/>
+              <a:t>loop {</a:t>
+            </a:r>
+            <a:br>
+              <a:rPr lang="en-US" altLang="ko-KR" dirty="0" smtClean="0"/>
+            </a:br>
+            <a:r>
+              <a:rPr lang="en-US" altLang="ko-KR" dirty="0" smtClean="0"/>
+              <a:t>   break</a:t>
+            </a:r>
+            <a:br>
+              <a:rPr lang="en-US" altLang="ko-KR" dirty="0" smtClean="0"/>
+            </a:br>
+            <a:r>
+              <a:rPr lang="en-US" altLang="ko-KR" dirty="0" smtClean="0"/>
+              <a:t>}</a:t>
+            </a:r>
+          </a:p>
+          <a:p>
+            <a:pPr lvl="0">
+              <a:buClr>
+                <a:srgbClr val="D6ECFF"/>
+              </a:buClr>
+            </a:pPr>
+            <a:r>
+              <a:rPr lang="en-US" altLang="ko-KR" dirty="0" smtClean="0"/>
+              <a:t> continue </a:t>
+            </a:r>
+            <a:r>
+              <a:rPr lang="en-US" altLang="ko-KR" sz="1200" dirty="0">
+                <a:solidFill>
+                  <a:srgbClr val="1AB39F"/>
+                </a:solidFill>
+              </a:rPr>
+              <a:t>(</a:t>
+            </a:r>
+            <a:r>
+              <a:rPr lang="ko-KR" altLang="en-US" sz="1200" dirty="0">
+                <a:solidFill>
+                  <a:srgbClr val="1AB39F"/>
+                </a:solidFill>
+              </a:rPr>
+              <a:t>가장 인접한 </a:t>
+            </a:r>
+            <a:r>
+              <a:rPr lang="ko-KR" altLang="en-US" sz="1200" dirty="0" err="1" smtClean="0">
+                <a:solidFill>
+                  <a:srgbClr val="1AB39F"/>
+                </a:solidFill>
+              </a:rPr>
+              <a:t>반복문의</a:t>
+            </a:r>
+            <a:r>
+              <a:rPr lang="en-US" altLang="ko-KR" sz="1200" dirty="0" smtClean="0">
+                <a:solidFill>
+                  <a:srgbClr val="1AB39F"/>
+                </a:solidFill>
+              </a:rPr>
+              <a:t> </a:t>
+            </a:r>
+            <a:r>
+              <a:rPr lang="ko-KR" altLang="en-US" sz="1200" dirty="0" smtClean="0">
+                <a:solidFill>
+                  <a:srgbClr val="1AB39F"/>
+                </a:solidFill>
+              </a:rPr>
+              <a:t>다음 반복을 바로 수행</a:t>
+            </a:r>
+            <a:r>
+              <a:rPr lang="en-US" altLang="ko-KR" sz="1200" dirty="0" smtClean="0">
+                <a:solidFill>
+                  <a:srgbClr val="1AB39F"/>
+                </a:solidFill>
+              </a:rPr>
+              <a:t>)</a:t>
+            </a:r>
+            <a:endParaRPr lang="en-US" altLang="ko-KR" dirty="0" smtClean="0"/>
+          </a:p>
+          <a:p>
+            <a:pPr lvl="1"/>
+            <a:r>
+              <a:rPr lang="ko-KR" altLang="en-US" dirty="0" err="1" smtClean="0"/>
+              <a:t>반복문</a:t>
+            </a:r>
+            <a:r>
+              <a:rPr lang="en-US" altLang="ko-KR" dirty="0" smtClean="0"/>
+              <a:t>loop {</a:t>
+            </a:r>
+            <a:br>
+              <a:rPr lang="en-US" altLang="ko-KR" dirty="0" smtClean="0"/>
+            </a:br>
+            <a:r>
+              <a:rPr lang="en-US" altLang="ko-KR" dirty="0" smtClean="0"/>
+              <a:t>	continue</a:t>
+            </a:r>
+            <a:br>
+              <a:rPr lang="en-US" altLang="ko-KR" dirty="0" smtClean="0"/>
+            </a:br>
+            <a:r>
+              <a:rPr lang="en-US" altLang="ko-KR" dirty="0" smtClean="0"/>
+              <a:t>}</a:t>
+            </a:r>
+          </a:p>
+          <a:p>
+            <a:endParaRPr lang="en-US" altLang="ko-KR" sz="1200" dirty="0">
+              <a:solidFill>
+                <a:schemeClr val="accent6"/>
+              </a:solidFill>
+            </a:endParaRPr>
+          </a:p>
+        </p:txBody>
+      </p:sp>
+      <p:pic>
+        <p:nvPicPr>
+          <p:cNvPr id="5" name="그림 4"/>
+          <p:cNvPicPr>
+            <a:picLocks noChangeAspect="1"/>
+          </p:cNvPicPr>
+          <p:nvPr/>
+        </p:nvPicPr>
+        <p:blipFill>
+          <a:blip r:embed="rId2"/>
+          <a:stretch>
+            <a:fillRect/>
+          </a:stretch>
+        </p:blipFill>
+        <p:spPr>
+          <a:xfrm>
+            <a:off x="400050" y="3371850"/>
+            <a:ext cx="8743950" cy="3486150"/>
+          </a:xfrm>
+          <a:prstGeom prst="rect">
+            <a:avLst/>
+          </a:prstGeom>
+        </p:spPr>
+      </p:pic>
+    </p:spTree>
+    <p:extLst>
+      <p:ext uri="{BB962C8B-B14F-4D97-AF65-F5344CB8AC3E}">
+        <p14:creationId xmlns:p14="http://schemas.microsoft.com/office/powerpoint/2010/main" val="1375163570"/>
+      </p:ext>
+    </p:extLst>
+  </p:cSld>
+  <p:clrMapOvr>
+    <a:masterClrMapping/>
+  </p:clrMapOvr>
+</p:sld>
+</file>
+
 <file path=ppt/slides/slide4.xml><?xml version="1.0" encoding="utf-8"?>
 <p:sld xmlns:a="http://schemas.openxmlformats.org/drawingml/2006/main" xmlns:r="http://schemas.openxmlformats.org/officeDocument/2006/relationships" xmlns:p="http://schemas.openxmlformats.org/presentationml/2006/main">
   <p:cSld>
@@ -23226,6 +25783,248 @@
       </p:par>
     </p:tnLst>
   </p:timing>
+</p:sld>
+</file>
+
+<file path=ppt/slides/slide40.xml><?xml version="1.0" encoding="utf-8"?>
+<p:sld xmlns:a="http://schemas.openxmlformats.org/drawingml/2006/main" xmlns:r="http://schemas.openxmlformats.org/officeDocument/2006/relationships" xmlns:p="http://schemas.openxmlformats.org/presentationml/2006/main">
+  <p:cSld>
+    <p:spTree>
+      <p:nvGrpSpPr>
+        <p:cNvPr id="1" name=""/>
+        <p:cNvGrpSpPr/>
+        <p:nvPr/>
+      </p:nvGrpSpPr>
+      <p:grpSpPr>
+        <a:xfrm>
+          <a:off x="0" y="0"/>
+          <a:ext cx="0" cy="0"/>
+          <a:chOff x="0" y="0"/>
+          <a:chExt cx="0" cy="0"/>
+        </a:xfrm>
+      </p:grpSpPr>
+      <p:sp>
+        <p:nvSpPr>
+          <p:cNvPr id="2" name="제목 1"/>
+          <p:cNvSpPr>
+            <a:spLocks noGrp="1"/>
+          </p:cNvSpPr>
+          <p:nvPr>
+            <p:ph type="title"/>
+          </p:nvPr>
+        </p:nvSpPr>
+        <p:spPr/>
+        <p:txBody>
+          <a:bodyPr/>
+          <a:lstStyle/>
+          <a:p>
+            <a:r>
+              <a:rPr lang="ko-KR" altLang="en-US" dirty="0" err="1" smtClean="0"/>
+              <a:t>제어문</a:t>
+            </a:r>
+            <a:r>
+              <a:rPr lang="en-US" altLang="ko-KR" dirty="0" smtClean="0"/>
+              <a:t>: </a:t>
+            </a:r>
+            <a:r>
+              <a:rPr lang="ko-KR" altLang="en-US" dirty="0" err="1" smtClean="0"/>
+              <a:t>조건문</a:t>
+            </a:r>
+            <a:endParaRPr lang="ko-KR" altLang="en-US" dirty="0"/>
+          </a:p>
+        </p:txBody>
+      </p:sp>
+      <p:sp>
+        <p:nvSpPr>
+          <p:cNvPr id="3" name="내용 개체 틀 2"/>
+          <p:cNvSpPr>
+            <a:spLocks noGrp="1"/>
+          </p:cNvSpPr>
+          <p:nvPr>
+            <p:ph idx="1"/>
+          </p:nvPr>
+        </p:nvSpPr>
+        <p:spPr/>
+        <p:txBody>
+          <a:bodyPr/>
+          <a:lstStyle/>
+          <a:p>
+            <a:r>
+              <a:rPr lang="en-US" altLang="ko-KR" dirty="0" smtClean="0"/>
+              <a:t>Labeled Statements (Swift only) </a:t>
+            </a:r>
+            <a:r>
+              <a:rPr lang="en-US" altLang="ko-KR" sz="1200" dirty="0" smtClean="0">
+                <a:solidFill>
+                  <a:srgbClr val="1AB39F"/>
+                </a:solidFill>
+              </a:rPr>
+              <a:t>(for, switch loop</a:t>
+            </a:r>
+            <a:r>
+              <a:rPr lang="ko-KR" altLang="en-US" sz="1200" dirty="0" smtClean="0">
+                <a:solidFill>
+                  <a:srgbClr val="1AB39F"/>
+                </a:solidFill>
+              </a:rPr>
+              <a:t>에 이름을 지정</a:t>
+            </a:r>
+            <a:r>
+              <a:rPr lang="en-US" altLang="ko-KR" sz="1200" dirty="0" smtClean="0">
+                <a:solidFill>
+                  <a:srgbClr val="1AB39F"/>
+                </a:solidFill>
+              </a:rPr>
+              <a:t>)</a:t>
+            </a:r>
+            <a:endParaRPr lang="en-US" altLang="ko-KR" sz="1200" dirty="0">
+              <a:solidFill>
+                <a:schemeClr val="accent6"/>
+              </a:solidFill>
+            </a:endParaRPr>
+          </a:p>
+          <a:p>
+            <a:pPr lvl="1"/>
+            <a:r>
+              <a:rPr lang="ko-KR" altLang="en-US" dirty="0" err="1" smtClean="0"/>
+              <a:t>라벨명</a:t>
+            </a:r>
+            <a:r>
+              <a:rPr lang="en-US" altLang="ko-KR" dirty="0" smtClean="0"/>
+              <a:t>: for </a:t>
+            </a:r>
+            <a:r>
+              <a:rPr lang="en-US" altLang="ko-KR" dirty="0" err="1" smtClean="0"/>
+              <a:t>i</a:t>
+            </a:r>
+            <a:r>
+              <a:rPr lang="en-US" altLang="ko-KR" dirty="0" smtClean="0"/>
+              <a:t> in range {</a:t>
+            </a:r>
+            <a:br>
+              <a:rPr lang="en-US" altLang="ko-KR" dirty="0" smtClean="0"/>
+            </a:br>
+            <a:r>
+              <a:rPr lang="en-US" altLang="ko-KR" dirty="0" smtClean="0"/>
+              <a:t>	// …</a:t>
+            </a:r>
+            <a:br>
+              <a:rPr lang="en-US" altLang="ko-KR" dirty="0" smtClean="0"/>
+            </a:br>
+            <a:r>
+              <a:rPr lang="en-US" altLang="ko-KR" dirty="0" smtClean="0"/>
+              <a:t>}</a:t>
+            </a:r>
+          </a:p>
+          <a:p>
+            <a:pPr lvl="1"/>
+            <a:r>
+              <a:rPr lang="ko-KR" altLang="en-US" dirty="0" smtClean="0"/>
+              <a:t>사용 예</a:t>
+            </a:r>
+            <a:r>
+              <a:rPr lang="en-US" altLang="ko-KR" dirty="0" smtClean="0"/>
+              <a:t>) break </a:t>
+            </a:r>
+            <a:r>
+              <a:rPr lang="ko-KR" altLang="en-US" dirty="0" err="1" smtClean="0"/>
+              <a:t>라벨명</a:t>
+            </a:r>
+            <a:r>
+              <a:rPr lang="en-US" altLang="ko-KR" dirty="0" smtClean="0"/>
+              <a:t>, continue </a:t>
+            </a:r>
+            <a:r>
+              <a:rPr lang="ko-KR" altLang="en-US" dirty="0" err="1" smtClean="0"/>
+              <a:t>라벨명</a:t>
+            </a:r>
+            <a:r>
+              <a:rPr lang="ko-KR" altLang="en-US" dirty="0" smtClean="0"/>
+              <a:t> </a:t>
+            </a:r>
+            <a:r>
+              <a:rPr lang="en-US" altLang="ko-KR" sz="1200" dirty="0" smtClean="0">
+                <a:solidFill>
+                  <a:srgbClr val="1AB39F"/>
+                </a:solidFill>
+                <a:latin typeface="맑은 고딕" panose="020B0503020000020004" pitchFamily="50" charset="-127"/>
+              </a:rPr>
+              <a:t>(break, continue </a:t>
+            </a:r>
+            <a:r>
+              <a:rPr lang="ko-KR" altLang="en-US" sz="1200" dirty="0" smtClean="0">
+                <a:solidFill>
+                  <a:srgbClr val="1AB39F"/>
+                </a:solidFill>
+                <a:latin typeface="맑은 고딕" panose="020B0503020000020004" pitchFamily="50" charset="-127"/>
+              </a:rPr>
+              <a:t>할 </a:t>
+            </a:r>
+            <a:r>
+              <a:rPr lang="en-US" altLang="ko-KR" sz="1200" dirty="0" smtClean="0">
+                <a:solidFill>
+                  <a:srgbClr val="1AB39F"/>
+                </a:solidFill>
+                <a:latin typeface="맑은 고딕" panose="020B0503020000020004" pitchFamily="50" charset="-127"/>
+              </a:rPr>
+              <a:t>loop</a:t>
+            </a:r>
+            <a:r>
+              <a:rPr lang="ko-KR" altLang="en-US" sz="1200" dirty="0" smtClean="0">
+                <a:solidFill>
+                  <a:srgbClr val="1AB39F"/>
+                </a:solidFill>
+                <a:latin typeface="맑은 고딕" panose="020B0503020000020004" pitchFamily="50" charset="-127"/>
+              </a:rPr>
+              <a:t>를 지정</a:t>
+            </a:r>
+            <a:r>
+              <a:rPr lang="en-US" altLang="ko-KR" sz="1200" dirty="0" smtClean="0">
+                <a:solidFill>
+                  <a:srgbClr val="1AB39F"/>
+                </a:solidFill>
+                <a:latin typeface="맑은 고딕" panose="020B0503020000020004" pitchFamily="50" charset="-127"/>
+              </a:rPr>
+              <a:t>)</a:t>
+            </a:r>
+            <a:endParaRPr lang="en-US" altLang="ko-KR" dirty="0" smtClean="0"/>
+          </a:p>
+        </p:txBody>
+      </p:sp>
+      <p:pic>
+        <p:nvPicPr>
+          <p:cNvPr id="4" name="그림 3"/>
+          <p:cNvPicPr>
+            <a:picLocks noChangeAspect="1"/>
+          </p:cNvPicPr>
+          <p:nvPr/>
+        </p:nvPicPr>
+        <p:blipFill>
+          <a:blip r:embed="rId2"/>
+          <a:stretch>
+            <a:fillRect/>
+          </a:stretch>
+        </p:blipFill>
+        <p:spPr>
+          <a:xfrm>
+            <a:off x="400050" y="3933056"/>
+            <a:ext cx="8743950" cy="2800350"/>
+          </a:xfrm>
+          <a:prstGeom prst="rect">
+            <a:avLst/>
+          </a:prstGeom>
+        </p:spPr>
+      </p:pic>
+    </p:spTree>
+    <p:extLst>
+      <p:ext uri="{BB962C8B-B14F-4D97-AF65-F5344CB8AC3E}">
+        <p14:creationId xmlns:p14="http://schemas.microsoft.com/office/powerpoint/2010/main" val="3840696329"/>
+      </p:ext>
+    </p:extLst>
+  </p:cSld>
+  <p:clrMapOvr>
+    <a:masterClrMapping/>
+  </p:clrMapOvr>
 </p:sld>
 </file>
 
@@ -25160,14 +27959,14 @@
                 <a:gridCol w="1440160">
                   <a:extLst>
                     <a:ext uri="{9D8B030D-6E8A-4147-A177-3AD203B41FA5}">
-                      <a16:colId xmlns="" xmlns:a16="http://schemas.microsoft.com/office/drawing/2014/main" val="20000"/>
+                      <a16:colId xmlns:a16="http://schemas.microsoft.com/office/drawing/2014/main" val="20000"/>
                     </a:ext>
                   </a:extLst>
                 </a:gridCol>
                 <a:gridCol w="1440160">
                   <a:extLst>
                     <a:ext uri="{9D8B030D-6E8A-4147-A177-3AD203B41FA5}">
-                      <a16:colId xmlns="" xmlns:a16="http://schemas.microsoft.com/office/drawing/2014/main" val="20001"/>
+                      <a16:colId xmlns:a16="http://schemas.microsoft.com/office/drawing/2014/main" val="20001"/>
                     </a:ext>
                   </a:extLst>
                 </a:gridCol>
@@ -25221,7 +28020,7 @@
                 </a:tc>
                 <a:extLst>
                   <a:ext uri="{0D108BD9-81ED-4DB2-BD59-A6C34878D82A}">
-                    <a16:rowId xmlns="" xmlns:a16="http://schemas.microsoft.com/office/drawing/2014/main" val="10000"/>
+                    <a16:rowId xmlns:a16="http://schemas.microsoft.com/office/drawing/2014/main" val="10000"/>
                   </a:ext>
                 </a:extLst>
               </a:tr>
@@ -25296,7 +28095,7 @@
                 </a:tc>
                 <a:extLst>
                   <a:ext uri="{0D108BD9-81ED-4DB2-BD59-A6C34878D82A}">
-                    <a16:rowId xmlns="" xmlns:a16="http://schemas.microsoft.com/office/drawing/2014/main" val="10001"/>
+                    <a16:rowId xmlns:a16="http://schemas.microsoft.com/office/drawing/2014/main" val="10001"/>
                   </a:ext>
                 </a:extLst>
               </a:tr>
@@ -25371,7 +28170,7 @@
                 </a:tc>
                 <a:extLst>
                   <a:ext uri="{0D108BD9-81ED-4DB2-BD59-A6C34878D82A}">
-                    <a16:rowId xmlns="" xmlns:a16="http://schemas.microsoft.com/office/drawing/2014/main" val="10002"/>
+                    <a16:rowId xmlns:a16="http://schemas.microsoft.com/office/drawing/2014/main" val="10002"/>
                   </a:ext>
                 </a:extLst>
               </a:tr>
@@ -25446,7 +28245,7 @@
                 </a:tc>
                 <a:extLst>
                   <a:ext uri="{0D108BD9-81ED-4DB2-BD59-A6C34878D82A}">
-                    <a16:rowId xmlns="" xmlns:a16="http://schemas.microsoft.com/office/drawing/2014/main" val="10003"/>
+                    <a16:rowId xmlns:a16="http://schemas.microsoft.com/office/drawing/2014/main" val="10003"/>
                   </a:ext>
                 </a:extLst>
               </a:tr>
@@ -25521,7 +28320,7 @@
                 </a:tc>
                 <a:extLst>
                   <a:ext uri="{0D108BD9-81ED-4DB2-BD59-A6C34878D82A}">
-                    <a16:rowId xmlns="" xmlns:a16="http://schemas.microsoft.com/office/drawing/2014/main" val="10004"/>
+                    <a16:rowId xmlns:a16="http://schemas.microsoft.com/office/drawing/2014/main" val="10004"/>
                   </a:ext>
                 </a:extLst>
               </a:tr>
@@ -25947,14 +28746,14 @@
                 <a:gridCol w="1440160">
                   <a:extLst>
                     <a:ext uri="{9D8B030D-6E8A-4147-A177-3AD203B41FA5}">
-                      <a16:colId xmlns="" xmlns:a16="http://schemas.microsoft.com/office/drawing/2014/main" val="20000"/>
+                      <a16:colId xmlns:a16="http://schemas.microsoft.com/office/drawing/2014/main" val="20000"/>
                     </a:ext>
                   </a:extLst>
                 </a:gridCol>
                 <a:gridCol w="1440160">
                   <a:extLst>
                     <a:ext uri="{9D8B030D-6E8A-4147-A177-3AD203B41FA5}">
-                      <a16:colId xmlns="" xmlns:a16="http://schemas.microsoft.com/office/drawing/2014/main" val="20001"/>
+                      <a16:colId xmlns:a16="http://schemas.microsoft.com/office/drawing/2014/main" val="20001"/>
                     </a:ext>
                   </a:extLst>
                 </a:gridCol>
@@ -26008,7 +28807,7 @@
                 </a:tc>
                 <a:extLst>
                   <a:ext uri="{0D108BD9-81ED-4DB2-BD59-A6C34878D82A}">
-                    <a16:rowId xmlns="" xmlns:a16="http://schemas.microsoft.com/office/drawing/2014/main" val="10000"/>
+                    <a16:rowId xmlns:a16="http://schemas.microsoft.com/office/drawing/2014/main" val="10000"/>
                   </a:ext>
                 </a:extLst>
               </a:tr>
@@ -26073,7 +28872,7 @@
                 </a:tc>
                 <a:extLst>
                   <a:ext uri="{0D108BD9-81ED-4DB2-BD59-A6C34878D82A}">
-                    <a16:rowId xmlns="" xmlns:a16="http://schemas.microsoft.com/office/drawing/2014/main" val="10001"/>
+                    <a16:rowId xmlns:a16="http://schemas.microsoft.com/office/drawing/2014/main" val="10001"/>
                   </a:ext>
                 </a:extLst>
               </a:tr>
@@ -26138,7 +28937,7 @@
                 </a:tc>
                 <a:extLst>
                   <a:ext uri="{0D108BD9-81ED-4DB2-BD59-A6C34878D82A}">
-                    <a16:rowId xmlns="" xmlns:a16="http://schemas.microsoft.com/office/drawing/2014/main" val="10002"/>
+                    <a16:rowId xmlns:a16="http://schemas.microsoft.com/office/drawing/2014/main" val="10002"/>
                   </a:ext>
                 </a:extLst>
               </a:tr>

</xml_diff>

<commit_message>
Chapter 11, struct and class
</commit_message>
<xml_diff>
--- a/Swift세미나자료.pptx
+++ b/Swift세미나자료.pptx
@@ -69,6 +69,17 @@
     <p:sldId id="314" r:id="rId63"/>
     <p:sldId id="315" r:id="rId64"/>
     <p:sldId id="316" r:id="rId65"/>
+    <p:sldId id="324" r:id="rId66"/>
+    <p:sldId id="325" r:id="rId67"/>
+    <p:sldId id="326" r:id="rId68"/>
+    <p:sldId id="327" r:id="rId69"/>
+    <p:sldId id="328" r:id="rId70"/>
+    <p:sldId id="329" r:id="rId71"/>
+    <p:sldId id="330" r:id="rId72"/>
+    <p:sldId id="332" r:id="rId73"/>
+    <p:sldId id="333" r:id="rId74"/>
+    <p:sldId id="334" r:id="rId75"/>
+    <p:sldId id="335" r:id="rId76"/>
   </p:sldIdLst>
   <p:sldSz cx="9144000" cy="6858000" type="screen4x3"/>
   <p:notesSz cx="6858000" cy="9144000"/>
@@ -184,6 +195,18 @@
     </p:ext>
   </p:extLst>
 </p:presentation>
+</file>
+
+<file path=ppt/commentAuthors.xml><?xml version="1.0" encoding="utf-8"?>
+<p:cmAuthorLst xmlns:a="http://schemas.openxmlformats.org/drawingml/2006/main" xmlns:r="http://schemas.openxmlformats.org/officeDocument/2006/relationships" xmlns:p="http://schemas.openxmlformats.org/presentationml/2006/main">
+  <p:cmAuthor id="1" name="Kyoungho Choi" initials="KC" lastIdx="1" clrIdx="0">
+    <p:extLst>
+      <p:ext uri="{19B8F6BF-5375-455C-9EA6-DF929625EA0E}">
+        <p15:presenceInfo xmlns:p15="http://schemas.microsoft.com/office/powerpoint/2012/main" userId="4f68918042eb8058" providerId="Windows Live"/>
+      </p:ext>
+    </p:extLst>
+  </p:cmAuthor>
+</p:cmAuthorLst>
 </file>
 
 <file path=ppt/slideLayouts/slideLayout1.xml><?xml version="1.0" encoding="utf-8"?>
@@ -5739,7 +5762,11 @@
             <a:pPr lvl="4" eaLnBrk="1" latinLnBrk="0" hangingPunct="1"/>
             <a:r>
               <a:rPr kumimoji="0" lang="ko-KR" altLang="en-US" dirty="0" smtClean="0"/>
-              <a:t>다섯째 수준</a:t>
+              <a:t>다섯째 </a:t>
+            </a:r>
+            <a:r>
+              <a:rPr kumimoji="0" lang="ko-KR" altLang="en-US" dirty="0" smtClean="0"/>
+              <a:t>수준</a:t>
             </a:r>
             <a:endParaRPr kumimoji="0" lang="en-US" dirty="0"/>
           </a:p>
@@ -6413,14 +6440,14 @@
                 <a:gridCol w="1440160">
                   <a:extLst>
                     <a:ext uri="{9D8B030D-6E8A-4147-A177-3AD203B41FA5}">
-                      <a16:colId xmlns:a16="http://schemas.microsoft.com/office/drawing/2014/main" xmlns="" val="20000"/>
+                      <a16:colId xmlns:a16="http://schemas.microsoft.com/office/drawing/2014/main" val="20000"/>
                     </a:ext>
                   </a:extLst>
                 </a:gridCol>
                 <a:gridCol w="1440160">
                   <a:extLst>
                     <a:ext uri="{9D8B030D-6E8A-4147-A177-3AD203B41FA5}">
-                      <a16:colId xmlns:a16="http://schemas.microsoft.com/office/drawing/2014/main" xmlns="" val="20001"/>
+                      <a16:colId xmlns:a16="http://schemas.microsoft.com/office/drawing/2014/main" val="20001"/>
                     </a:ext>
                   </a:extLst>
                 </a:gridCol>
@@ -6474,7 +6501,7 @@
                 </a:tc>
                 <a:extLst>
                   <a:ext uri="{0D108BD9-81ED-4DB2-BD59-A6C34878D82A}">
-                    <a16:rowId xmlns:a16="http://schemas.microsoft.com/office/drawing/2014/main" xmlns="" val="10000"/>
+                    <a16:rowId xmlns:a16="http://schemas.microsoft.com/office/drawing/2014/main" val="10000"/>
                   </a:ext>
                 </a:extLst>
               </a:tr>
@@ -6539,7 +6566,7 @@
                 </a:tc>
                 <a:extLst>
                   <a:ext uri="{0D108BD9-81ED-4DB2-BD59-A6C34878D82A}">
-                    <a16:rowId xmlns:a16="http://schemas.microsoft.com/office/drawing/2014/main" xmlns="" val="10001"/>
+                    <a16:rowId xmlns:a16="http://schemas.microsoft.com/office/drawing/2014/main" val="10001"/>
                   </a:ext>
                 </a:extLst>
               </a:tr>
@@ -6841,14 +6868,14 @@
                 <a:gridCol w="1980220">
                   <a:extLst>
                     <a:ext uri="{9D8B030D-6E8A-4147-A177-3AD203B41FA5}">
-                      <a16:colId xmlns:a16="http://schemas.microsoft.com/office/drawing/2014/main" xmlns="" val="20000"/>
+                      <a16:colId xmlns:a16="http://schemas.microsoft.com/office/drawing/2014/main" val="20000"/>
                     </a:ext>
                   </a:extLst>
                 </a:gridCol>
                 <a:gridCol w="1980220">
                   <a:extLst>
                     <a:ext uri="{9D8B030D-6E8A-4147-A177-3AD203B41FA5}">
-                      <a16:colId xmlns:a16="http://schemas.microsoft.com/office/drawing/2014/main" xmlns="" val="20001"/>
+                      <a16:colId xmlns:a16="http://schemas.microsoft.com/office/drawing/2014/main" val="20001"/>
                     </a:ext>
                   </a:extLst>
                 </a:gridCol>
@@ -6924,7 +6951,7 @@
                 </a:tc>
                 <a:extLst>
                   <a:ext uri="{0D108BD9-81ED-4DB2-BD59-A6C34878D82A}">
-                    <a16:rowId xmlns:a16="http://schemas.microsoft.com/office/drawing/2014/main" xmlns="" val="10000"/>
+                    <a16:rowId xmlns:a16="http://schemas.microsoft.com/office/drawing/2014/main" val="10000"/>
                   </a:ext>
                 </a:extLst>
               </a:tr>
@@ -6989,7 +7016,7 @@
                 </a:tc>
                 <a:extLst>
                   <a:ext uri="{0D108BD9-81ED-4DB2-BD59-A6C34878D82A}">
-                    <a16:rowId xmlns:a16="http://schemas.microsoft.com/office/drawing/2014/main" xmlns="" val="10001"/>
+                    <a16:rowId xmlns:a16="http://schemas.microsoft.com/office/drawing/2014/main" val="10001"/>
                   </a:ext>
                 </a:extLst>
               </a:tr>
@@ -7251,7 +7278,7 @@
           <a:graphicData uri="http://schemas.openxmlformats.org/presentationml/2006/ole">
             <mc:AlternateContent xmlns:mc="http://schemas.openxmlformats.org/markup-compatibility/2006">
               <mc:Choice xmlns:v="urn:schemas-microsoft-com:vml" Requires="v">
-                <p:oleObj spid="_x0000_s1119" name="포장기 셸 개체" showAsIcon="1" r:id="rId3" imgW="1154880" imgH="604800" progId="Package">
+                <p:oleObj spid="_x0000_s1122" name="포장기 셸 개체" showAsIcon="1" r:id="rId3" imgW="1154880" imgH="604800" progId="Package">
                   <p:embed/>
                 </p:oleObj>
               </mc:Choice>
@@ -7854,7 +7881,7 @@
           <a:graphicData uri="http://schemas.openxmlformats.org/presentationml/2006/ole">
             <mc:AlternateContent xmlns:mc="http://schemas.openxmlformats.org/markup-compatibility/2006">
               <mc:Choice xmlns:v="urn:schemas-microsoft-com:vml" Requires="v">
-                <p:oleObj spid="_x0000_s2143" name="포장기 셸 개체" showAsIcon="1" r:id="rId3" imgW="1154880" imgH="604800" progId="Package">
+                <p:oleObj spid="_x0000_s2146" name="포장기 셸 개체" showAsIcon="1" r:id="rId3" imgW="1154880" imgH="604800" progId="Package">
                   <p:embed/>
                 </p:oleObj>
               </mc:Choice>
@@ -8834,7 +8861,7 @@
           <a:graphicData uri="http://schemas.openxmlformats.org/presentationml/2006/ole">
             <mc:AlternateContent xmlns:mc="http://schemas.openxmlformats.org/markup-compatibility/2006">
               <mc:Choice xmlns:v="urn:schemas-microsoft-com:vml" Requires="v">
-                <p:oleObj spid="_x0000_s3166" name="포장기 셸 개체" showAsIcon="1" r:id="rId3" imgW="1154880" imgH="604800" progId="Package">
+                <p:oleObj spid="_x0000_s3169" name="포장기 셸 개체" showAsIcon="1" r:id="rId3" imgW="1154880" imgH="604800" progId="Package">
                   <p:embed/>
                 </p:oleObj>
               </mc:Choice>
@@ -13591,28 +13618,28 @@
                 <a:gridCol w="936104">
                   <a:extLst>
                     <a:ext uri="{9D8B030D-6E8A-4147-A177-3AD203B41FA5}">
-                      <a16:colId xmlns:a16="http://schemas.microsoft.com/office/drawing/2014/main" xmlns="" val="20000"/>
+                      <a16:colId xmlns:a16="http://schemas.microsoft.com/office/drawing/2014/main" val="20000"/>
                     </a:ext>
                   </a:extLst>
                 </a:gridCol>
                 <a:gridCol w="1512168">
                   <a:extLst>
                     <a:ext uri="{9D8B030D-6E8A-4147-A177-3AD203B41FA5}">
-                      <a16:colId xmlns:a16="http://schemas.microsoft.com/office/drawing/2014/main" xmlns="" val="20001"/>
+                      <a16:colId xmlns:a16="http://schemas.microsoft.com/office/drawing/2014/main" val="20001"/>
                     </a:ext>
                   </a:extLst>
                 </a:gridCol>
                 <a:gridCol w="4968552">
                   <a:extLst>
                     <a:ext uri="{9D8B030D-6E8A-4147-A177-3AD203B41FA5}">
-                      <a16:colId xmlns:a16="http://schemas.microsoft.com/office/drawing/2014/main" xmlns="" val="20002"/>
+                      <a16:colId xmlns:a16="http://schemas.microsoft.com/office/drawing/2014/main" val="20002"/>
                     </a:ext>
                   </a:extLst>
                 </a:gridCol>
                 <a:gridCol w="1008112">
                   <a:extLst>
                     <a:ext uri="{9D8B030D-6E8A-4147-A177-3AD203B41FA5}">
-                      <a16:colId xmlns:a16="http://schemas.microsoft.com/office/drawing/2014/main" xmlns="" val="20003"/>
+                      <a16:colId xmlns:a16="http://schemas.microsoft.com/office/drawing/2014/main" val="20003"/>
                     </a:ext>
                   </a:extLst>
                 </a:gridCol>
@@ -13692,7 +13719,7 @@
                 </a:tc>
                 <a:extLst>
                   <a:ext uri="{0D108BD9-81ED-4DB2-BD59-A6C34878D82A}">
-                    <a16:rowId xmlns:a16="http://schemas.microsoft.com/office/drawing/2014/main" xmlns="" val="10000"/>
+                    <a16:rowId xmlns:a16="http://schemas.microsoft.com/office/drawing/2014/main" val="10000"/>
                   </a:ext>
                 </a:extLst>
               </a:tr>
@@ -13930,7 +13957,7 @@
                 </a:tc>
                 <a:extLst>
                   <a:ext uri="{0D108BD9-81ED-4DB2-BD59-A6C34878D82A}">
-                    <a16:rowId xmlns:a16="http://schemas.microsoft.com/office/drawing/2014/main" xmlns="" val="10001"/>
+                    <a16:rowId xmlns:a16="http://schemas.microsoft.com/office/drawing/2014/main" val="10001"/>
                   </a:ext>
                 </a:extLst>
               </a:tr>
@@ -14184,7 +14211,7 @@
                 </a:tc>
                 <a:extLst>
                   <a:ext uri="{0D108BD9-81ED-4DB2-BD59-A6C34878D82A}">
-                    <a16:rowId xmlns:a16="http://schemas.microsoft.com/office/drawing/2014/main" xmlns="" val="10002"/>
+                    <a16:rowId xmlns:a16="http://schemas.microsoft.com/office/drawing/2014/main" val="10002"/>
                   </a:ext>
                 </a:extLst>
               </a:tr>
@@ -14754,28 +14781,28 @@
                 <a:gridCol w="936104">
                   <a:extLst>
                     <a:ext uri="{9D8B030D-6E8A-4147-A177-3AD203B41FA5}">
-                      <a16:colId xmlns:a16="http://schemas.microsoft.com/office/drawing/2014/main" xmlns="" val="20000"/>
+                      <a16:colId xmlns:a16="http://schemas.microsoft.com/office/drawing/2014/main" val="20000"/>
                     </a:ext>
                   </a:extLst>
                 </a:gridCol>
                 <a:gridCol w="1512168">
                   <a:extLst>
                     <a:ext uri="{9D8B030D-6E8A-4147-A177-3AD203B41FA5}">
-                      <a16:colId xmlns:a16="http://schemas.microsoft.com/office/drawing/2014/main" xmlns="" val="20001"/>
+                      <a16:colId xmlns:a16="http://schemas.microsoft.com/office/drawing/2014/main" val="20001"/>
                     </a:ext>
                   </a:extLst>
                 </a:gridCol>
                 <a:gridCol w="4968552">
                   <a:extLst>
                     <a:ext uri="{9D8B030D-6E8A-4147-A177-3AD203B41FA5}">
-                      <a16:colId xmlns:a16="http://schemas.microsoft.com/office/drawing/2014/main" xmlns="" val="20002"/>
+                      <a16:colId xmlns:a16="http://schemas.microsoft.com/office/drawing/2014/main" val="20002"/>
                     </a:ext>
                   </a:extLst>
                 </a:gridCol>
                 <a:gridCol w="1008112">
                   <a:extLst>
                     <a:ext uri="{9D8B030D-6E8A-4147-A177-3AD203B41FA5}">
-                      <a16:colId xmlns:a16="http://schemas.microsoft.com/office/drawing/2014/main" xmlns="" val="20003"/>
+                      <a16:colId xmlns:a16="http://schemas.microsoft.com/office/drawing/2014/main" val="20003"/>
                     </a:ext>
                   </a:extLst>
                 </a:gridCol>
@@ -14855,7 +14882,7 @@
                 </a:tc>
                 <a:extLst>
                   <a:ext uri="{0D108BD9-81ED-4DB2-BD59-A6C34878D82A}">
-                    <a16:rowId xmlns:a16="http://schemas.microsoft.com/office/drawing/2014/main" xmlns="" val="10000"/>
+                    <a16:rowId xmlns:a16="http://schemas.microsoft.com/office/drawing/2014/main" val="10000"/>
                   </a:ext>
                 </a:extLst>
               </a:tr>
@@ -15119,7 +15146,7 @@
                 </a:tc>
                 <a:extLst>
                   <a:ext uri="{0D108BD9-81ED-4DB2-BD59-A6C34878D82A}">
-                    <a16:rowId xmlns:a16="http://schemas.microsoft.com/office/drawing/2014/main" xmlns="" val="10001"/>
+                    <a16:rowId xmlns:a16="http://schemas.microsoft.com/office/drawing/2014/main" val="10001"/>
                   </a:ext>
                 </a:extLst>
               </a:tr>
@@ -15412,7 +15439,7 @@
                 </a:tc>
                 <a:extLst>
                   <a:ext uri="{0D108BD9-81ED-4DB2-BD59-A6C34878D82A}">
-                    <a16:rowId xmlns:a16="http://schemas.microsoft.com/office/drawing/2014/main" xmlns="" val="10002"/>
+                    <a16:rowId xmlns:a16="http://schemas.microsoft.com/office/drawing/2014/main" val="10002"/>
                   </a:ext>
                 </a:extLst>
               </a:tr>
@@ -15627,7 +15654,7 @@
                 </a:tc>
                 <a:extLst>
                   <a:ext uri="{0D108BD9-81ED-4DB2-BD59-A6C34878D82A}">
-                    <a16:rowId xmlns:a16="http://schemas.microsoft.com/office/drawing/2014/main" xmlns="" val="10003"/>
+                    <a16:rowId xmlns:a16="http://schemas.microsoft.com/office/drawing/2014/main" val="10003"/>
                   </a:ext>
                 </a:extLst>
               </a:tr>
@@ -16244,28 +16271,28 @@
                 <a:gridCol w="936104">
                   <a:extLst>
                     <a:ext uri="{9D8B030D-6E8A-4147-A177-3AD203B41FA5}">
-                      <a16:colId xmlns:a16="http://schemas.microsoft.com/office/drawing/2014/main" xmlns="" val="20000"/>
+                      <a16:colId xmlns:a16="http://schemas.microsoft.com/office/drawing/2014/main" val="20000"/>
                     </a:ext>
                   </a:extLst>
                 </a:gridCol>
                 <a:gridCol w="1512168">
                   <a:extLst>
                     <a:ext uri="{9D8B030D-6E8A-4147-A177-3AD203B41FA5}">
-                      <a16:colId xmlns:a16="http://schemas.microsoft.com/office/drawing/2014/main" xmlns="" val="20001"/>
+                      <a16:colId xmlns:a16="http://schemas.microsoft.com/office/drawing/2014/main" val="20001"/>
                     </a:ext>
                   </a:extLst>
                 </a:gridCol>
                 <a:gridCol w="4968552">
                   <a:extLst>
                     <a:ext uri="{9D8B030D-6E8A-4147-A177-3AD203B41FA5}">
-                      <a16:colId xmlns:a16="http://schemas.microsoft.com/office/drawing/2014/main" xmlns="" val="20002"/>
+                      <a16:colId xmlns:a16="http://schemas.microsoft.com/office/drawing/2014/main" val="20002"/>
                     </a:ext>
                   </a:extLst>
                 </a:gridCol>
                 <a:gridCol w="1008112">
                   <a:extLst>
                     <a:ext uri="{9D8B030D-6E8A-4147-A177-3AD203B41FA5}">
-                      <a16:colId xmlns:a16="http://schemas.microsoft.com/office/drawing/2014/main" xmlns="" val="20003"/>
+                      <a16:colId xmlns:a16="http://schemas.microsoft.com/office/drawing/2014/main" val="20003"/>
                     </a:ext>
                   </a:extLst>
                 </a:gridCol>
@@ -16345,7 +16372,7 @@
                 </a:tc>
                 <a:extLst>
                   <a:ext uri="{0D108BD9-81ED-4DB2-BD59-A6C34878D82A}">
-                    <a16:rowId xmlns:a16="http://schemas.microsoft.com/office/drawing/2014/main" xmlns="" val="10000"/>
+                    <a16:rowId xmlns:a16="http://schemas.microsoft.com/office/drawing/2014/main" val="10000"/>
                   </a:ext>
                 </a:extLst>
               </a:tr>
@@ -16531,7 +16558,7 @@
                 </a:tc>
                 <a:extLst>
                   <a:ext uri="{0D108BD9-81ED-4DB2-BD59-A6C34878D82A}">
-                    <a16:rowId xmlns:a16="http://schemas.microsoft.com/office/drawing/2014/main" xmlns="" val="10001"/>
+                    <a16:rowId xmlns:a16="http://schemas.microsoft.com/office/drawing/2014/main" val="10001"/>
                   </a:ext>
                 </a:extLst>
               </a:tr>
@@ -16717,7 +16744,7 @@
                 </a:tc>
                 <a:extLst>
                   <a:ext uri="{0D108BD9-81ED-4DB2-BD59-A6C34878D82A}">
-                    <a16:rowId xmlns:a16="http://schemas.microsoft.com/office/drawing/2014/main" xmlns="" val="10002"/>
+                    <a16:rowId xmlns:a16="http://schemas.microsoft.com/office/drawing/2014/main" val="10002"/>
                   </a:ext>
                 </a:extLst>
               </a:tr>
@@ -16890,7 +16917,7 @@
                 </a:tc>
                 <a:extLst>
                   <a:ext uri="{0D108BD9-81ED-4DB2-BD59-A6C34878D82A}">
-                    <a16:rowId xmlns:a16="http://schemas.microsoft.com/office/drawing/2014/main" xmlns="" val="10003"/>
+                    <a16:rowId xmlns:a16="http://schemas.microsoft.com/office/drawing/2014/main" val="10003"/>
                   </a:ext>
                 </a:extLst>
               </a:tr>
@@ -17066,7 +17093,7 @@
                 </a:tc>
                 <a:extLst>
                   <a:ext uri="{0D108BD9-81ED-4DB2-BD59-A6C34878D82A}">
-                    <a16:rowId xmlns:a16="http://schemas.microsoft.com/office/drawing/2014/main" xmlns="" val="10004"/>
+                    <a16:rowId xmlns:a16="http://schemas.microsoft.com/office/drawing/2014/main" val="10004"/>
                   </a:ext>
                 </a:extLst>
               </a:tr>
@@ -17398,7 +17425,7 @@
                 </a:tc>
                 <a:extLst>
                   <a:ext uri="{0D108BD9-81ED-4DB2-BD59-A6C34878D82A}">
-                    <a16:rowId xmlns:a16="http://schemas.microsoft.com/office/drawing/2014/main" xmlns="" val="10005"/>
+                    <a16:rowId xmlns:a16="http://schemas.microsoft.com/office/drawing/2014/main" val="10005"/>
                   </a:ext>
                 </a:extLst>
               </a:tr>
@@ -17717,7 +17744,7 @@
                 </a:tc>
                 <a:extLst>
                   <a:ext uri="{0D108BD9-81ED-4DB2-BD59-A6C34878D82A}">
-                    <a16:rowId xmlns:a16="http://schemas.microsoft.com/office/drawing/2014/main" xmlns="" val="10006"/>
+                    <a16:rowId xmlns:a16="http://schemas.microsoft.com/office/drawing/2014/main" val="10006"/>
                   </a:ext>
                 </a:extLst>
               </a:tr>
@@ -22224,7 +22251,7 @@
           <a:graphicData uri="http://schemas.openxmlformats.org/presentationml/2006/ole">
             <mc:AlternateContent xmlns:mc="http://schemas.openxmlformats.org/markup-compatibility/2006">
               <mc:Choice xmlns:v="urn:schemas-microsoft-com:vml" Requires="v">
-                <p:oleObj spid="_x0000_s4141" name="포장기 셸 개체" showAsIcon="1" r:id="rId3" imgW="1154880" imgH="604800" progId="Package">
+                <p:oleObj spid="_x0000_s4144" name="포장기 셸 개체" showAsIcon="1" r:id="rId3" imgW="1154880" imgH="604800" progId="Package">
                   <p:embed/>
                 </p:oleObj>
               </mc:Choice>
@@ -22901,7 +22928,7 @@
           <a:graphicData uri="http://schemas.openxmlformats.org/presentationml/2006/ole">
             <mc:AlternateContent xmlns:mc="http://schemas.openxmlformats.org/markup-compatibility/2006">
               <mc:Choice xmlns:v="urn:schemas-microsoft-com:vml" Requires="v">
-                <p:oleObj spid="_x0000_s5165" name="포장기 셸 개체" showAsIcon="1" r:id="rId3" imgW="1154880" imgH="604800" progId="Package">
+                <p:oleObj spid="_x0000_s5168" name="포장기 셸 개체" showAsIcon="1" r:id="rId3" imgW="1154880" imgH="604800" progId="Package">
                   <p:embed/>
                 </p:oleObj>
               </mc:Choice>
@@ -29368,13 +29395,7 @@
               <a:rPr lang="ko-KR" altLang="en-US" sz="1400" dirty="0" smtClean="0">
                 <a:latin typeface="+mn-ea"/>
               </a:rPr>
-              <a:t>으로 선언하면 변경이 가능하지 </a:t>
-            </a:r>
-            <a:r>
-              <a:rPr lang="ko-KR" altLang="en-US" sz="1400" dirty="0" smtClean="0">
-                <a:latin typeface="+mn-ea"/>
-              </a:rPr>
-              <a:t>않음</a:t>
+              <a:t>으로 선언하면 변경이 가능하지 않음</a:t>
             </a:r>
             <a:endParaRPr lang="en-US" altLang="ko-KR" sz="1400" dirty="0">
               <a:latin typeface="+mn-ea"/>
@@ -31275,13 +31296,7 @@
               <a:rPr lang="en-US" altLang="ko-KR" sz="1400" dirty="0" smtClean="0">
                 <a:latin typeface="+mn-ea"/>
               </a:rPr>
-              <a:t>, </a:t>
-            </a:r>
-            <a:r>
-              <a:rPr lang="en-US" altLang="ko-KR" sz="1400" dirty="0" smtClean="0">
-                <a:latin typeface="+mn-ea"/>
-              </a:rPr>
-              <a:t>sorted()</a:t>
+              <a:t>, sorted()</a:t>
             </a:r>
             <a:r>
               <a:rPr lang="ko-KR" altLang="en-US" sz="1400" dirty="0" smtClean="0">
@@ -35341,13 +35356,7 @@
               <a:rPr lang="ko-KR" altLang="en-US" sz="1400" dirty="0" smtClean="0">
                 <a:latin typeface="+mn-ea"/>
               </a:rPr>
-              <a:t> 각 항목이 </a:t>
-            </a:r>
-            <a:r>
-              <a:rPr lang="ko-KR" altLang="en-US" sz="1400" dirty="0" smtClean="0">
-                <a:latin typeface="+mn-ea"/>
-              </a:rPr>
-              <a:t>연관</a:t>
+              <a:t> 각 항목이 연관</a:t>
             </a:r>
             <a:r>
               <a:rPr lang="en-US" altLang="ko-KR" sz="1400" dirty="0">
@@ -41117,6 +41126,1684 @@
 </p:sld>
 </file>
 
+<file path=ppt/slides/slide65.xml><?xml version="1.0" encoding="utf-8"?>
+<p:sld xmlns:a="http://schemas.openxmlformats.org/drawingml/2006/main" xmlns:r="http://schemas.openxmlformats.org/officeDocument/2006/relationships" xmlns:p="http://schemas.openxmlformats.org/presentationml/2006/main">
+  <p:cSld>
+    <p:spTree>
+      <p:nvGrpSpPr>
+        <p:cNvPr id="1" name=""/>
+        <p:cNvGrpSpPr/>
+        <p:nvPr/>
+      </p:nvGrpSpPr>
+      <p:grpSpPr>
+        <a:xfrm>
+          <a:off x="0" y="0"/>
+          <a:ext cx="0" cy="0"/>
+          <a:chOff x="0" y="0"/>
+          <a:chExt cx="0" cy="0"/>
+        </a:xfrm>
+      </p:grpSpPr>
+      <p:sp>
+        <p:nvSpPr>
+          <p:cNvPr id="2" name="TextBox 1"/>
+          <p:cNvSpPr txBox="1"/>
+          <p:nvPr/>
+        </p:nvSpPr>
+        <p:spPr>
+          <a:xfrm>
+            <a:off x="1964556" y="2937138"/>
+            <a:ext cx="5214889" cy="707886"/>
+          </a:xfrm>
+          <a:prstGeom prst="rect">
+            <a:avLst/>
+          </a:prstGeom>
+          <a:noFill/>
+        </p:spPr>
+        <p:txBody>
+          <a:bodyPr wrap="none" rtlCol="0">
+            <a:spAutoFit/>
+          </a:bodyPr>
+          <a:lstStyle/>
+          <a:p>
+            <a:r>
+              <a:rPr lang="en-US" altLang="ko-KR" sz="4000" dirty="0" smtClean="0">
+                <a:latin typeface="+mn-ea"/>
+              </a:rPr>
+              <a:t>11</a:t>
+            </a:r>
+            <a:r>
+              <a:rPr lang="ko-KR" altLang="en-US" sz="4000" dirty="0" smtClean="0">
+                <a:latin typeface="+mn-ea"/>
+              </a:rPr>
+              <a:t>장 구조체와 클래스</a:t>
+            </a:r>
+            <a:endParaRPr lang="ko-KR" altLang="en-US" sz="4000" dirty="0">
+              <a:latin typeface="+mn-ea"/>
+            </a:endParaRPr>
+          </a:p>
+        </p:txBody>
+      </p:sp>
+      <p:sp>
+        <p:nvSpPr>
+          <p:cNvPr id="3" name="TextBox 2"/>
+          <p:cNvSpPr txBox="1"/>
+          <p:nvPr/>
+        </p:nvSpPr>
+        <p:spPr>
+          <a:xfrm>
+            <a:off x="7092280" y="6525344"/>
+            <a:ext cx="2008820" cy="307777"/>
+          </a:xfrm>
+          <a:prstGeom prst="rect">
+            <a:avLst/>
+          </a:prstGeom>
+          <a:noFill/>
+        </p:spPr>
+        <p:txBody>
+          <a:bodyPr wrap="none" rtlCol="0">
+            <a:spAutoFit/>
+          </a:bodyPr>
+          <a:lstStyle/>
+          <a:p>
+            <a:r>
+              <a:rPr lang="en-US" altLang="ko-KR" sz="1400" dirty="0" smtClean="0">
+                <a:latin typeface="+mn-ea"/>
+              </a:rPr>
+              <a:t>New book: chapter 09</a:t>
+            </a:r>
+            <a:endParaRPr lang="ko-KR" altLang="en-US" sz="1400" dirty="0">
+              <a:latin typeface="+mn-ea"/>
+            </a:endParaRPr>
+          </a:p>
+        </p:txBody>
+      </p:sp>
+    </p:spTree>
+    <p:extLst>
+      <p:ext uri="{BB962C8B-B14F-4D97-AF65-F5344CB8AC3E}">
+        <p14:creationId xmlns:p14="http://schemas.microsoft.com/office/powerpoint/2010/main" val="1178902070"/>
+      </p:ext>
+    </p:extLst>
+  </p:cSld>
+  <p:clrMapOvr>
+    <a:masterClrMapping/>
+  </p:clrMapOvr>
+  <p:timing>
+    <p:tnLst>
+      <p:par>
+        <p:cTn id="1" dur="indefinite" restart="never" nodeType="tmRoot"/>
+      </p:par>
+    </p:tnLst>
+  </p:timing>
+</p:sld>
+</file>
+
+<file path=ppt/slides/slide66.xml><?xml version="1.0" encoding="utf-8"?>
+<p:sld xmlns:a="http://schemas.openxmlformats.org/drawingml/2006/main" xmlns:r="http://schemas.openxmlformats.org/officeDocument/2006/relationships" xmlns:p="http://schemas.openxmlformats.org/presentationml/2006/main">
+  <p:cSld>
+    <p:spTree>
+      <p:nvGrpSpPr>
+        <p:cNvPr id="1" name=""/>
+        <p:cNvGrpSpPr/>
+        <p:nvPr/>
+      </p:nvGrpSpPr>
+      <p:grpSpPr>
+        <a:xfrm>
+          <a:off x="0" y="0"/>
+          <a:ext cx="0" cy="0"/>
+          <a:chOff x="0" y="0"/>
+          <a:chExt cx="0" cy="0"/>
+        </a:xfrm>
+      </p:grpSpPr>
+      <p:sp>
+        <p:nvSpPr>
+          <p:cNvPr id="2" name="제목 1"/>
+          <p:cNvSpPr>
+            <a:spLocks noGrp="1"/>
+          </p:cNvSpPr>
+          <p:nvPr>
+            <p:ph type="title"/>
+          </p:nvPr>
+        </p:nvSpPr>
+        <p:spPr/>
+        <p:txBody>
+          <a:bodyPr/>
+          <a:lstStyle/>
+          <a:p>
+            <a:r>
+              <a:rPr lang="ko-KR" altLang="en-US" dirty="0" smtClean="0"/>
+              <a:t>구조체와 클래스</a:t>
+            </a:r>
+            <a:endParaRPr lang="ko-KR" altLang="en-US" dirty="0"/>
+          </a:p>
+        </p:txBody>
+      </p:sp>
+      <p:sp>
+        <p:nvSpPr>
+          <p:cNvPr id="3" name="내용 개체 틀 2"/>
+          <p:cNvSpPr>
+            <a:spLocks noGrp="1"/>
+          </p:cNvSpPr>
+          <p:nvPr>
+            <p:ph idx="1"/>
+          </p:nvPr>
+        </p:nvSpPr>
+        <p:spPr/>
+        <p:txBody>
+          <a:bodyPr/>
+          <a:lstStyle/>
+          <a:p>
+            <a:r>
+              <a:rPr lang="ko-KR" altLang="en-US" dirty="0" smtClean="0"/>
+              <a:t>구조체</a:t>
+            </a:r>
+            <a:endParaRPr lang="en-US" altLang="ko-KR" dirty="0" smtClean="0"/>
+          </a:p>
+          <a:p>
+            <a:pPr lvl="1"/>
+            <a:r>
+              <a:rPr lang="ko-KR" altLang="en-US" dirty="0" smtClean="0"/>
+              <a:t>구조체 정의</a:t>
+            </a:r>
+            <a:endParaRPr lang="en-US" altLang="ko-KR" dirty="0" smtClean="0"/>
+          </a:p>
+          <a:p>
+            <a:pPr lvl="2"/>
+            <a:r>
+              <a:rPr lang="en-US" altLang="ko-KR" dirty="0" err="1" smtClean="0"/>
+              <a:t>struct</a:t>
+            </a:r>
+            <a:r>
+              <a:rPr lang="en-US" altLang="ko-KR" dirty="0" smtClean="0"/>
+              <a:t> </a:t>
+            </a:r>
+            <a:r>
+              <a:rPr lang="ko-KR" altLang="en-US" dirty="0" smtClean="0"/>
+              <a:t>구조체 이름 </a:t>
+            </a:r>
+            <a:r>
+              <a:rPr lang="en-US" altLang="ko-KR" dirty="0" smtClean="0"/>
+              <a:t>{</a:t>
+            </a:r>
+            <a:br>
+              <a:rPr lang="en-US" altLang="ko-KR" dirty="0" smtClean="0"/>
+            </a:br>
+            <a:r>
+              <a:rPr lang="en-US" altLang="ko-KR" dirty="0" smtClean="0"/>
+              <a:t>   </a:t>
+            </a:r>
+            <a:r>
+              <a:rPr lang="ko-KR" altLang="en-US" dirty="0" err="1" smtClean="0"/>
+              <a:t>프로퍼티</a:t>
+            </a:r>
+            <a:r>
+              <a:rPr lang="en-US" altLang="ko-KR" dirty="0" smtClean="0"/>
+              <a:t/>
+            </a:r>
+            <a:br>
+              <a:rPr lang="en-US" altLang="ko-KR" dirty="0" smtClean="0"/>
+            </a:br>
+            <a:r>
+              <a:rPr lang="en-US" altLang="ko-KR" dirty="0" smtClean="0"/>
+              <a:t>   </a:t>
+            </a:r>
+            <a:r>
+              <a:rPr lang="ko-KR" altLang="en-US" dirty="0" err="1" smtClean="0"/>
+              <a:t>메소드</a:t>
+            </a:r>
+            <a:r>
+              <a:rPr lang="en-US" altLang="ko-KR" dirty="0" smtClean="0"/>
+              <a:t/>
+            </a:r>
+            <a:br>
+              <a:rPr lang="en-US" altLang="ko-KR" dirty="0" smtClean="0"/>
+            </a:br>
+            <a:r>
+              <a:rPr lang="en-US" altLang="ko-KR" dirty="0" smtClean="0"/>
+              <a:t>}</a:t>
+            </a:r>
+          </a:p>
+          <a:p>
+            <a:pPr lvl="2"/>
+            <a:r>
+              <a:rPr lang="ko-KR" altLang="en-US" dirty="0" smtClean="0"/>
+              <a:t>구조체 이름은 대문자 </a:t>
+            </a:r>
+            <a:r>
+              <a:rPr lang="en-US" altLang="ko-KR" dirty="0" err="1" smtClean="0"/>
+              <a:t>CamelCase</a:t>
+            </a:r>
+            <a:r>
+              <a:rPr lang="ko-KR" altLang="en-US" dirty="0" smtClean="0"/>
+              <a:t>로 명명</a:t>
+            </a:r>
+            <a:endParaRPr lang="en-US" altLang="ko-KR" dirty="0" smtClean="0"/>
+          </a:p>
+          <a:p>
+            <a:pPr lvl="2"/>
+            <a:r>
+              <a:rPr lang="ko-KR" altLang="en-US" dirty="0" err="1" smtClean="0"/>
+              <a:t>프로퍼티</a:t>
+            </a:r>
+            <a:r>
+              <a:rPr lang="en-US" altLang="ko-KR" dirty="0" smtClean="0"/>
+              <a:t> </a:t>
+            </a:r>
+            <a:r>
+              <a:rPr lang="ko-KR" altLang="en-US" dirty="0" smtClean="0"/>
+              <a:t>및 </a:t>
+            </a:r>
+            <a:r>
+              <a:rPr lang="ko-KR" altLang="en-US" dirty="0" err="1" smtClean="0"/>
+              <a:t>메소드는</a:t>
+            </a:r>
+            <a:r>
+              <a:rPr lang="ko-KR" altLang="en-US" dirty="0" smtClean="0"/>
+              <a:t> 소문자 </a:t>
+            </a:r>
+            <a:r>
+              <a:rPr lang="en-US" altLang="ko-KR" dirty="0" err="1" smtClean="0"/>
+              <a:t>camel</a:t>
+            </a:r>
+            <a:r>
+              <a:rPr lang="en-US" altLang="ko-KR" dirty="0" err="1"/>
+              <a:t>C</a:t>
+            </a:r>
+            <a:r>
+              <a:rPr lang="en-US" altLang="ko-KR" dirty="0" err="1" smtClean="0"/>
+              <a:t>ase</a:t>
+            </a:r>
+            <a:r>
+              <a:rPr lang="ko-KR" altLang="en-US" dirty="0" smtClean="0"/>
+              <a:t>로 명</a:t>
+            </a:r>
+            <a:endParaRPr lang="en-US" altLang="ko-KR" dirty="0" smtClean="0"/>
+          </a:p>
+          <a:p>
+            <a:pPr lvl="2"/>
+            <a:endParaRPr lang="en-US" altLang="ko-KR" dirty="0"/>
+          </a:p>
+          <a:p>
+            <a:pPr lvl="1"/>
+            <a:r>
+              <a:rPr lang="ko-KR" altLang="en-US" dirty="0" smtClean="0"/>
+              <a:t>생성 및 초기화</a:t>
+            </a:r>
+            <a:endParaRPr lang="en-US" altLang="ko-KR" dirty="0" smtClean="0"/>
+          </a:p>
+          <a:p>
+            <a:pPr lvl="2"/>
+            <a:r>
+              <a:rPr lang="ko-KR" altLang="en-US" dirty="0" err="1" smtClean="0"/>
+              <a:t>프로퍼티</a:t>
+            </a:r>
+            <a:r>
+              <a:rPr lang="ko-KR" altLang="en-US" dirty="0" smtClean="0"/>
+              <a:t> 이름으로 자동 생성된 </a:t>
+            </a:r>
+            <a:r>
+              <a:rPr lang="ko-KR" altLang="en-US" dirty="0" err="1" smtClean="0"/>
+              <a:t>이니셜라이저</a:t>
+            </a:r>
+            <a:endParaRPr lang="en-US" altLang="ko-KR" dirty="0" smtClean="0"/>
+          </a:p>
+          <a:p>
+            <a:pPr lvl="2"/>
+            <a:r>
+              <a:rPr lang="ko-KR" altLang="en-US" dirty="0" smtClean="0"/>
+              <a:t>구조체 이름</a:t>
+            </a:r>
+            <a:r>
+              <a:rPr lang="en-US" altLang="ko-KR" dirty="0" smtClean="0"/>
+              <a:t>(</a:t>
+            </a:r>
+            <a:r>
+              <a:rPr lang="ko-KR" altLang="en-US" dirty="0" err="1" smtClean="0"/>
+              <a:t>프로퍼티</a:t>
+            </a:r>
+            <a:r>
+              <a:rPr lang="en-US" altLang="ko-KR" dirty="0" smtClean="0"/>
+              <a:t>: “</a:t>
+            </a:r>
+            <a:r>
+              <a:rPr lang="ko-KR" altLang="en-US" dirty="0" smtClean="0"/>
+              <a:t>값</a:t>
+            </a:r>
+            <a:r>
+              <a:rPr lang="en-US" altLang="ko-KR" dirty="0" smtClean="0"/>
+              <a:t>”, </a:t>
+            </a:r>
+            <a:r>
+              <a:rPr lang="ko-KR" altLang="en-US" dirty="0" err="1" smtClean="0"/>
+              <a:t>프로퍼티</a:t>
+            </a:r>
+            <a:r>
+              <a:rPr lang="en-US" altLang="ko-KR" dirty="0" smtClean="0"/>
+              <a:t>: “</a:t>
+            </a:r>
+            <a:r>
+              <a:rPr lang="ko-KR" altLang="en-US" dirty="0" smtClean="0"/>
+              <a:t>값</a:t>
+            </a:r>
+            <a:r>
+              <a:rPr lang="en-US" altLang="ko-KR" dirty="0" smtClean="0"/>
+              <a:t>”……..)</a:t>
+            </a:r>
+          </a:p>
+          <a:p>
+            <a:pPr lvl="2"/>
+            <a:endParaRPr lang="en-US" altLang="ko-KR" dirty="0"/>
+          </a:p>
+          <a:p>
+            <a:pPr lvl="2"/>
+            <a:r>
+              <a:rPr lang="en-US" altLang="ko-KR" dirty="0" smtClean="0"/>
+              <a:t>ex)</a:t>
+            </a:r>
+            <a:br>
+              <a:rPr lang="en-US" altLang="ko-KR" dirty="0" smtClean="0"/>
+            </a:br>
+            <a:endParaRPr lang="en-US" altLang="ko-KR" dirty="0" smtClean="0"/>
+          </a:p>
+          <a:p>
+            <a:pPr lvl="2"/>
+            <a:endParaRPr lang="en-US" altLang="ko-KR" dirty="0" smtClean="0"/>
+          </a:p>
+          <a:p>
+            <a:pPr lvl="2"/>
+            <a:endParaRPr lang="en-US" altLang="ko-KR" dirty="0" smtClean="0"/>
+          </a:p>
+          <a:p>
+            <a:pPr lvl="1"/>
+            <a:endParaRPr lang="en-US" altLang="ko-KR" dirty="0" smtClean="0"/>
+          </a:p>
+        </p:txBody>
+      </p:sp>
+      <p:sp>
+        <p:nvSpPr>
+          <p:cNvPr id="4" name="TextBox 3"/>
+          <p:cNvSpPr txBox="1"/>
+          <p:nvPr/>
+        </p:nvSpPr>
+        <p:spPr>
+          <a:xfrm>
+            <a:off x="1619672" y="5013176"/>
+            <a:ext cx="7920880" cy="1754326"/>
+          </a:xfrm>
+          <a:prstGeom prst="rect">
+            <a:avLst/>
+          </a:prstGeom>
+          <a:noFill/>
+        </p:spPr>
+        <p:txBody>
+          <a:bodyPr wrap="square" rtlCol="0">
+            <a:spAutoFit/>
+          </a:bodyPr>
+          <a:lstStyle/>
+          <a:p>
+            <a:r>
+              <a:rPr lang="en-US" altLang="ko-KR" dirty="0" err="1" smtClean="0"/>
+              <a:t>struct</a:t>
+            </a:r>
+            <a:r>
+              <a:rPr lang="en-US" altLang="ko-KR" dirty="0" smtClean="0"/>
+              <a:t> </a:t>
+            </a:r>
+            <a:r>
+              <a:rPr lang="en-US" altLang="ko-KR" dirty="0" err="1" smtClean="0">
+                <a:solidFill>
+                  <a:schemeClr val="accent3"/>
+                </a:solidFill>
+              </a:rPr>
+              <a:t>BasicInformation</a:t>
+            </a:r>
+            <a:r>
+              <a:rPr lang="en-US" altLang="ko-KR" dirty="0" smtClean="0"/>
+              <a:t> {</a:t>
+            </a:r>
+            <a:br>
+              <a:rPr lang="en-US" altLang="ko-KR" dirty="0" smtClean="0"/>
+            </a:br>
+            <a:r>
+              <a:rPr lang="en-US" altLang="ko-KR" dirty="0" smtClean="0"/>
+              <a:t>	</a:t>
+            </a:r>
+            <a:r>
+              <a:rPr lang="en-US" altLang="ko-KR" dirty="0" err="1" smtClean="0"/>
+              <a:t>var</a:t>
+            </a:r>
+            <a:r>
+              <a:rPr lang="en-US" altLang="ko-KR" dirty="0" smtClean="0"/>
+              <a:t> </a:t>
+            </a:r>
+            <a:r>
+              <a:rPr lang="en-US" altLang="ko-KR" dirty="0" smtClean="0">
+                <a:solidFill>
+                  <a:schemeClr val="accent2"/>
+                </a:solidFill>
+              </a:rPr>
+              <a:t>name: String</a:t>
+            </a:r>
+            <a:r>
+              <a:rPr lang="en-US" altLang="ko-KR" dirty="0" smtClean="0"/>
+              <a:t>	</a:t>
+            </a:r>
+            <a:r>
+              <a:rPr lang="en-US" altLang="ko-KR" dirty="0" smtClean="0">
+                <a:solidFill>
+                  <a:schemeClr val="accent6"/>
+                </a:solidFill>
+              </a:rPr>
+              <a:t>// properties</a:t>
+            </a:r>
+            <a:r>
+              <a:rPr lang="en-US" altLang="ko-KR" dirty="0" smtClean="0"/>
+              <a:t/>
+            </a:r>
+            <a:br>
+              <a:rPr lang="en-US" altLang="ko-KR" dirty="0" smtClean="0"/>
+            </a:br>
+            <a:r>
+              <a:rPr lang="en-US" altLang="ko-KR" dirty="0" smtClean="0"/>
+              <a:t>	</a:t>
+            </a:r>
+            <a:r>
+              <a:rPr lang="en-US" altLang="ko-KR" dirty="0" err="1" smtClean="0"/>
+              <a:t>var</a:t>
+            </a:r>
+            <a:r>
+              <a:rPr lang="en-US" altLang="ko-KR" dirty="0" smtClean="0"/>
+              <a:t> </a:t>
+            </a:r>
+            <a:r>
+              <a:rPr lang="en-US" altLang="ko-KR" dirty="0" smtClean="0">
+                <a:solidFill>
+                  <a:schemeClr val="accent2"/>
+                </a:solidFill>
+              </a:rPr>
+              <a:t>age: </a:t>
+            </a:r>
+            <a:r>
+              <a:rPr lang="en-US" altLang="ko-KR" dirty="0" err="1" smtClean="0">
+                <a:solidFill>
+                  <a:schemeClr val="accent2"/>
+                </a:solidFill>
+              </a:rPr>
+              <a:t>Int</a:t>
+            </a:r>
+            <a:r>
+              <a:rPr lang="en-US" altLang="ko-KR" dirty="0" smtClean="0">
+                <a:solidFill>
+                  <a:schemeClr val="accent2"/>
+                </a:solidFill>
+              </a:rPr>
+              <a:t/>
+            </a:r>
+            <a:br>
+              <a:rPr lang="en-US" altLang="ko-KR" dirty="0" smtClean="0">
+                <a:solidFill>
+                  <a:schemeClr val="accent2"/>
+                </a:solidFill>
+              </a:rPr>
+            </a:br>
+            <a:r>
+              <a:rPr lang="en-US" altLang="ko-KR" dirty="0" smtClean="0"/>
+              <a:t>}</a:t>
+            </a:r>
+          </a:p>
+          <a:p>
+            <a:endParaRPr lang="en-US" altLang="ko-KR" dirty="0"/>
+          </a:p>
+          <a:p>
+            <a:r>
+              <a:rPr lang="en-US" altLang="ko-KR" dirty="0" err="1" smtClean="0"/>
+              <a:t>var</a:t>
+            </a:r>
+            <a:r>
+              <a:rPr lang="en-US" altLang="ko-KR" dirty="0" smtClean="0"/>
+              <a:t> </a:t>
+            </a:r>
+            <a:r>
+              <a:rPr lang="en-US" altLang="ko-KR" dirty="0" err="1" smtClean="0"/>
+              <a:t>myInfo</a:t>
+            </a:r>
+            <a:r>
+              <a:rPr lang="en-US" altLang="ko-KR" dirty="0" smtClean="0"/>
+              <a:t>: </a:t>
+            </a:r>
+            <a:r>
+              <a:rPr lang="en-US" altLang="ko-KR" dirty="0" err="1" smtClean="0"/>
+              <a:t>BasicInformation</a:t>
+            </a:r>
+            <a:r>
+              <a:rPr lang="en-US" altLang="ko-KR" dirty="0" smtClean="0"/>
+              <a:t> = </a:t>
+            </a:r>
+            <a:r>
+              <a:rPr lang="en-US" altLang="ko-KR" dirty="0" err="1" smtClean="0">
+                <a:solidFill>
+                  <a:schemeClr val="accent3"/>
+                </a:solidFill>
+              </a:rPr>
+              <a:t>BasicInformation</a:t>
+            </a:r>
+            <a:r>
+              <a:rPr lang="en-US" altLang="ko-KR" dirty="0" smtClean="0">
+                <a:solidFill>
+                  <a:schemeClr val="accent2"/>
+                </a:solidFill>
+              </a:rPr>
+              <a:t>(name: “Kyoungho”, age: 30)</a:t>
+            </a:r>
+            <a:endParaRPr lang="ko-KR" altLang="en-US" dirty="0">
+              <a:solidFill>
+                <a:schemeClr val="accent2"/>
+              </a:solidFill>
+            </a:endParaRPr>
+          </a:p>
+        </p:txBody>
+      </p:sp>
+    </p:spTree>
+    <p:extLst>
+      <p:ext uri="{BB962C8B-B14F-4D97-AF65-F5344CB8AC3E}">
+        <p14:creationId xmlns:p14="http://schemas.microsoft.com/office/powerpoint/2010/main" val="4022816183"/>
+      </p:ext>
+    </p:extLst>
+  </p:cSld>
+  <p:clrMapOvr>
+    <a:masterClrMapping/>
+  </p:clrMapOvr>
+</p:sld>
+</file>
+
+<file path=ppt/slides/slide67.xml><?xml version="1.0" encoding="utf-8"?>
+<p:sld xmlns:a="http://schemas.openxmlformats.org/drawingml/2006/main" xmlns:r="http://schemas.openxmlformats.org/officeDocument/2006/relationships" xmlns:p="http://schemas.openxmlformats.org/presentationml/2006/main">
+  <p:cSld>
+    <p:spTree>
+      <p:nvGrpSpPr>
+        <p:cNvPr id="1" name=""/>
+        <p:cNvGrpSpPr/>
+        <p:nvPr/>
+      </p:nvGrpSpPr>
+      <p:grpSpPr>
+        <a:xfrm>
+          <a:off x="0" y="0"/>
+          <a:ext cx="0" cy="0"/>
+          <a:chOff x="0" y="0"/>
+          <a:chExt cx="0" cy="0"/>
+        </a:xfrm>
+      </p:grpSpPr>
+      <p:sp>
+        <p:nvSpPr>
+          <p:cNvPr id="2" name="제목 1"/>
+          <p:cNvSpPr>
+            <a:spLocks noGrp="1"/>
+          </p:cNvSpPr>
+          <p:nvPr>
+            <p:ph type="title"/>
+          </p:nvPr>
+        </p:nvSpPr>
+        <p:spPr/>
+        <p:txBody>
+          <a:bodyPr/>
+          <a:lstStyle/>
+          <a:p>
+            <a:r>
+              <a:rPr lang="ko-KR" altLang="en-US" dirty="0" smtClean="0"/>
+              <a:t>구조체와 클래스</a:t>
+            </a:r>
+            <a:endParaRPr lang="ko-KR" altLang="en-US" dirty="0"/>
+          </a:p>
+        </p:txBody>
+      </p:sp>
+      <p:sp>
+        <p:nvSpPr>
+          <p:cNvPr id="3" name="내용 개체 틀 2"/>
+          <p:cNvSpPr>
+            <a:spLocks noGrp="1"/>
+          </p:cNvSpPr>
+          <p:nvPr>
+            <p:ph idx="1"/>
+          </p:nvPr>
+        </p:nvSpPr>
+        <p:spPr/>
+        <p:txBody>
+          <a:bodyPr>
+            <a:normAutofit/>
+          </a:bodyPr>
+          <a:lstStyle/>
+          <a:p>
+            <a:r>
+              <a:rPr lang="ko-KR" altLang="en-US" dirty="0" smtClean="0"/>
+              <a:t>구조체</a:t>
+            </a:r>
+            <a:endParaRPr lang="en-US" altLang="ko-KR" dirty="0" smtClean="0"/>
+          </a:p>
+          <a:p>
+            <a:pPr lvl="1"/>
+            <a:r>
+              <a:rPr lang="ko-KR" altLang="en-US" dirty="0" err="1" smtClean="0"/>
+              <a:t>프로퍼티</a:t>
+            </a:r>
+            <a:r>
+              <a:rPr lang="ko-KR" altLang="en-US" dirty="0" smtClean="0"/>
+              <a:t> 접근</a:t>
+            </a:r>
+            <a:endParaRPr lang="en-US" altLang="ko-KR" dirty="0" smtClean="0"/>
+          </a:p>
+          <a:p>
+            <a:pPr lvl="2"/>
+            <a:r>
+              <a:rPr lang="ko-KR" altLang="en-US" dirty="0" smtClean="0"/>
+              <a:t>구조체 인스턴스</a:t>
+            </a:r>
+            <a:r>
+              <a:rPr lang="en-US" altLang="ko-KR" sz="1800" b="1" u="sng" dirty="0" smtClean="0">
+                <a:solidFill>
+                  <a:schemeClr val="accent2"/>
+                </a:solidFill>
+              </a:rPr>
+              <a:t>.</a:t>
+            </a:r>
+            <a:r>
+              <a:rPr lang="ko-KR" altLang="en-US" dirty="0" err="1" smtClean="0"/>
+              <a:t>프로퍼티</a:t>
+            </a:r>
+            <a:endParaRPr lang="en-US" altLang="ko-KR" dirty="0" smtClean="0"/>
+          </a:p>
+          <a:p>
+            <a:pPr lvl="2"/>
+            <a:endParaRPr lang="en-US" altLang="ko-KR" dirty="0"/>
+          </a:p>
+          <a:p>
+            <a:pPr lvl="2"/>
+            <a:endParaRPr lang="en-US" altLang="ko-KR" dirty="0" smtClean="0"/>
+          </a:p>
+          <a:p>
+            <a:pPr lvl="2"/>
+            <a:r>
+              <a:rPr lang="ko-KR" altLang="en-US" dirty="0" smtClean="0">
+                <a:solidFill>
+                  <a:schemeClr val="accent6"/>
+                </a:solidFill>
+              </a:rPr>
+              <a:t>구조체 인스턴스가 </a:t>
+            </a:r>
+            <a:r>
+              <a:rPr lang="en-US" altLang="ko-KR" dirty="0" smtClean="0">
+                <a:solidFill>
+                  <a:schemeClr val="accent6"/>
+                </a:solidFill>
+              </a:rPr>
+              <a:t>let </a:t>
+            </a:r>
+            <a:r>
+              <a:rPr lang="ko-KR" altLang="en-US" dirty="0" smtClean="0">
+                <a:solidFill>
+                  <a:schemeClr val="accent6"/>
+                </a:solidFill>
+              </a:rPr>
+              <a:t>으로 선언되었다면 </a:t>
+            </a:r>
+            <a:r>
+              <a:rPr lang="ko-KR" altLang="en-US" dirty="0" err="1" smtClean="0">
+                <a:solidFill>
+                  <a:schemeClr val="accent6"/>
+                </a:solidFill>
+              </a:rPr>
+              <a:t>프로퍼티</a:t>
+            </a:r>
+            <a:r>
+              <a:rPr lang="ko-KR" altLang="en-US" dirty="0" smtClean="0">
+                <a:solidFill>
+                  <a:schemeClr val="accent6"/>
+                </a:solidFill>
+              </a:rPr>
+              <a:t> 변경 불가</a:t>
+            </a:r>
+            <a:endParaRPr lang="en-US" altLang="ko-KR" dirty="0" smtClean="0">
+              <a:solidFill>
+                <a:schemeClr val="accent6"/>
+              </a:solidFill>
+            </a:endParaRPr>
+          </a:p>
+          <a:p>
+            <a:pPr marL="768096" lvl="2" indent="0">
+              <a:buNone/>
+            </a:pPr>
+            <a:endParaRPr lang="en-US" altLang="ko-KR" dirty="0" smtClean="0"/>
+          </a:p>
+          <a:p>
+            <a:pPr lvl="2"/>
+            <a:endParaRPr lang="en-US" altLang="ko-KR" dirty="0" smtClean="0"/>
+          </a:p>
+          <a:p>
+            <a:pPr lvl="1"/>
+            <a:endParaRPr lang="en-US" altLang="ko-KR" dirty="0" smtClean="0"/>
+          </a:p>
+        </p:txBody>
+      </p:sp>
+      <p:sp>
+        <p:nvSpPr>
+          <p:cNvPr id="4" name="TextBox 3"/>
+          <p:cNvSpPr txBox="1"/>
+          <p:nvPr/>
+        </p:nvSpPr>
+        <p:spPr>
+          <a:xfrm>
+            <a:off x="1979712" y="1772816"/>
+            <a:ext cx="5472608" cy="923330"/>
+          </a:xfrm>
+          <a:prstGeom prst="rect">
+            <a:avLst/>
+          </a:prstGeom>
+          <a:noFill/>
+        </p:spPr>
+        <p:txBody>
+          <a:bodyPr wrap="square" rtlCol="0">
+            <a:spAutoFit/>
+          </a:bodyPr>
+          <a:lstStyle/>
+          <a:p>
+            <a:r>
+              <a:rPr lang="en-US" altLang="ko-KR" dirty="0" err="1" smtClean="0"/>
+              <a:t>myInfo</a:t>
+            </a:r>
+            <a:r>
+              <a:rPr lang="en-US" altLang="ko-KR" dirty="0" err="1" smtClean="0">
+                <a:solidFill>
+                  <a:schemeClr val="accent3"/>
+                </a:solidFill>
+              </a:rPr>
+              <a:t>.age</a:t>
+            </a:r>
+            <a:r>
+              <a:rPr lang="en-US" altLang="ko-KR" dirty="0" smtClean="0">
+                <a:solidFill>
+                  <a:schemeClr val="accent3"/>
+                </a:solidFill>
+              </a:rPr>
+              <a:t> </a:t>
+            </a:r>
+            <a:r>
+              <a:rPr lang="en-US" altLang="ko-KR" dirty="0" smtClean="0"/>
+              <a:t>= 27</a:t>
+            </a:r>
+          </a:p>
+          <a:p>
+            <a:r>
+              <a:rPr lang="en-US" altLang="ko-KR" dirty="0" smtClean="0"/>
+              <a:t>myInfo</a:t>
+            </a:r>
+            <a:r>
+              <a:rPr lang="en-US" altLang="ko-KR" dirty="0" smtClean="0">
+                <a:solidFill>
+                  <a:schemeClr val="accent3"/>
+                </a:solidFill>
+              </a:rPr>
+              <a:t>.name </a:t>
+            </a:r>
+            <a:r>
+              <a:rPr lang="en-US" altLang="ko-KR" dirty="0" smtClean="0"/>
+              <a:t>= “Bob”</a:t>
+            </a:r>
+          </a:p>
+          <a:p>
+            <a:endParaRPr lang="ko-KR" altLang="en-US" dirty="0">
+              <a:solidFill>
+                <a:schemeClr val="accent2"/>
+              </a:solidFill>
+            </a:endParaRPr>
+          </a:p>
+        </p:txBody>
+      </p:sp>
+      <p:pic>
+        <p:nvPicPr>
+          <p:cNvPr id="5" name="그림 4"/>
+          <p:cNvPicPr>
+            <a:picLocks noChangeAspect="1"/>
+          </p:cNvPicPr>
+          <p:nvPr/>
+        </p:nvPicPr>
+        <p:blipFill>
+          <a:blip r:embed="rId2"/>
+          <a:stretch>
+            <a:fillRect/>
+          </a:stretch>
+        </p:blipFill>
+        <p:spPr>
+          <a:xfrm>
+            <a:off x="428625" y="3486150"/>
+            <a:ext cx="8715375" cy="3371850"/>
+          </a:xfrm>
+          <a:prstGeom prst="rect">
+            <a:avLst/>
+          </a:prstGeom>
+        </p:spPr>
+      </p:pic>
+    </p:spTree>
+    <p:extLst>
+      <p:ext uri="{BB962C8B-B14F-4D97-AF65-F5344CB8AC3E}">
+        <p14:creationId xmlns:p14="http://schemas.microsoft.com/office/powerpoint/2010/main" val="722806307"/>
+      </p:ext>
+    </p:extLst>
+  </p:cSld>
+  <p:clrMapOvr>
+    <a:masterClrMapping/>
+  </p:clrMapOvr>
+</p:sld>
+</file>
+
+<file path=ppt/slides/slide68.xml><?xml version="1.0" encoding="utf-8"?>
+<p:sld xmlns:a="http://schemas.openxmlformats.org/drawingml/2006/main" xmlns:r="http://schemas.openxmlformats.org/officeDocument/2006/relationships" xmlns:p="http://schemas.openxmlformats.org/presentationml/2006/main">
+  <p:cSld>
+    <p:spTree>
+      <p:nvGrpSpPr>
+        <p:cNvPr id="1" name=""/>
+        <p:cNvGrpSpPr/>
+        <p:nvPr/>
+      </p:nvGrpSpPr>
+      <p:grpSpPr>
+        <a:xfrm>
+          <a:off x="0" y="0"/>
+          <a:ext cx="0" cy="0"/>
+          <a:chOff x="0" y="0"/>
+          <a:chExt cx="0" cy="0"/>
+        </a:xfrm>
+      </p:grpSpPr>
+      <p:sp>
+        <p:nvSpPr>
+          <p:cNvPr id="2" name="제목 1"/>
+          <p:cNvSpPr>
+            <a:spLocks noGrp="1"/>
+          </p:cNvSpPr>
+          <p:nvPr>
+            <p:ph type="title"/>
+          </p:nvPr>
+        </p:nvSpPr>
+        <p:spPr/>
+        <p:txBody>
+          <a:bodyPr/>
+          <a:lstStyle/>
+          <a:p>
+            <a:r>
+              <a:rPr lang="ko-KR" altLang="en-US" dirty="0" smtClean="0"/>
+              <a:t>구조체와 클래스</a:t>
+            </a:r>
+            <a:endParaRPr lang="ko-KR" altLang="en-US" dirty="0"/>
+          </a:p>
+        </p:txBody>
+      </p:sp>
+      <p:sp>
+        <p:nvSpPr>
+          <p:cNvPr id="3" name="내용 개체 틀 2"/>
+          <p:cNvSpPr>
+            <a:spLocks noGrp="1"/>
+          </p:cNvSpPr>
+          <p:nvPr>
+            <p:ph idx="1"/>
+          </p:nvPr>
+        </p:nvSpPr>
+        <p:spPr/>
+        <p:txBody>
+          <a:bodyPr/>
+          <a:lstStyle/>
+          <a:p>
+            <a:r>
+              <a:rPr lang="ko-KR" altLang="en-US" dirty="0" smtClean="0"/>
+              <a:t>클래스 </a:t>
+            </a:r>
+            <a:r>
+              <a:rPr lang="en-US" altLang="ko-KR" sz="1600" dirty="0" smtClean="0">
+                <a:solidFill>
+                  <a:schemeClr val="accent6"/>
+                </a:solidFill>
+              </a:rPr>
+              <a:t>(</a:t>
+            </a:r>
+            <a:r>
+              <a:rPr lang="ko-KR" altLang="en-US" sz="1600" dirty="0" smtClean="0">
+                <a:solidFill>
+                  <a:schemeClr val="accent6"/>
+                </a:solidFill>
+              </a:rPr>
+              <a:t>구조체와는 다르게 참조 타입</a:t>
+            </a:r>
+            <a:r>
+              <a:rPr lang="en-US" altLang="ko-KR" sz="1600" dirty="0" smtClean="0">
+                <a:solidFill>
+                  <a:schemeClr val="accent6"/>
+                </a:solidFill>
+              </a:rPr>
+              <a:t>)</a:t>
+            </a:r>
+            <a:endParaRPr lang="en-US" altLang="ko-KR" dirty="0" smtClean="0">
+              <a:solidFill>
+                <a:schemeClr val="accent6"/>
+              </a:solidFill>
+            </a:endParaRPr>
+          </a:p>
+          <a:p>
+            <a:pPr lvl="1"/>
+            <a:r>
+              <a:rPr lang="ko-KR" altLang="en-US" dirty="0" smtClean="0"/>
+              <a:t>클래스 정의</a:t>
+            </a:r>
+            <a:endParaRPr lang="en-US" altLang="ko-KR" dirty="0" smtClean="0"/>
+          </a:p>
+          <a:p>
+            <a:pPr lvl="2"/>
+            <a:r>
+              <a:rPr lang="en-US" altLang="ko-KR" dirty="0" smtClean="0"/>
+              <a:t>class </a:t>
+            </a:r>
+            <a:r>
+              <a:rPr lang="ko-KR" altLang="en-US" dirty="0" smtClean="0"/>
+              <a:t>클래스 이름</a:t>
+            </a:r>
+            <a:r>
+              <a:rPr lang="en-US" altLang="ko-KR" dirty="0" smtClean="0"/>
+              <a:t>: </a:t>
+            </a:r>
+            <a:r>
+              <a:rPr lang="ko-KR" altLang="en-US" dirty="0" smtClean="0"/>
+              <a:t>부모 클래스 이름 </a:t>
+            </a:r>
+            <a:r>
+              <a:rPr lang="en-US" altLang="ko-KR" dirty="0" smtClean="0"/>
+              <a:t>{  </a:t>
+            </a:r>
+            <a:r>
+              <a:rPr lang="en-US" altLang="ko-KR" dirty="0" smtClean="0">
+                <a:solidFill>
+                  <a:schemeClr val="accent6"/>
+                </a:solidFill>
+              </a:rPr>
+              <a:t>// </a:t>
+            </a:r>
+            <a:r>
+              <a:rPr lang="ko-KR" altLang="en-US" dirty="0" smtClean="0">
+                <a:solidFill>
+                  <a:schemeClr val="accent6"/>
+                </a:solidFill>
+              </a:rPr>
+              <a:t>상속 받을 경우</a:t>
+            </a:r>
+            <a:r>
+              <a:rPr lang="en-US" altLang="ko-KR" dirty="0" smtClean="0"/>
+              <a:t/>
+            </a:r>
+            <a:br>
+              <a:rPr lang="en-US" altLang="ko-KR" dirty="0" smtClean="0"/>
+            </a:br>
+            <a:r>
+              <a:rPr lang="en-US" altLang="ko-KR" dirty="0" smtClean="0"/>
+              <a:t>   </a:t>
+            </a:r>
+            <a:r>
+              <a:rPr lang="ko-KR" altLang="en-US" dirty="0" err="1" smtClean="0"/>
+              <a:t>프로퍼티</a:t>
+            </a:r>
+            <a:r>
+              <a:rPr lang="ko-KR" altLang="en-US" dirty="0" smtClean="0"/>
+              <a:t> </a:t>
+            </a:r>
+            <a:r>
+              <a:rPr lang="en-US" altLang="ko-KR" dirty="0" smtClean="0"/>
+              <a:t>= </a:t>
+            </a:r>
+            <a:r>
+              <a:rPr lang="ko-KR" altLang="en-US" dirty="0" smtClean="0"/>
+              <a:t>기본값</a:t>
+            </a:r>
+            <a:r>
+              <a:rPr lang="en-US" altLang="ko-KR" dirty="0" smtClean="0"/>
+              <a:t/>
+            </a:r>
+            <a:br>
+              <a:rPr lang="en-US" altLang="ko-KR" dirty="0" smtClean="0"/>
+            </a:br>
+            <a:r>
+              <a:rPr lang="en-US" altLang="ko-KR" dirty="0" smtClean="0"/>
+              <a:t>   </a:t>
+            </a:r>
+            <a:r>
+              <a:rPr lang="ko-KR" altLang="en-US" dirty="0" err="1" smtClean="0"/>
+              <a:t>메소드</a:t>
+            </a:r>
+            <a:r>
+              <a:rPr lang="en-US" altLang="ko-KR" dirty="0" smtClean="0"/>
+              <a:t/>
+            </a:r>
+            <a:br>
+              <a:rPr lang="en-US" altLang="ko-KR" dirty="0" smtClean="0"/>
+            </a:br>
+            <a:r>
+              <a:rPr lang="en-US" altLang="ko-KR" dirty="0" smtClean="0"/>
+              <a:t>}</a:t>
+            </a:r>
+          </a:p>
+          <a:p>
+            <a:pPr lvl="2"/>
+            <a:r>
+              <a:rPr lang="ko-KR" altLang="en-US" dirty="0" smtClean="0"/>
+              <a:t>클래스 이름은 대문자 </a:t>
+            </a:r>
+            <a:r>
+              <a:rPr lang="en-US" altLang="ko-KR" dirty="0" err="1" smtClean="0"/>
+              <a:t>CamelCase</a:t>
+            </a:r>
+            <a:r>
+              <a:rPr lang="ko-KR" altLang="en-US" dirty="0" smtClean="0"/>
+              <a:t>로 명명</a:t>
+            </a:r>
+            <a:endParaRPr lang="en-US" altLang="ko-KR" dirty="0" smtClean="0"/>
+          </a:p>
+          <a:p>
+            <a:pPr lvl="2"/>
+            <a:r>
+              <a:rPr lang="ko-KR" altLang="en-US" dirty="0" err="1" smtClean="0"/>
+              <a:t>프로퍼티</a:t>
+            </a:r>
+            <a:r>
+              <a:rPr lang="en-US" altLang="ko-KR" dirty="0" smtClean="0"/>
+              <a:t> </a:t>
+            </a:r>
+            <a:r>
+              <a:rPr lang="ko-KR" altLang="en-US" dirty="0" smtClean="0"/>
+              <a:t>및 </a:t>
+            </a:r>
+            <a:r>
+              <a:rPr lang="ko-KR" altLang="en-US" dirty="0" err="1" smtClean="0"/>
+              <a:t>메소드는</a:t>
+            </a:r>
+            <a:r>
+              <a:rPr lang="ko-KR" altLang="en-US" dirty="0" smtClean="0"/>
+              <a:t> 소문자 </a:t>
+            </a:r>
+            <a:r>
+              <a:rPr lang="en-US" altLang="ko-KR" dirty="0" err="1" smtClean="0"/>
+              <a:t>camel</a:t>
+            </a:r>
+            <a:r>
+              <a:rPr lang="en-US" altLang="ko-KR" dirty="0" err="1"/>
+              <a:t>C</a:t>
+            </a:r>
+            <a:r>
+              <a:rPr lang="en-US" altLang="ko-KR" dirty="0" err="1" smtClean="0"/>
+              <a:t>ase</a:t>
+            </a:r>
+            <a:r>
+              <a:rPr lang="ko-KR" altLang="en-US" dirty="0" smtClean="0"/>
+              <a:t>로 명</a:t>
+            </a:r>
+            <a:endParaRPr lang="en-US" altLang="ko-KR" dirty="0" smtClean="0"/>
+          </a:p>
+          <a:p>
+            <a:pPr lvl="2"/>
+            <a:endParaRPr lang="en-US" altLang="ko-KR" dirty="0"/>
+          </a:p>
+          <a:p>
+            <a:pPr lvl="1"/>
+            <a:r>
+              <a:rPr lang="ko-KR" altLang="en-US" dirty="0" smtClean="0"/>
+              <a:t>생성 및 초기화</a:t>
+            </a:r>
+            <a:endParaRPr lang="en-US" altLang="ko-KR" dirty="0" smtClean="0"/>
+          </a:p>
+          <a:p>
+            <a:pPr lvl="2"/>
+            <a:r>
+              <a:rPr lang="ko-KR" altLang="en-US" dirty="0" smtClean="0"/>
+              <a:t>자동 생성된 </a:t>
+            </a:r>
+            <a:r>
+              <a:rPr lang="ko-KR" altLang="en-US" dirty="0" err="1" smtClean="0"/>
+              <a:t>이니셜라이저</a:t>
+            </a:r>
+            <a:r>
+              <a:rPr lang="ko-KR" altLang="en-US" dirty="0" smtClean="0"/>
+              <a:t> 이용하여 생성 </a:t>
+            </a:r>
+            <a:r>
+              <a:rPr lang="en-US" altLang="ko-KR" dirty="0" smtClean="0"/>
+              <a:t>: </a:t>
+            </a:r>
+            <a:r>
+              <a:rPr lang="ko-KR" altLang="en-US" dirty="0" smtClean="0"/>
+              <a:t>클래스 이름</a:t>
+            </a:r>
+            <a:r>
+              <a:rPr lang="en-US" altLang="ko-KR" dirty="0" smtClean="0"/>
+              <a:t>()</a:t>
+            </a:r>
+          </a:p>
+          <a:p>
+            <a:pPr lvl="2"/>
+            <a:r>
+              <a:rPr lang="ko-KR" altLang="en-US" dirty="0" smtClean="0"/>
+              <a:t>마침표</a:t>
+            </a:r>
+            <a:r>
+              <a:rPr lang="en-US" altLang="ko-KR" dirty="0" smtClean="0"/>
+              <a:t>(.) </a:t>
+            </a:r>
+            <a:r>
+              <a:rPr lang="ko-KR" altLang="en-US" dirty="0" smtClean="0"/>
+              <a:t>사용하여 </a:t>
+            </a:r>
+            <a:r>
+              <a:rPr lang="ko-KR" altLang="en-US" dirty="0" err="1" smtClean="0"/>
+              <a:t>프로퍼티에</a:t>
+            </a:r>
+            <a:r>
+              <a:rPr lang="ko-KR" altLang="en-US" dirty="0" smtClean="0"/>
+              <a:t> 접근</a:t>
+            </a:r>
+            <a:endParaRPr lang="en-US" altLang="ko-KR" dirty="0" smtClean="0"/>
+          </a:p>
+          <a:p>
+            <a:pPr lvl="2"/>
+            <a:r>
+              <a:rPr lang="en-US" altLang="ko-KR" dirty="0" smtClean="0"/>
+              <a:t>ex)</a:t>
+            </a:r>
+            <a:br>
+              <a:rPr lang="en-US" altLang="ko-KR" dirty="0" smtClean="0"/>
+            </a:br>
+            <a:endParaRPr lang="en-US" altLang="ko-KR" dirty="0" smtClean="0"/>
+          </a:p>
+          <a:p>
+            <a:pPr lvl="2"/>
+            <a:endParaRPr lang="en-US" altLang="ko-KR" dirty="0" smtClean="0"/>
+          </a:p>
+          <a:p>
+            <a:pPr lvl="2"/>
+            <a:endParaRPr lang="en-US" altLang="ko-KR" dirty="0" smtClean="0"/>
+          </a:p>
+          <a:p>
+            <a:pPr lvl="1"/>
+            <a:endParaRPr lang="en-US" altLang="ko-KR" dirty="0" smtClean="0"/>
+          </a:p>
+        </p:txBody>
+      </p:sp>
+      <p:sp>
+        <p:nvSpPr>
+          <p:cNvPr id="4" name="TextBox 3"/>
+          <p:cNvSpPr txBox="1"/>
+          <p:nvPr/>
+        </p:nvSpPr>
+        <p:spPr>
+          <a:xfrm>
+            <a:off x="1619672" y="4581128"/>
+            <a:ext cx="7920880" cy="2031325"/>
+          </a:xfrm>
+          <a:prstGeom prst="rect">
+            <a:avLst/>
+          </a:prstGeom>
+          <a:noFill/>
+        </p:spPr>
+        <p:txBody>
+          <a:bodyPr wrap="square" rtlCol="0">
+            <a:spAutoFit/>
+          </a:bodyPr>
+          <a:lstStyle/>
+          <a:p>
+            <a:r>
+              <a:rPr lang="en-US" altLang="ko-KR" dirty="0" smtClean="0"/>
+              <a:t>class </a:t>
+            </a:r>
+            <a:r>
+              <a:rPr lang="en-US" altLang="ko-KR" dirty="0" smtClean="0">
+                <a:solidFill>
+                  <a:schemeClr val="accent3"/>
+                </a:solidFill>
+              </a:rPr>
+              <a:t>Person</a:t>
+            </a:r>
+            <a:r>
+              <a:rPr lang="en-US" altLang="ko-KR" dirty="0" smtClean="0"/>
+              <a:t> {</a:t>
+            </a:r>
+            <a:br>
+              <a:rPr lang="en-US" altLang="ko-KR" dirty="0" smtClean="0"/>
+            </a:br>
+            <a:r>
+              <a:rPr lang="en-US" altLang="ko-KR" dirty="0" smtClean="0"/>
+              <a:t>	</a:t>
+            </a:r>
+            <a:r>
+              <a:rPr lang="en-US" altLang="ko-KR" dirty="0" err="1" smtClean="0"/>
+              <a:t>var</a:t>
+            </a:r>
+            <a:r>
+              <a:rPr lang="en-US" altLang="ko-KR" dirty="0" smtClean="0"/>
+              <a:t> </a:t>
+            </a:r>
+            <a:r>
+              <a:rPr lang="en-US" altLang="ko-KR" dirty="0" smtClean="0">
+                <a:solidFill>
+                  <a:schemeClr val="accent2"/>
+                </a:solidFill>
+              </a:rPr>
+              <a:t>height: Float = 0.0</a:t>
+            </a:r>
+            <a:r>
+              <a:rPr lang="en-US" altLang="ko-KR" dirty="0" smtClean="0"/>
+              <a:t>	</a:t>
+            </a:r>
+            <a:r>
+              <a:rPr lang="en-US" altLang="ko-KR" dirty="0" smtClean="0">
+                <a:solidFill>
+                  <a:schemeClr val="accent6"/>
+                </a:solidFill>
+              </a:rPr>
+              <a:t>// </a:t>
+            </a:r>
+            <a:r>
+              <a:rPr lang="ko-KR" altLang="en-US" dirty="0" err="1" smtClean="0">
+                <a:solidFill>
+                  <a:schemeClr val="accent6"/>
+                </a:solidFill>
+              </a:rPr>
+              <a:t>프로퍼티의</a:t>
+            </a:r>
+            <a:r>
+              <a:rPr lang="ko-KR" altLang="en-US" dirty="0" smtClean="0">
+                <a:solidFill>
+                  <a:schemeClr val="accent6"/>
+                </a:solidFill>
+              </a:rPr>
+              <a:t> 기본값 지정 가능</a:t>
+            </a:r>
+            <a:r>
+              <a:rPr lang="en-US" altLang="ko-KR" dirty="0" smtClean="0"/>
+              <a:t/>
+            </a:r>
+            <a:br>
+              <a:rPr lang="en-US" altLang="ko-KR" dirty="0" smtClean="0"/>
+            </a:br>
+            <a:r>
+              <a:rPr lang="en-US" altLang="ko-KR" dirty="0" smtClean="0"/>
+              <a:t>	</a:t>
+            </a:r>
+            <a:r>
+              <a:rPr lang="en-US" altLang="ko-KR" dirty="0" err="1" smtClean="0"/>
+              <a:t>var</a:t>
+            </a:r>
+            <a:r>
+              <a:rPr lang="en-US" altLang="ko-KR" dirty="0" smtClean="0"/>
+              <a:t> </a:t>
+            </a:r>
+            <a:r>
+              <a:rPr lang="en-US" altLang="ko-KR" dirty="0" smtClean="0">
+                <a:solidFill>
+                  <a:schemeClr val="accent2"/>
+                </a:solidFill>
+              </a:rPr>
+              <a:t>weight: Float = 0.0</a:t>
+            </a:r>
+            <a:br>
+              <a:rPr lang="en-US" altLang="ko-KR" dirty="0" smtClean="0">
+                <a:solidFill>
+                  <a:schemeClr val="accent2"/>
+                </a:solidFill>
+              </a:rPr>
+            </a:br>
+            <a:r>
+              <a:rPr lang="en-US" altLang="ko-KR" dirty="0" smtClean="0"/>
+              <a:t>}</a:t>
+            </a:r>
+            <a:endParaRPr lang="en-US" altLang="ko-KR" dirty="0"/>
+          </a:p>
+          <a:p>
+            <a:r>
+              <a:rPr lang="en-US" altLang="ko-KR" dirty="0" err="1" smtClean="0"/>
+              <a:t>var</a:t>
+            </a:r>
+            <a:r>
+              <a:rPr lang="en-US" altLang="ko-KR" dirty="0" smtClean="0"/>
+              <a:t> </a:t>
+            </a:r>
+            <a:r>
+              <a:rPr lang="en-US" altLang="ko-KR" dirty="0" err="1" smtClean="0"/>
+              <a:t>myInfo</a:t>
+            </a:r>
+            <a:r>
+              <a:rPr lang="en-US" altLang="ko-KR" dirty="0" smtClean="0"/>
+              <a:t>: </a:t>
+            </a:r>
+            <a:r>
+              <a:rPr lang="en-US" altLang="ko-KR" dirty="0" smtClean="0">
+                <a:solidFill>
+                  <a:schemeClr val="accent3"/>
+                </a:solidFill>
+              </a:rPr>
+              <a:t>Person</a:t>
+            </a:r>
+            <a:r>
+              <a:rPr lang="en-US" altLang="ko-KR" dirty="0" smtClean="0"/>
+              <a:t> = </a:t>
+            </a:r>
+            <a:r>
+              <a:rPr lang="en-US" altLang="ko-KR" dirty="0" smtClean="0">
+                <a:solidFill>
+                  <a:schemeClr val="accent3"/>
+                </a:solidFill>
+              </a:rPr>
+              <a:t>Person</a:t>
+            </a:r>
+            <a:r>
+              <a:rPr lang="en-US" altLang="ko-KR" dirty="0" smtClean="0">
+                <a:solidFill>
+                  <a:schemeClr val="accent2"/>
+                </a:solidFill>
+              </a:rPr>
+              <a:t>()</a:t>
+            </a:r>
+          </a:p>
+          <a:p>
+            <a:r>
+              <a:rPr lang="en-US" altLang="ko-KR" dirty="0" err="1" smtClean="0">
+                <a:solidFill>
+                  <a:schemeClr val="accent3"/>
+                </a:solidFill>
+              </a:rPr>
+              <a:t>myInfo.height</a:t>
+            </a:r>
+            <a:r>
+              <a:rPr lang="en-US" altLang="ko-KR" dirty="0" smtClean="0">
+                <a:solidFill>
+                  <a:schemeClr val="accent2"/>
+                </a:solidFill>
+              </a:rPr>
+              <a:t> </a:t>
+            </a:r>
+            <a:r>
+              <a:rPr lang="en-US" altLang="ko-KR" dirty="0" smtClean="0"/>
+              <a:t>= 170.0</a:t>
+            </a:r>
+          </a:p>
+          <a:p>
+            <a:r>
+              <a:rPr lang="en-US" altLang="ko-KR" dirty="0" err="1" smtClean="0">
+                <a:solidFill>
+                  <a:schemeClr val="accent3"/>
+                </a:solidFill>
+              </a:rPr>
+              <a:t>myInfo.weight</a:t>
+            </a:r>
+            <a:r>
+              <a:rPr lang="en-US" altLang="ko-KR" dirty="0" smtClean="0">
+                <a:solidFill>
+                  <a:schemeClr val="accent2"/>
+                </a:solidFill>
+              </a:rPr>
+              <a:t> </a:t>
+            </a:r>
+            <a:r>
+              <a:rPr lang="en-US" altLang="ko-KR" dirty="0" smtClean="0"/>
+              <a:t>= 65.0</a:t>
+            </a:r>
+            <a:endParaRPr lang="ko-KR" altLang="en-US" dirty="0"/>
+          </a:p>
+        </p:txBody>
+      </p:sp>
+    </p:spTree>
+    <p:extLst>
+      <p:ext uri="{BB962C8B-B14F-4D97-AF65-F5344CB8AC3E}">
+        <p14:creationId xmlns:p14="http://schemas.microsoft.com/office/powerpoint/2010/main" val="2861596981"/>
+      </p:ext>
+    </p:extLst>
+  </p:cSld>
+  <p:clrMapOvr>
+    <a:masterClrMapping/>
+  </p:clrMapOvr>
+</p:sld>
+</file>
+
+<file path=ppt/slides/slide69.xml><?xml version="1.0" encoding="utf-8"?>
+<p:sld xmlns:a="http://schemas.openxmlformats.org/drawingml/2006/main" xmlns:r="http://schemas.openxmlformats.org/officeDocument/2006/relationships" xmlns:p="http://schemas.openxmlformats.org/presentationml/2006/main">
+  <p:cSld>
+    <p:spTree>
+      <p:nvGrpSpPr>
+        <p:cNvPr id="1" name=""/>
+        <p:cNvGrpSpPr/>
+        <p:nvPr/>
+      </p:nvGrpSpPr>
+      <p:grpSpPr>
+        <a:xfrm>
+          <a:off x="0" y="0"/>
+          <a:ext cx="0" cy="0"/>
+          <a:chOff x="0" y="0"/>
+          <a:chExt cx="0" cy="0"/>
+        </a:xfrm>
+      </p:grpSpPr>
+      <p:sp>
+        <p:nvSpPr>
+          <p:cNvPr id="2" name="제목 1"/>
+          <p:cNvSpPr>
+            <a:spLocks noGrp="1"/>
+          </p:cNvSpPr>
+          <p:nvPr>
+            <p:ph type="title"/>
+          </p:nvPr>
+        </p:nvSpPr>
+        <p:spPr/>
+        <p:txBody>
+          <a:bodyPr/>
+          <a:lstStyle/>
+          <a:p>
+            <a:r>
+              <a:rPr lang="ko-KR" altLang="en-US" dirty="0" smtClean="0"/>
+              <a:t>구조체와 클래스</a:t>
+            </a:r>
+            <a:endParaRPr lang="ko-KR" altLang="en-US" dirty="0"/>
+          </a:p>
+        </p:txBody>
+      </p:sp>
+      <p:sp>
+        <p:nvSpPr>
+          <p:cNvPr id="3" name="내용 개체 틀 2"/>
+          <p:cNvSpPr>
+            <a:spLocks noGrp="1"/>
+          </p:cNvSpPr>
+          <p:nvPr>
+            <p:ph idx="1"/>
+          </p:nvPr>
+        </p:nvSpPr>
+        <p:spPr/>
+        <p:txBody>
+          <a:bodyPr>
+            <a:normAutofit/>
+          </a:bodyPr>
+          <a:lstStyle/>
+          <a:p>
+            <a:r>
+              <a:rPr lang="ko-KR" altLang="en-US" dirty="0" smtClean="0"/>
+              <a:t>클래스</a:t>
+            </a:r>
+            <a:endParaRPr lang="en-US" altLang="ko-KR" dirty="0" smtClean="0"/>
+          </a:p>
+          <a:p>
+            <a:pPr lvl="1"/>
+            <a:r>
+              <a:rPr lang="ko-KR" altLang="en-US" dirty="0" smtClean="0"/>
+              <a:t>클래스의 인스턴스는 참조 타입</a:t>
+            </a:r>
+            <a:endParaRPr lang="en-US" altLang="ko-KR" dirty="0" smtClean="0"/>
+          </a:p>
+          <a:p>
+            <a:pPr lvl="2"/>
+            <a:r>
+              <a:rPr lang="en-US" altLang="ko-KR" dirty="0" smtClean="0">
+                <a:solidFill>
+                  <a:schemeClr val="accent6"/>
+                </a:solidFill>
+              </a:rPr>
+              <a:t>let</a:t>
+            </a:r>
+            <a:r>
+              <a:rPr lang="ko-KR" altLang="en-US" dirty="0" smtClean="0">
+                <a:solidFill>
+                  <a:schemeClr val="accent6"/>
+                </a:solidFill>
+              </a:rPr>
+              <a:t>으로 인스턴스를 선언하여도 내부 </a:t>
+            </a:r>
+            <a:r>
+              <a:rPr lang="ko-KR" altLang="en-US" dirty="0" err="1" smtClean="0">
+                <a:solidFill>
+                  <a:schemeClr val="accent6"/>
+                </a:solidFill>
+              </a:rPr>
+              <a:t>프로퍼티</a:t>
+            </a:r>
+            <a:r>
+              <a:rPr lang="ko-KR" altLang="en-US" dirty="0" smtClean="0">
+                <a:solidFill>
+                  <a:schemeClr val="accent6"/>
+                </a:solidFill>
+              </a:rPr>
+              <a:t> 변경 가능</a:t>
+            </a:r>
+            <a:endParaRPr lang="en-US" altLang="ko-KR" dirty="0">
+              <a:solidFill>
+                <a:schemeClr val="accent6"/>
+              </a:solidFill>
+            </a:endParaRPr>
+          </a:p>
+          <a:p>
+            <a:pPr lvl="2"/>
+            <a:endParaRPr lang="en-US" altLang="ko-KR" dirty="0" smtClean="0"/>
+          </a:p>
+          <a:p>
+            <a:pPr marL="768096" lvl="2" indent="0">
+              <a:buNone/>
+            </a:pPr>
+            <a:endParaRPr lang="en-US" altLang="ko-KR" dirty="0" smtClean="0"/>
+          </a:p>
+          <a:p>
+            <a:pPr lvl="2"/>
+            <a:endParaRPr lang="en-US" altLang="ko-KR" dirty="0" smtClean="0"/>
+          </a:p>
+          <a:p>
+            <a:pPr lvl="1"/>
+            <a:endParaRPr lang="en-US" altLang="ko-KR" dirty="0" smtClean="0"/>
+          </a:p>
+        </p:txBody>
+      </p:sp>
+      <p:sp>
+        <p:nvSpPr>
+          <p:cNvPr id="4" name="TextBox 3"/>
+          <p:cNvSpPr txBox="1"/>
+          <p:nvPr/>
+        </p:nvSpPr>
+        <p:spPr>
+          <a:xfrm>
+            <a:off x="1979712" y="1772816"/>
+            <a:ext cx="5472608" cy="1477328"/>
+          </a:xfrm>
+          <a:prstGeom prst="rect">
+            <a:avLst/>
+          </a:prstGeom>
+          <a:noFill/>
+        </p:spPr>
+        <p:txBody>
+          <a:bodyPr wrap="square" rtlCol="0">
+            <a:spAutoFit/>
+          </a:bodyPr>
+          <a:lstStyle/>
+          <a:p>
+            <a:r>
+              <a:rPr lang="en-US" altLang="ko-KR" dirty="0" smtClean="0"/>
+              <a:t>let </a:t>
+            </a:r>
+            <a:r>
+              <a:rPr lang="en-US" altLang="ko-KR" dirty="0" err="1" smtClean="0"/>
+              <a:t>myInfo</a:t>
+            </a:r>
+            <a:r>
+              <a:rPr lang="en-US" altLang="ko-KR" dirty="0" smtClean="0"/>
+              <a:t>: Person = Person()</a:t>
+            </a:r>
+          </a:p>
+          <a:p>
+            <a:endParaRPr lang="en-US" altLang="ko-KR" dirty="0"/>
+          </a:p>
+          <a:p>
+            <a:r>
+              <a:rPr lang="en-US" altLang="ko-KR" dirty="0" err="1" smtClean="0"/>
+              <a:t>myInfo</a:t>
+            </a:r>
+            <a:r>
+              <a:rPr lang="en-US" altLang="ko-KR" dirty="0" err="1" smtClean="0">
+                <a:solidFill>
+                  <a:schemeClr val="accent3"/>
+                </a:solidFill>
+              </a:rPr>
+              <a:t>.height</a:t>
+            </a:r>
+            <a:r>
+              <a:rPr lang="en-US" altLang="ko-KR" dirty="0" smtClean="0">
+                <a:solidFill>
+                  <a:schemeClr val="accent3"/>
+                </a:solidFill>
+              </a:rPr>
+              <a:t> </a:t>
+            </a:r>
+            <a:r>
+              <a:rPr lang="en-US" altLang="ko-KR" dirty="0" smtClean="0"/>
+              <a:t>= 180.0</a:t>
+            </a:r>
+          </a:p>
+          <a:p>
+            <a:r>
+              <a:rPr lang="en-US" altLang="ko-KR" dirty="0" err="1" smtClean="0"/>
+              <a:t>myInfo</a:t>
+            </a:r>
+            <a:r>
+              <a:rPr lang="en-US" altLang="ko-KR" dirty="0" err="1" smtClean="0">
+                <a:solidFill>
+                  <a:schemeClr val="accent3"/>
+                </a:solidFill>
+              </a:rPr>
+              <a:t>.weight</a:t>
+            </a:r>
+            <a:r>
+              <a:rPr lang="en-US" altLang="ko-KR" dirty="0" smtClean="0">
+                <a:solidFill>
+                  <a:schemeClr val="accent3"/>
+                </a:solidFill>
+              </a:rPr>
+              <a:t> </a:t>
+            </a:r>
+            <a:r>
+              <a:rPr lang="en-US" altLang="ko-KR" dirty="0" smtClean="0"/>
+              <a:t>= 70.0</a:t>
+            </a:r>
+          </a:p>
+          <a:p>
+            <a:endParaRPr lang="ko-KR" altLang="en-US" dirty="0">
+              <a:solidFill>
+                <a:schemeClr val="accent2"/>
+              </a:solidFill>
+            </a:endParaRPr>
+          </a:p>
+        </p:txBody>
+      </p:sp>
+    </p:spTree>
+    <p:extLst>
+      <p:ext uri="{BB962C8B-B14F-4D97-AF65-F5344CB8AC3E}">
+        <p14:creationId xmlns:p14="http://schemas.microsoft.com/office/powerpoint/2010/main" val="3269727912"/>
+      </p:ext>
+    </p:extLst>
+  </p:cSld>
+  <p:clrMapOvr>
+    <a:masterClrMapping/>
+  </p:clrMapOvr>
+</p:sld>
+</file>
+
 <file path=ppt/slides/slide7.xml><?xml version="1.0" encoding="utf-8"?>
 <p:sld xmlns:a="http://schemas.openxmlformats.org/drawingml/2006/main" xmlns:r="http://schemas.openxmlformats.org/officeDocument/2006/relationships" xmlns:p="http://schemas.openxmlformats.org/presentationml/2006/main">
   <p:cSld>
@@ -41782,6 +43469,2248 @@
       </p:par>
     </p:tnLst>
   </p:timing>
+</p:sld>
+</file>
+
+<file path=ppt/slides/slide70.xml><?xml version="1.0" encoding="utf-8"?>
+<p:sld xmlns:a="http://schemas.openxmlformats.org/drawingml/2006/main" xmlns:r="http://schemas.openxmlformats.org/officeDocument/2006/relationships" xmlns:p="http://schemas.openxmlformats.org/presentationml/2006/main">
+  <p:cSld>
+    <p:spTree>
+      <p:nvGrpSpPr>
+        <p:cNvPr id="1" name=""/>
+        <p:cNvGrpSpPr/>
+        <p:nvPr/>
+      </p:nvGrpSpPr>
+      <p:grpSpPr>
+        <a:xfrm>
+          <a:off x="0" y="0"/>
+          <a:ext cx="0" cy="0"/>
+          <a:chOff x="0" y="0"/>
+          <a:chExt cx="0" cy="0"/>
+        </a:xfrm>
+      </p:grpSpPr>
+      <p:sp>
+        <p:nvSpPr>
+          <p:cNvPr id="2" name="제목 1"/>
+          <p:cNvSpPr>
+            <a:spLocks noGrp="1"/>
+          </p:cNvSpPr>
+          <p:nvPr>
+            <p:ph type="title"/>
+          </p:nvPr>
+        </p:nvSpPr>
+        <p:spPr/>
+        <p:txBody>
+          <a:bodyPr/>
+          <a:lstStyle/>
+          <a:p>
+            <a:r>
+              <a:rPr lang="ko-KR" altLang="en-US" dirty="0" smtClean="0"/>
+              <a:t>구조체와 클래스</a:t>
+            </a:r>
+            <a:endParaRPr lang="ko-KR" altLang="en-US" dirty="0"/>
+          </a:p>
+        </p:txBody>
+      </p:sp>
+      <p:sp>
+        <p:nvSpPr>
+          <p:cNvPr id="3" name="내용 개체 틀 2"/>
+          <p:cNvSpPr>
+            <a:spLocks noGrp="1"/>
+          </p:cNvSpPr>
+          <p:nvPr>
+            <p:ph idx="1"/>
+          </p:nvPr>
+        </p:nvSpPr>
+        <p:spPr/>
+        <p:txBody>
+          <a:bodyPr>
+            <a:normAutofit/>
+          </a:bodyPr>
+          <a:lstStyle/>
+          <a:p>
+            <a:r>
+              <a:rPr lang="ko-KR" altLang="en-US" dirty="0" smtClean="0"/>
+              <a:t>클래스</a:t>
+            </a:r>
+            <a:endParaRPr lang="en-US" altLang="ko-KR" dirty="0" smtClean="0"/>
+          </a:p>
+          <a:p>
+            <a:pPr lvl="1"/>
+            <a:r>
+              <a:rPr lang="ko-KR" altLang="en-US" dirty="0" smtClean="0"/>
+              <a:t>인스턴스의 소멸</a:t>
+            </a:r>
+            <a:endParaRPr lang="en-US" altLang="ko-KR" dirty="0" smtClean="0"/>
+          </a:p>
+          <a:p>
+            <a:pPr lvl="2"/>
+            <a:r>
+              <a:rPr lang="ko-KR" altLang="en-US" dirty="0" smtClean="0"/>
+              <a:t>인스턴스가 참조 타입이므로 필요 없을 때 메모리에서 해제됨</a:t>
+            </a:r>
+            <a:endParaRPr lang="en-US" altLang="ko-KR" dirty="0" smtClean="0"/>
+          </a:p>
+          <a:p>
+            <a:pPr lvl="2"/>
+            <a:r>
+              <a:rPr lang="ko-KR" altLang="en-US" dirty="0" smtClean="0">
+                <a:solidFill>
+                  <a:schemeClr val="accent6"/>
+                </a:solidFill>
+              </a:rPr>
+              <a:t>소멸되기 직전 </a:t>
+            </a:r>
+            <a:r>
+              <a:rPr lang="en-US" altLang="ko-KR" dirty="0" err="1" smtClean="0">
+                <a:solidFill>
+                  <a:schemeClr val="accent6"/>
+                </a:solidFill>
+              </a:rPr>
+              <a:t>deinit</a:t>
+            </a:r>
+            <a:r>
+              <a:rPr lang="en-US" altLang="ko-KR" dirty="0" smtClean="0">
+                <a:solidFill>
+                  <a:schemeClr val="accent6"/>
+                </a:solidFill>
+              </a:rPr>
+              <a:t> </a:t>
+            </a:r>
+            <a:r>
+              <a:rPr lang="ko-KR" altLang="en-US" dirty="0" err="1" smtClean="0">
+                <a:solidFill>
+                  <a:schemeClr val="accent6"/>
+                </a:solidFill>
+              </a:rPr>
+              <a:t>메소드가</a:t>
+            </a:r>
+            <a:r>
+              <a:rPr lang="ko-KR" altLang="en-US" dirty="0" smtClean="0">
+                <a:solidFill>
+                  <a:schemeClr val="accent6"/>
+                </a:solidFill>
+              </a:rPr>
+              <a:t> 호출됨</a:t>
+            </a:r>
+            <a:endParaRPr lang="en-US" altLang="ko-KR" dirty="0">
+              <a:solidFill>
+                <a:schemeClr val="accent6"/>
+              </a:solidFill>
+            </a:endParaRPr>
+          </a:p>
+          <a:p>
+            <a:pPr lvl="2"/>
+            <a:endParaRPr lang="en-US" altLang="ko-KR" dirty="0" smtClean="0"/>
+          </a:p>
+          <a:p>
+            <a:pPr marL="768096" lvl="2" indent="0">
+              <a:buNone/>
+            </a:pPr>
+            <a:endParaRPr lang="en-US" altLang="ko-KR" dirty="0" smtClean="0"/>
+          </a:p>
+          <a:p>
+            <a:pPr lvl="2"/>
+            <a:endParaRPr lang="en-US" altLang="ko-KR" dirty="0" smtClean="0"/>
+          </a:p>
+          <a:p>
+            <a:pPr lvl="1"/>
+            <a:endParaRPr lang="en-US" altLang="ko-KR" dirty="0" smtClean="0"/>
+          </a:p>
+        </p:txBody>
+      </p:sp>
+      <p:sp>
+        <p:nvSpPr>
+          <p:cNvPr id="4" name="TextBox 3"/>
+          <p:cNvSpPr txBox="1"/>
+          <p:nvPr/>
+        </p:nvSpPr>
+        <p:spPr>
+          <a:xfrm>
+            <a:off x="1979712" y="2060848"/>
+            <a:ext cx="5472608" cy="2308324"/>
+          </a:xfrm>
+          <a:prstGeom prst="rect">
+            <a:avLst/>
+          </a:prstGeom>
+          <a:noFill/>
+        </p:spPr>
+        <p:txBody>
+          <a:bodyPr wrap="square" rtlCol="0">
+            <a:spAutoFit/>
+          </a:bodyPr>
+          <a:lstStyle/>
+          <a:p>
+            <a:r>
+              <a:rPr lang="en-US" altLang="ko-KR" sz="1600" dirty="0"/>
+              <a:t>class </a:t>
+            </a:r>
+            <a:r>
+              <a:rPr lang="en-US" altLang="ko-KR" sz="1600" dirty="0">
+                <a:solidFill>
+                  <a:schemeClr val="accent3"/>
+                </a:solidFill>
+              </a:rPr>
+              <a:t>Person</a:t>
+            </a:r>
+            <a:r>
+              <a:rPr lang="en-US" altLang="ko-KR" sz="1600" dirty="0"/>
+              <a:t> {</a:t>
+            </a:r>
+            <a:br>
+              <a:rPr lang="en-US" altLang="ko-KR" sz="1600" dirty="0"/>
+            </a:br>
+            <a:r>
+              <a:rPr lang="en-US" altLang="ko-KR" sz="1600" dirty="0"/>
+              <a:t>	</a:t>
+            </a:r>
+            <a:r>
+              <a:rPr lang="en-US" altLang="ko-KR" sz="1600" dirty="0" err="1"/>
+              <a:t>var</a:t>
+            </a:r>
+            <a:r>
+              <a:rPr lang="en-US" altLang="ko-KR" sz="1600" dirty="0"/>
+              <a:t> height: Float = </a:t>
+            </a:r>
+            <a:r>
+              <a:rPr lang="en-US" altLang="ko-KR" sz="1600" dirty="0" smtClean="0"/>
+              <a:t>0.0</a:t>
+            </a:r>
+            <a:r>
+              <a:rPr lang="en-US" altLang="ko-KR" sz="1600" dirty="0"/>
+              <a:t/>
+            </a:r>
+            <a:br>
+              <a:rPr lang="en-US" altLang="ko-KR" sz="1600" dirty="0"/>
+            </a:br>
+            <a:r>
+              <a:rPr lang="en-US" altLang="ko-KR" sz="1600" dirty="0"/>
+              <a:t>	</a:t>
+            </a:r>
+            <a:r>
+              <a:rPr lang="en-US" altLang="ko-KR" sz="1600" dirty="0" err="1"/>
+              <a:t>var</a:t>
+            </a:r>
+            <a:r>
+              <a:rPr lang="en-US" altLang="ko-KR" sz="1600" dirty="0"/>
+              <a:t> weight: Float = </a:t>
+            </a:r>
+            <a:r>
+              <a:rPr lang="en-US" altLang="ko-KR" sz="1600" dirty="0" smtClean="0"/>
+              <a:t>0.0</a:t>
+            </a:r>
+            <a:br>
+              <a:rPr lang="en-US" altLang="ko-KR" sz="1600" dirty="0" smtClean="0"/>
+            </a:br>
+            <a:r>
+              <a:rPr lang="en-US" altLang="ko-KR" sz="1600" dirty="0" smtClean="0">
+                <a:solidFill>
+                  <a:schemeClr val="accent2"/>
+                </a:solidFill>
+              </a:rPr>
+              <a:t>	</a:t>
+            </a:r>
+            <a:r>
+              <a:rPr lang="en-US" altLang="ko-KR" sz="1600" dirty="0" err="1" smtClean="0">
+                <a:solidFill>
+                  <a:schemeClr val="accent2"/>
+                </a:solidFill>
+              </a:rPr>
+              <a:t>deinit</a:t>
+            </a:r>
+            <a:r>
+              <a:rPr lang="en-US" altLang="ko-KR" sz="1600" dirty="0" smtClean="0">
+                <a:solidFill>
+                  <a:schemeClr val="accent2"/>
+                </a:solidFill>
+              </a:rPr>
+              <a:t> {</a:t>
+            </a:r>
+            <a:br>
+              <a:rPr lang="en-US" altLang="ko-KR" sz="1600" dirty="0" smtClean="0">
+                <a:solidFill>
+                  <a:schemeClr val="accent2"/>
+                </a:solidFill>
+              </a:rPr>
+            </a:br>
+            <a:r>
+              <a:rPr lang="en-US" altLang="ko-KR" sz="1600" dirty="0" smtClean="0">
+                <a:solidFill>
+                  <a:schemeClr val="accent2"/>
+                </a:solidFill>
+              </a:rPr>
+              <a:t>	</a:t>
+            </a:r>
+            <a:r>
+              <a:rPr lang="en-US" altLang="ko-KR" sz="1600" dirty="0">
+                <a:solidFill>
+                  <a:schemeClr val="accent2"/>
+                </a:solidFill>
+              </a:rPr>
+              <a:t>	</a:t>
+            </a:r>
+            <a:r>
+              <a:rPr lang="en-US" altLang="ko-KR" sz="1600" dirty="0" smtClean="0">
+                <a:solidFill>
+                  <a:schemeClr val="accent2"/>
+                </a:solidFill>
+              </a:rPr>
+              <a:t>print(“Person </a:t>
+            </a:r>
+            <a:r>
+              <a:rPr lang="ko-KR" altLang="en-US" sz="1600" dirty="0" smtClean="0">
+                <a:solidFill>
+                  <a:schemeClr val="accent2"/>
+                </a:solidFill>
+              </a:rPr>
+              <a:t>인스턴스 소멸</a:t>
+            </a:r>
+            <a:r>
+              <a:rPr lang="en-US" altLang="ko-KR" sz="1600" dirty="0" smtClean="0">
+                <a:solidFill>
+                  <a:schemeClr val="accent2"/>
+                </a:solidFill>
+              </a:rPr>
+              <a:t>”)</a:t>
+            </a:r>
+          </a:p>
+          <a:p>
+            <a:r>
+              <a:rPr lang="en-US" altLang="ko-KR" sz="1600" dirty="0" smtClean="0">
+                <a:solidFill>
+                  <a:schemeClr val="accent2"/>
+                </a:solidFill>
+              </a:rPr>
+              <a:t>	}</a:t>
+            </a:r>
+            <a:r>
+              <a:rPr lang="en-US" altLang="ko-KR" sz="1600" dirty="0">
+                <a:solidFill>
+                  <a:schemeClr val="accent2"/>
+                </a:solidFill>
+              </a:rPr>
+              <a:t/>
+            </a:r>
+            <a:br>
+              <a:rPr lang="en-US" altLang="ko-KR" sz="1600" dirty="0">
+                <a:solidFill>
+                  <a:schemeClr val="accent2"/>
+                </a:solidFill>
+              </a:rPr>
+            </a:br>
+            <a:r>
+              <a:rPr lang="en-US" altLang="ko-KR" sz="1600" dirty="0" smtClean="0"/>
+              <a:t>}</a:t>
+            </a:r>
+            <a:br>
+              <a:rPr lang="en-US" altLang="ko-KR" sz="1600" dirty="0" smtClean="0"/>
+            </a:br>
+            <a:r>
+              <a:rPr lang="en-US" altLang="ko-KR" sz="1600" dirty="0" err="1" smtClean="0"/>
+              <a:t>var</a:t>
+            </a:r>
+            <a:r>
+              <a:rPr lang="en-US" altLang="ko-KR" sz="1600" dirty="0" smtClean="0"/>
+              <a:t> </a:t>
+            </a:r>
+            <a:r>
+              <a:rPr lang="en-US" altLang="ko-KR" sz="1600" dirty="0" err="1" smtClean="0"/>
+              <a:t>myInstance</a:t>
+            </a:r>
+            <a:r>
+              <a:rPr lang="en-US" altLang="ko-KR" sz="1600" dirty="0" smtClean="0"/>
+              <a:t>: Person? = Person()</a:t>
+            </a:r>
+          </a:p>
+          <a:p>
+            <a:r>
+              <a:rPr lang="en-US" altLang="ko-KR" sz="1600" dirty="0" err="1" smtClean="0"/>
+              <a:t>myInstance</a:t>
+            </a:r>
+            <a:r>
+              <a:rPr lang="en-US" altLang="ko-KR" sz="1600" dirty="0" smtClean="0"/>
+              <a:t> = nil   </a:t>
+            </a:r>
+            <a:r>
+              <a:rPr lang="en-US" altLang="ko-KR" sz="1200" dirty="0" smtClean="0">
+                <a:solidFill>
+                  <a:schemeClr val="accent6"/>
+                </a:solidFill>
+              </a:rPr>
+              <a:t>// </a:t>
+            </a:r>
+            <a:r>
+              <a:rPr lang="ko-KR" altLang="en-US" sz="1200" dirty="0" smtClean="0">
+                <a:solidFill>
+                  <a:schemeClr val="accent6"/>
+                </a:solidFill>
+              </a:rPr>
+              <a:t>이 시점에서 </a:t>
+            </a:r>
+            <a:r>
+              <a:rPr lang="en-US" altLang="ko-KR" sz="1200" dirty="0" smtClean="0">
+                <a:solidFill>
+                  <a:schemeClr val="accent6"/>
+                </a:solidFill>
+              </a:rPr>
+              <a:t>Person </a:t>
+            </a:r>
+            <a:r>
+              <a:rPr lang="ko-KR" altLang="en-US" sz="1200" dirty="0" smtClean="0">
+                <a:solidFill>
+                  <a:schemeClr val="accent6"/>
+                </a:solidFill>
+              </a:rPr>
+              <a:t>인스턴스 소멸</a:t>
+            </a:r>
+            <a:endParaRPr lang="en-US" altLang="ko-KR" sz="1200" dirty="0">
+              <a:solidFill>
+                <a:schemeClr val="accent6"/>
+              </a:solidFill>
+            </a:endParaRPr>
+          </a:p>
+        </p:txBody>
+      </p:sp>
+      <p:pic>
+        <p:nvPicPr>
+          <p:cNvPr id="5" name="그림 4"/>
+          <p:cNvPicPr>
+            <a:picLocks noChangeAspect="1"/>
+          </p:cNvPicPr>
+          <p:nvPr/>
+        </p:nvPicPr>
+        <p:blipFill>
+          <a:blip r:embed="rId2"/>
+          <a:stretch>
+            <a:fillRect/>
+          </a:stretch>
+        </p:blipFill>
+        <p:spPr>
+          <a:xfrm>
+            <a:off x="406581" y="4357067"/>
+            <a:ext cx="8743950" cy="2600325"/>
+          </a:xfrm>
+          <a:prstGeom prst="rect">
+            <a:avLst/>
+          </a:prstGeom>
+        </p:spPr>
+      </p:pic>
+    </p:spTree>
+    <p:extLst>
+      <p:ext uri="{BB962C8B-B14F-4D97-AF65-F5344CB8AC3E}">
+        <p14:creationId xmlns:p14="http://schemas.microsoft.com/office/powerpoint/2010/main" val="16513156"/>
+      </p:ext>
+    </p:extLst>
+  </p:cSld>
+  <p:clrMapOvr>
+    <a:masterClrMapping/>
+  </p:clrMapOvr>
+</p:sld>
+</file>
+
+<file path=ppt/slides/slide71.xml><?xml version="1.0" encoding="utf-8"?>
+<p:sld xmlns:a="http://schemas.openxmlformats.org/drawingml/2006/main" xmlns:r="http://schemas.openxmlformats.org/officeDocument/2006/relationships" xmlns:p="http://schemas.openxmlformats.org/presentationml/2006/main">
+  <p:cSld>
+    <p:spTree>
+      <p:nvGrpSpPr>
+        <p:cNvPr id="1" name=""/>
+        <p:cNvGrpSpPr/>
+        <p:nvPr/>
+      </p:nvGrpSpPr>
+      <p:grpSpPr>
+        <a:xfrm>
+          <a:off x="0" y="0"/>
+          <a:ext cx="0" cy="0"/>
+          <a:chOff x="0" y="0"/>
+          <a:chExt cx="0" cy="0"/>
+        </a:xfrm>
+      </p:grpSpPr>
+      <p:sp>
+        <p:nvSpPr>
+          <p:cNvPr id="2" name="제목 1"/>
+          <p:cNvSpPr>
+            <a:spLocks noGrp="1"/>
+          </p:cNvSpPr>
+          <p:nvPr>
+            <p:ph type="title"/>
+          </p:nvPr>
+        </p:nvSpPr>
+        <p:spPr/>
+        <p:txBody>
+          <a:bodyPr/>
+          <a:lstStyle/>
+          <a:p>
+            <a:r>
+              <a:rPr lang="ko-KR" altLang="en-US" dirty="0" smtClean="0"/>
+              <a:t>구조체와 클래스</a:t>
+            </a:r>
+            <a:endParaRPr lang="ko-KR" altLang="en-US" dirty="0"/>
+          </a:p>
+        </p:txBody>
+      </p:sp>
+      <p:sp>
+        <p:nvSpPr>
+          <p:cNvPr id="3" name="내용 개체 틀 2"/>
+          <p:cNvSpPr>
+            <a:spLocks noGrp="1"/>
+          </p:cNvSpPr>
+          <p:nvPr>
+            <p:ph idx="1"/>
+          </p:nvPr>
+        </p:nvSpPr>
+        <p:spPr/>
+        <p:txBody>
+          <a:bodyPr>
+            <a:normAutofit/>
+          </a:bodyPr>
+          <a:lstStyle/>
+          <a:p>
+            <a:r>
+              <a:rPr lang="ko-KR" altLang="en-US" dirty="0" smtClean="0"/>
+              <a:t>구조체와 클래스의 차이</a:t>
+            </a:r>
+            <a:endParaRPr lang="en-US" altLang="ko-KR" dirty="0"/>
+          </a:p>
+          <a:p>
+            <a:endParaRPr lang="en-US" altLang="ko-KR" dirty="0" smtClean="0"/>
+          </a:p>
+          <a:p>
+            <a:endParaRPr lang="en-US" altLang="ko-KR" dirty="0"/>
+          </a:p>
+          <a:p>
+            <a:endParaRPr lang="en-US" altLang="ko-KR" dirty="0" smtClean="0"/>
+          </a:p>
+          <a:p>
+            <a:endParaRPr lang="en-US" altLang="ko-KR" dirty="0"/>
+          </a:p>
+          <a:p>
+            <a:pPr marL="454914" lvl="1" indent="0">
+              <a:buNone/>
+            </a:pPr>
+            <a:endParaRPr lang="en-US" altLang="ko-KR" dirty="0" smtClean="0"/>
+          </a:p>
+          <a:p>
+            <a:endParaRPr lang="en-US" altLang="ko-KR" dirty="0"/>
+          </a:p>
+          <a:p>
+            <a:endParaRPr lang="en-US" altLang="ko-KR" dirty="0" smtClean="0"/>
+          </a:p>
+          <a:p>
+            <a:endParaRPr lang="en-US" altLang="ko-KR" dirty="0"/>
+          </a:p>
+          <a:p>
+            <a:endParaRPr lang="en-US" altLang="ko-KR" dirty="0" smtClean="0"/>
+          </a:p>
+          <a:p>
+            <a:endParaRPr lang="en-US" altLang="ko-KR" dirty="0"/>
+          </a:p>
+        </p:txBody>
+      </p:sp>
+      <p:graphicFrame>
+        <p:nvGraphicFramePr>
+          <p:cNvPr id="6" name="표 5"/>
+          <p:cNvGraphicFramePr>
+            <a:graphicFrameLocks noGrp="1"/>
+          </p:cNvGraphicFramePr>
+          <p:nvPr>
+            <p:extLst>
+              <p:ext uri="{D42A27DB-BD31-4B8C-83A1-F6EECF244321}">
+                <p14:modId xmlns:p14="http://schemas.microsoft.com/office/powerpoint/2010/main" val="547536864"/>
+              </p:ext>
+            </p:extLst>
+          </p:nvPr>
+        </p:nvGraphicFramePr>
+        <p:xfrm>
+          <a:off x="1475656" y="1196752"/>
+          <a:ext cx="6096000" cy="2214880"/>
+        </p:xfrm>
+        <a:graphic>
+          <a:graphicData uri="http://schemas.openxmlformats.org/drawingml/2006/table">
+            <a:tbl>
+              <a:tblPr firstRow="1" bandRow="1">
+                <a:tableStyleId>{10A1B5D5-9B99-4C35-A422-299274C87663}</a:tableStyleId>
+              </a:tblPr>
+              <a:tblGrid>
+                <a:gridCol w="2032000">
+                  <a:extLst>
+                    <a:ext uri="{9D8B030D-6E8A-4147-A177-3AD203B41FA5}">
+                      <a16:colId xmlns:a16="http://schemas.microsoft.com/office/drawing/2014/main" val="4183474523"/>
+                    </a:ext>
+                  </a:extLst>
+                </a:gridCol>
+                <a:gridCol w="2032000">
+                  <a:extLst>
+                    <a:ext uri="{9D8B030D-6E8A-4147-A177-3AD203B41FA5}">
+                      <a16:colId xmlns:a16="http://schemas.microsoft.com/office/drawing/2014/main" val="1622359793"/>
+                    </a:ext>
+                  </a:extLst>
+                </a:gridCol>
+                <a:gridCol w="2032000">
+                  <a:extLst>
+                    <a:ext uri="{9D8B030D-6E8A-4147-A177-3AD203B41FA5}">
+                      <a16:colId xmlns:a16="http://schemas.microsoft.com/office/drawing/2014/main" val="294171533"/>
+                    </a:ext>
+                  </a:extLst>
+                </a:gridCol>
+              </a:tblGrid>
+              <a:tr h="370840">
+                <a:tc>
+                  <a:txBody>
+                    <a:bodyPr/>
+                    <a:lstStyle/>
+                    <a:p>
+                      <a:pPr latinLnBrk="1"/>
+                      <a:endParaRPr lang="ko-KR" altLang="en-US" dirty="0"/>
+                    </a:p>
+                  </a:txBody>
+                  <a:tcPr/>
+                </a:tc>
+                <a:tc>
+                  <a:txBody>
+                    <a:bodyPr/>
+                    <a:lstStyle/>
+                    <a:p>
+                      <a:pPr latinLnBrk="1"/>
+                      <a:r>
+                        <a:rPr lang="ko-KR" altLang="en-US" dirty="0" smtClean="0"/>
+                        <a:t>구조체</a:t>
+                      </a:r>
+                      <a:endParaRPr lang="ko-KR" altLang="en-US" dirty="0"/>
+                    </a:p>
+                  </a:txBody>
+                  <a:tcPr/>
+                </a:tc>
+                <a:tc>
+                  <a:txBody>
+                    <a:bodyPr/>
+                    <a:lstStyle/>
+                    <a:p>
+                      <a:pPr latinLnBrk="1"/>
+                      <a:r>
+                        <a:rPr lang="ko-KR" altLang="en-US" dirty="0" smtClean="0"/>
+                        <a:t>클래스</a:t>
+                      </a:r>
+                      <a:endParaRPr lang="ko-KR" altLang="en-US" dirty="0"/>
+                    </a:p>
+                  </a:txBody>
+                  <a:tcPr/>
+                </a:tc>
+                <a:extLst>
+                  <a:ext uri="{0D108BD9-81ED-4DB2-BD59-A6C34878D82A}">
+                    <a16:rowId xmlns:a16="http://schemas.microsoft.com/office/drawing/2014/main" val="1883699554"/>
+                  </a:ext>
+                </a:extLst>
+              </a:tr>
+              <a:tr h="370840">
+                <a:tc>
+                  <a:txBody>
+                    <a:bodyPr/>
+                    <a:lstStyle/>
+                    <a:p>
+                      <a:pPr latinLnBrk="1"/>
+                      <a:r>
+                        <a:rPr lang="ko-KR" altLang="en-US" dirty="0" smtClean="0"/>
+                        <a:t>상속</a:t>
+                      </a:r>
+                      <a:endParaRPr lang="ko-KR" altLang="en-US" dirty="0"/>
+                    </a:p>
+                  </a:txBody>
+                  <a:tcPr/>
+                </a:tc>
+                <a:tc>
+                  <a:txBody>
+                    <a:bodyPr/>
+                    <a:lstStyle/>
+                    <a:p>
+                      <a:pPr latinLnBrk="1"/>
+                      <a:r>
+                        <a:rPr lang="en-US" altLang="ko-KR" dirty="0" smtClean="0"/>
+                        <a:t>X</a:t>
+                      </a:r>
+                      <a:endParaRPr lang="ko-KR" altLang="en-US" dirty="0"/>
+                    </a:p>
+                  </a:txBody>
+                  <a:tcPr/>
+                </a:tc>
+                <a:tc>
+                  <a:txBody>
+                    <a:bodyPr/>
+                    <a:lstStyle/>
+                    <a:p>
+                      <a:pPr latinLnBrk="1"/>
+                      <a:r>
+                        <a:rPr lang="en-US" altLang="ko-KR" dirty="0" smtClean="0"/>
+                        <a:t>O</a:t>
+                      </a:r>
+                      <a:endParaRPr lang="ko-KR" altLang="en-US" dirty="0"/>
+                    </a:p>
+                  </a:txBody>
+                  <a:tcPr/>
+                </a:tc>
+                <a:extLst>
+                  <a:ext uri="{0D108BD9-81ED-4DB2-BD59-A6C34878D82A}">
+                    <a16:rowId xmlns:a16="http://schemas.microsoft.com/office/drawing/2014/main" val="3082145626"/>
+                  </a:ext>
+                </a:extLst>
+              </a:tr>
+              <a:tr h="370840">
+                <a:tc>
+                  <a:txBody>
+                    <a:bodyPr/>
+                    <a:lstStyle/>
+                    <a:p>
+                      <a:pPr latinLnBrk="1"/>
+                      <a:r>
+                        <a:rPr lang="en-US" altLang="ko-KR" dirty="0" smtClean="0"/>
+                        <a:t>Type casting</a:t>
+                      </a:r>
+                      <a:endParaRPr lang="ko-KR" altLang="en-US" dirty="0"/>
+                    </a:p>
+                  </a:txBody>
+                  <a:tcPr/>
+                </a:tc>
+                <a:tc>
+                  <a:txBody>
+                    <a:bodyPr/>
+                    <a:lstStyle/>
+                    <a:p>
+                      <a:pPr latinLnBrk="1"/>
+                      <a:r>
+                        <a:rPr lang="en-US" altLang="ko-KR" dirty="0" smtClean="0"/>
+                        <a:t>X</a:t>
+                      </a:r>
+                      <a:endParaRPr lang="ko-KR" altLang="en-US" dirty="0"/>
+                    </a:p>
+                  </a:txBody>
+                  <a:tcPr/>
+                </a:tc>
+                <a:tc>
+                  <a:txBody>
+                    <a:bodyPr/>
+                    <a:lstStyle/>
+                    <a:p>
+                      <a:pPr latinLnBrk="1"/>
+                      <a:r>
+                        <a:rPr lang="en-US" altLang="ko-KR" dirty="0" smtClean="0"/>
+                        <a:t>O</a:t>
+                      </a:r>
+                      <a:endParaRPr lang="ko-KR" altLang="en-US" dirty="0"/>
+                    </a:p>
+                  </a:txBody>
+                  <a:tcPr/>
+                </a:tc>
+                <a:extLst>
+                  <a:ext uri="{0D108BD9-81ED-4DB2-BD59-A6C34878D82A}">
+                    <a16:rowId xmlns:a16="http://schemas.microsoft.com/office/drawing/2014/main" val="1237999315"/>
+                  </a:ext>
+                </a:extLst>
+              </a:tr>
+              <a:tr h="370840">
+                <a:tc>
+                  <a:txBody>
+                    <a:bodyPr/>
+                    <a:lstStyle/>
+                    <a:p>
+                      <a:pPr latinLnBrk="1"/>
+                      <a:r>
+                        <a:rPr lang="en-US" altLang="ko-KR" dirty="0" err="1" smtClean="0"/>
+                        <a:t>Deinitializer</a:t>
+                      </a:r>
+                      <a:endParaRPr lang="ko-KR" altLang="en-US" dirty="0"/>
+                    </a:p>
+                  </a:txBody>
+                  <a:tcPr/>
+                </a:tc>
+                <a:tc>
+                  <a:txBody>
+                    <a:bodyPr/>
+                    <a:lstStyle/>
+                    <a:p>
+                      <a:pPr latinLnBrk="1"/>
+                      <a:r>
+                        <a:rPr lang="en-US" altLang="ko-KR" dirty="0" smtClean="0"/>
+                        <a:t>X</a:t>
+                      </a:r>
+                      <a:endParaRPr lang="ko-KR" altLang="en-US" dirty="0"/>
+                    </a:p>
+                  </a:txBody>
+                  <a:tcPr/>
+                </a:tc>
+                <a:tc>
+                  <a:txBody>
+                    <a:bodyPr/>
+                    <a:lstStyle/>
+                    <a:p>
+                      <a:pPr latinLnBrk="1"/>
+                      <a:r>
+                        <a:rPr lang="en-US" altLang="ko-KR" dirty="0" smtClean="0"/>
+                        <a:t>O</a:t>
+                      </a:r>
+                      <a:endParaRPr lang="ko-KR" altLang="en-US" dirty="0"/>
+                    </a:p>
+                  </a:txBody>
+                  <a:tcPr/>
+                </a:tc>
+                <a:extLst>
+                  <a:ext uri="{0D108BD9-81ED-4DB2-BD59-A6C34878D82A}">
+                    <a16:rowId xmlns:a16="http://schemas.microsoft.com/office/drawing/2014/main" val="2656202295"/>
+                  </a:ext>
+                </a:extLst>
+              </a:tr>
+              <a:tr h="185420">
+                <a:tc>
+                  <a:txBody>
+                    <a:bodyPr/>
+                    <a:lstStyle/>
+                    <a:p>
+                      <a:pPr latinLnBrk="1"/>
+                      <a:r>
+                        <a:rPr lang="en-US" altLang="ko-KR" dirty="0" smtClean="0"/>
+                        <a:t>Reference counting</a:t>
+                      </a:r>
+                      <a:endParaRPr lang="ko-KR" altLang="en-US" dirty="0"/>
+                    </a:p>
+                  </a:txBody>
+                  <a:tcPr/>
+                </a:tc>
+                <a:tc>
+                  <a:txBody>
+                    <a:bodyPr/>
+                    <a:lstStyle/>
+                    <a:p>
+                      <a:pPr latinLnBrk="1"/>
+                      <a:r>
+                        <a:rPr lang="en-US" altLang="ko-KR" dirty="0" smtClean="0"/>
+                        <a:t>X</a:t>
+                      </a:r>
+                    </a:p>
+                  </a:txBody>
+                  <a:tcPr/>
+                </a:tc>
+                <a:tc>
+                  <a:txBody>
+                    <a:bodyPr/>
+                    <a:lstStyle/>
+                    <a:p>
+                      <a:pPr latinLnBrk="1"/>
+                      <a:r>
+                        <a:rPr lang="en-US" altLang="ko-KR" dirty="0" smtClean="0"/>
+                        <a:t>O</a:t>
+                      </a:r>
+                      <a:endParaRPr lang="ko-KR" altLang="en-US" dirty="0"/>
+                    </a:p>
+                  </a:txBody>
+                  <a:tcPr/>
+                </a:tc>
+                <a:extLst>
+                  <a:ext uri="{0D108BD9-81ED-4DB2-BD59-A6C34878D82A}">
+                    <a16:rowId xmlns:a16="http://schemas.microsoft.com/office/drawing/2014/main" val="3820442643"/>
+                  </a:ext>
+                </a:extLst>
+              </a:tr>
+              <a:tr h="185420">
+                <a:tc>
+                  <a:txBody>
+                    <a:bodyPr/>
+                    <a:lstStyle/>
+                    <a:p>
+                      <a:pPr latinLnBrk="1"/>
+                      <a:r>
+                        <a:rPr lang="en-US" altLang="ko-KR" dirty="0" smtClean="0">
+                          <a:solidFill>
+                            <a:schemeClr val="accent2"/>
+                          </a:solidFill>
+                        </a:rPr>
+                        <a:t>Data</a:t>
+                      </a:r>
+                      <a:r>
+                        <a:rPr lang="en-US" altLang="ko-KR" baseline="0" dirty="0" smtClean="0">
+                          <a:solidFill>
+                            <a:schemeClr val="accent2"/>
+                          </a:solidFill>
+                        </a:rPr>
+                        <a:t> type</a:t>
+                      </a:r>
+                      <a:endParaRPr lang="ko-KR" altLang="en-US" dirty="0">
+                        <a:solidFill>
+                          <a:schemeClr val="accent2"/>
+                        </a:solidFill>
+                      </a:endParaRPr>
+                    </a:p>
+                  </a:txBody>
+                  <a:tcPr/>
+                </a:tc>
+                <a:tc>
+                  <a:txBody>
+                    <a:bodyPr/>
+                    <a:lstStyle/>
+                    <a:p>
+                      <a:pPr latinLnBrk="1"/>
+                      <a:r>
+                        <a:rPr lang="ko-KR" altLang="en-US" dirty="0" smtClean="0">
+                          <a:solidFill>
+                            <a:schemeClr val="accent2"/>
+                          </a:solidFill>
+                        </a:rPr>
+                        <a:t>값</a:t>
+                      </a:r>
+                      <a:endParaRPr lang="en-US" altLang="ko-KR" dirty="0" smtClean="0">
+                        <a:solidFill>
+                          <a:schemeClr val="accent2"/>
+                        </a:solidFill>
+                      </a:endParaRPr>
+                    </a:p>
+                  </a:txBody>
+                  <a:tcPr/>
+                </a:tc>
+                <a:tc>
+                  <a:txBody>
+                    <a:bodyPr/>
+                    <a:lstStyle/>
+                    <a:p>
+                      <a:pPr latinLnBrk="1"/>
+                      <a:r>
+                        <a:rPr lang="ko-KR" altLang="en-US" dirty="0" smtClean="0">
+                          <a:solidFill>
+                            <a:schemeClr val="accent2"/>
+                          </a:solidFill>
+                        </a:rPr>
+                        <a:t>참조</a:t>
+                      </a:r>
+                      <a:endParaRPr lang="ko-KR" altLang="en-US" dirty="0">
+                        <a:solidFill>
+                          <a:schemeClr val="accent2"/>
+                        </a:solidFill>
+                      </a:endParaRPr>
+                    </a:p>
+                  </a:txBody>
+                  <a:tcPr/>
+                </a:tc>
+                <a:extLst>
+                  <a:ext uri="{0D108BD9-81ED-4DB2-BD59-A6C34878D82A}">
+                    <a16:rowId xmlns:a16="http://schemas.microsoft.com/office/drawing/2014/main" val="3177822037"/>
+                  </a:ext>
+                </a:extLst>
+              </a:tr>
+            </a:tbl>
+          </a:graphicData>
+        </a:graphic>
+      </p:graphicFrame>
+    </p:spTree>
+    <p:extLst>
+      <p:ext uri="{BB962C8B-B14F-4D97-AF65-F5344CB8AC3E}">
+        <p14:creationId xmlns:p14="http://schemas.microsoft.com/office/powerpoint/2010/main" val="2926061900"/>
+      </p:ext>
+    </p:extLst>
+  </p:cSld>
+  <p:clrMapOvr>
+    <a:masterClrMapping/>
+  </p:clrMapOvr>
+</p:sld>
+</file>
+
+<file path=ppt/slides/slide72.xml><?xml version="1.0" encoding="utf-8"?>
+<p:sld xmlns:a="http://schemas.openxmlformats.org/drawingml/2006/main" xmlns:r="http://schemas.openxmlformats.org/officeDocument/2006/relationships" xmlns:p="http://schemas.openxmlformats.org/presentationml/2006/main">
+  <p:cSld>
+    <p:spTree>
+      <p:nvGrpSpPr>
+        <p:cNvPr id="1" name=""/>
+        <p:cNvGrpSpPr/>
+        <p:nvPr/>
+      </p:nvGrpSpPr>
+      <p:grpSpPr>
+        <a:xfrm>
+          <a:off x="0" y="0"/>
+          <a:ext cx="0" cy="0"/>
+          <a:chOff x="0" y="0"/>
+          <a:chExt cx="0" cy="0"/>
+        </a:xfrm>
+      </p:grpSpPr>
+      <p:sp>
+        <p:nvSpPr>
+          <p:cNvPr id="2" name="제목 1"/>
+          <p:cNvSpPr>
+            <a:spLocks noGrp="1"/>
+          </p:cNvSpPr>
+          <p:nvPr>
+            <p:ph type="title"/>
+          </p:nvPr>
+        </p:nvSpPr>
+        <p:spPr/>
+        <p:txBody>
+          <a:bodyPr/>
+          <a:lstStyle/>
+          <a:p>
+            <a:r>
+              <a:rPr lang="ko-KR" altLang="en-US" dirty="0" smtClean="0"/>
+              <a:t>구조체와 클래스</a:t>
+            </a:r>
+            <a:endParaRPr lang="ko-KR" altLang="en-US" dirty="0"/>
+          </a:p>
+        </p:txBody>
+      </p:sp>
+      <p:sp>
+        <p:nvSpPr>
+          <p:cNvPr id="3" name="내용 개체 틀 2"/>
+          <p:cNvSpPr>
+            <a:spLocks noGrp="1"/>
+          </p:cNvSpPr>
+          <p:nvPr>
+            <p:ph idx="1"/>
+          </p:nvPr>
+        </p:nvSpPr>
+        <p:spPr/>
+        <p:txBody>
+          <a:bodyPr>
+            <a:normAutofit/>
+          </a:bodyPr>
+          <a:lstStyle/>
+          <a:p>
+            <a:r>
+              <a:rPr lang="ko-KR" altLang="en-US" dirty="0" smtClean="0"/>
+              <a:t>구조체와 클래스의 차이</a:t>
+            </a:r>
+            <a:endParaRPr lang="en-US" altLang="ko-KR" dirty="0" smtClean="0"/>
+          </a:p>
+          <a:p>
+            <a:pPr lvl="1"/>
+            <a:r>
+              <a:rPr lang="ko-KR" altLang="en-US" dirty="0" smtClean="0"/>
+              <a:t>함수의 전달 인자로 전달될 때</a:t>
+            </a:r>
+            <a:endParaRPr lang="en-US" altLang="ko-KR" dirty="0"/>
+          </a:p>
+          <a:p>
+            <a:pPr lvl="2"/>
+            <a:r>
+              <a:rPr lang="ko-KR" altLang="en-US" dirty="0" smtClean="0"/>
+              <a:t>구조체</a:t>
+            </a:r>
+            <a:r>
+              <a:rPr lang="en-US" altLang="ko-KR" dirty="0" smtClean="0"/>
+              <a:t>:</a:t>
+            </a:r>
+            <a:r>
+              <a:rPr lang="ko-KR" altLang="en-US" dirty="0" smtClean="0"/>
+              <a:t> </a:t>
+            </a:r>
+            <a:r>
+              <a:rPr lang="ko-KR" altLang="en-US" dirty="0" smtClean="0">
+                <a:solidFill>
+                  <a:schemeClr val="accent3"/>
+                </a:solidFill>
+              </a:rPr>
+              <a:t>값이 복사</a:t>
+            </a:r>
+            <a:r>
+              <a:rPr lang="ko-KR" altLang="en-US" dirty="0" smtClean="0"/>
+              <a:t>되어 전달</a:t>
+            </a:r>
+            <a:endParaRPr lang="en-US" altLang="ko-KR" dirty="0" smtClean="0"/>
+          </a:p>
+          <a:p>
+            <a:pPr lvl="2"/>
+            <a:r>
+              <a:rPr lang="ko-KR" altLang="en-US" dirty="0" smtClean="0"/>
+              <a:t>클래스</a:t>
+            </a:r>
+            <a:r>
+              <a:rPr lang="en-US" altLang="ko-KR" dirty="0" smtClean="0"/>
+              <a:t>:</a:t>
+            </a:r>
+            <a:r>
+              <a:rPr lang="ko-KR" altLang="en-US" dirty="0" smtClean="0"/>
+              <a:t> 클래스의 </a:t>
+            </a:r>
+            <a:r>
+              <a:rPr lang="ko-KR" altLang="en-US" dirty="0" err="1" smtClean="0">
+                <a:solidFill>
+                  <a:schemeClr val="accent2"/>
+                </a:solidFill>
+              </a:rPr>
+              <a:t>참조값</a:t>
+            </a:r>
+            <a:r>
+              <a:rPr lang="ko-KR" altLang="en-US" dirty="0" smtClean="0"/>
+              <a:t> 전달</a:t>
+            </a:r>
+            <a:endParaRPr lang="en-US" altLang="ko-KR" dirty="0"/>
+          </a:p>
+          <a:p>
+            <a:endParaRPr lang="en-US" altLang="ko-KR" dirty="0" smtClean="0"/>
+          </a:p>
+          <a:p>
+            <a:endParaRPr lang="en-US" altLang="ko-KR" dirty="0"/>
+          </a:p>
+          <a:p>
+            <a:endParaRPr lang="en-US" altLang="ko-KR" dirty="0" smtClean="0"/>
+          </a:p>
+          <a:p>
+            <a:endParaRPr lang="en-US" altLang="ko-KR" dirty="0"/>
+          </a:p>
+          <a:p>
+            <a:pPr marL="454914" lvl="1" indent="0">
+              <a:buNone/>
+            </a:pPr>
+            <a:endParaRPr lang="en-US" altLang="ko-KR" dirty="0" smtClean="0"/>
+          </a:p>
+          <a:p>
+            <a:endParaRPr lang="en-US" altLang="ko-KR" dirty="0"/>
+          </a:p>
+          <a:p>
+            <a:endParaRPr lang="en-US" altLang="ko-KR" dirty="0" smtClean="0"/>
+          </a:p>
+          <a:p>
+            <a:endParaRPr lang="en-US" altLang="ko-KR" dirty="0"/>
+          </a:p>
+          <a:p>
+            <a:endParaRPr lang="en-US" altLang="ko-KR" dirty="0" smtClean="0"/>
+          </a:p>
+          <a:p>
+            <a:endParaRPr lang="en-US" altLang="ko-KR" dirty="0"/>
+          </a:p>
+        </p:txBody>
+      </p:sp>
+      <p:sp>
+        <p:nvSpPr>
+          <p:cNvPr id="4" name="TextBox 3"/>
+          <p:cNvSpPr txBox="1"/>
+          <p:nvPr/>
+        </p:nvSpPr>
+        <p:spPr>
+          <a:xfrm>
+            <a:off x="971600" y="2204864"/>
+            <a:ext cx="8172400" cy="4401205"/>
+          </a:xfrm>
+          <a:prstGeom prst="rect">
+            <a:avLst/>
+          </a:prstGeom>
+          <a:noFill/>
+        </p:spPr>
+        <p:txBody>
+          <a:bodyPr wrap="square" rtlCol="0">
+            <a:spAutoFit/>
+          </a:bodyPr>
+          <a:lstStyle/>
+          <a:p>
+            <a:r>
+              <a:rPr lang="en-US" altLang="ko-KR" sz="1400" dirty="0" err="1" smtClean="0"/>
+              <a:t>struct</a:t>
+            </a:r>
+            <a:r>
+              <a:rPr lang="en-US" altLang="ko-KR" sz="1400" dirty="0" smtClean="0"/>
+              <a:t> </a:t>
+            </a:r>
+            <a:r>
+              <a:rPr lang="en-US" altLang="ko-KR" sz="1400" dirty="0" err="1">
+                <a:solidFill>
+                  <a:schemeClr val="accent3"/>
+                </a:solidFill>
+              </a:rPr>
+              <a:t>SampleStruct</a:t>
+            </a:r>
+            <a:r>
+              <a:rPr lang="en-US" altLang="ko-KR" sz="1400" dirty="0"/>
+              <a:t> {</a:t>
+            </a:r>
+          </a:p>
+          <a:p>
+            <a:r>
+              <a:rPr lang="en-US" altLang="ko-KR" sz="1400" dirty="0"/>
+              <a:t>	</a:t>
+            </a:r>
+            <a:r>
+              <a:rPr lang="en-US" altLang="ko-KR" sz="1400" dirty="0" err="1"/>
+              <a:t>var</a:t>
+            </a:r>
+            <a:r>
+              <a:rPr lang="en-US" altLang="ko-KR" sz="1400" dirty="0"/>
+              <a:t> name: String</a:t>
+            </a:r>
+          </a:p>
+          <a:p>
+            <a:r>
+              <a:rPr lang="en-US" altLang="ko-KR" sz="1400" dirty="0"/>
+              <a:t>	</a:t>
+            </a:r>
+            <a:r>
+              <a:rPr lang="en-US" altLang="ko-KR" sz="1400" dirty="0" err="1"/>
+              <a:t>var</a:t>
+            </a:r>
+            <a:r>
+              <a:rPr lang="en-US" altLang="ko-KR" sz="1400" dirty="0"/>
+              <a:t> count: </a:t>
+            </a:r>
+            <a:r>
+              <a:rPr lang="en-US" altLang="ko-KR" sz="1400" dirty="0" err="1"/>
+              <a:t>Int</a:t>
+            </a:r>
+            <a:endParaRPr lang="en-US" altLang="ko-KR" sz="1400" dirty="0"/>
+          </a:p>
+          <a:p>
+            <a:r>
+              <a:rPr lang="en-US" altLang="ko-KR" sz="1400" dirty="0"/>
+              <a:t>}</a:t>
+            </a:r>
+          </a:p>
+          <a:p>
+            <a:endParaRPr lang="en-US" altLang="ko-KR" sz="1400" dirty="0"/>
+          </a:p>
+          <a:p>
+            <a:r>
+              <a:rPr lang="en-US" altLang="ko-KR" sz="1400" dirty="0" err="1"/>
+              <a:t>var</a:t>
+            </a:r>
+            <a:r>
+              <a:rPr lang="en-US" altLang="ko-KR" sz="1400" dirty="0"/>
+              <a:t> </a:t>
+            </a:r>
+            <a:r>
+              <a:rPr lang="en-US" altLang="ko-KR" sz="1400" dirty="0" err="1"/>
+              <a:t>testStruct</a:t>
+            </a:r>
+            <a:r>
+              <a:rPr lang="en-US" altLang="ko-KR" sz="1400" dirty="0"/>
+              <a:t>: </a:t>
+            </a:r>
+            <a:r>
+              <a:rPr lang="en-US" altLang="ko-KR" sz="1400" dirty="0" err="1">
+                <a:solidFill>
+                  <a:schemeClr val="accent3"/>
+                </a:solidFill>
+              </a:rPr>
+              <a:t>SampleStruct</a:t>
+            </a:r>
+            <a:r>
+              <a:rPr lang="en-US" altLang="ko-KR" sz="1400" dirty="0"/>
+              <a:t> = </a:t>
+            </a:r>
+            <a:r>
+              <a:rPr lang="en-US" altLang="ko-KR" sz="1400" dirty="0" err="1"/>
+              <a:t>SampleStruct</a:t>
+            </a:r>
+            <a:r>
+              <a:rPr lang="en-US" altLang="ko-KR" sz="1400" dirty="0"/>
+              <a:t>(name: "Sample </a:t>
+            </a:r>
+            <a:r>
+              <a:rPr lang="en-US" altLang="ko-KR" sz="1400" dirty="0" err="1"/>
+              <a:t>Struct</a:t>
+            </a:r>
+            <a:r>
+              <a:rPr lang="en-US" altLang="ko-KR" sz="1400" dirty="0"/>
+              <a:t>", count: 1)</a:t>
+            </a:r>
+          </a:p>
+          <a:p>
+            <a:endParaRPr lang="en-US" altLang="ko-KR" sz="1400" dirty="0"/>
+          </a:p>
+          <a:p>
+            <a:r>
+              <a:rPr lang="en-US" altLang="ko-KR" sz="1400" dirty="0"/>
+              <a:t>class </a:t>
+            </a:r>
+            <a:r>
+              <a:rPr lang="en-US" altLang="ko-KR" sz="1400" dirty="0" err="1">
+                <a:solidFill>
+                  <a:schemeClr val="accent3"/>
+                </a:solidFill>
+              </a:rPr>
+              <a:t>SampleClass</a:t>
+            </a:r>
+            <a:r>
+              <a:rPr lang="en-US" altLang="ko-KR" sz="1400" dirty="0"/>
+              <a:t> {</a:t>
+            </a:r>
+          </a:p>
+          <a:p>
+            <a:r>
+              <a:rPr lang="en-US" altLang="ko-KR" sz="1400" dirty="0"/>
+              <a:t>	</a:t>
+            </a:r>
+            <a:r>
+              <a:rPr lang="en-US" altLang="ko-KR" sz="1400" dirty="0" err="1"/>
+              <a:t>var</a:t>
+            </a:r>
+            <a:r>
+              <a:rPr lang="en-US" altLang="ko-KR" sz="1400" dirty="0"/>
+              <a:t> name: String = ""</a:t>
+            </a:r>
+          </a:p>
+          <a:p>
+            <a:r>
+              <a:rPr lang="en-US" altLang="ko-KR" sz="1400" dirty="0"/>
+              <a:t>	</a:t>
+            </a:r>
+            <a:r>
+              <a:rPr lang="en-US" altLang="ko-KR" sz="1400" dirty="0" err="1"/>
+              <a:t>var</a:t>
+            </a:r>
+            <a:r>
+              <a:rPr lang="en-US" altLang="ko-KR" sz="1400" dirty="0"/>
+              <a:t> count: </a:t>
+            </a:r>
+            <a:r>
+              <a:rPr lang="en-US" altLang="ko-KR" sz="1400" dirty="0" err="1"/>
+              <a:t>Int</a:t>
+            </a:r>
+            <a:r>
+              <a:rPr lang="en-US" altLang="ko-KR" sz="1400" dirty="0"/>
+              <a:t> = 0</a:t>
+            </a:r>
+          </a:p>
+          <a:p>
+            <a:r>
+              <a:rPr lang="en-US" altLang="ko-KR" sz="1400" dirty="0"/>
+              <a:t>}</a:t>
+            </a:r>
+          </a:p>
+          <a:p>
+            <a:endParaRPr lang="en-US" altLang="ko-KR" sz="1400" dirty="0"/>
+          </a:p>
+          <a:p>
+            <a:r>
+              <a:rPr lang="en-US" altLang="ko-KR" sz="1400" dirty="0" err="1"/>
+              <a:t>var</a:t>
+            </a:r>
+            <a:r>
+              <a:rPr lang="en-US" altLang="ko-KR" sz="1400" dirty="0"/>
+              <a:t> </a:t>
+            </a:r>
+            <a:r>
+              <a:rPr lang="en-US" altLang="ko-KR" sz="1400" dirty="0" err="1"/>
+              <a:t>testClass</a:t>
+            </a:r>
+            <a:r>
+              <a:rPr lang="en-US" altLang="ko-KR" sz="1400" dirty="0"/>
+              <a:t>: </a:t>
+            </a:r>
+            <a:r>
+              <a:rPr lang="en-US" altLang="ko-KR" sz="1400" dirty="0" err="1">
+                <a:solidFill>
+                  <a:schemeClr val="accent3"/>
+                </a:solidFill>
+              </a:rPr>
+              <a:t>SampleClass</a:t>
+            </a:r>
+            <a:r>
+              <a:rPr lang="en-US" altLang="ko-KR" sz="1400" dirty="0"/>
+              <a:t> = </a:t>
+            </a:r>
+            <a:r>
+              <a:rPr lang="en-US" altLang="ko-KR" sz="1400" dirty="0" err="1"/>
+              <a:t>SampleClass</a:t>
+            </a:r>
+            <a:r>
+              <a:rPr lang="en-US" altLang="ko-KR" sz="1400" dirty="0"/>
+              <a:t>()</a:t>
+            </a:r>
+          </a:p>
+          <a:p>
+            <a:endParaRPr lang="en-US" altLang="ko-KR" sz="1400" dirty="0"/>
+          </a:p>
+          <a:p>
+            <a:r>
+              <a:rPr lang="en-US" altLang="ko-KR" sz="1400" dirty="0"/>
+              <a:t>testClass.name = "Sample Class"</a:t>
+            </a:r>
+          </a:p>
+          <a:p>
+            <a:r>
+              <a:rPr lang="en-US" altLang="ko-KR" sz="1400" dirty="0" err="1"/>
+              <a:t>testClass.count</a:t>
+            </a:r>
+            <a:r>
+              <a:rPr lang="en-US" altLang="ko-KR" sz="1400" dirty="0"/>
+              <a:t> = 1</a:t>
+            </a:r>
+          </a:p>
+          <a:p>
+            <a:endParaRPr lang="en-US" altLang="ko-KR" sz="1400" dirty="0"/>
+          </a:p>
+          <a:p>
+            <a:r>
+              <a:rPr lang="en-US" altLang="ko-KR" sz="1400" dirty="0"/>
+              <a:t>print("------ before change ------")</a:t>
+            </a:r>
+          </a:p>
+          <a:p>
+            <a:r>
+              <a:rPr lang="en-US" altLang="ko-KR" sz="1400" dirty="0"/>
+              <a:t>print("Sample </a:t>
+            </a:r>
+            <a:r>
+              <a:rPr lang="en-US" altLang="ko-KR" sz="1400" dirty="0" err="1"/>
+              <a:t>Struct</a:t>
+            </a:r>
+            <a:r>
+              <a:rPr lang="en-US" altLang="ko-KR" sz="1400" dirty="0"/>
+              <a:t>: Name: \(testStruct.name), Count: \(</a:t>
+            </a:r>
+            <a:r>
+              <a:rPr lang="en-US" altLang="ko-KR" sz="1400" dirty="0" err="1"/>
+              <a:t>testStruct.count</a:t>
+            </a:r>
+            <a:r>
+              <a:rPr lang="en-US" altLang="ko-KR" sz="1400" dirty="0"/>
+              <a:t>)")</a:t>
+            </a:r>
+          </a:p>
+          <a:p>
+            <a:r>
+              <a:rPr lang="en-US" altLang="ko-KR" sz="1400" dirty="0"/>
+              <a:t>print("Sample Class : Name: \(testClass.name), Count: \(</a:t>
+            </a:r>
+            <a:r>
+              <a:rPr lang="en-US" altLang="ko-KR" sz="1400" dirty="0" err="1"/>
+              <a:t>testClass.count</a:t>
+            </a:r>
+            <a:r>
+              <a:rPr lang="en-US" altLang="ko-KR" sz="1400" dirty="0" smtClean="0"/>
+              <a:t>)")</a:t>
+            </a:r>
+            <a:endParaRPr lang="en-US" altLang="ko-KR" sz="1400" dirty="0"/>
+          </a:p>
+        </p:txBody>
+      </p:sp>
+    </p:spTree>
+    <p:extLst>
+      <p:ext uri="{BB962C8B-B14F-4D97-AF65-F5344CB8AC3E}">
+        <p14:creationId xmlns:p14="http://schemas.microsoft.com/office/powerpoint/2010/main" val="2473512210"/>
+      </p:ext>
+    </p:extLst>
+  </p:cSld>
+  <p:clrMapOvr>
+    <a:masterClrMapping/>
+  </p:clrMapOvr>
+</p:sld>
+</file>
+
+<file path=ppt/slides/slide73.xml><?xml version="1.0" encoding="utf-8"?>
+<p:sld xmlns:a="http://schemas.openxmlformats.org/drawingml/2006/main" xmlns:r="http://schemas.openxmlformats.org/officeDocument/2006/relationships" xmlns:p="http://schemas.openxmlformats.org/presentationml/2006/main">
+  <p:cSld>
+    <p:spTree>
+      <p:nvGrpSpPr>
+        <p:cNvPr id="1" name=""/>
+        <p:cNvGrpSpPr/>
+        <p:nvPr/>
+      </p:nvGrpSpPr>
+      <p:grpSpPr>
+        <a:xfrm>
+          <a:off x="0" y="0"/>
+          <a:ext cx="0" cy="0"/>
+          <a:chOff x="0" y="0"/>
+          <a:chExt cx="0" cy="0"/>
+        </a:xfrm>
+      </p:grpSpPr>
+      <p:sp>
+        <p:nvSpPr>
+          <p:cNvPr id="2" name="제목 1"/>
+          <p:cNvSpPr>
+            <a:spLocks noGrp="1"/>
+          </p:cNvSpPr>
+          <p:nvPr>
+            <p:ph type="title"/>
+          </p:nvPr>
+        </p:nvSpPr>
+        <p:spPr/>
+        <p:txBody>
+          <a:bodyPr/>
+          <a:lstStyle/>
+          <a:p>
+            <a:r>
+              <a:rPr lang="ko-KR" altLang="en-US" dirty="0" smtClean="0"/>
+              <a:t>구조체와 클래스</a:t>
+            </a:r>
+            <a:endParaRPr lang="ko-KR" altLang="en-US" dirty="0"/>
+          </a:p>
+        </p:txBody>
+      </p:sp>
+      <p:sp>
+        <p:nvSpPr>
+          <p:cNvPr id="3" name="내용 개체 틀 2"/>
+          <p:cNvSpPr>
+            <a:spLocks noGrp="1"/>
+          </p:cNvSpPr>
+          <p:nvPr>
+            <p:ph idx="1"/>
+          </p:nvPr>
+        </p:nvSpPr>
+        <p:spPr/>
+        <p:txBody>
+          <a:bodyPr>
+            <a:normAutofit/>
+          </a:bodyPr>
+          <a:lstStyle/>
+          <a:p>
+            <a:r>
+              <a:rPr lang="ko-KR" altLang="en-US" dirty="0" smtClean="0"/>
+              <a:t>구조체와 클래스의 차이</a:t>
+            </a:r>
+            <a:endParaRPr lang="en-US" altLang="ko-KR" dirty="0" smtClean="0"/>
+          </a:p>
+          <a:p>
+            <a:endParaRPr lang="en-US" altLang="ko-KR" dirty="0"/>
+          </a:p>
+          <a:p>
+            <a:endParaRPr lang="en-US" altLang="ko-KR" dirty="0" smtClean="0"/>
+          </a:p>
+          <a:p>
+            <a:endParaRPr lang="en-US" altLang="ko-KR" dirty="0"/>
+          </a:p>
+          <a:p>
+            <a:pPr marL="454914" lvl="1" indent="0">
+              <a:buNone/>
+            </a:pPr>
+            <a:endParaRPr lang="en-US" altLang="ko-KR" dirty="0" smtClean="0"/>
+          </a:p>
+          <a:p>
+            <a:endParaRPr lang="en-US" altLang="ko-KR" dirty="0"/>
+          </a:p>
+          <a:p>
+            <a:endParaRPr lang="en-US" altLang="ko-KR" dirty="0" smtClean="0"/>
+          </a:p>
+          <a:p>
+            <a:endParaRPr lang="en-US" altLang="ko-KR" dirty="0"/>
+          </a:p>
+          <a:p>
+            <a:endParaRPr lang="en-US" altLang="ko-KR" dirty="0" smtClean="0"/>
+          </a:p>
+          <a:p>
+            <a:endParaRPr lang="en-US" altLang="ko-KR" dirty="0"/>
+          </a:p>
+        </p:txBody>
+      </p:sp>
+      <p:sp>
+        <p:nvSpPr>
+          <p:cNvPr id="4" name="TextBox 3"/>
+          <p:cNvSpPr txBox="1"/>
+          <p:nvPr/>
+        </p:nvSpPr>
+        <p:spPr>
+          <a:xfrm>
+            <a:off x="971600" y="1196752"/>
+            <a:ext cx="8172400" cy="3970318"/>
+          </a:xfrm>
+          <a:prstGeom prst="rect">
+            <a:avLst/>
+          </a:prstGeom>
+          <a:noFill/>
+        </p:spPr>
+        <p:txBody>
+          <a:bodyPr wrap="square" rtlCol="0">
+            <a:spAutoFit/>
+          </a:bodyPr>
+          <a:lstStyle/>
+          <a:p>
+            <a:r>
+              <a:rPr lang="en-US" altLang="ko-KR" sz="1400" dirty="0" err="1" smtClean="0"/>
+              <a:t>func</a:t>
+            </a:r>
+            <a:r>
+              <a:rPr lang="en-US" altLang="ko-KR" sz="1400" dirty="0" smtClean="0"/>
+              <a:t> </a:t>
+            </a:r>
+            <a:r>
+              <a:rPr lang="en-US" altLang="ko-KR" sz="1400" dirty="0" err="1">
+                <a:solidFill>
+                  <a:schemeClr val="accent2"/>
+                </a:solidFill>
+              </a:rPr>
+              <a:t>changeStructProperties</a:t>
+            </a:r>
+            <a:r>
+              <a:rPr lang="en-US" altLang="ko-KR" sz="1400" dirty="0"/>
+              <a:t>(_ info: </a:t>
+            </a:r>
+            <a:r>
+              <a:rPr lang="en-US" altLang="ko-KR" sz="1400" dirty="0" err="1"/>
+              <a:t>SampleStruct</a:t>
+            </a:r>
+            <a:r>
+              <a:rPr lang="en-US" altLang="ko-KR" sz="1400" dirty="0"/>
+              <a:t>) {</a:t>
+            </a:r>
+          </a:p>
+          <a:p>
+            <a:r>
+              <a:rPr lang="en-US" altLang="ko-KR" sz="1400" dirty="0"/>
+              <a:t>	</a:t>
+            </a:r>
+            <a:r>
+              <a:rPr lang="en-US" altLang="ko-KR" sz="1400" dirty="0" err="1"/>
+              <a:t>var</a:t>
+            </a:r>
+            <a:r>
+              <a:rPr lang="en-US" altLang="ko-KR" sz="1400" dirty="0"/>
+              <a:t> </a:t>
+            </a:r>
+            <a:r>
+              <a:rPr lang="en-US" altLang="ko-KR" sz="1400" dirty="0" err="1"/>
+              <a:t>copiedInfo</a:t>
+            </a:r>
+            <a:r>
+              <a:rPr lang="en-US" altLang="ko-KR" sz="1400" dirty="0"/>
+              <a:t>: </a:t>
+            </a:r>
+            <a:r>
+              <a:rPr lang="en-US" altLang="ko-KR" sz="1400" dirty="0" err="1"/>
+              <a:t>SampleStruct</a:t>
+            </a:r>
+            <a:r>
+              <a:rPr lang="en-US" altLang="ko-KR" sz="1400" dirty="0"/>
+              <a:t> = info</a:t>
+            </a:r>
+          </a:p>
+          <a:p>
+            <a:r>
+              <a:rPr lang="en-US" altLang="ko-KR" sz="1400" dirty="0"/>
+              <a:t>	copiedInfo.name = "</a:t>
+            </a:r>
+            <a:r>
+              <a:rPr lang="en-US" altLang="ko-KR" sz="1400" dirty="0" err="1"/>
+              <a:t>Struct</a:t>
+            </a:r>
+            <a:r>
+              <a:rPr lang="en-US" altLang="ko-KR" sz="1400" dirty="0"/>
+              <a:t> name is changed."</a:t>
+            </a:r>
+          </a:p>
+          <a:p>
+            <a:r>
+              <a:rPr lang="en-US" altLang="ko-KR" sz="1400" dirty="0"/>
+              <a:t>	</a:t>
+            </a:r>
+            <a:r>
+              <a:rPr lang="en-US" altLang="ko-KR" sz="1400" dirty="0" err="1"/>
+              <a:t>copiedInfo.count</a:t>
+            </a:r>
+            <a:r>
+              <a:rPr lang="en-US" altLang="ko-KR" sz="1400" dirty="0"/>
+              <a:t> = 2</a:t>
+            </a:r>
+          </a:p>
+          <a:p>
+            <a:r>
+              <a:rPr lang="en-US" altLang="ko-KR" sz="1400" dirty="0"/>
+              <a:t>}</a:t>
+            </a:r>
+          </a:p>
+          <a:p>
+            <a:endParaRPr lang="en-US" altLang="ko-KR" sz="1400" dirty="0"/>
+          </a:p>
+          <a:p>
+            <a:r>
+              <a:rPr lang="en-US" altLang="ko-KR" sz="1400" dirty="0" err="1"/>
+              <a:t>func</a:t>
+            </a:r>
+            <a:r>
+              <a:rPr lang="en-US" altLang="ko-KR" sz="1400" dirty="0"/>
+              <a:t> </a:t>
+            </a:r>
+            <a:r>
+              <a:rPr lang="en-US" altLang="ko-KR" sz="1400" dirty="0" err="1">
+                <a:solidFill>
+                  <a:schemeClr val="accent2"/>
+                </a:solidFill>
+              </a:rPr>
+              <a:t>changeClassProperties</a:t>
+            </a:r>
+            <a:r>
+              <a:rPr lang="en-US" altLang="ko-KR" sz="1400" dirty="0"/>
+              <a:t>(_ info: </a:t>
+            </a:r>
+            <a:r>
+              <a:rPr lang="en-US" altLang="ko-KR" sz="1400" dirty="0" err="1"/>
+              <a:t>SampleClass</a:t>
+            </a:r>
+            <a:r>
+              <a:rPr lang="en-US" altLang="ko-KR" sz="1400" dirty="0"/>
+              <a:t>) {</a:t>
+            </a:r>
+          </a:p>
+          <a:p>
+            <a:r>
+              <a:rPr lang="en-US" altLang="ko-KR" sz="1400" dirty="0"/>
+              <a:t>	let </a:t>
+            </a:r>
+            <a:r>
+              <a:rPr lang="en-US" altLang="ko-KR" sz="1400" dirty="0" err="1"/>
+              <a:t>copiedInfo</a:t>
+            </a:r>
+            <a:r>
+              <a:rPr lang="en-US" altLang="ko-KR" sz="1400" dirty="0"/>
+              <a:t>: </a:t>
+            </a:r>
+            <a:r>
+              <a:rPr lang="en-US" altLang="ko-KR" sz="1400" dirty="0" err="1"/>
+              <a:t>SampleClass</a:t>
+            </a:r>
+            <a:r>
+              <a:rPr lang="en-US" altLang="ko-KR" sz="1400" dirty="0"/>
+              <a:t> = info</a:t>
+            </a:r>
+          </a:p>
+          <a:p>
+            <a:r>
+              <a:rPr lang="en-US" altLang="ko-KR" sz="1400" dirty="0"/>
+              <a:t>	copiedInfo.name = "Class name is changed."</a:t>
+            </a:r>
+          </a:p>
+          <a:p>
+            <a:r>
+              <a:rPr lang="en-US" altLang="ko-KR" sz="1400" dirty="0"/>
+              <a:t>	</a:t>
+            </a:r>
+            <a:r>
+              <a:rPr lang="en-US" altLang="ko-KR" sz="1400" dirty="0" err="1"/>
+              <a:t>copiedInfo.count</a:t>
+            </a:r>
+            <a:r>
+              <a:rPr lang="en-US" altLang="ko-KR" sz="1400" dirty="0"/>
+              <a:t> = 2</a:t>
+            </a:r>
+          </a:p>
+          <a:p>
+            <a:r>
+              <a:rPr lang="en-US" altLang="ko-KR" sz="1400" dirty="0"/>
+              <a:t>}</a:t>
+            </a:r>
+          </a:p>
+          <a:p>
+            <a:endParaRPr lang="en-US" altLang="ko-KR" sz="1400" dirty="0"/>
+          </a:p>
+          <a:p>
+            <a:r>
+              <a:rPr lang="en-US" altLang="ko-KR" sz="1400" dirty="0" err="1">
+                <a:solidFill>
+                  <a:schemeClr val="accent2"/>
+                </a:solidFill>
+              </a:rPr>
+              <a:t>changeStructProperties</a:t>
+            </a:r>
+            <a:r>
+              <a:rPr lang="en-US" altLang="ko-KR" sz="1400" dirty="0">
+                <a:solidFill>
+                  <a:schemeClr val="accent3"/>
+                </a:solidFill>
+              </a:rPr>
+              <a:t>(</a:t>
+            </a:r>
+            <a:r>
+              <a:rPr lang="en-US" altLang="ko-KR" sz="1400" dirty="0" err="1">
+                <a:solidFill>
+                  <a:schemeClr val="accent3"/>
+                </a:solidFill>
+              </a:rPr>
+              <a:t>testStruct</a:t>
+            </a:r>
+            <a:r>
+              <a:rPr lang="en-US" altLang="ko-KR" sz="1400" dirty="0">
+                <a:solidFill>
+                  <a:schemeClr val="accent3"/>
+                </a:solidFill>
+              </a:rPr>
+              <a:t>)</a:t>
+            </a:r>
+          </a:p>
+          <a:p>
+            <a:r>
+              <a:rPr lang="en-US" altLang="ko-KR" sz="1400" dirty="0" err="1">
+                <a:solidFill>
+                  <a:schemeClr val="accent2"/>
+                </a:solidFill>
+              </a:rPr>
+              <a:t>changeClassProperties</a:t>
+            </a:r>
+            <a:r>
+              <a:rPr lang="en-US" altLang="ko-KR" sz="1400" dirty="0">
+                <a:solidFill>
+                  <a:schemeClr val="accent3"/>
+                </a:solidFill>
+              </a:rPr>
+              <a:t>(</a:t>
+            </a:r>
+            <a:r>
+              <a:rPr lang="en-US" altLang="ko-KR" sz="1400" dirty="0" err="1">
+                <a:solidFill>
+                  <a:schemeClr val="accent3"/>
+                </a:solidFill>
+              </a:rPr>
+              <a:t>testClass</a:t>
+            </a:r>
+            <a:r>
+              <a:rPr lang="en-US" altLang="ko-KR" sz="1400" dirty="0">
+                <a:solidFill>
+                  <a:schemeClr val="accent3"/>
+                </a:solidFill>
+              </a:rPr>
+              <a:t>)</a:t>
+            </a:r>
+          </a:p>
+          <a:p>
+            <a:endParaRPr lang="en-US" altLang="ko-KR" sz="1400" dirty="0"/>
+          </a:p>
+          <a:p>
+            <a:r>
+              <a:rPr lang="en-US" altLang="ko-KR" sz="1400" dirty="0"/>
+              <a:t>print("------ after change ------")</a:t>
+            </a:r>
+          </a:p>
+          <a:p>
+            <a:r>
+              <a:rPr lang="en-US" altLang="ko-KR" sz="1400" dirty="0"/>
+              <a:t>print("Sample </a:t>
+            </a:r>
+            <a:r>
+              <a:rPr lang="en-US" altLang="ko-KR" sz="1400" dirty="0" err="1"/>
+              <a:t>Struct</a:t>
+            </a:r>
+            <a:r>
+              <a:rPr lang="en-US" altLang="ko-KR" sz="1400" dirty="0"/>
+              <a:t>: Name: \(testStruct.name), Count: \(</a:t>
+            </a:r>
+            <a:r>
+              <a:rPr lang="en-US" altLang="ko-KR" sz="1400" dirty="0" err="1"/>
+              <a:t>testStruct.count</a:t>
+            </a:r>
+            <a:r>
+              <a:rPr lang="en-US" altLang="ko-KR" sz="1400" dirty="0"/>
+              <a:t>)")</a:t>
+            </a:r>
+          </a:p>
+          <a:p>
+            <a:r>
+              <a:rPr lang="en-US" altLang="ko-KR" sz="1400" dirty="0"/>
+              <a:t>print("Sample Class : Name: \(testClass.name), Count: \(</a:t>
+            </a:r>
+            <a:r>
+              <a:rPr lang="en-US" altLang="ko-KR" sz="1400" dirty="0" err="1"/>
+              <a:t>testClass.count</a:t>
+            </a:r>
+            <a:r>
+              <a:rPr lang="en-US" altLang="ko-KR" sz="1400" dirty="0"/>
+              <a:t>)")</a:t>
+            </a:r>
+            <a:endParaRPr lang="ko-KR" altLang="en-US" sz="1400" dirty="0"/>
+          </a:p>
+        </p:txBody>
+      </p:sp>
+    </p:spTree>
+    <p:extLst>
+      <p:ext uri="{BB962C8B-B14F-4D97-AF65-F5344CB8AC3E}">
+        <p14:creationId xmlns:p14="http://schemas.microsoft.com/office/powerpoint/2010/main" val="1244378856"/>
+      </p:ext>
+    </p:extLst>
+  </p:cSld>
+  <p:clrMapOvr>
+    <a:masterClrMapping/>
+  </p:clrMapOvr>
+</p:sld>
+</file>
+
+<file path=ppt/slides/slide74.xml><?xml version="1.0" encoding="utf-8"?>
+<p:sld xmlns:a="http://schemas.openxmlformats.org/drawingml/2006/main" xmlns:r="http://schemas.openxmlformats.org/officeDocument/2006/relationships" xmlns:p="http://schemas.openxmlformats.org/presentationml/2006/main">
+  <p:cSld>
+    <p:spTree>
+      <p:nvGrpSpPr>
+        <p:cNvPr id="1" name=""/>
+        <p:cNvGrpSpPr/>
+        <p:nvPr/>
+      </p:nvGrpSpPr>
+      <p:grpSpPr>
+        <a:xfrm>
+          <a:off x="0" y="0"/>
+          <a:ext cx="0" cy="0"/>
+          <a:chOff x="0" y="0"/>
+          <a:chExt cx="0" cy="0"/>
+        </a:xfrm>
+      </p:grpSpPr>
+      <p:sp>
+        <p:nvSpPr>
+          <p:cNvPr id="2" name="제목 1"/>
+          <p:cNvSpPr>
+            <a:spLocks noGrp="1"/>
+          </p:cNvSpPr>
+          <p:nvPr>
+            <p:ph type="title"/>
+          </p:nvPr>
+        </p:nvSpPr>
+        <p:spPr/>
+        <p:txBody>
+          <a:bodyPr/>
+          <a:lstStyle/>
+          <a:p>
+            <a:r>
+              <a:rPr lang="ko-KR" altLang="en-US" dirty="0" smtClean="0"/>
+              <a:t>구조체와 클래스</a:t>
+            </a:r>
+            <a:endParaRPr lang="ko-KR" altLang="en-US" dirty="0"/>
+          </a:p>
+        </p:txBody>
+      </p:sp>
+      <p:sp>
+        <p:nvSpPr>
+          <p:cNvPr id="3" name="내용 개체 틀 2"/>
+          <p:cNvSpPr>
+            <a:spLocks noGrp="1"/>
+          </p:cNvSpPr>
+          <p:nvPr>
+            <p:ph idx="1"/>
+          </p:nvPr>
+        </p:nvSpPr>
+        <p:spPr/>
+        <p:txBody>
+          <a:bodyPr>
+            <a:normAutofit/>
+          </a:bodyPr>
+          <a:lstStyle/>
+          <a:p>
+            <a:r>
+              <a:rPr lang="ko-KR" altLang="en-US" dirty="0" smtClean="0"/>
+              <a:t>구조체와 클래스의 차이</a:t>
+            </a:r>
+            <a:endParaRPr lang="en-US" altLang="ko-KR" dirty="0" smtClean="0"/>
+          </a:p>
+          <a:p>
+            <a:endParaRPr lang="en-US" altLang="ko-KR" dirty="0"/>
+          </a:p>
+          <a:p>
+            <a:endParaRPr lang="en-US" altLang="ko-KR" dirty="0" smtClean="0"/>
+          </a:p>
+          <a:p>
+            <a:endParaRPr lang="en-US" altLang="ko-KR" dirty="0"/>
+          </a:p>
+          <a:p>
+            <a:pPr marL="454914" lvl="1" indent="0">
+              <a:buNone/>
+            </a:pPr>
+            <a:endParaRPr lang="en-US" altLang="ko-KR" dirty="0" smtClean="0"/>
+          </a:p>
+          <a:p>
+            <a:endParaRPr lang="en-US" altLang="ko-KR" dirty="0"/>
+          </a:p>
+          <a:p>
+            <a:endParaRPr lang="en-US" altLang="ko-KR" dirty="0" smtClean="0"/>
+          </a:p>
+          <a:p>
+            <a:endParaRPr lang="en-US" altLang="ko-KR" dirty="0"/>
+          </a:p>
+          <a:p>
+            <a:endParaRPr lang="en-US" altLang="ko-KR" dirty="0" smtClean="0"/>
+          </a:p>
+          <a:p>
+            <a:endParaRPr lang="en-US" altLang="ko-KR" dirty="0"/>
+          </a:p>
+        </p:txBody>
+      </p:sp>
+      <p:pic>
+        <p:nvPicPr>
+          <p:cNvPr id="5" name="그림 4"/>
+          <p:cNvPicPr>
+            <a:picLocks noChangeAspect="1"/>
+          </p:cNvPicPr>
+          <p:nvPr/>
+        </p:nvPicPr>
+        <p:blipFill>
+          <a:blip r:embed="rId2"/>
+          <a:stretch>
+            <a:fillRect/>
+          </a:stretch>
+        </p:blipFill>
+        <p:spPr>
+          <a:xfrm>
+            <a:off x="2267744" y="1196752"/>
+            <a:ext cx="6468689" cy="5645145"/>
+          </a:xfrm>
+          <a:prstGeom prst="rect">
+            <a:avLst/>
+          </a:prstGeom>
+        </p:spPr>
+      </p:pic>
+    </p:spTree>
+    <p:extLst>
+      <p:ext uri="{BB962C8B-B14F-4D97-AF65-F5344CB8AC3E}">
+        <p14:creationId xmlns:p14="http://schemas.microsoft.com/office/powerpoint/2010/main" val="3132518845"/>
+      </p:ext>
+    </p:extLst>
+  </p:cSld>
+  <p:clrMapOvr>
+    <a:masterClrMapping/>
+  </p:clrMapOvr>
+</p:sld>
+</file>
+
+<file path=ppt/slides/slide75.xml><?xml version="1.0" encoding="utf-8"?>
+<p:sld xmlns:a="http://schemas.openxmlformats.org/drawingml/2006/main" xmlns:r="http://schemas.openxmlformats.org/officeDocument/2006/relationships" xmlns:p="http://schemas.openxmlformats.org/presentationml/2006/main">
+  <p:cSld>
+    <p:spTree>
+      <p:nvGrpSpPr>
+        <p:cNvPr id="1" name=""/>
+        <p:cNvGrpSpPr/>
+        <p:nvPr/>
+      </p:nvGrpSpPr>
+      <p:grpSpPr>
+        <a:xfrm>
+          <a:off x="0" y="0"/>
+          <a:ext cx="0" cy="0"/>
+          <a:chOff x="0" y="0"/>
+          <a:chExt cx="0" cy="0"/>
+        </a:xfrm>
+      </p:grpSpPr>
+      <p:sp>
+        <p:nvSpPr>
+          <p:cNvPr id="2" name="제목 1"/>
+          <p:cNvSpPr>
+            <a:spLocks noGrp="1"/>
+          </p:cNvSpPr>
+          <p:nvPr>
+            <p:ph type="title"/>
+          </p:nvPr>
+        </p:nvSpPr>
+        <p:spPr/>
+        <p:txBody>
+          <a:bodyPr/>
+          <a:lstStyle/>
+          <a:p>
+            <a:r>
+              <a:rPr lang="ko-KR" altLang="en-US" dirty="0" smtClean="0"/>
+              <a:t>구조체와 클래스</a:t>
+            </a:r>
+            <a:endParaRPr lang="ko-KR" altLang="en-US" dirty="0"/>
+          </a:p>
+        </p:txBody>
+      </p:sp>
+      <p:sp>
+        <p:nvSpPr>
+          <p:cNvPr id="3" name="내용 개체 틀 2"/>
+          <p:cNvSpPr>
+            <a:spLocks noGrp="1"/>
+          </p:cNvSpPr>
+          <p:nvPr>
+            <p:ph idx="1"/>
+          </p:nvPr>
+        </p:nvSpPr>
+        <p:spPr/>
+        <p:txBody>
+          <a:bodyPr>
+            <a:normAutofit/>
+          </a:bodyPr>
+          <a:lstStyle/>
+          <a:p>
+            <a:r>
+              <a:rPr lang="ko-KR" altLang="en-US" dirty="0" smtClean="0"/>
+              <a:t>식별 연산자 </a:t>
+            </a:r>
+            <a:r>
+              <a:rPr lang="en-US" altLang="ko-KR" dirty="0" smtClean="0"/>
+              <a:t>(===, !==)</a:t>
+            </a:r>
+          </a:p>
+          <a:p>
+            <a:pPr lvl="1"/>
+            <a:r>
+              <a:rPr lang="ko-KR" altLang="en-US" dirty="0" smtClean="0"/>
+              <a:t>클래스의 인스턴스가 같은 </a:t>
+            </a:r>
+            <a:r>
+              <a:rPr lang="ko-KR" altLang="en-US" dirty="0" err="1" smtClean="0"/>
+              <a:t>참조값을</a:t>
+            </a:r>
+            <a:r>
+              <a:rPr lang="ko-KR" altLang="en-US" dirty="0" smtClean="0"/>
+              <a:t> 갖는지</a:t>
+            </a:r>
+            <a:r>
+              <a:rPr lang="en-US" altLang="ko-KR" dirty="0"/>
+              <a:t> </a:t>
+            </a:r>
+            <a:r>
+              <a:rPr lang="ko-KR" altLang="en-US" dirty="0" smtClean="0"/>
+              <a:t>확인할 수 있다</a:t>
+            </a:r>
+            <a:r>
+              <a:rPr lang="en-US" altLang="ko-KR" dirty="0" smtClean="0"/>
+              <a:t>.</a:t>
+            </a:r>
+          </a:p>
+          <a:p>
+            <a:pPr marL="454914" lvl="1" indent="0">
+              <a:buNone/>
+            </a:pPr>
+            <a:endParaRPr lang="en-US" altLang="ko-KR" dirty="0" smtClean="0"/>
+          </a:p>
+          <a:p>
+            <a:endParaRPr lang="en-US" altLang="ko-KR" dirty="0"/>
+          </a:p>
+          <a:p>
+            <a:endParaRPr lang="en-US" altLang="ko-KR" dirty="0" smtClean="0"/>
+          </a:p>
+          <a:p>
+            <a:endParaRPr lang="en-US" altLang="ko-KR" dirty="0"/>
+          </a:p>
+          <a:p>
+            <a:pPr marL="454914" lvl="1" indent="0">
+              <a:buNone/>
+            </a:pPr>
+            <a:endParaRPr lang="en-US" altLang="ko-KR" dirty="0" smtClean="0"/>
+          </a:p>
+          <a:p>
+            <a:endParaRPr lang="en-US" altLang="ko-KR" dirty="0"/>
+          </a:p>
+          <a:p>
+            <a:endParaRPr lang="en-US" altLang="ko-KR" dirty="0" smtClean="0"/>
+          </a:p>
+          <a:p>
+            <a:endParaRPr lang="en-US" altLang="ko-KR" dirty="0"/>
+          </a:p>
+          <a:p>
+            <a:endParaRPr lang="en-US" altLang="ko-KR" dirty="0" smtClean="0"/>
+          </a:p>
+          <a:p>
+            <a:endParaRPr lang="en-US" altLang="ko-KR" dirty="0"/>
+          </a:p>
+        </p:txBody>
+      </p:sp>
+      <p:sp>
+        <p:nvSpPr>
+          <p:cNvPr id="5" name="TextBox 4"/>
+          <p:cNvSpPr txBox="1"/>
+          <p:nvPr/>
+        </p:nvSpPr>
+        <p:spPr>
+          <a:xfrm>
+            <a:off x="1619672" y="1656566"/>
+            <a:ext cx="7272808" cy="1754326"/>
+          </a:xfrm>
+          <a:prstGeom prst="rect">
+            <a:avLst/>
+          </a:prstGeom>
+          <a:noFill/>
+        </p:spPr>
+        <p:txBody>
+          <a:bodyPr wrap="square" rtlCol="0">
+            <a:spAutoFit/>
+          </a:bodyPr>
+          <a:lstStyle/>
+          <a:p>
+            <a:r>
+              <a:rPr lang="en-US" altLang="ko-KR" dirty="0" err="1" smtClean="0"/>
+              <a:t>var</a:t>
+            </a:r>
+            <a:r>
+              <a:rPr lang="en-US" altLang="ko-KR" dirty="0" smtClean="0"/>
+              <a:t> </a:t>
+            </a:r>
+            <a:r>
+              <a:rPr lang="en-US" altLang="ko-KR" dirty="0" smtClean="0">
+                <a:solidFill>
+                  <a:schemeClr val="accent3"/>
+                </a:solidFill>
+              </a:rPr>
+              <a:t>bob</a:t>
+            </a:r>
+            <a:r>
+              <a:rPr lang="en-US" altLang="ko-KR" dirty="0" smtClean="0"/>
+              <a:t>: Person = Person()</a:t>
+            </a:r>
+          </a:p>
+          <a:p>
+            <a:r>
+              <a:rPr lang="en-US" altLang="ko-KR" dirty="0" smtClean="0"/>
+              <a:t>let </a:t>
+            </a:r>
+            <a:r>
+              <a:rPr lang="en-US" altLang="ko-KR" dirty="0" smtClean="0">
+                <a:solidFill>
+                  <a:schemeClr val="accent3"/>
+                </a:solidFill>
+              </a:rPr>
+              <a:t>friend</a:t>
+            </a:r>
+            <a:r>
+              <a:rPr lang="en-US" altLang="ko-KR" dirty="0" smtClean="0"/>
+              <a:t>: Person = bob</a:t>
+            </a:r>
+          </a:p>
+          <a:p>
+            <a:r>
+              <a:rPr lang="en-US" altLang="ko-KR" dirty="0" smtClean="0"/>
+              <a:t>let </a:t>
+            </a:r>
+            <a:r>
+              <a:rPr lang="en-US" altLang="ko-KR" dirty="0" err="1" smtClean="0">
+                <a:solidFill>
+                  <a:schemeClr val="accent3"/>
+                </a:solidFill>
+              </a:rPr>
+              <a:t>anotherFriend</a:t>
+            </a:r>
+            <a:r>
+              <a:rPr lang="en-US" altLang="ko-KR" dirty="0" smtClean="0"/>
+              <a:t>: Person = Person()</a:t>
+            </a:r>
+          </a:p>
+          <a:p>
+            <a:endParaRPr lang="en-US" altLang="ko-KR" dirty="0"/>
+          </a:p>
+          <a:p>
+            <a:r>
+              <a:rPr lang="en-US" altLang="ko-KR" dirty="0" smtClean="0"/>
+              <a:t>print(bob === friend)	// true</a:t>
+            </a:r>
+          </a:p>
+          <a:p>
+            <a:r>
+              <a:rPr lang="en-US" altLang="ko-KR" dirty="0" smtClean="0"/>
+              <a:t>print(bob === </a:t>
+            </a:r>
+            <a:r>
+              <a:rPr lang="en-US" altLang="ko-KR" dirty="0" err="1" smtClean="0"/>
+              <a:t>anotherFirend</a:t>
+            </a:r>
+            <a:r>
+              <a:rPr lang="en-US" altLang="ko-KR" dirty="0" smtClean="0"/>
+              <a:t>)	// false</a:t>
+            </a:r>
+            <a:endParaRPr lang="ko-KR" altLang="en-US" dirty="0"/>
+          </a:p>
+        </p:txBody>
+      </p:sp>
+      <p:pic>
+        <p:nvPicPr>
+          <p:cNvPr id="6" name="그림 5"/>
+          <p:cNvPicPr>
+            <a:picLocks noChangeAspect="1"/>
+          </p:cNvPicPr>
+          <p:nvPr/>
+        </p:nvPicPr>
+        <p:blipFill>
+          <a:blip r:embed="rId2"/>
+          <a:stretch>
+            <a:fillRect/>
+          </a:stretch>
+        </p:blipFill>
+        <p:spPr>
+          <a:xfrm>
+            <a:off x="409575" y="4255070"/>
+            <a:ext cx="8734425" cy="2590800"/>
+          </a:xfrm>
+          <a:prstGeom prst="rect">
+            <a:avLst/>
+          </a:prstGeom>
+        </p:spPr>
+      </p:pic>
+    </p:spTree>
+    <p:extLst>
+      <p:ext uri="{BB962C8B-B14F-4D97-AF65-F5344CB8AC3E}">
+        <p14:creationId xmlns:p14="http://schemas.microsoft.com/office/powerpoint/2010/main" val="440137252"/>
+      </p:ext>
+    </p:extLst>
+  </p:cSld>
+  <p:clrMapOvr>
+    <a:masterClrMapping/>
+  </p:clrMapOvr>
 </p:sld>
 </file>
 
@@ -41994,14 +45923,14 @@
                 <a:gridCol w="1440160">
                   <a:extLst>
                     <a:ext uri="{9D8B030D-6E8A-4147-A177-3AD203B41FA5}">
-                      <a16:colId xmlns:a16="http://schemas.microsoft.com/office/drawing/2014/main" xmlns="" val="20000"/>
+                      <a16:colId xmlns:a16="http://schemas.microsoft.com/office/drawing/2014/main" val="20000"/>
                     </a:ext>
                   </a:extLst>
                 </a:gridCol>
                 <a:gridCol w="1440160">
                   <a:extLst>
                     <a:ext uri="{9D8B030D-6E8A-4147-A177-3AD203B41FA5}">
-                      <a16:colId xmlns:a16="http://schemas.microsoft.com/office/drawing/2014/main" xmlns="" val="20001"/>
+                      <a16:colId xmlns:a16="http://schemas.microsoft.com/office/drawing/2014/main" val="20001"/>
                     </a:ext>
                   </a:extLst>
                 </a:gridCol>
@@ -42055,7 +45984,7 @@
                 </a:tc>
                 <a:extLst>
                   <a:ext uri="{0D108BD9-81ED-4DB2-BD59-A6C34878D82A}">
-                    <a16:rowId xmlns:a16="http://schemas.microsoft.com/office/drawing/2014/main" xmlns="" val="10000"/>
+                    <a16:rowId xmlns:a16="http://schemas.microsoft.com/office/drawing/2014/main" val="10000"/>
                   </a:ext>
                 </a:extLst>
               </a:tr>
@@ -42130,7 +46059,7 @@
                 </a:tc>
                 <a:extLst>
                   <a:ext uri="{0D108BD9-81ED-4DB2-BD59-A6C34878D82A}">
-                    <a16:rowId xmlns:a16="http://schemas.microsoft.com/office/drawing/2014/main" xmlns="" val="10001"/>
+                    <a16:rowId xmlns:a16="http://schemas.microsoft.com/office/drawing/2014/main" val="10001"/>
                   </a:ext>
                 </a:extLst>
               </a:tr>
@@ -42205,7 +46134,7 @@
                 </a:tc>
                 <a:extLst>
                   <a:ext uri="{0D108BD9-81ED-4DB2-BD59-A6C34878D82A}">
-                    <a16:rowId xmlns:a16="http://schemas.microsoft.com/office/drawing/2014/main" xmlns="" val="10002"/>
+                    <a16:rowId xmlns:a16="http://schemas.microsoft.com/office/drawing/2014/main" val="10002"/>
                   </a:ext>
                 </a:extLst>
               </a:tr>
@@ -42280,7 +46209,7 @@
                 </a:tc>
                 <a:extLst>
                   <a:ext uri="{0D108BD9-81ED-4DB2-BD59-A6C34878D82A}">
-                    <a16:rowId xmlns:a16="http://schemas.microsoft.com/office/drawing/2014/main" xmlns="" val="10003"/>
+                    <a16:rowId xmlns:a16="http://schemas.microsoft.com/office/drawing/2014/main" val="10003"/>
                   </a:ext>
                 </a:extLst>
               </a:tr>
@@ -42355,7 +46284,7 @@
                 </a:tc>
                 <a:extLst>
                   <a:ext uri="{0D108BD9-81ED-4DB2-BD59-A6C34878D82A}">
-                    <a16:rowId xmlns:a16="http://schemas.microsoft.com/office/drawing/2014/main" xmlns="" val="10004"/>
+                    <a16:rowId xmlns:a16="http://schemas.microsoft.com/office/drawing/2014/main" val="10004"/>
                   </a:ext>
                 </a:extLst>
               </a:tr>
@@ -42781,14 +46710,14 @@
                 <a:gridCol w="1440160">
                   <a:extLst>
                     <a:ext uri="{9D8B030D-6E8A-4147-A177-3AD203B41FA5}">
-                      <a16:colId xmlns:a16="http://schemas.microsoft.com/office/drawing/2014/main" xmlns="" val="20000"/>
+                      <a16:colId xmlns:a16="http://schemas.microsoft.com/office/drawing/2014/main" val="20000"/>
                     </a:ext>
                   </a:extLst>
                 </a:gridCol>
                 <a:gridCol w="1440160">
                   <a:extLst>
                     <a:ext uri="{9D8B030D-6E8A-4147-A177-3AD203B41FA5}">
-                      <a16:colId xmlns:a16="http://schemas.microsoft.com/office/drawing/2014/main" xmlns="" val="20001"/>
+                      <a16:colId xmlns:a16="http://schemas.microsoft.com/office/drawing/2014/main" val="20001"/>
                     </a:ext>
                   </a:extLst>
                 </a:gridCol>
@@ -42842,7 +46771,7 @@
                 </a:tc>
                 <a:extLst>
                   <a:ext uri="{0D108BD9-81ED-4DB2-BD59-A6C34878D82A}">
-                    <a16:rowId xmlns:a16="http://schemas.microsoft.com/office/drawing/2014/main" xmlns="" val="10000"/>
+                    <a16:rowId xmlns:a16="http://schemas.microsoft.com/office/drawing/2014/main" val="10000"/>
                   </a:ext>
                 </a:extLst>
               </a:tr>
@@ -42907,7 +46836,7 @@
                 </a:tc>
                 <a:extLst>
                   <a:ext uri="{0D108BD9-81ED-4DB2-BD59-A6C34878D82A}">
-                    <a16:rowId xmlns:a16="http://schemas.microsoft.com/office/drawing/2014/main" xmlns="" val="10001"/>
+                    <a16:rowId xmlns:a16="http://schemas.microsoft.com/office/drawing/2014/main" val="10001"/>
                   </a:ext>
                 </a:extLst>
               </a:tr>
@@ -42972,7 +46901,7 @@
                 </a:tc>
                 <a:extLst>
                   <a:ext uri="{0D108BD9-81ED-4DB2-BD59-A6C34878D82A}">
-                    <a16:rowId xmlns:a16="http://schemas.microsoft.com/office/drawing/2014/main" xmlns="" val="10002"/>
+                    <a16:rowId xmlns:a16="http://schemas.microsoft.com/office/drawing/2014/main" val="10002"/>
                   </a:ext>
                 </a:extLst>
               </a:tr>

</xml_diff>